<commit_message>
ppt slides 1-3 updated
</commit_message>
<xml_diff>
--- a/MMS_2024_09_10/Farkas_2024_09_10.pptx
+++ b/MMS_2024_09_10/Farkas_2024_09_10.pptx
@@ -5,11 +5,9 @@
     <p:sldMasterId id="2147483648" r:id="rId1"/>
   </p:sldMasterIdLst>
   <p:sldIdLst>
-    <p:sldId id="256" r:id="rId2"/>
-    <p:sldId id="257" r:id="rId3"/>
-    <p:sldId id="258" r:id="rId4"/>
-    <p:sldId id="259" r:id="rId5"/>
-    <p:sldId id="260" r:id="rId6"/>
+    <p:sldId id="258" r:id="rId2"/>
+    <p:sldId id="259" r:id="rId3"/>
+    <p:sldId id="260" r:id="rId4"/>
   </p:sldIdLst>
   <p:sldSz cx="12192000" cy="6858000"/>
   <p:notesSz cx="6858000" cy="9144000"/>
@@ -108,6 +106,11 @@
       </a:defRPr>
     </a:lvl9pPr>
   </p:defaultTextStyle>
+  <p:extLst>
+    <p:ext uri="{EFAFB233-063F-42B5-8137-9DF3F51BA10A}">
+      <p15:sldGuideLst xmlns:p15="http://schemas.microsoft.com/office/powerpoint/2012/main"/>
+    </p:ext>
+  </p:extLst>
 </p:presentation>
 </file>
 
@@ -290,7 +293,7 @@
           <a:p>
             <a:fld id="{0163D073-7F8B-4D43-A6FF-3B651CD8FEF9}" type="datetimeFigureOut">
               <a:rPr lang="en-US" smtClean="0"/>
-              <a:t>7/16/2024</a:t>
+              <a:t>7/17/2024</a:t>
             </a:fld>
             <a:endParaRPr lang="en-US"/>
           </a:p>
@@ -528,7 +531,7 @@
           <a:p>
             <a:fld id="{0163D073-7F8B-4D43-A6FF-3B651CD8FEF9}" type="datetimeFigureOut">
               <a:rPr lang="en-US" smtClean="0"/>
-              <a:t>7/16/2024</a:t>
+              <a:t>7/17/2024</a:t>
             </a:fld>
             <a:endParaRPr lang="en-US"/>
           </a:p>
@@ -766,7 +769,7 @@
           <a:p>
             <a:fld id="{0163D073-7F8B-4D43-A6FF-3B651CD8FEF9}" type="datetimeFigureOut">
               <a:rPr lang="en-US" smtClean="0"/>
-              <a:t>7/16/2024</a:t>
+              <a:t>7/17/2024</a:t>
             </a:fld>
             <a:endParaRPr lang="en-US"/>
           </a:p>
@@ -1071,7 +1074,7 @@
           <a:p>
             <a:fld id="{0163D073-7F8B-4D43-A6FF-3B651CD8FEF9}" type="datetimeFigureOut">
               <a:rPr lang="en-US" smtClean="0"/>
-              <a:t>7/16/2024</a:t>
+              <a:t>7/17/2024</a:t>
             </a:fld>
             <a:endParaRPr lang="en-US"/>
           </a:p>
@@ -1374,7 +1377,7 @@
           <a:p>
             <a:fld id="{0163D073-7F8B-4D43-A6FF-3B651CD8FEF9}" type="datetimeFigureOut">
               <a:rPr lang="en-US" smtClean="0"/>
-              <a:t>7/16/2024</a:t>
+              <a:t>7/17/2024</a:t>
             </a:fld>
             <a:endParaRPr lang="en-US"/>
           </a:p>
@@ -1825,7 +1828,7 @@
           <a:p>
             <a:fld id="{0163D073-7F8B-4D43-A6FF-3B651CD8FEF9}" type="datetimeFigureOut">
               <a:rPr lang="en-US" smtClean="0"/>
-              <a:t>7/16/2024</a:t>
+              <a:t>7/17/2024</a:t>
             </a:fld>
             <a:endParaRPr lang="en-US"/>
           </a:p>
@@ -1998,7 +2001,7 @@
           <a:p>
             <a:fld id="{0163D073-7F8B-4D43-A6FF-3B651CD8FEF9}" type="datetimeFigureOut">
               <a:rPr lang="en-US" smtClean="0"/>
-              <a:t>7/16/2024</a:t>
+              <a:t>7/17/2024</a:t>
             </a:fld>
             <a:endParaRPr lang="en-US"/>
           </a:p>
@@ -2135,7 +2138,7 @@
           <a:p>
             <a:fld id="{0163D073-7F8B-4D43-A6FF-3B651CD8FEF9}" type="datetimeFigureOut">
               <a:rPr lang="en-US" smtClean="0"/>
-              <a:t>7/16/2024</a:t>
+              <a:t>7/17/2024</a:t>
             </a:fld>
             <a:endParaRPr lang="en-US"/>
           </a:p>
@@ -2479,7 +2482,7 @@
           <a:p>
             <a:fld id="{0163D073-7F8B-4D43-A6FF-3B651CD8FEF9}" type="datetimeFigureOut">
               <a:rPr lang="en-US" smtClean="0"/>
-              <a:t>7/16/2024</a:t>
+              <a:t>7/17/2024</a:t>
             </a:fld>
             <a:endParaRPr lang="en-US"/>
           </a:p>
@@ -2800,7 +2803,7 @@
           <a:p>
             <a:fld id="{0163D073-7F8B-4D43-A6FF-3B651CD8FEF9}" type="datetimeFigureOut">
               <a:rPr lang="en-US" smtClean="0"/>
-              <a:t>7/16/2024</a:t>
+              <a:t>7/17/2024</a:t>
             </a:fld>
             <a:endParaRPr lang="en-US"/>
           </a:p>
@@ -3049,7 +3052,55 @@
                   <a:schemeClr val="bg1"/>
                 </a:solidFill>
               </a:rPr>
-              <a:t>BME Mathematical Modeling Seminar                                                                                                                                                       Sep/10, 2024</a:t>
+              <a:t>BME Mathematical Modeling Seminar                                                                                                                                                      </a:t>
+            </a:r>
+            <a:r>
+              <a:rPr lang="hu-HU" dirty="0">
+                <a:solidFill>
+                  <a:schemeClr val="bg1"/>
+                </a:solidFill>
+              </a:rPr>
+              <a:t> </a:t>
+            </a:r>
+            <a:r>
+              <a:rPr lang="en-US" dirty="0">
+                <a:solidFill>
+                  <a:schemeClr val="bg1"/>
+                </a:solidFill>
+              </a:rPr>
+              <a:t>Sep</a:t>
+            </a:r>
+            <a:r>
+              <a:rPr lang="hu-HU" dirty="0">
+                <a:solidFill>
+                  <a:schemeClr val="bg1"/>
+                </a:solidFill>
+              </a:rPr>
+              <a:t>-</a:t>
+            </a:r>
+            <a:r>
+              <a:rPr lang="en-US" dirty="0">
+                <a:solidFill>
+                  <a:schemeClr val="bg1"/>
+                </a:solidFill>
+              </a:rPr>
+              <a:t>10</a:t>
+            </a:r>
+            <a:r>
+              <a:rPr lang="hu-HU" dirty="0">
+                <a:solidFill>
+                  <a:schemeClr val="bg1"/>
+                </a:solidFill>
+              </a:rPr>
+              <a:t>, </a:t>
+            </a:r>
+            <a:r>
+              <a:rPr lang="en-US" dirty="0">
+                <a:solidFill>
+                  <a:schemeClr val="bg1"/>
+                </a:solidFill>
+              </a:rPr>
+              <a:t>2024</a:t>
             </a:r>
           </a:p>
         </p:txBody>
@@ -3485,10 +3536,46 @@
           </a:p>
         </p:txBody>
       </p:sp>
+      <p:sp>
+        <p:nvSpPr>
+          <p:cNvPr id="2" name="TextBox 1">
+            <a:extLst>
+              <a:ext uri="{FF2B5EF4-FFF2-40B4-BE49-F238E27FC236}">
+                <a16:creationId xmlns:a16="http://schemas.microsoft.com/office/drawing/2014/main" id="{632C3D97-C308-DE22-0F53-98586ABF1575}"/>
+              </a:ext>
+            </a:extLst>
+          </p:cNvPr>
+          <p:cNvSpPr txBox="1"/>
+          <p:nvPr/>
+        </p:nvSpPr>
+        <p:spPr>
+          <a:xfrm>
+            <a:off x="4461638" y="4906501"/>
+            <a:ext cx="3289737" cy="400110"/>
+          </a:xfrm>
+          <a:prstGeom prst="rect">
+            <a:avLst/>
+          </a:prstGeom>
+          <a:noFill/>
+        </p:spPr>
+        <p:txBody>
+          <a:bodyPr wrap="square" rtlCol="0">
+            <a:spAutoFit/>
+          </a:bodyPr>
+          <a:lstStyle/>
+          <a:p>
+            <a:pPr algn="ctr"/>
+            <a:r>
+              <a:rPr lang="en-US" sz="2000" i="1" dirty="0"/>
+              <a:t>Source: BMETE15MF78</a:t>
+            </a:r>
+          </a:p>
+        </p:txBody>
+      </p:sp>
     </p:spTree>
     <p:extLst>
       <p:ext uri="{BB962C8B-B14F-4D97-AF65-F5344CB8AC3E}">
-        <p14:creationId xmlns:p14="http://schemas.microsoft.com/office/powerpoint/2010/main" val="1502271539"/>
+        <p14:creationId xmlns:p14="http://schemas.microsoft.com/office/powerpoint/2010/main" val="2512097233"/>
       </p:ext>
     </p:extLst>
   </p:cSld>
@@ -3517,10 +3604,10 @@
       </p:grpSpPr>
       <p:sp>
         <p:nvSpPr>
-          <p:cNvPr id="7" name="TextBox 6">
-            <a:extLst>
-              <a:ext uri="{FF2B5EF4-FFF2-40B4-BE49-F238E27FC236}">
-                <a16:creationId xmlns:a16="http://schemas.microsoft.com/office/drawing/2014/main" id="{15AC98AD-93EB-1FC4-CCAE-A24A07B5ED9D}"/>
+          <p:cNvPr id="8" name="TextBox 7">
+            <a:extLst>
+              <a:ext uri="{FF2B5EF4-FFF2-40B4-BE49-F238E27FC236}">
+                <a16:creationId xmlns:a16="http://schemas.microsoft.com/office/drawing/2014/main" id="{12B97E98-1D37-81AE-7102-185720B74B78}"/>
               </a:ext>
             </a:extLst>
           </p:cNvPr>
@@ -3529,8 +3616,8 @@
         </p:nvSpPr>
         <p:spPr>
           <a:xfrm>
-            <a:off x="3584027" y="1846565"/>
-            <a:ext cx="5023945" cy="1938992"/>
+            <a:off x="105100" y="156234"/>
+            <a:ext cx="12002814" cy="369332"/>
           </a:xfrm>
           <a:prstGeom prst="rect">
             <a:avLst/>
@@ -3543,498 +3630,19 @@
           </a:bodyPr>
           <a:lstStyle/>
           <a:p>
-            <a:pPr algn="ctr"/>
-            <a:r>
-              <a:rPr lang="en-US" sz="2400" b="1" dirty="0">
-                <a:solidFill>
-                  <a:srgbClr val="C00000"/>
-                </a:solidFill>
-              </a:rPr>
-              <a:t>Modern</a:t>
-            </a:r>
-            <a:r>
-              <a:rPr lang="en-US" sz="2400" b="1" dirty="0"/>
-              <a:t> Portfolio Theory</a:t>
-            </a:r>
-          </a:p>
-          <a:p>
-            <a:pPr algn="ctr"/>
-            <a:endParaRPr lang="en-US" sz="2400" b="1" dirty="0"/>
-          </a:p>
-          <a:p>
-            <a:pPr algn="ctr"/>
-            <a:r>
-              <a:rPr lang="en-US" sz="2400" b="1" dirty="0"/>
-              <a:t>&amp;</a:t>
-            </a:r>
-          </a:p>
-          <a:p>
-            <a:pPr algn="ctr"/>
-            <a:endParaRPr lang="en-US" sz="2400" b="1" dirty="0"/>
-          </a:p>
-          <a:p>
-            <a:pPr algn="ctr"/>
-            <a:r>
-              <a:rPr lang="en-US" sz="2400" b="1" dirty="0"/>
-              <a:t>Capital Asset Pricing Model</a:t>
-            </a:r>
-          </a:p>
-        </p:txBody>
-      </p:sp>
-      <p:sp>
-        <p:nvSpPr>
-          <p:cNvPr id="8" name="TextBox 7">
-            <a:extLst>
-              <a:ext uri="{FF2B5EF4-FFF2-40B4-BE49-F238E27FC236}">
-                <a16:creationId xmlns:a16="http://schemas.microsoft.com/office/drawing/2014/main" id="{12B97E98-1D37-81AE-7102-185720B74B78}"/>
-              </a:ext>
-            </a:extLst>
-          </p:cNvPr>
-          <p:cNvSpPr txBox="1"/>
-          <p:nvPr/>
-        </p:nvSpPr>
-        <p:spPr>
-          <a:xfrm>
-            <a:off x="105100" y="156234"/>
-            <a:ext cx="12002814" cy="369332"/>
-          </a:xfrm>
-          <a:prstGeom prst="rect">
-            <a:avLst/>
-          </a:prstGeom>
-          <a:noFill/>
-        </p:spPr>
-        <p:txBody>
-          <a:bodyPr wrap="square" rtlCol="0">
-            <a:spAutoFit/>
-          </a:bodyPr>
-          <a:lstStyle/>
-          <a:p>
-            <a:r>
-              <a:rPr lang="en-US" dirty="0">
-                <a:solidFill>
-                  <a:schemeClr val="bg1"/>
-                </a:solidFill>
-              </a:rPr>
-              <a:t>Farkas Ill</a:t>
-            </a:r>
             <a:r>
               <a:rPr lang="hu-HU" dirty="0">
                 <a:solidFill>
                   <a:schemeClr val="bg1"/>
                 </a:solidFill>
               </a:rPr>
-              <a:t>és										Citibank HU MQA</a:t>
+              <a:t>Intro</a:t>
             </a:r>
             <a:endParaRPr lang="en-US" dirty="0">
               <a:solidFill>
                 <a:schemeClr val="bg1"/>
               </a:solidFill>
             </a:endParaRPr>
-          </a:p>
-        </p:txBody>
-      </p:sp>
-      <p:sp>
-        <p:nvSpPr>
-          <p:cNvPr id="10" name="TextBox 9">
-            <a:extLst>
-              <a:ext uri="{FF2B5EF4-FFF2-40B4-BE49-F238E27FC236}">
-                <a16:creationId xmlns:a16="http://schemas.microsoft.com/office/drawing/2014/main" id="{53AB0B18-E620-0E45-98FD-16C0C30BF7A2}"/>
-              </a:ext>
-            </a:extLst>
-          </p:cNvPr>
-          <p:cNvSpPr txBox="1"/>
-          <p:nvPr/>
-        </p:nvSpPr>
-        <p:spPr>
-          <a:xfrm>
-            <a:off x="2984937" y="1515302"/>
-            <a:ext cx="1881352" cy="400110"/>
-          </a:xfrm>
-          <a:prstGeom prst="rect">
-            <a:avLst/>
-          </a:prstGeom>
-          <a:noFill/>
-        </p:spPr>
-        <p:txBody>
-          <a:bodyPr wrap="square" rtlCol="0">
-            <a:spAutoFit/>
-          </a:bodyPr>
-          <a:lstStyle/>
-          <a:p>
-            <a:r>
-              <a:rPr lang="hu-HU" sz="2000" i="1" dirty="0">
-                <a:solidFill>
-                  <a:srgbClr val="C00000"/>
-                </a:solidFill>
-              </a:rPr>
-              <a:t>1960</a:t>
-            </a:r>
-            <a:r>
-              <a:rPr lang="en-US" altLang="zh-CN" sz="2000" i="1" dirty="0">
-                <a:solidFill>
-                  <a:srgbClr val="C00000"/>
-                </a:solidFill>
-              </a:rPr>
-              <a:t>s</a:t>
-            </a:r>
-            <a:r>
-              <a:rPr lang="hu-HU" sz="2000" i="1" dirty="0">
-                <a:solidFill>
-                  <a:srgbClr val="C00000"/>
-                </a:solidFill>
-              </a:rPr>
-              <a:t> </a:t>
-            </a:r>
-            <a:r>
-              <a:rPr lang="en-US" sz="2000" i="1" dirty="0">
-                <a:solidFill>
-                  <a:srgbClr val="C00000"/>
-                </a:solidFill>
-              </a:rPr>
-              <a:t>/ 19</a:t>
-            </a:r>
-            <a:r>
-              <a:rPr lang="hu-HU" sz="2000" i="1" dirty="0">
-                <a:solidFill>
-                  <a:srgbClr val="C00000"/>
-                </a:solidFill>
-              </a:rPr>
-              <a:t>70s</a:t>
-            </a:r>
-            <a:endParaRPr lang="en-US" sz="2000" i="1" dirty="0">
-              <a:solidFill>
-                <a:srgbClr val="C00000"/>
-              </a:solidFill>
-            </a:endParaRPr>
-          </a:p>
-        </p:txBody>
-      </p:sp>
-    </p:spTree>
-    <p:extLst>
-      <p:ext uri="{BB962C8B-B14F-4D97-AF65-F5344CB8AC3E}">
-        <p14:creationId xmlns:p14="http://schemas.microsoft.com/office/powerpoint/2010/main" val="3013584576"/>
-      </p:ext>
-    </p:extLst>
-  </p:cSld>
-  <p:clrMapOvr>
-    <a:masterClrMapping/>
-  </p:clrMapOvr>
-</p:sld>
-</file>
-
-<file path=ppt/slides/slide3.xml><?xml version="1.0" encoding="utf-8"?>
-<p:sld xmlns:a="http://schemas.openxmlformats.org/drawingml/2006/main" xmlns:r="http://schemas.openxmlformats.org/officeDocument/2006/relationships" xmlns:p="http://schemas.openxmlformats.org/presentationml/2006/main">
-  <p:cSld>
-    <p:spTree>
-      <p:nvGrpSpPr>
-        <p:cNvPr id="1" name=""/>
-        <p:cNvGrpSpPr/>
-        <p:nvPr/>
-      </p:nvGrpSpPr>
-      <p:grpSpPr>
-        <a:xfrm>
-          <a:off x="0" y="0"/>
-          <a:ext cx="0" cy="0"/>
-          <a:chOff x="0" y="0"/>
-          <a:chExt cx="0" cy="0"/>
-        </a:xfrm>
-      </p:grpSpPr>
-      <p:sp>
-        <p:nvSpPr>
-          <p:cNvPr id="7" name="TextBox 6">
-            <a:extLst>
-              <a:ext uri="{FF2B5EF4-FFF2-40B4-BE49-F238E27FC236}">
-                <a16:creationId xmlns:a16="http://schemas.microsoft.com/office/drawing/2014/main" id="{15AC98AD-93EB-1FC4-CCAE-A24A07B5ED9D}"/>
-              </a:ext>
-            </a:extLst>
-          </p:cNvPr>
-          <p:cNvSpPr txBox="1"/>
-          <p:nvPr/>
-        </p:nvSpPr>
-        <p:spPr>
-          <a:xfrm>
-            <a:off x="3584027" y="1846565"/>
-            <a:ext cx="5023945" cy="1938992"/>
-          </a:xfrm>
-          <a:prstGeom prst="rect">
-            <a:avLst/>
-          </a:prstGeom>
-          <a:noFill/>
-        </p:spPr>
-        <p:txBody>
-          <a:bodyPr wrap="square" rtlCol="0">
-            <a:spAutoFit/>
-          </a:bodyPr>
-          <a:lstStyle/>
-          <a:p>
-            <a:pPr algn="ctr"/>
-            <a:r>
-              <a:rPr lang="en-US" sz="2400" b="1" dirty="0">
-                <a:solidFill>
-                  <a:srgbClr val="C00000"/>
-                </a:solidFill>
-              </a:rPr>
-              <a:t>Modern</a:t>
-            </a:r>
-            <a:r>
-              <a:rPr lang="en-US" sz="2400" b="1" dirty="0"/>
-              <a:t> Portfolio Theory</a:t>
-            </a:r>
-          </a:p>
-          <a:p>
-            <a:pPr algn="ctr"/>
-            <a:endParaRPr lang="en-US" sz="2400" b="1" dirty="0"/>
-          </a:p>
-          <a:p>
-            <a:pPr algn="ctr"/>
-            <a:r>
-              <a:rPr lang="en-US" sz="2400" b="1" dirty="0"/>
-              <a:t>&amp;</a:t>
-            </a:r>
-          </a:p>
-          <a:p>
-            <a:pPr algn="ctr"/>
-            <a:endParaRPr lang="en-US" sz="2400" b="1" dirty="0"/>
-          </a:p>
-          <a:p>
-            <a:pPr algn="ctr"/>
-            <a:r>
-              <a:rPr lang="en-US" sz="2400" b="1" dirty="0"/>
-              <a:t>Capital Asset Pricing Model</a:t>
-            </a:r>
-          </a:p>
-        </p:txBody>
-      </p:sp>
-      <p:sp>
-        <p:nvSpPr>
-          <p:cNvPr id="8" name="TextBox 7">
-            <a:extLst>
-              <a:ext uri="{FF2B5EF4-FFF2-40B4-BE49-F238E27FC236}">
-                <a16:creationId xmlns:a16="http://schemas.microsoft.com/office/drawing/2014/main" id="{12B97E98-1D37-81AE-7102-185720B74B78}"/>
-              </a:ext>
-            </a:extLst>
-          </p:cNvPr>
-          <p:cNvSpPr txBox="1"/>
-          <p:nvPr/>
-        </p:nvSpPr>
-        <p:spPr>
-          <a:xfrm>
-            <a:off x="105100" y="156234"/>
-            <a:ext cx="12002814" cy="369332"/>
-          </a:xfrm>
-          <a:prstGeom prst="rect">
-            <a:avLst/>
-          </a:prstGeom>
-          <a:noFill/>
-        </p:spPr>
-        <p:txBody>
-          <a:bodyPr wrap="square" rtlCol="0">
-            <a:spAutoFit/>
-          </a:bodyPr>
-          <a:lstStyle/>
-          <a:p>
-            <a:r>
-              <a:rPr lang="en-US" dirty="0">
-                <a:solidFill>
-                  <a:schemeClr val="bg1"/>
-                </a:solidFill>
-              </a:rPr>
-              <a:t>Farkas Ill</a:t>
-            </a:r>
-            <a:r>
-              <a:rPr lang="hu-HU" dirty="0">
-                <a:solidFill>
-                  <a:schemeClr val="bg1"/>
-                </a:solidFill>
-              </a:rPr>
-              <a:t>és										Citibank HU MQA</a:t>
-            </a:r>
-            <a:endParaRPr lang="en-US" dirty="0">
-              <a:solidFill>
-                <a:schemeClr val="bg1"/>
-              </a:solidFill>
-            </a:endParaRPr>
-          </a:p>
-        </p:txBody>
-      </p:sp>
-      <p:sp>
-        <p:nvSpPr>
-          <p:cNvPr id="10" name="TextBox 9">
-            <a:extLst>
-              <a:ext uri="{FF2B5EF4-FFF2-40B4-BE49-F238E27FC236}">
-                <a16:creationId xmlns:a16="http://schemas.microsoft.com/office/drawing/2014/main" id="{53AB0B18-E620-0E45-98FD-16C0C30BF7A2}"/>
-              </a:ext>
-            </a:extLst>
-          </p:cNvPr>
-          <p:cNvSpPr txBox="1"/>
-          <p:nvPr/>
-        </p:nvSpPr>
-        <p:spPr>
-          <a:xfrm>
-            <a:off x="2984937" y="1515302"/>
-            <a:ext cx="1881352" cy="400110"/>
-          </a:xfrm>
-          <a:prstGeom prst="rect">
-            <a:avLst/>
-          </a:prstGeom>
-          <a:noFill/>
-        </p:spPr>
-        <p:txBody>
-          <a:bodyPr wrap="square" rtlCol="0">
-            <a:spAutoFit/>
-          </a:bodyPr>
-          <a:lstStyle/>
-          <a:p>
-            <a:r>
-              <a:rPr lang="hu-HU" sz="2000" i="1" dirty="0">
-                <a:solidFill>
-                  <a:srgbClr val="C00000"/>
-                </a:solidFill>
-              </a:rPr>
-              <a:t>1960</a:t>
-            </a:r>
-            <a:r>
-              <a:rPr lang="en-US" altLang="zh-CN" sz="2000" i="1" dirty="0">
-                <a:solidFill>
-                  <a:srgbClr val="C00000"/>
-                </a:solidFill>
-              </a:rPr>
-              <a:t>s</a:t>
-            </a:r>
-            <a:r>
-              <a:rPr lang="hu-HU" sz="2000" i="1" dirty="0">
-                <a:solidFill>
-                  <a:srgbClr val="C00000"/>
-                </a:solidFill>
-              </a:rPr>
-              <a:t> </a:t>
-            </a:r>
-            <a:r>
-              <a:rPr lang="en-US" sz="2000" i="1" dirty="0">
-                <a:solidFill>
-                  <a:srgbClr val="C00000"/>
-                </a:solidFill>
-              </a:rPr>
-              <a:t>/ 19</a:t>
-            </a:r>
-            <a:r>
-              <a:rPr lang="hu-HU" sz="2000" i="1" dirty="0">
-                <a:solidFill>
-                  <a:srgbClr val="C00000"/>
-                </a:solidFill>
-              </a:rPr>
-              <a:t>70s</a:t>
-            </a:r>
-            <a:endParaRPr lang="en-US" sz="2000" i="1" dirty="0">
-              <a:solidFill>
-                <a:srgbClr val="C00000"/>
-              </a:solidFill>
-            </a:endParaRPr>
-          </a:p>
-        </p:txBody>
-      </p:sp>
-      <p:sp>
-        <p:nvSpPr>
-          <p:cNvPr id="2" name="TextBox 1">
-            <a:extLst>
-              <a:ext uri="{FF2B5EF4-FFF2-40B4-BE49-F238E27FC236}">
-                <a16:creationId xmlns:a16="http://schemas.microsoft.com/office/drawing/2014/main" id="{632C3D97-C308-DE22-0F53-98586ABF1575}"/>
-              </a:ext>
-            </a:extLst>
-          </p:cNvPr>
-          <p:cNvSpPr txBox="1"/>
-          <p:nvPr/>
-        </p:nvSpPr>
-        <p:spPr>
-          <a:xfrm>
-            <a:off x="4461638" y="4906501"/>
-            <a:ext cx="3289737" cy="400110"/>
-          </a:xfrm>
-          <a:prstGeom prst="rect">
-            <a:avLst/>
-          </a:prstGeom>
-          <a:noFill/>
-        </p:spPr>
-        <p:txBody>
-          <a:bodyPr wrap="square" rtlCol="0">
-            <a:spAutoFit/>
-          </a:bodyPr>
-          <a:lstStyle/>
-          <a:p>
-            <a:pPr algn="ctr"/>
-            <a:r>
-              <a:rPr lang="en-US" sz="2000" i="1" dirty="0"/>
-              <a:t>Source: BMETE15MF78</a:t>
-            </a:r>
-          </a:p>
-        </p:txBody>
-      </p:sp>
-    </p:spTree>
-    <p:extLst>
-      <p:ext uri="{BB962C8B-B14F-4D97-AF65-F5344CB8AC3E}">
-        <p14:creationId xmlns:p14="http://schemas.microsoft.com/office/powerpoint/2010/main" val="2512097233"/>
-      </p:ext>
-    </p:extLst>
-  </p:cSld>
-  <p:clrMapOvr>
-    <a:masterClrMapping/>
-  </p:clrMapOvr>
-</p:sld>
-</file>
-
-<file path=ppt/slides/slide4.xml><?xml version="1.0" encoding="utf-8"?>
-<p:sld xmlns:a="http://schemas.openxmlformats.org/drawingml/2006/main" xmlns:r="http://schemas.openxmlformats.org/officeDocument/2006/relationships" xmlns:p="http://schemas.openxmlformats.org/presentationml/2006/main">
-  <p:cSld>
-    <p:spTree>
-      <p:nvGrpSpPr>
-        <p:cNvPr id="1" name=""/>
-        <p:cNvGrpSpPr/>
-        <p:nvPr/>
-      </p:nvGrpSpPr>
-      <p:grpSpPr>
-        <a:xfrm>
-          <a:off x="0" y="0"/>
-          <a:ext cx="0" cy="0"/>
-          <a:chOff x="0" y="0"/>
-          <a:chExt cx="0" cy="0"/>
-        </a:xfrm>
-      </p:grpSpPr>
-      <p:sp>
-        <p:nvSpPr>
-          <p:cNvPr id="8" name="TextBox 7">
-            <a:extLst>
-              <a:ext uri="{FF2B5EF4-FFF2-40B4-BE49-F238E27FC236}">
-                <a16:creationId xmlns:a16="http://schemas.microsoft.com/office/drawing/2014/main" id="{12B97E98-1D37-81AE-7102-185720B74B78}"/>
-              </a:ext>
-            </a:extLst>
-          </p:cNvPr>
-          <p:cNvSpPr txBox="1"/>
-          <p:nvPr/>
-        </p:nvSpPr>
-        <p:spPr>
-          <a:xfrm>
-            <a:off x="105100" y="156234"/>
-            <a:ext cx="12002814" cy="369332"/>
-          </a:xfrm>
-          <a:prstGeom prst="rect">
-            <a:avLst/>
-          </a:prstGeom>
-          <a:noFill/>
-        </p:spPr>
-        <p:txBody>
-          <a:bodyPr wrap="square" rtlCol="0">
-            <a:spAutoFit/>
-          </a:bodyPr>
-          <a:lstStyle/>
-          <a:p>
-            <a:r>
-              <a:rPr lang="en-US" dirty="0">
-                <a:solidFill>
-                  <a:schemeClr val="bg1"/>
-                </a:solidFill>
-              </a:rPr>
-              <a:t>Topic</a:t>
-            </a:r>
           </a:p>
         </p:txBody>
       </p:sp>
@@ -4339,7 +3947,7 @@
 </p:sld>
 </file>
 
-<file path=ppt/slides/slide5.xml><?xml version="1.0" encoding="utf-8"?>
+<file path=ppt/slides/slide3.xml><?xml version="1.0" encoding="utf-8"?>
 <p:sld xmlns:a="http://schemas.openxmlformats.org/drawingml/2006/main" xmlns:r="http://schemas.openxmlformats.org/officeDocument/2006/relationships" xmlns:p="http://schemas.openxmlformats.org/presentationml/2006/main">
   <p:cSld>
     <p:spTree>
@@ -4358,10 +3966,10 @@
       </p:grpSpPr>
       <p:sp>
         <p:nvSpPr>
-          <p:cNvPr id="8" name="TextBox 7">
-            <a:extLst>
-              <a:ext uri="{FF2B5EF4-FFF2-40B4-BE49-F238E27FC236}">
-                <a16:creationId xmlns:a16="http://schemas.microsoft.com/office/drawing/2014/main" id="{12B97E98-1D37-81AE-7102-185720B74B78}"/>
+          <p:cNvPr id="3" name="TextBox 2">
+            <a:extLst>
+              <a:ext uri="{FF2B5EF4-FFF2-40B4-BE49-F238E27FC236}">
+                <a16:creationId xmlns:a16="http://schemas.microsoft.com/office/drawing/2014/main" id="{5BF1FBE9-6845-04B8-3738-90763B05AD50}"/>
               </a:ext>
             </a:extLst>
           </p:cNvPr>
@@ -4370,8 +3978,8 @@
         </p:nvSpPr>
         <p:spPr>
           <a:xfrm>
-            <a:off x="105100" y="156234"/>
-            <a:ext cx="12002814" cy="369332"/>
+            <a:off x="6316712" y="1602305"/>
+            <a:ext cx="4516387" cy="461665"/>
           </a:xfrm>
           <a:prstGeom prst="rect">
             <a:avLst/>
@@ -4385,365 +3993,353 @@
           <a:lstStyle/>
           <a:p>
             <a:r>
-              <a:rPr lang="en-US" dirty="0">
+              <a:rPr lang="en-US" sz="2400" dirty="0"/>
+              <a:t>2</a:t>
+            </a:r>
+            <a:r>
+              <a:rPr lang="hu-HU" sz="2400" dirty="0"/>
+              <a:t>4</a:t>
+            </a:r>
+            <a:r>
+              <a:rPr lang="en-US" sz="2400" dirty="0"/>
+              <a:t>0</a:t>
+            </a:r>
+            <a:r>
+              <a:rPr lang="hu-HU" sz="2400" dirty="0"/>
+              <a:t> 000 colleagues</a:t>
+            </a:r>
+            <a:r>
+              <a:rPr lang="en-US" sz="2400" dirty="0"/>
+              <a:t> globally</a:t>
+            </a:r>
+          </a:p>
+        </p:txBody>
+      </p:sp>
+      <p:sp>
+        <p:nvSpPr>
+          <p:cNvPr id="2" name="TextBox 1">
+            <a:extLst>
+              <a:ext uri="{FF2B5EF4-FFF2-40B4-BE49-F238E27FC236}">
+                <a16:creationId xmlns:a16="http://schemas.microsoft.com/office/drawing/2014/main" id="{02002A64-F599-BFAE-7FA0-842F396C21E9}"/>
+              </a:ext>
+            </a:extLst>
+          </p:cNvPr>
+          <p:cNvSpPr txBox="1"/>
+          <p:nvPr/>
+        </p:nvSpPr>
+        <p:spPr>
+          <a:xfrm>
+            <a:off x="625365" y="1602304"/>
+            <a:ext cx="804043" cy="461665"/>
+          </a:xfrm>
+          <a:prstGeom prst="rect">
+            <a:avLst/>
+          </a:prstGeom>
+          <a:noFill/>
+        </p:spPr>
+        <p:txBody>
+          <a:bodyPr wrap="square" rtlCol="0">
+            <a:spAutoFit/>
+          </a:bodyPr>
+          <a:lstStyle/>
+          <a:p>
+            <a:r>
+              <a:rPr lang="en-US" sz="2400" dirty="0"/>
+              <a:t>CEO</a:t>
+            </a:r>
+          </a:p>
+        </p:txBody>
+      </p:sp>
+      <p:sp>
+        <p:nvSpPr>
+          <p:cNvPr id="5" name="TextBox 4">
+            <a:extLst>
+              <a:ext uri="{FF2B5EF4-FFF2-40B4-BE49-F238E27FC236}">
+                <a16:creationId xmlns:a16="http://schemas.microsoft.com/office/drawing/2014/main" id="{7CC0E1A6-5864-175F-E223-C4DB6733E3AF}"/>
+              </a:ext>
+            </a:extLst>
+          </p:cNvPr>
+          <p:cNvSpPr txBox="1"/>
+          <p:nvPr/>
+        </p:nvSpPr>
+        <p:spPr>
+          <a:xfrm>
+            <a:off x="625365" y="2685214"/>
+            <a:ext cx="1389924" cy="830997"/>
+          </a:xfrm>
+          <a:prstGeom prst="rect">
+            <a:avLst/>
+          </a:prstGeom>
+          <a:noFill/>
+        </p:spPr>
+        <p:txBody>
+          <a:bodyPr wrap="square" rtlCol="0">
+            <a:spAutoFit/>
+          </a:bodyPr>
+          <a:lstStyle/>
+          <a:p>
+            <a:r>
+              <a:rPr lang="en-US" sz="2400" dirty="0"/>
+              <a:t>HU SSC</a:t>
+            </a:r>
+            <a:endParaRPr lang="hu-HU" sz="2400" dirty="0"/>
+          </a:p>
+          <a:p>
+            <a:r>
+              <a:rPr lang="en-US" sz="2400" dirty="0"/>
+              <a:t>Head</a:t>
+            </a:r>
+          </a:p>
+        </p:txBody>
+      </p:sp>
+      <p:sp>
+        <p:nvSpPr>
+          <p:cNvPr id="7" name="TextBox 6">
+            <a:extLst>
+              <a:ext uri="{FF2B5EF4-FFF2-40B4-BE49-F238E27FC236}">
+                <a16:creationId xmlns:a16="http://schemas.microsoft.com/office/drawing/2014/main" id="{FC8BE81A-C958-F19D-C633-58C1F5EFFE30}"/>
+              </a:ext>
+            </a:extLst>
+          </p:cNvPr>
+          <p:cNvSpPr txBox="1"/>
+          <p:nvPr/>
+        </p:nvSpPr>
+        <p:spPr>
+          <a:xfrm>
+            <a:off x="6341894" y="2690469"/>
+            <a:ext cx="2849411" cy="461665"/>
+          </a:xfrm>
+          <a:prstGeom prst="rect">
+            <a:avLst/>
+          </a:prstGeom>
+          <a:noFill/>
+        </p:spPr>
+        <p:txBody>
+          <a:bodyPr wrap="square" rtlCol="0">
+            <a:spAutoFit/>
+          </a:bodyPr>
+          <a:lstStyle/>
+          <a:p>
+            <a:r>
+              <a:rPr lang="en-US" sz="2400" dirty="0"/>
+              <a:t>3</a:t>
+            </a:r>
+            <a:r>
+              <a:rPr lang="hu-HU" sz="2400" dirty="0"/>
+              <a:t>1</a:t>
+            </a:r>
+            <a:r>
+              <a:rPr lang="en-US" sz="2400" dirty="0"/>
+              <a:t>00</a:t>
+            </a:r>
+            <a:r>
+              <a:rPr lang="hu-HU" sz="2400" dirty="0"/>
+              <a:t> in Budapest</a:t>
+            </a:r>
+            <a:r>
+              <a:rPr lang="en-US" sz="2400" dirty="0"/>
+              <a:t> </a:t>
+            </a:r>
+          </a:p>
+        </p:txBody>
+      </p:sp>
+      <p:sp>
+        <p:nvSpPr>
+          <p:cNvPr id="9" name="TextBox 8">
+            <a:extLst>
+              <a:ext uri="{FF2B5EF4-FFF2-40B4-BE49-F238E27FC236}">
+                <a16:creationId xmlns:a16="http://schemas.microsoft.com/office/drawing/2014/main" id="{76DB2818-7BB4-B7D0-6029-A9943CDF24A6}"/>
+              </a:ext>
+            </a:extLst>
+          </p:cNvPr>
+          <p:cNvSpPr txBox="1"/>
+          <p:nvPr/>
+        </p:nvSpPr>
+        <p:spPr>
+          <a:xfrm>
+            <a:off x="3000696" y="1634623"/>
+            <a:ext cx="1739466" cy="461665"/>
+          </a:xfrm>
+          <a:prstGeom prst="rect">
+            <a:avLst/>
+          </a:prstGeom>
+          <a:noFill/>
+        </p:spPr>
+        <p:txBody>
+          <a:bodyPr wrap="square" rtlCol="0">
+            <a:spAutoFit/>
+          </a:bodyPr>
+          <a:lstStyle/>
+          <a:p>
+            <a:r>
+              <a:rPr lang="en-US" sz="2400" dirty="0"/>
+              <a:t>Jane Fraser</a:t>
+            </a:r>
+          </a:p>
+        </p:txBody>
+      </p:sp>
+      <p:sp>
+        <p:nvSpPr>
+          <p:cNvPr id="10" name="TextBox 9">
+            <a:extLst>
+              <a:ext uri="{FF2B5EF4-FFF2-40B4-BE49-F238E27FC236}">
+                <a16:creationId xmlns:a16="http://schemas.microsoft.com/office/drawing/2014/main" id="{7D9AA9EB-D47A-1CFE-195D-127A90D63DAF}"/>
+              </a:ext>
+            </a:extLst>
+          </p:cNvPr>
+          <p:cNvSpPr txBox="1"/>
+          <p:nvPr/>
+        </p:nvSpPr>
+        <p:spPr>
+          <a:xfrm>
+            <a:off x="3000695" y="2685213"/>
+            <a:ext cx="2969178" cy="461665"/>
+          </a:xfrm>
+          <a:prstGeom prst="rect">
+            <a:avLst/>
+          </a:prstGeom>
+          <a:noFill/>
+        </p:spPr>
+        <p:txBody>
+          <a:bodyPr wrap="square" rtlCol="0">
+            <a:spAutoFit/>
+          </a:bodyPr>
+          <a:lstStyle/>
+          <a:p>
+            <a:r>
+              <a:rPr lang="en-US" sz="2400" dirty="0"/>
+              <a:t>Veronika Spanarova</a:t>
+            </a:r>
+          </a:p>
+        </p:txBody>
+      </p:sp>
+      <p:sp>
+        <p:nvSpPr>
+          <p:cNvPr id="4" name="TextBox 3">
+            <a:extLst>
+              <a:ext uri="{FF2B5EF4-FFF2-40B4-BE49-F238E27FC236}">
+                <a16:creationId xmlns:a16="http://schemas.microsoft.com/office/drawing/2014/main" id="{AAA8C009-BE60-78A8-81AD-936DEBCC0580}"/>
+              </a:ext>
+            </a:extLst>
+          </p:cNvPr>
+          <p:cNvSpPr txBox="1"/>
+          <p:nvPr/>
+        </p:nvSpPr>
+        <p:spPr>
+          <a:xfrm>
+            <a:off x="4471219" y="4074121"/>
+            <a:ext cx="4333556" cy="461665"/>
+          </a:xfrm>
+          <a:prstGeom prst="rect">
+            <a:avLst/>
+          </a:prstGeom>
+          <a:noFill/>
+        </p:spPr>
+        <p:txBody>
+          <a:bodyPr wrap="square" rtlCol="0">
+            <a:spAutoFit/>
+          </a:bodyPr>
+          <a:lstStyle/>
+          <a:p>
+            <a:r>
+              <a:rPr lang="en-US" sz="2400" dirty="0"/>
+              <a:t>Arena Corner   (M2 Stadionok)</a:t>
+            </a:r>
+          </a:p>
+        </p:txBody>
+      </p:sp>
+      <p:sp>
+        <p:nvSpPr>
+          <p:cNvPr id="6" name="TextBox 5">
+            <a:extLst>
+              <a:ext uri="{FF2B5EF4-FFF2-40B4-BE49-F238E27FC236}">
+                <a16:creationId xmlns:a16="http://schemas.microsoft.com/office/drawing/2014/main" id="{A96EE1FD-1F17-D981-EA48-A7B8EEE0A846}"/>
+              </a:ext>
+            </a:extLst>
+          </p:cNvPr>
+          <p:cNvSpPr txBox="1"/>
+          <p:nvPr/>
+        </p:nvSpPr>
+        <p:spPr>
+          <a:xfrm>
+            <a:off x="4471219" y="4866205"/>
+            <a:ext cx="6276655" cy="461665"/>
+          </a:xfrm>
+          <a:prstGeom prst="rect">
+            <a:avLst/>
+          </a:prstGeom>
+          <a:noFill/>
+        </p:spPr>
+        <p:txBody>
+          <a:bodyPr wrap="square" rtlCol="0">
+            <a:spAutoFit/>
+          </a:bodyPr>
+          <a:lstStyle/>
+          <a:p>
+            <a:r>
+              <a:rPr lang="en-US" sz="2400" dirty="0"/>
+              <a:t>Promenade Gardens </a:t>
+            </a:r>
+            <a:r>
+              <a:rPr lang="hu-HU" sz="2400" dirty="0"/>
+              <a:t>  </a:t>
+            </a:r>
+            <a:r>
+              <a:rPr lang="en-US" sz="2400" dirty="0"/>
+              <a:t>(M3 D</a:t>
+            </a:r>
+            <a:r>
+              <a:rPr lang="hu-HU" sz="2400" dirty="0"/>
+              <a:t>ózsa György út)</a:t>
+            </a:r>
+            <a:endParaRPr lang="en-US" sz="2400" dirty="0"/>
+          </a:p>
+        </p:txBody>
+      </p:sp>
+      <p:sp>
+        <p:nvSpPr>
+          <p:cNvPr id="11" name="TextBox 10">
+            <a:extLst>
+              <a:ext uri="{FF2B5EF4-FFF2-40B4-BE49-F238E27FC236}">
+                <a16:creationId xmlns:a16="http://schemas.microsoft.com/office/drawing/2014/main" id="{EC134B16-DCE9-765A-7C9D-A62A134E92BA}"/>
+              </a:ext>
+            </a:extLst>
+          </p:cNvPr>
+          <p:cNvSpPr txBox="1"/>
+          <p:nvPr/>
+        </p:nvSpPr>
+        <p:spPr>
+          <a:xfrm>
+            <a:off x="105100" y="156234"/>
+            <a:ext cx="12002814" cy="369332"/>
+          </a:xfrm>
+          <a:prstGeom prst="rect">
+            <a:avLst/>
+          </a:prstGeom>
+          <a:noFill/>
+        </p:spPr>
+        <p:txBody>
+          <a:bodyPr wrap="square" rtlCol="0">
+            <a:spAutoFit/>
+          </a:bodyPr>
+          <a:lstStyle/>
+          <a:p>
+            <a:r>
+              <a:rPr lang="hu-HU" dirty="0">
                 <a:solidFill>
                   <a:schemeClr val="bg1"/>
                 </a:solidFill>
               </a:rPr>
-              <a:t>Topic | Citi</a:t>
-            </a:r>
-          </a:p>
-        </p:txBody>
-      </p:sp>
-      <p:sp>
-        <p:nvSpPr>
-          <p:cNvPr id="3" name="TextBox 2">
-            <a:extLst>
-              <a:ext uri="{FF2B5EF4-FFF2-40B4-BE49-F238E27FC236}">
-                <a16:creationId xmlns:a16="http://schemas.microsoft.com/office/drawing/2014/main" id="{5BF1FBE9-6845-04B8-3738-90763B05AD50}"/>
-              </a:ext>
-            </a:extLst>
-          </p:cNvPr>
-          <p:cNvSpPr txBox="1"/>
-          <p:nvPr/>
-        </p:nvSpPr>
-        <p:spPr>
-          <a:xfrm>
-            <a:off x="6316713" y="1335605"/>
-            <a:ext cx="1986458" cy="461665"/>
-          </a:xfrm>
-          <a:prstGeom prst="rect">
-            <a:avLst/>
-          </a:prstGeom>
-          <a:noFill/>
-        </p:spPr>
-        <p:txBody>
-          <a:bodyPr wrap="square" rtlCol="0">
-            <a:spAutoFit/>
-          </a:bodyPr>
-          <a:lstStyle/>
-          <a:p>
-            <a:r>
-              <a:rPr lang="en-US" sz="2400" dirty="0"/>
-              <a:t>200k+ people</a:t>
-            </a:r>
-          </a:p>
-        </p:txBody>
-      </p:sp>
-      <p:sp>
-        <p:nvSpPr>
-          <p:cNvPr id="2" name="TextBox 1">
-            <a:extLst>
-              <a:ext uri="{FF2B5EF4-FFF2-40B4-BE49-F238E27FC236}">
-                <a16:creationId xmlns:a16="http://schemas.microsoft.com/office/drawing/2014/main" id="{02002A64-F599-BFAE-7FA0-842F396C21E9}"/>
-              </a:ext>
-            </a:extLst>
-          </p:cNvPr>
-          <p:cNvSpPr txBox="1"/>
-          <p:nvPr/>
-        </p:nvSpPr>
-        <p:spPr>
-          <a:xfrm>
-            <a:off x="625365" y="1335604"/>
-            <a:ext cx="804043" cy="461665"/>
-          </a:xfrm>
-          <a:prstGeom prst="rect">
-            <a:avLst/>
-          </a:prstGeom>
-          <a:noFill/>
-        </p:spPr>
-        <p:txBody>
-          <a:bodyPr wrap="square" rtlCol="0">
-            <a:spAutoFit/>
-          </a:bodyPr>
-          <a:lstStyle/>
-          <a:p>
-            <a:r>
-              <a:rPr lang="en-US" sz="2400" dirty="0"/>
-              <a:t>CEO</a:t>
-            </a:r>
-          </a:p>
-        </p:txBody>
-      </p:sp>
-      <p:sp>
-        <p:nvSpPr>
-          <p:cNvPr id="5" name="TextBox 4">
-            <a:extLst>
-              <a:ext uri="{FF2B5EF4-FFF2-40B4-BE49-F238E27FC236}">
-                <a16:creationId xmlns:a16="http://schemas.microsoft.com/office/drawing/2014/main" id="{7CC0E1A6-5864-175F-E223-C4DB6733E3AF}"/>
-              </a:ext>
-            </a:extLst>
-          </p:cNvPr>
-          <p:cNvSpPr txBox="1"/>
-          <p:nvPr/>
-        </p:nvSpPr>
-        <p:spPr>
-          <a:xfrm>
-            <a:off x="625365" y="2418514"/>
-            <a:ext cx="2060026" cy="461665"/>
-          </a:xfrm>
-          <a:prstGeom prst="rect">
-            <a:avLst/>
-          </a:prstGeom>
-          <a:noFill/>
-        </p:spPr>
-        <p:txBody>
-          <a:bodyPr wrap="square" rtlCol="0">
-            <a:spAutoFit/>
-          </a:bodyPr>
-          <a:lstStyle/>
-          <a:p>
-            <a:r>
-              <a:rPr lang="en-US" sz="2400" dirty="0"/>
-              <a:t>HU SSC Head</a:t>
-            </a:r>
-          </a:p>
-        </p:txBody>
-      </p:sp>
-      <p:sp>
-        <p:nvSpPr>
-          <p:cNvPr id="7" name="TextBox 6">
-            <a:extLst>
-              <a:ext uri="{FF2B5EF4-FFF2-40B4-BE49-F238E27FC236}">
-                <a16:creationId xmlns:a16="http://schemas.microsoft.com/office/drawing/2014/main" id="{FC8BE81A-C958-F19D-C633-58C1F5EFFE30}"/>
-              </a:ext>
-            </a:extLst>
-          </p:cNvPr>
-          <p:cNvSpPr txBox="1"/>
-          <p:nvPr/>
-        </p:nvSpPr>
-        <p:spPr>
-          <a:xfrm>
-            <a:off x="6348244" y="2423769"/>
-            <a:ext cx="1986458" cy="461665"/>
-          </a:xfrm>
-          <a:prstGeom prst="rect">
-            <a:avLst/>
-          </a:prstGeom>
-          <a:noFill/>
-        </p:spPr>
-        <p:txBody>
-          <a:bodyPr wrap="square" rtlCol="0">
-            <a:spAutoFit/>
-          </a:bodyPr>
-          <a:lstStyle/>
-          <a:p>
-            <a:r>
-              <a:rPr lang="en-US" sz="2400" dirty="0"/>
-              <a:t>3 000 </a:t>
-            </a:r>
-          </a:p>
-        </p:txBody>
-      </p:sp>
-      <p:sp>
-        <p:nvSpPr>
-          <p:cNvPr id="9" name="TextBox 8">
-            <a:extLst>
-              <a:ext uri="{FF2B5EF4-FFF2-40B4-BE49-F238E27FC236}">
-                <a16:creationId xmlns:a16="http://schemas.microsoft.com/office/drawing/2014/main" id="{76DB2818-7BB4-B7D0-6029-A9943CDF24A6}"/>
-              </a:ext>
-            </a:extLst>
-          </p:cNvPr>
-          <p:cNvSpPr txBox="1"/>
-          <p:nvPr/>
-        </p:nvSpPr>
-        <p:spPr>
-          <a:xfrm>
-            <a:off x="3000696" y="1367923"/>
-            <a:ext cx="1739466" cy="461665"/>
-          </a:xfrm>
-          <a:prstGeom prst="rect">
-            <a:avLst/>
-          </a:prstGeom>
-          <a:noFill/>
-        </p:spPr>
-        <p:txBody>
-          <a:bodyPr wrap="square" rtlCol="0">
-            <a:spAutoFit/>
-          </a:bodyPr>
-          <a:lstStyle/>
-          <a:p>
-            <a:r>
-              <a:rPr lang="en-US" sz="2400" dirty="0"/>
-              <a:t>Jane Fraser</a:t>
-            </a:r>
-          </a:p>
-        </p:txBody>
-      </p:sp>
-      <p:sp>
-        <p:nvSpPr>
-          <p:cNvPr id="10" name="TextBox 9">
-            <a:extLst>
-              <a:ext uri="{FF2B5EF4-FFF2-40B4-BE49-F238E27FC236}">
-                <a16:creationId xmlns:a16="http://schemas.microsoft.com/office/drawing/2014/main" id="{7D9AA9EB-D47A-1CFE-195D-127A90D63DAF}"/>
-              </a:ext>
-            </a:extLst>
-          </p:cNvPr>
-          <p:cNvSpPr txBox="1"/>
-          <p:nvPr/>
-        </p:nvSpPr>
-        <p:spPr>
-          <a:xfrm>
-            <a:off x="3000695" y="2418513"/>
-            <a:ext cx="2969178" cy="461665"/>
-          </a:xfrm>
-          <a:prstGeom prst="rect">
-            <a:avLst/>
-          </a:prstGeom>
-          <a:noFill/>
-        </p:spPr>
-        <p:txBody>
-          <a:bodyPr wrap="square" rtlCol="0">
-            <a:spAutoFit/>
-          </a:bodyPr>
-          <a:lstStyle/>
-          <a:p>
-            <a:r>
-              <a:rPr lang="en-US" sz="2400" dirty="0"/>
-              <a:t>Veronika Spanarova</a:t>
-            </a:r>
-          </a:p>
-        </p:txBody>
-      </p:sp>
-      <p:pic>
-        <p:nvPicPr>
-          <p:cNvPr id="1026" name="Picture 2">
-            <a:extLst>
-              <a:ext uri="{FF2B5EF4-FFF2-40B4-BE49-F238E27FC236}">
-                <a16:creationId xmlns:a16="http://schemas.microsoft.com/office/drawing/2014/main" id="{2EACFA01-87E2-FBD5-267D-AE31DF42853B}"/>
-              </a:ext>
-            </a:extLst>
-          </p:cNvPr>
-          <p:cNvPicPr>
-            <a:picLocks noChangeAspect="1" noChangeArrowheads="1"/>
-          </p:cNvPicPr>
-          <p:nvPr/>
-        </p:nvPicPr>
-        <p:blipFill>
-          <a:blip r:embed="rId2">
-            <a:extLst>
-              <a:ext uri="{28A0092B-C50C-407E-A947-70E740481C1C}">
-                <a14:useLocalDpi xmlns:a14="http://schemas.microsoft.com/office/drawing/2010/main" val="0"/>
-              </a:ext>
-            </a:extLst>
-          </a:blip>
-          <a:srcRect/>
-          <a:stretch>
-            <a:fillRect/>
-          </a:stretch>
-        </p:blipFill>
-        <p:spPr bwMode="auto">
-          <a:xfrm>
-            <a:off x="7589861" y="2239494"/>
-            <a:ext cx="4407694" cy="4158383"/>
-          </a:xfrm>
-          <a:prstGeom prst="rect">
-            <a:avLst/>
-          </a:prstGeom>
-          <a:noFill/>
-          <a:extLst>
-            <a:ext uri="{909E8E84-426E-40DD-AFC4-6F175D3DCCD1}">
-              <a14:hiddenFill xmlns:a14="http://schemas.microsoft.com/office/drawing/2010/main">
-                <a:solidFill>
-                  <a:srgbClr val="FFFFFF"/>
-                </a:solidFill>
-              </a14:hiddenFill>
-            </a:ext>
-          </a:extLst>
-        </p:spPr>
-      </p:pic>
-      <p:cxnSp>
-        <p:nvCxnSpPr>
-          <p:cNvPr id="14" name="Straight Arrow Connector 13">
-            <a:extLst>
-              <a:ext uri="{FF2B5EF4-FFF2-40B4-BE49-F238E27FC236}">
-                <a16:creationId xmlns:a16="http://schemas.microsoft.com/office/drawing/2014/main" id="{F685C496-56BA-DACF-5904-811416E19498}"/>
-              </a:ext>
-            </a:extLst>
-          </p:cNvPr>
-          <p:cNvCxnSpPr>
-            <a:cxnSpLocks/>
-          </p:cNvCxnSpPr>
-          <p:nvPr/>
-        </p:nvCxnSpPr>
-        <p:spPr>
-          <a:xfrm flipV="1">
-            <a:off x="9049407" y="2880178"/>
-            <a:ext cx="399393" cy="693339"/>
-          </a:xfrm>
-          <a:prstGeom prst="straightConnector1">
-            <a:avLst/>
-          </a:prstGeom>
-          <a:ln w="38100" cap="rnd">
-            <a:solidFill>
-              <a:srgbClr val="C00000"/>
-            </a:solidFill>
-            <a:round/>
-            <a:headEnd type="stealth" w="lg" len="lg"/>
-            <a:tailEnd type="none"/>
-          </a:ln>
-        </p:spPr>
-        <p:style>
-          <a:lnRef idx="2">
-            <a:schemeClr val="accent1"/>
-          </a:lnRef>
-          <a:fillRef idx="0">
-            <a:schemeClr val="accent1"/>
-          </a:fillRef>
-          <a:effectRef idx="1">
-            <a:schemeClr val="accent1"/>
-          </a:effectRef>
-          <a:fontRef idx="minor">
-            <a:schemeClr val="tx1"/>
-          </a:fontRef>
-        </p:style>
-      </p:cxnSp>
-      <p:cxnSp>
-        <p:nvCxnSpPr>
-          <p:cNvPr id="17" name="Straight Arrow Connector 16">
-            <a:extLst>
-              <a:ext uri="{FF2B5EF4-FFF2-40B4-BE49-F238E27FC236}">
-                <a16:creationId xmlns:a16="http://schemas.microsoft.com/office/drawing/2014/main" id="{6B58A3FA-9755-276A-95A2-DC9E2F3A3439}"/>
-              </a:ext>
-            </a:extLst>
-          </p:cNvPr>
-          <p:cNvCxnSpPr>
-            <a:cxnSpLocks/>
-          </p:cNvCxnSpPr>
-          <p:nvPr/>
-        </p:nvCxnSpPr>
-        <p:spPr>
-          <a:xfrm flipV="1">
-            <a:off x="9541461" y="3302864"/>
-            <a:ext cx="399393" cy="693339"/>
-          </a:xfrm>
-          <a:prstGeom prst="straightConnector1">
-            <a:avLst/>
-          </a:prstGeom>
-          <a:ln w="38100" cap="rnd">
-            <a:solidFill>
-              <a:srgbClr val="C00000"/>
-            </a:solidFill>
-            <a:round/>
-            <a:headEnd type="stealth" w="lg" len="lg"/>
-            <a:tailEnd type="none"/>
-          </a:ln>
-        </p:spPr>
-        <p:style>
-          <a:lnRef idx="2">
-            <a:schemeClr val="accent1"/>
-          </a:lnRef>
-          <a:fillRef idx="0">
-            <a:schemeClr val="accent1"/>
-          </a:fillRef>
-          <a:effectRef idx="1">
-            <a:schemeClr val="accent1"/>
-          </a:effectRef>
-          <a:fontRef idx="minor">
-            <a:schemeClr val="tx1"/>
-          </a:fontRef>
-        </p:style>
-      </p:cxnSp>
+              <a:t>Intro</a:t>
+            </a:r>
+            <a:endParaRPr lang="en-US" dirty="0">
+              <a:solidFill>
+                <a:schemeClr val="bg1"/>
+              </a:solidFill>
+            </a:endParaRPr>
+          </a:p>
+        </p:txBody>
+      </p:sp>
     </p:spTree>
     <p:extLst>
       <p:ext uri="{BB962C8B-B14F-4D97-AF65-F5344CB8AC3E}">

</xml_diff>

<commit_message>
updated intro and return slide
</commit_message>
<xml_diff>
--- a/MMS_2024_09_10/Farkas_2024_09_10.pptx
+++ b/MMS_2024_09_10/Farkas_2024_09_10.pptx
@@ -8,10 +8,12 @@
     <p:sldId id="258" r:id="rId2"/>
     <p:sldId id="260" r:id="rId3"/>
     <p:sldId id="261" r:id="rId4"/>
-    <p:sldId id="259" r:id="rId5"/>
-    <p:sldId id="262" r:id="rId6"/>
-    <p:sldId id="263" r:id="rId7"/>
-    <p:sldId id="264" r:id="rId8"/>
+    <p:sldId id="265" r:id="rId5"/>
+    <p:sldId id="259" r:id="rId6"/>
+    <p:sldId id="262" r:id="rId7"/>
+    <p:sldId id="266" r:id="rId8"/>
+    <p:sldId id="263" r:id="rId9"/>
+    <p:sldId id="264" r:id="rId10"/>
   </p:sldIdLst>
   <p:sldSz cx="12192000" cy="6858000"/>
   <p:notesSz cx="6858000" cy="9144000"/>
@@ -297,7 +299,7 @@
           <a:p>
             <a:fld id="{0163D073-7F8B-4D43-A6FF-3B651CD8FEF9}" type="datetimeFigureOut">
               <a:rPr lang="en-US" smtClean="0"/>
-              <a:t>7/18/2024</a:t>
+              <a:t>7/21/2024</a:t>
             </a:fld>
             <a:endParaRPr lang="en-US"/>
           </a:p>
@@ -535,7 +537,7 @@
           <a:p>
             <a:fld id="{0163D073-7F8B-4D43-A6FF-3B651CD8FEF9}" type="datetimeFigureOut">
               <a:rPr lang="en-US" smtClean="0"/>
-              <a:t>7/18/2024</a:t>
+              <a:t>7/21/2024</a:t>
             </a:fld>
             <a:endParaRPr lang="en-US"/>
           </a:p>
@@ -773,7 +775,7 @@
           <a:p>
             <a:fld id="{0163D073-7F8B-4D43-A6FF-3B651CD8FEF9}" type="datetimeFigureOut">
               <a:rPr lang="en-US" smtClean="0"/>
-              <a:t>7/18/2024</a:t>
+              <a:t>7/21/2024</a:t>
             </a:fld>
             <a:endParaRPr lang="en-US"/>
           </a:p>
@@ -1078,7 +1080,7 @@
           <a:p>
             <a:fld id="{0163D073-7F8B-4D43-A6FF-3B651CD8FEF9}" type="datetimeFigureOut">
               <a:rPr lang="en-US" smtClean="0"/>
-              <a:t>7/18/2024</a:t>
+              <a:t>7/21/2024</a:t>
             </a:fld>
             <a:endParaRPr lang="en-US"/>
           </a:p>
@@ -1381,7 +1383,7 @@
           <a:p>
             <a:fld id="{0163D073-7F8B-4D43-A6FF-3B651CD8FEF9}" type="datetimeFigureOut">
               <a:rPr lang="en-US" smtClean="0"/>
-              <a:t>7/18/2024</a:t>
+              <a:t>7/21/2024</a:t>
             </a:fld>
             <a:endParaRPr lang="en-US"/>
           </a:p>
@@ -1832,7 +1834,7 @@
           <a:p>
             <a:fld id="{0163D073-7F8B-4D43-A6FF-3B651CD8FEF9}" type="datetimeFigureOut">
               <a:rPr lang="en-US" smtClean="0"/>
-              <a:t>7/18/2024</a:t>
+              <a:t>7/21/2024</a:t>
             </a:fld>
             <a:endParaRPr lang="en-US"/>
           </a:p>
@@ -2005,7 +2007,7 @@
           <a:p>
             <a:fld id="{0163D073-7F8B-4D43-A6FF-3B651CD8FEF9}" type="datetimeFigureOut">
               <a:rPr lang="en-US" smtClean="0"/>
-              <a:t>7/18/2024</a:t>
+              <a:t>7/21/2024</a:t>
             </a:fld>
             <a:endParaRPr lang="en-US"/>
           </a:p>
@@ -2142,7 +2144,7 @@
           <a:p>
             <a:fld id="{0163D073-7F8B-4D43-A6FF-3B651CD8FEF9}" type="datetimeFigureOut">
               <a:rPr lang="en-US" smtClean="0"/>
-              <a:t>7/18/2024</a:t>
+              <a:t>7/21/2024</a:t>
             </a:fld>
             <a:endParaRPr lang="en-US"/>
           </a:p>
@@ -2486,7 +2488,7 @@
           <a:p>
             <a:fld id="{0163D073-7F8B-4D43-A6FF-3B651CD8FEF9}" type="datetimeFigureOut">
               <a:rPr lang="en-US" smtClean="0"/>
-              <a:t>7/18/2024</a:t>
+              <a:t>7/21/2024</a:t>
             </a:fld>
             <a:endParaRPr lang="en-US"/>
           </a:p>
@@ -2807,7 +2809,7 @@
           <a:p>
             <a:fld id="{0163D073-7F8B-4D43-A6FF-3B651CD8FEF9}" type="datetimeFigureOut">
               <a:rPr lang="en-US" smtClean="0"/>
-              <a:t>7/18/2024</a:t>
+              <a:t>7/21/2024</a:t>
             </a:fld>
             <a:endParaRPr lang="en-US"/>
           </a:p>
@@ -3645,7 +3647,7 @@
           <a:p>
             <a:r>
               <a:rPr lang="en-US" sz="2400" dirty="0"/>
-              <a:t>– 2017		Eotvos Univ., Hung. Acad. of Sci.</a:t>
+              <a:t> – 2017	Eotvos Univ., Hung. Acad. of Sci.</a:t>
             </a:r>
           </a:p>
           <a:p>
@@ -4137,10 +4139,10 @@
       </p:grpSpPr>
       <p:sp>
         <p:nvSpPr>
-          <p:cNvPr id="3" name="TextBox 2">
-            <a:extLst>
-              <a:ext uri="{FF2B5EF4-FFF2-40B4-BE49-F238E27FC236}">
-                <a16:creationId xmlns:a16="http://schemas.microsoft.com/office/drawing/2014/main" id="{5BF1FBE9-6845-04B8-3738-90763B05AD50}"/>
+          <p:cNvPr id="7" name="TextBox 6">
+            <a:extLst>
+              <a:ext uri="{FF2B5EF4-FFF2-40B4-BE49-F238E27FC236}">
+                <a16:creationId xmlns:a16="http://schemas.microsoft.com/office/drawing/2014/main" id="{15AC98AD-93EB-1FC4-CCAE-A24A07B5ED9D}"/>
               </a:ext>
             </a:extLst>
           </p:cNvPr>
@@ -4149,8 +4151,8 @@
         </p:nvSpPr>
         <p:spPr>
           <a:xfrm>
-            <a:off x="4246178" y="1819079"/>
-            <a:ext cx="1156139" cy="461665"/>
+            <a:off x="3584027" y="1846565"/>
+            <a:ext cx="5023945" cy="1938992"/>
           </a:xfrm>
           <a:prstGeom prst="rect">
             <a:avLst/>
@@ -4165,6 +4167,182 @@
           <a:p>
             <a:pPr algn="ctr"/>
             <a:r>
+              <a:rPr lang="en-US" sz="2400" b="1" dirty="0"/>
+              <a:t>Modern Portfolio Theory</a:t>
+            </a:r>
+          </a:p>
+          <a:p>
+            <a:pPr algn="ctr"/>
+            <a:endParaRPr lang="en-US" sz="2400" b="1" dirty="0"/>
+          </a:p>
+          <a:p>
+            <a:pPr algn="ctr"/>
+            <a:r>
+              <a:rPr lang="en-US" sz="2400" b="1" dirty="0"/>
+              <a:t>&amp;</a:t>
+            </a:r>
+          </a:p>
+          <a:p>
+            <a:pPr algn="ctr"/>
+            <a:endParaRPr lang="en-US" sz="2400" b="1" dirty="0"/>
+          </a:p>
+          <a:p>
+            <a:pPr algn="ctr"/>
+            <a:r>
+              <a:rPr lang="en-US" sz="2400" b="1" dirty="0"/>
+              <a:t>Capital Asset Pricing Model</a:t>
+            </a:r>
+          </a:p>
+        </p:txBody>
+      </p:sp>
+      <p:sp>
+        <p:nvSpPr>
+          <p:cNvPr id="8" name="TextBox 7">
+            <a:extLst>
+              <a:ext uri="{FF2B5EF4-FFF2-40B4-BE49-F238E27FC236}">
+                <a16:creationId xmlns:a16="http://schemas.microsoft.com/office/drawing/2014/main" id="{12B97E98-1D37-81AE-7102-185720B74B78}"/>
+              </a:ext>
+            </a:extLst>
+          </p:cNvPr>
+          <p:cNvSpPr txBox="1"/>
+          <p:nvPr/>
+        </p:nvSpPr>
+        <p:spPr>
+          <a:xfrm>
+            <a:off x="105100" y="156234"/>
+            <a:ext cx="12002814" cy="369332"/>
+          </a:xfrm>
+          <a:prstGeom prst="rect">
+            <a:avLst/>
+          </a:prstGeom>
+          <a:noFill/>
+        </p:spPr>
+        <p:txBody>
+          <a:bodyPr wrap="square" rtlCol="0">
+            <a:spAutoFit/>
+          </a:bodyPr>
+          <a:lstStyle/>
+          <a:p>
+            <a:r>
+              <a:rPr lang="en-US" dirty="0">
+                <a:solidFill>
+                  <a:schemeClr val="bg1"/>
+                </a:solidFill>
+              </a:rPr>
+              <a:t>Farkas Ill</a:t>
+            </a:r>
+            <a:r>
+              <a:rPr lang="hu-HU" dirty="0">
+                <a:solidFill>
+                  <a:schemeClr val="bg1"/>
+                </a:solidFill>
+              </a:rPr>
+              <a:t>és										Citibank HU MQA</a:t>
+            </a:r>
+            <a:endParaRPr lang="en-US" dirty="0">
+              <a:solidFill>
+                <a:schemeClr val="bg1"/>
+              </a:solidFill>
+            </a:endParaRPr>
+          </a:p>
+        </p:txBody>
+      </p:sp>
+      <p:sp>
+        <p:nvSpPr>
+          <p:cNvPr id="2" name="TextBox 1">
+            <a:extLst>
+              <a:ext uri="{FF2B5EF4-FFF2-40B4-BE49-F238E27FC236}">
+                <a16:creationId xmlns:a16="http://schemas.microsoft.com/office/drawing/2014/main" id="{632C3D97-C308-DE22-0F53-98586ABF1575}"/>
+              </a:ext>
+            </a:extLst>
+          </p:cNvPr>
+          <p:cNvSpPr txBox="1"/>
+          <p:nvPr/>
+        </p:nvSpPr>
+        <p:spPr>
+          <a:xfrm>
+            <a:off x="4461638" y="4906501"/>
+            <a:ext cx="3289737" cy="400110"/>
+          </a:xfrm>
+          <a:prstGeom prst="rect">
+            <a:avLst/>
+          </a:prstGeom>
+          <a:noFill/>
+        </p:spPr>
+        <p:txBody>
+          <a:bodyPr wrap="square" rtlCol="0">
+            <a:spAutoFit/>
+          </a:bodyPr>
+          <a:lstStyle/>
+          <a:p>
+            <a:pPr algn="ctr"/>
+            <a:r>
+              <a:rPr lang="en-US" sz="2000" i="1" dirty="0"/>
+              <a:t>Source: BMETE15MF78</a:t>
+            </a:r>
+          </a:p>
+        </p:txBody>
+      </p:sp>
+    </p:spTree>
+    <p:extLst>
+      <p:ext uri="{BB962C8B-B14F-4D97-AF65-F5344CB8AC3E}">
+        <p14:creationId xmlns:p14="http://schemas.microsoft.com/office/powerpoint/2010/main" val="1241681796"/>
+      </p:ext>
+    </p:extLst>
+  </p:cSld>
+  <p:clrMapOvr>
+    <a:masterClrMapping/>
+  </p:clrMapOvr>
+</p:sld>
+</file>
+
+<file path=ppt/slides/slide5.xml><?xml version="1.0" encoding="utf-8"?>
+<p:sld xmlns:a="http://schemas.openxmlformats.org/drawingml/2006/main" xmlns:r="http://schemas.openxmlformats.org/officeDocument/2006/relationships" xmlns:p="http://schemas.openxmlformats.org/presentationml/2006/main">
+  <p:cSld>
+    <p:spTree>
+      <p:nvGrpSpPr>
+        <p:cNvPr id="1" name=""/>
+        <p:cNvGrpSpPr/>
+        <p:nvPr/>
+      </p:nvGrpSpPr>
+      <p:grpSpPr>
+        <a:xfrm>
+          <a:off x="0" y="0"/>
+          <a:ext cx="0" cy="0"/>
+          <a:chOff x="0" y="0"/>
+          <a:chExt cx="0" cy="0"/>
+        </a:xfrm>
+      </p:grpSpPr>
+      <p:sp>
+        <p:nvSpPr>
+          <p:cNvPr id="3" name="TextBox 2">
+            <a:extLst>
+              <a:ext uri="{FF2B5EF4-FFF2-40B4-BE49-F238E27FC236}">
+                <a16:creationId xmlns:a16="http://schemas.microsoft.com/office/drawing/2014/main" id="{5BF1FBE9-6845-04B8-3738-90763B05AD50}"/>
+              </a:ext>
+            </a:extLst>
+          </p:cNvPr>
+          <p:cNvSpPr txBox="1"/>
+          <p:nvPr/>
+        </p:nvSpPr>
+        <p:spPr>
+          <a:xfrm>
+            <a:off x="4246178" y="1654487"/>
+            <a:ext cx="1156139" cy="461665"/>
+          </a:xfrm>
+          <a:prstGeom prst="rect">
+            <a:avLst/>
+          </a:prstGeom>
+          <a:noFill/>
+        </p:spPr>
+        <p:txBody>
+          <a:bodyPr wrap="square" rtlCol="0">
+            <a:spAutoFit/>
+          </a:bodyPr>
+          <a:lstStyle/>
+          <a:p>
+            <a:pPr algn="ctr"/>
+            <a:r>
               <a:rPr lang="en-US" sz="2400" dirty="0"/>
               <a:t>Return</a:t>
             </a:r>
@@ -4185,7 +4363,7 @@
         </p:nvSpPr>
         <p:spPr>
           <a:xfrm>
-            <a:off x="7068204" y="3922359"/>
+            <a:off x="7068204" y="3757767"/>
             <a:ext cx="1014249" cy="461665"/>
           </a:xfrm>
           <a:prstGeom prst="rect">
@@ -4223,7 +4401,7 @@
         </p:nvCxnSpPr>
         <p:spPr>
           <a:xfrm flipV="1">
-            <a:off x="4277708" y="2270234"/>
+            <a:off x="4277708" y="2105642"/>
             <a:ext cx="0" cy="3552497"/>
           </a:xfrm>
           <a:prstGeom prst="straightConnector1">
@@ -4268,7 +4446,7 @@
         </p:nvCxnSpPr>
         <p:spPr>
           <a:xfrm>
-            <a:off x="4277708" y="4457595"/>
+            <a:off x="4277708" y="4293003"/>
             <a:ext cx="3047999" cy="0"/>
           </a:xfrm>
           <a:prstGeom prst="straightConnector1">
@@ -4311,7 +4489,7 @@
         </p:nvSpPr>
         <p:spPr>
           <a:xfrm>
-            <a:off x="4988465" y="2784030"/>
+            <a:off x="4988465" y="2619438"/>
             <a:ext cx="1495104" cy="461665"/>
           </a:xfrm>
           <a:prstGeom prst="rect">
@@ -4347,7 +4525,7 @@
         </p:nvSpPr>
         <p:spPr>
           <a:xfrm>
-            <a:off x="5034455" y="3216163"/>
+            <a:off x="5034455" y="3051571"/>
             <a:ext cx="1671145" cy="945931"/>
           </a:xfrm>
           <a:custGeom>
@@ -4475,146 +4653,6 @@
 </p:sld>
 </file>
 
-<file path=ppt/slides/slide5.xml><?xml version="1.0" encoding="utf-8"?>
-<p:sld xmlns:a="http://schemas.openxmlformats.org/drawingml/2006/main" xmlns:r="http://schemas.openxmlformats.org/officeDocument/2006/relationships" xmlns:p="http://schemas.openxmlformats.org/presentationml/2006/main">
-  <p:cSld>
-    <p:spTree>
-      <p:nvGrpSpPr>
-        <p:cNvPr id="1" name=""/>
-        <p:cNvGrpSpPr/>
-        <p:nvPr/>
-      </p:nvGrpSpPr>
-      <p:grpSpPr>
-        <a:xfrm>
-          <a:off x="0" y="0"/>
-          <a:ext cx="0" cy="0"/>
-          <a:chOff x="0" y="0"/>
-          <a:chExt cx="0" cy="0"/>
-        </a:xfrm>
-      </p:grpSpPr>
-      <p:pic>
-        <p:nvPicPr>
-          <p:cNvPr id="9" name="Picture 8" descr="A diagram of a group of people&#10;&#10;Description automatically generated">
-            <a:extLst>
-              <a:ext uri="{FF2B5EF4-FFF2-40B4-BE49-F238E27FC236}">
-                <a16:creationId xmlns:a16="http://schemas.microsoft.com/office/drawing/2014/main" id="{8D1FAEBE-0DA0-DF79-D36F-4A665F90FEBE}"/>
-              </a:ext>
-            </a:extLst>
-          </p:cNvPr>
-          <p:cNvPicPr>
-            <a:picLocks noChangeAspect="1"/>
-          </p:cNvPicPr>
-          <p:nvPr/>
-        </p:nvPicPr>
-        <p:blipFill>
-          <a:blip r:embed="rId2">
-            <a:extLst>
-              <a:ext uri="{28A0092B-C50C-407E-A947-70E740481C1C}">
-                <a14:useLocalDpi xmlns:a14="http://schemas.microsoft.com/office/drawing/2010/main" val="0"/>
-              </a:ext>
-            </a:extLst>
-          </a:blip>
-          <a:stretch>
-            <a:fillRect/>
-          </a:stretch>
-        </p:blipFill>
-        <p:spPr>
-          <a:xfrm>
-            <a:off x="3753725" y="1499097"/>
-            <a:ext cx="4684550" cy="3559920"/>
-          </a:xfrm>
-          <a:prstGeom prst="rect">
-            <a:avLst/>
-          </a:prstGeom>
-        </p:spPr>
-      </p:pic>
-      <p:sp>
-        <p:nvSpPr>
-          <p:cNvPr id="12" name="TextBox 11">
-            <a:extLst>
-              <a:ext uri="{FF2B5EF4-FFF2-40B4-BE49-F238E27FC236}">
-                <a16:creationId xmlns:a16="http://schemas.microsoft.com/office/drawing/2014/main" id="{706A4D02-961D-456E-92D6-353375DDEE25}"/>
-              </a:ext>
-            </a:extLst>
-          </p:cNvPr>
-          <p:cNvSpPr txBox="1"/>
-          <p:nvPr/>
-        </p:nvSpPr>
-        <p:spPr>
-          <a:xfrm>
-            <a:off x="105100" y="156234"/>
-            <a:ext cx="12002814" cy="369332"/>
-          </a:xfrm>
-          <a:prstGeom prst="rect">
-            <a:avLst/>
-          </a:prstGeom>
-          <a:noFill/>
-        </p:spPr>
-        <p:txBody>
-          <a:bodyPr wrap="square" rtlCol="0">
-            <a:spAutoFit/>
-          </a:bodyPr>
-          <a:lstStyle/>
-          <a:p>
-            <a:r>
-              <a:rPr lang="en-US" dirty="0">
-                <a:solidFill>
-                  <a:schemeClr val="bg1"/>
-                </a:solidFill>
-              </a:rPr>
-              <a:t>Intro</a:t>
-            </a:r>
-          </a:p>
-        </p:txBody>
-      </p:sp>
-      <p:sp>
-        <p:nvSpPr>
-          <p:cNvPr id="13" name="TextBox 12">
-            <a:extLst>
-              <a:ext uri="{FF2B5EF4-FFF2-40B4-BE49-F238E27FC236}">
-                <a16:creationId xmlns:a16="http://schemas.microsoft.com/office/drawing/2014/main" id="{A12B5396-3C9E-F44E-BC68-3C7826679490}"/>
-              </a:ext>
-            </a:extLst>
-          </p:cNvPr>
-          <p:cNvSpPr txBox="1"/>
-          <p:nvPr/>
-        </p:nvSpPr>
-        <p:spPr>
-          <a:xfrm>
-            <a:off x="625365" y="1602304"/>
-            <a:ext cx="1210061" cy="461665"/>
-          </a:xfrm>
-          <a:prstGeom prst="rect">
-            <a:avLst/>
-          </a:prstGeom>
-          <a:noFill/>
-        </p:spPr>
-        <p:txBody>
-          <a:bodyPr wrap="square" rtlCol="0">
-            <a:spAutoFit/>
-          </a:bodyPr>
-          <a:lstStyle/>
-          <a:p>
-            <a:r>
-              <a:rPr lang="en-US" sz="2400" dirty="0"/>
-              <a:t>Return</a:t>
-            </a:r>
-          </a:p>
-        </p:txBody>
-      </p:sp>
-    </p:spTree>
-    <p:extLst>
-      <p:ext uri="{BB962C8B-B14F-4D97-AF65-F5344CB8AC3E}">
-        <p14:creationId xmlns:p14="http://schemas.microsoft.com/office/powerpoint/2010/main" val="3982887013"/>
-      </p:ext>
-    </p:extLst>
-  </p:cSld>
-  <p:clrMapOvr>
-    <a:masterClrMapping/>
-  </p:clrMapOvr>
-</p:sld>
-</file>
-
 <file path=ppt/slides/slide6.xml><?xml version="1.0" encoding="utf-8"?>
 <p:sld xmlns:a="http://schemas.openxmlformats.org/drawingml/2006/main" xmlns:r="http://schemas.openxmlformats.org/officeDocument/2006/relationships" xmlns:p="http://schemas.openxmlformats.org/presentationml/2006/main">
   <p:cSld>
@@ -4634,10 +4672,10 @@
       </p:grpSpPr>
       <p:sp>
         <p:nvSpPr>
-          <p:cNvPr id="2" name="TextBox 1">
-            <a:extLst>
-              <a:ext uri="{FF2B5EF4-FFF2-40B4-BE49-F238E27FC236}">
-                <a16:creationId xmlns:a16="http://schemas.microsoft.com/office/drawing/2014/main" id="{E03B3FC0-A19A-0D68-D5BE-C9362748E2B5}"/>
+          <p:cNvPr id="12" name="TextBox 11">
+            <a:extLst>
+              <a:ext uri="{FF2B5EF4-FFF2-40B4-BE49-F238E27FC236}">
+                <a16:creationId xmlns:a16="http://schemas.microsoft.com/office/drawing/2014/main" id="{706A4D02-961D-456E-92D6-353375DDEE25}"/>
               </a:ext>
             </a:extLst>
           </p:cNvPr>
@@ -4673,10 +4711,10 @@
       </p:sp>
       <p:sp>
         <p:nvSpPr>
-          <p:cNvPr id="3" name="TextBox 2">
-            <a:extLst>
-              <a:ext uri="{FF2B5EF4-FFF2-40B4-BE49-F238E27FC236}">
-                <a16:creationId xmlns:a16="http://schemas.microsoft.com/office/drawing/2014/main" id="{7F8B13E4-29B3-5435-324C-4149E3AE4146}"/>
+          <p:cNvPr id="13" name="TextBox 12">
+            <a:extLst>
+              <a:ext uri="{FF2B5EF4-FFF2-40B4-BE49-F238E27FC236}">
+                <a16:creationId xmlns:a16="http://schemas.microsoft.com/office/drawing/2014/main" id="{A12B5396-3C9E-F44E-BC68-3C7826679490}"/>
               </a:ext>
             </a:extLst>
           </p:cNvPr>
@@ -4686,7 +4724,7 @@
         <p:spPr>
           <a:xfrm>
             <a:off x="625365" y="1602304"/>
-            <a:ext cx="925139" cy="461665"/>
+            <a:ext cx="1210061" cy="461665"/>
           </a:xfrm>
           <a:prstGeom prst="rect">
             <a:avLst/>
@@ -4700,8 +4738,776 @@
           <a:lstStyle/>
           <a:p>
             <a:r>
+              <a:rPr lang="en-US" sz="2400" b="1" dirty="0"/>
+              <a:t>Return</a:t>
+            </a:r>
+          </a:p>
+        </p:txBody>
+      </p:sp>
+      <p:cxnSp>
+        <p:nvCxnSpPr>
+          <p:cNvPr id="22" name="Straight Arrow Connector 21">
+            <a:extLst>
+              <a:ext uri="{FF2B5EF4-FFF2-40B4-BE49-F238E27FC236}">
+                <a16:creationId xmlns:a16="http://schemas.microsoft.com/office/drawing/2014/main" id="{A55FF6FE-ABED-05BE-32C9-B6F28F172723}"/>
+              </a:ext>
+            </a:extLst>
+          </p:cNvPr>
+          <p:cNvCxnSpPr/>
+          <p:nvPr/>
+        </p:nvCxnSpPr>
+        <p:spPr>
+          <a:xfrm>
+            <a:off x="4391372" y="5026121"/>
+            <a:ext cx="4464000" cy="0"/>
+          </a:xfrm>
+          <a:prstGeom prst="straightConnector1">
+            <a:avLst/>
+          </a:prstGeom>
+          <a:ln w="25400" cap="rnd">
+            <a:solidFill>
+              <a:schemeClr val="tx1"/>
+            </a:solidFill>
+            <a:tailEnd type="arrow" w="lg" len="lg"/>
+          </a:ln>
+        </p:spPr>
+        <p:style>
+          <a:lnRef idx="1">
+            <a:schemeClr val="accent1"/>
+          </a:lnRef>
+          <a:fillRef idx="0">
+            <a:schemeClr val="accent1"/>
+          </a:fillRef>
+          <a:effectRef idx="0">
+            <a:schemeClr val="accent1"/>
+          </a:effectRef>
+          <a:fontRef idx="minor">
+            <a:schemeClr val="tx1"/>
+          </a:fontRef>
+        </p:style>
+      </p:cxnSp>
+      <p:cxnSp>
+        <p:nvCxnSpPr>
+          <p:cNvPr id="23" name="Straight Arrow Connector 22">
+            <a:extLst>
+              <a:ext uri="{FF2B5EF4-FFF2-40B4-BE49-F238E27FC236}">
+                <a16:creationId xmlns:a16="http://schemas.microsoft.com/office/drawing/2014/main" id="{3B11E5E3-2960-3717-242D-5568D05BE418}"/>
+              </a:ext>
+            </a:extLst>
+          </p:cNvPr>
+          <p:cNvCxnSpPr>
+            <a:cxnSpLocks/>
+          </p:cNvCxnSpPr>
+          <p:nvPr/>
+        </p:nvCxnSpPr>
+        <p:spPr>
+          <a:xfrm flipV="1">
+            <a:off x="4749178" y="4877034"/>
+            <a:ext cx="0" cy="301487"/>
+          </a:xfrm>
+          <a:prstGeom prst="straightConnector1">
+            <a:avLst/>
+          </a:prstGeom>
+          <a:ln w="25400" cap="rnd">
+            <a:solidFill>
+              <a:schemeClr val="tx1"/>
+            </a:solidFill>
+            <a:tailEnd type="none" w="lg" len="lg"/>
+          </a:ln>
+        </p:spPr>
+        <p:style>
+          <a:lnRef idx="1">
+            <a:schemeClr val="accent1"/>
+          </a:lnRef>
+          <a:fillRef idx="0">
+            <a:schemeClr val="accent1"/>
+          </a:fillRef>
+          <a:effectRef idx="0">
+            <a:schemeClr val="accent1"/>
+          </a:effectRef>
+          <a:fontRef idx="minor">
+            <a:schemeClr val="tx1"/>
+          </a:fontRef>
+        </p:style>
+      </p:cxnSp>
+      <p:cxnSp>
+        <p:nvCxnSpPr>
+          <p:cNvPr id="24" name="Straight Arrow Connector 23">
+            <a:extLst>
+              <a:ext uri="{FF2B5EF4-FFF2-40B4-BE49-F238E27FC236}">
+                <a16:creationId xmlns:a16="http://schemas.microsoft.com/office/drawing/2014/main" id="{B547C32D-A926-AEDC-7A83-8545EB5B1CAC}"/>
+              </a:ext>
+            </a:extLst>
+          </p:cNvPr>
+          <p:cNvCxnSpPr>
+            <a:cxnSpLocks/>
+          </p:cNvCxnSpPr>
+          <p:nvPr/>
+        </p:nvCxnSpPr>
+        <p:spPr>
+          <a:xfrm flipV="1">
+            <a:off x="6813847" y="4877034"/>
+            <a:ext cx="0" cy="301487"/>
+          </a:xfrm>
+          <a:prstGeom prst="straightConnector1">
+            <a:avLst/>
+          </a:prstGeom>
+          <a:ln w="25400" cap="rnd">
+            <a:solidFill>
+              <a:schemeClr val="tx1"/>
+            </a:solidFill>
+            <a:tailEnd type="none" w="lg" len="lg"/>
+          </a:ln>
+        </p:spPr>
+        <p:style>
+          <a:lnRef idx="1">
+            <a:schemeClr val="accent1"/>
+          </a:lnRef>
+          <a:fillRef idx="0">
+            <a:schemeClr val="accent1"/>
+          </a:fillRef>
+          <a:effectRef idx="0">
+            <a:schemeClr val="accent1"/>
+          </a:effectRef>
+          <a:fontRef idx="minor">
+            <a:schemeClr val="tx1"/>
+          </a:fontRef>
+        </p:style>
+      </p:cxnSp>
+      <p:sp>
+        <p:nvSpPr>
+          <p:cNvPr id="25" name="TextBox 24">
+            <a:extLst>
+              <a:ext uri="{FF2B5EF4-FFF2-40B4-BE49-F238E27FC236}">
+                <a16:creationId xmlns:a16="http://schemas.microsoft.com/office/drawing/2014/main" id="{17438D28-9229-EDE5-21EA-1F3B6405FCD6}"/>
+              </a:ext>
+            </a:extLst>
+          </p:cNvPr>
+          <p:cNvSpPr txBox="1"/>
+          <p:nvPr/>
+        </p:nvSpPr>
+        <p:spPr>
+          <a:xfrm>
+            <a:off x="7707434" y="4441346"/>
+            <a:ext cx="914396" cy="461665"/>
+          </a:xfrm>
+          <a:prstGeom prst="rect">
+            <a:avLst/>
+          </a:prstGeom>
+          <a:noFill/>
+        </p:spPr>
+        <p:txBody>
+          <a:bodyPr wrap="square" rtlCol="0">
+            <a:spAutoFit/>
+          </a:bodyPr>
+          <a:lstStyle/>
+          <a:p>
+            <a:pPr algn="r"/>
+            <a:r>
+              <a:rPr lang="hu-HU" sz="2400" dirty="0"/>
+              <a:t>Time</a:t>
+            </a:r>
+            <a:endParaRPr lang="en-US" sz="2400" dirty="0"/>
+          </a:p>
+        </p:txBody>
+      </p:sp>
+      <p:sp>
+        <p:nvSpPr>
+          <p:cNvPr id="26" name="TextBox 25">
+            <a:extLst>
+              <a:ext uri="{FF2B5EF4-FFF2-40B4-BE49-F238E27FC236}">
+                <a16:creationId xmlns:a16="http://schemas.microsoft.com/office/drawing/2014/main" id="{78ED060C-EC26-352F-E429-EF13D97716E7}"/>
+              </a:ext>
+            </a:extLst>
+          </p:cNvPr>
+          <p:cNvSpPr txBox="1"/>
+          <p:nvPr/>
+        </p:nvSpPr>
+        <p:spPr>
+          <a:xfrm>
+            <a:off x="4305241" y="5270446"/>
+            <a:ext cx="881264" cy="461665"/>
+          </a:xfrm>
+          <a:prstGeom prst="rect">
+            <a:avLst/>
+          </a:prstGeom>
+          <a:noFill/>
+        </p:spPr>
+        <p:txBody>
+          <a:bodyPr wrap="square" rtlCol="0">
+            <a:spAutoFit/>
+          </a:bodyPr>
+          <a:lstStyle/>
+          <a:p>
+            <a:pPr algn="ctr"/>
+            <a:r>
+              <a:rPr lang="hu-HU" sz="2400" dirty="0"/>
+              <a:t>0</a:t>
+            </a:r>
+            <a:endParaRPr lang="en-US" sz="2400" dirty="0"/>
+          </a:p>
+        </p:txBody>
+      </p:sp>
+      <p:sp>
+        <p:nvSpPr>
+          <p:cNvPr id="27" name="TextBox 26">
+            <a:extLst>
+              <a:ext uri="{FF2B5EF4-FFF2-40B4-BE49-F238E27FC236}">
+                <a16:creationId xmlns:a16="http://schemas.microsoft.com/office/drawing/2014/main" id="{83687220-C7E5-B563-7DFC-99F5967052E6}"/>
+              </a:ext>
+            </a:extLst>
+          </p:cNvPr>
+          <p:cNvSpPr txBox="1"/>
+          <p:nvPr/>
+        </p:nvSpPr>
+        <p:spPr>
+          <a:xfrm>
+            <a:off x="6376885" y="5270446"/>
+            <a:ext cx="881264" cy="461665"/>
+          </a:xfrm>
+          <a:prstGeom prst="rect">
+            <a:avLst/>
+          </a:prstGeom>
+          <a:noFill/>
+        </p:spPr>
+        <p:txBody>
+          <a:bodyPr wrap="square" rtlCol="0">
+            <a:spAutoFit/>
+          </a:bodyPr>
+          <a:lstStyle/>
+          <a:p>
+            <a:pPr algn="ctr"/>
+            <a:r>
+              <a:rPr lang="hu-HU" sz="2400" dirty="0"/>
+              <a:t>1</a:t>
+            </a:r>
+            <a:endParaRPr lang="en-US" sz="2400" dirty="0"/>
+          </a:p>
+        </p:txBody>
+      </p:sp>
+      <p:sp>
+        <p:nvSpPr>
+          <p:cNvPr id="30" name="TextBox 29">
+            <a:extLst>
+              <a:ext uri="{FF2B5EF4-FFF2-40B4-BE49-F238E27FC236}">
+                <a16:creationId xmlns:a16="http://schemas.microsoft.com/office/drawing/2014/main" id="{0DE7E593-4DF4-5EE2-9A6F-3D6A62BF3827}"/>
+              </a:ext>
+            </a:extLst>
+          </p:cNvPr>
+          <p:cNvSpPr txBox="1"/>
+          <p:nvPr/>
+        </p:nvSpPr>
+        <p:spPr>
+          <a:xfrm>
+            <a:off x="4256443" y="1252728"/>
+            <a:ext cx="1000531" cy="461665"/>
+          </a:xfrm>
+          <a:prstGeom prst="rect">
+            <a:avLst/>
+          </a:prstGeom>
+          <a:noFill/>
+        </p:spPr>
+        <p:txBody>
+          <a:bodyPr wrap="square" rtlCol="0">
+            <a:spAutoFit/>
+          </a:bodyPr>
+          <a:lstStyle/>
+          <a:p>
+            <a:pPr algn="ctr"/>
+            <a:r>
+              <a:rPr lang="hu-HU" sz="2400" dirty="0"/>
+              <a:t>Alice</a:t>
+            </a:r>
+            <a:endParaRPr lang="en-US" sz="2400" dirty="0"/>
+          </a:p>
+        </p:txBody>
+      </p:sp>
+      <p:sp>
+        <p:nvSpPr>
+          <p:cNvPr id="31" name="TextBox 30">
+            <a:extLst>
+              <a:ext uri="{FF2B5EF4-FFF2-40B4-BE49-F238E27FC236}">
+                <a16:creationId xmlns:a16="http://schemas.microsoft.com/office/drawing/2014/main" id="{B3D11117-A649-533A-39CC-8E67C361FBA7}"/>
+              </a:ext>
+            </a:extLst>
+          </p:cNvPr>
+          <p:cNvSpPr txBox="1"/>
+          <p:nvPr/>
+        </p:nvSpPr>
+        <p:spPr>
+          <a:xfrm>
+            <a:off x="4257371" y="4383493"/>
+            <a:ext cx="1000531" cy="461665"/>
+          </a:xfrm>
+          <a:prstGeom prst="rect">
+            <a:avLst/>
+          </a:prstGeom>
+          <a:noFill/>
+        </p:spPr>
+        <p:txBody>
+          <a:bodyPr wrap="square" rtlCol="0">
+            <a:spAutoFit/>
+          </a:bodyPr>
+          <a:lstStyle/>
+          <a:p>
+            <a:pPr algn="ctr"/>
+            <a:r>
+              <a:rPr lang="hu-HU" sz="2400" dirty="0"/>
+              <a:t>Bob</a:t>
+            </a:r>
+            <a:endParaRPr lang="en-US" sz="2400" dirty="0"/>
+          </a:p>
+        </p:txBody>
+      </p:sp>
+      <p:cxnSp>
+        <p:nvCxnSpPr>
+          <p:cNvPr id="32" name="Straight Arrow Connector 31">
+            <a:extLst>
+              <a:ext uri="{FF2B5EF4-FFF2-40B4-BE49-F238E27FC236}">
+                <a16:creationId xmlns:a16="http://schemas.microsoft.com/office/drawing/2014/main" id="{2D27A85E-0789-177E-BA38-88261BC7524B}"/>
+              </a:ext>
+            </a:extLst>
+          </p:cNvPr>
+          <p:cNvCxnSpPr>
+            <a:cxnSpLocks/>
+          </p:cNvCxnSpPr>
+          <p:nvPr/>
+        </p:nvCxnSpPr>
+        <p:spPr>
+          <a:xfrm>
+            <a:off x="4745873" y="2346677"/>
+            <a:ext cx="0" cy="1417980"/>
+          </a:xfrm>
+          <a:prstGeom prst="straightConnector1">
+            <a:avLst/>
+          </a:prstGeom>
+          <a:ln w="25400" cap="rnd">
+            <a:solidFill>
+              <a:schemeClr val="tx1"/>
+            </a:solidFill>
+            <a:headEnd w="lg" len="lg"/>
+            <a:tailEnd type="arrow" w="lg" len="lg"/>
+          </a:ln>
+        </p:spPr>
+        <p:style>
+          <a:lnRef idx="1">
+            <a:schemeClr val="accent1"/>
+          </a:lnRef>
+          <a:fillRef idx="0">
+            <a:schemeClr val="accent1"/>
+          </a:fillRef>
+          <a:effectRef idx="0">
+            <a:schemeClr val="accent1"/>
+          </a:effectRef>
+          <a:fontRef idx="minor">
+            <a:schemeClr val="tx1"/>
+          </a:fontRef>
+        </p:style>
+      </p:cxnSp>
+      <p:cxnSp>
+        <p:nvCxnSpPr>
+          <p:cNvPr id="35" name="Straight Arrow Connector 34">
+            <a:extLst>
+              <a:ext uri="{FF2B5EF4-FFF2-40B4-BE49-F238E27FC236}">
+                <a16:creationId xmlns:a16="http://schemas.microsoft.com/office/drawing/2014/main" id="{F231E58E-6969-8B7B-BD6B-7D3960568FB7}"/>
+              </a:ext>
+            </a:extLst>
+          </p:cNvPr>
+          <p:cNvCxnSpPr>
+            <a:cxnSpLocks/>
+          </p:cNvCxnSpPr>
+          <p:nvPr/>
+        </p:nvCxnSpPr>
+        <p:spPr>
+          <a:xfrm>
+            <a:off x="6805155" y="2328015"/>
+            <a:ext cx="0" cy="1417980"/>
+          </a:xfrm>
+          <a:prstGeom prst="straightConnector1">
+            <a:avLst/>
+          </a:prstGeom>
+          <a:ln w="25400" cap="rnd">
+            <a:solidFill>
+              <a:schemeClr val="tx1"/>
+            </a:solidFill>
+            <a:headEnd type="arrow" w="lg" len="lg"/>
+            <a:tailEnd type="none" w="lg" len="lg"/>
+          </a:ln>
+        </p:spPr>
+        <p:style>
+          <a:lnRef idx="1">
+            <a:schemeClr val="accent1"/>
+          </a:lnRef>
+          <a:fillRef idx="0">
+            <a:schemeClr val="accent1"/>
+          </a:fillRef>
+          <a:effectRef idx="0">
+            <a:schemeClr val="accent1"/>
+          </a:effectRef>
+          <a:fontRef idx="minor">
+            <a:schemeClr val="tx1"/>
+          </a:fontRef>
+        </p:style>
+      </p:cxnSp>
+      <p:sp>
+        <p:nvSpPr>
+          <p:cNvPr id="39" name="Oval 38">
+            <a:extLst>
+              <a:ext uri="{FF2B5EF4-FFF2-40B4-BE49-F238E27FC236}">
+                <a16:creationId xmlns:a16="http://schemas.microsoft.com/office/drawing/2014/main" id="{FEAF57DE-A6CC-6CD4-CE8B-31704AA26C16}"/>
+              </a:ext>
+            </a:extLst>
+          </p:cNvPr>
+          <p:cNvSpPr/>
+          <p:nvPr/>
+        </p:nvSpPr>
+        <p:spPr>
+          <a:xfrm>
+            <a:off x="4453905" y="1664758"/>
+            <a:ext cx="605608" cy="585407"/>
+          </a:xfrm>
+          <a:prstGeom prst="ellipse">
+            <a:avLst/>
+          </a:prstGeom>
+          <a:solidFill>
+            <a:srgbClr val="FF6161"/>
+          </a:solidFill>
+          <a:ln w="38100">
+            <a:solidFill>
+              <a:srgbClr val="C00000"/>
+            </a:solidFill>
+          </a:ln>
+        </p:spPr>
+        <p:style>
+          <a:lnRef idx="2">
+            <a:schemeClr val="accent1">
+              <a:shade val="15000"/>
+            </a:schemeClr>
+          </a:lnRef>
+          <a:fillRef idx="1">
+            <a:schemeClr val="accent1"/>
+          </a:fillRef>
+          <a:effectRef idx="0">
+            <a:schemeClr val="accent1"/>
+          </a:effectRef>
+          <a:fontRef idx="minor">
+            <a:schemeClr val="lt1"/>
+          </a:fontRef>
+        </p:style>
+        <p:txBody>
+          <a:bodyPr rtlCol="0" anchor="ctr"/>
+          <a:lstStyle/>
+          <a:p>
+            <a:pPr algn="ctr"/>
+            <a:endParaRPr lang="en-US"/>
+          </a:p>
+        </p:txBody>
+      </p:sp>
+      <p:sp>
+        <p:nvSpPr>
+          <p:cNvPr id="41" name="Oval 40">
+            <a:extLst>
+              <a:ext uri="{FF2B5EF4-FFF2-40B4-BE49-F238E27FC236}">
+                <a16:creationId xmlns:a16="http://schemas.microsoft.com/office/drawing/2014/main" id="{09FB6A3C-2B15-91A6-4D64-9753B4FF5E75}"/>
+              </a:ext>
+            </a:extLst>
+          </p:cNvPr>
+          <p:cNvSpPr/>
+          <p:nvPr/>
+        </p:nvSpPr>
+        <p:spPr>
+          <a:xfrm>
+            <a:off x="6497935" y="1665495"/>
+            <a:ext cx="605608" cy="585407"/>
+          </a:xfrm>
+          <a:prstGeom prst="ellipse">
+            <a:avLst/>
+          </a:prstGeom>
+          <a:solidFill>
+            <a:srgbClr val="FF6161"/>
+          </a:solidFill>
+          <a:ln w="38100">
+            <a:solidFill>
+              <a:srgbClr val="C00000"/>
+            </a:solidFill>
+          </a:ln>
+        </p:spPr>
+        <p:style>
+          <a:lnRef idx="2">
+            <a:schemeClr val="accent1">
+              <a:shade val="15000"/>
+            </a:schemeClr>
+          </a:lnRef>
+          <a:fillRef idx="1">
+            <a:schemeClr val="accent1"/>
+          </a:fillRef>
+          <a:effectRef idx="0">
+            <a:schemeClr val="accent1"/>
+          </a:effectRef>
+          <a:fontRef idx="minor">
+            <a:schemeClr val="lt1"/>
+          </a:fontRef>
+        </p:style>
+        <p:txBody>
+          <a:bodyPr rtlCol="0" anchor="ctr"/>
+          <a:lstStyle/>
+          <a:p>
+            <a:pPr algn="ctr"/>
+            <a:endParaRPr lang="en-US"/>
+          </a:p>
+        </p:txBody>
+      </p:sp>
+      <p:sp>
+        <p:nvSpPr>
+          <p:cNvPr id="42" name="Oval 41">
+            <a:extLst>
+              <a:ext uri="{FF2B5EF4-FFF2-40B4-BE49-F238E27FC236}">
+                <a16:creationId xmlns:a16="http://schemas.microsoft.com/office/drawing/2014/main" id="{C6BE660A-3E1E-1B29-4B1D-7F7EF28C3568}"/>
+              </a:ext>
+            </a:extLst>
+          </p:cNvPr>
+          <p:cNvSpPr/>
+          <p:nvPr/>
+        </p:nvSpPr>
+        <p:spPr>
+          <a:xfrm>
+            <a:off x="4453905" y="3845409"/>
+            <a:ext cx="605608" cy="585407"/>
+          </a:xfrm>
+          <a:prstGeom prst="ellipse">
+            <a:avLst/>
+          </a:prstGeom>
+          <a:solidFill>
+            <a:srgbClr val="00B0F0"/>
+          </a:solidFill>
+          <a:ln w="38100">
+            <a:solidFill>
+              <a:schemeClr val="accent1">
+                <a:lumMod val="50000"/>
+              </a:schemeClr>
+            </a:solidFill>
+          </a:ln>
+        </p:spPr>
+        <p:style>
+          <a:lnRef idx="2">
+            <a:schemeClr val="accent1">
+              <a:shade val="15000"/>
+            </a:schemeClr>
+          </a:lnRef>
+          <a:fillRef idx="1">
+            <a:schemeClr val="accent1"/>
+          </a:fillRef>
+          <a:effectRef idx="0">
+            <a:schemeClr val="accent1"/>
+          </a:effectRef>
+          <a:fontRef idx="minor">
+            <a:schemeClr val="lt1"/>
+          </a:fontRef>
+        </p:style>
+        <p:txBody>
+          <a:bodyPr rtlCol="0" anchor="ctr"/>
+          <a:lstStyle/>
+          <a:p>
+            <a:pPr algn="ctr"/>
+            <a:endParaRPr lang="en-US"/>
+          </a:p>
+        </p:txBody>
+      </p:sp>
+      <p:sp>
+        <p:nvSpPr>
+          <p:cNvPr id="43" name="Oval 42">
+            <a:extLst>
+              <a:ext uri="{FF2B5EF4-FFF2-40B4-BE49-F238E27FC236}">
+                <a16:creationId xmlns:a16="http://schemas.microsoft.com/office/drawing/2014/main" id="{3C39E87D-5531-1BAF-8436-2A23496168EB}"/>
+              </a:ext>
+            </a:extLst>
+          </p:cNvPr>
+          <p:cNvSpPr/>
+          <p:nvPr/>
+        </p:nvSpPr>
+        <p:spPr>
+          <a:xfrm>
+            <a:off x="6512630" y="3845409"/>
+            <a:ext cx="605608" cy="585407"/>
+          </a:xfrm>
+          <a:prstGeom prst="ellipse">
+            <a:avLst/>
+          </a:prstGeom>
+          <a:solidFill>
+            <a:srgbClr val="00B0F0"/>
+          </a:solidFill>
+          <a:ln w="38100">
+            <a:solidFill>
+              <a:schemeClr val="accent1">
+                <a:lumMod val="50000"/>
+              </a:schemeClr>
+            </a:solidFill>
+          </a:ln>
+        </p:spPr>
+        <p:style>
+          <a:lnRef idx="2">
+            <a:schemeClr val="accent1">
+              <a:shade val="15000"/>
+            </a:schemeClr>
+          </a:lnRef>
+          <a:fillRef idx="1">
+            <a:schemeClr val="accent1"/>
+          </a:fillRef>
+          <a:effectRef idx="0">
+            <a:schemeClr val="accent1"/>
+          </a:effectRef>
+          <a:fontRef idx="minor">
+            <a:schemeClr val="lt1"/>
+          </a:fontRef>
+        </p:style>
+        <p:txBody>
+          <a:bodyPr rtlCol="0" anchor="ctr"/>
+          <a:lstStyle/>
+          <a:p>
+            <a:pPr algn="ctr"/>
+            <a:endParaRPr lang="en-US"/>
+          </a:p>
+        </p:txBody>
+      </p:sp>
+      <p:sp>
+        <p:nvSpPr>
+          <p:cNvPr id="44" name="TextBox 43">
+            <a:extLst>
+              <a:ext uri="{FF2B5EF4-FFF2-40B4-BE49-F238E27FC236}">
+                <a16:creationId xmlns:a16="http://schemas.microsoft.com/office/drawing/2014/main" id="{1FE37F4D-CC83-F97A-AE97-96DBD37FAE69}"/>
+              </a:ext>
+            </a:extLst>
+          </p:cNvPr>
+          <p:cNvSpPr txBox="1"/>
+          <p:nvPr/>
+        </p:nvSpPr>
+        <p:spPr>
+          <a:xfrm>
+            <a:off x="4682061" y="2452120"/>
+            <a:ext cx="605608" cy="461665"/>
+          </a:xfrm>
+          <a:prstGeom prst="rect">
+            <a:avLst/>
+          </a:prstGeom>
+          <a:noFill/>
+        </p:spPr>
+        <p:txBody>
+          <a:bodyPr wrap="square" rtlCol="0">
+            <a:spAutoFit/>
+          </a:bodyPr>
+          <a:lstStyle/>
+          <a:p>
+            <a:pPr algn="ctr"/>
+            <a:r>
               <a:rPr lang="en-US" sz="2400" dirty="0"/>
-              <a:t>Risk</a:t>
+              <a:t>1</a:t>
+            </a:r>
+          </a:p>
+        </p:txBody>
+      </p:sp>
+      <p:sp>
+        <p:nvSpPr>
+          <p:cNvPr id="45" name="TextBox 44">
+            <a:extLst>
+              <a:ext uri="{FF2B5EF4-FFF2-40B4-BE49-F238E27FC236}">
+                <a16:creationId xmlns:a16="http://schemas.microsoft.com/office/drawing/2014/main" id="{A304783E-8497-6D42-F49D-286288FD850F}"/>
+              </a:ext>
+            </a:extLst>
+          </p:cNvPr>
+          <p:cNvSpPr txBox="1"/>
+          <p:nvPr/>
+        </p:nvSpPr>
+        <p:spPr>
+          <a:xfrm>
+            <a:off x="2602612" y="2447584"/>
+            <a:ext cx="1674975" cy="461665"/>
+          </a:xfrm>
+          <a:prstGeom prst="rect">
+            <a:avLst/>
+          </a:prstGeom>
+          <a:noFill/>
+        </p:spPr>
+        <p:txBody>
+          <a:bodyPr wrap="square" rtlCol="0">
+            <a:spAutoFit/>
+          </a:bodyPr>
+          <a:lstStyle/>
+          <a:p>
+            <a:pPr algn="r"/>
+            <a:r>
+              <a:rPr lang="hu-HU" sz="2400" dirty="0"/>
+              <a:t>Payments</a:t>
+            </a:r>
+            <a:endParaRPr lang="en-US" sz="2400" dirty="0"/>
+          </a:p>
+        </p:txBody>
+      </p:sp>
+      <p:sp>
+        <p:nvSpPr>
+          <p:cNvPr id="46" name="TextBox 45">
+            <a:extLst>
+              <a:ext uri="{FF2B5EF4-FFF2-40B4-BE49-F238E27FC236}">
+                <a16:creationId xmlns:a16="http://schemas.microsoft.com/office/drawing/2014/main" id="{D62313C6-6C77-2AE1-0259-6E34E147346F}"/>
+              </a:ext>
+            </a:extLst>
+          </p:cNvPr>
+          <p:cNvSpPr txBox="1"/>
+          <p:nvPr/>
+        </p:nvSpPr>
+        <p:spPr>
+          <a:xfrm>
+            <a:off x="6890876" y="2452121"/>
+            <a:ext cx="914396" cy="461665"/>
+          </a:xfrm>
+          <a:prstGeom prst="rect">
+            <a:avLst/>
+          </a:prstGeom>
+          <a:noFill/>
+        </p:spPr>
+        <p:txBody>
+          <a:bodyPr wrap="square" rtlCol="0">
+            <a:spAutoFit/>
+          </a:bodyPr>
+          <a:lstStyle/>
+          <a:p>
+            <a:r>
+              <a:rPr lang="en-US" sz="2400" dirty="0"/>
+              <a:t>1 + q</a:t>
+            </a:r>
+          </a:p>
+        </p:txBody>
+      </p:sp>
+      <p:sp>
+        <p:nvSpPr>
+          <p:cNvPr id="47" name="TextBox 46">
+            <a:extLst>
+              <a:ext uri="{FF2B5EF4-FFF2-40B4-BE49-F238E27FC236}">
+                <a16:creationId xmlns:a16="http://schemas.microsoft.com/office/drawing/2014/main" id="{EE10D786-8E8B-DE21-8CD0-462D9343039E}"/>
+              </a:ext>
+            </a:extLst>
+          </p:cNvPr>
+          <p:cNvSpPr txBox="1"/>
+          <p:nvPr/>
+        </p:nvSpPr>
+        <p:spPr>
+          <a:xfrm>
+            <a:off x="8864437" y="2447583"/>
+            <a:ext cx="2369354" cy="461665"/>
+          </a:xfrm>
+          <a:prstGeom prst="rect">
+            <a:avLst/>
+          </a:prstGeom>
+          <a:noFill/>
+        </p:spPr>
+        <p:txBody>
+          <a:bodyPr wrap="square" rtlCol="0">
+            <a:spAutoFit/>
+          </a:bodyPr>
+          <a:lstStyle/>
+          <a:p>
+            <a:r>
+              <a:rPr lang="en-US" sz="2400" dirty="0"/>
+              <a:t>( 1y simple rate )</a:t>
             </a:r>
           </a:p>
         </p:txBody>
@@ -4709,7 +5515,7 @@
     </p:spTree>
     <p:extLst>
       <p:ext uri="{BB962C8B-B14F-4D97-AF65-F5344CB8AC3E}">
-        <p14:creationId xmlns:p14="http://schemas.microsoft.com/office/powerpoint/2010/main" val="1126488000"/>
+        <p14:creationId xmlns:p14="http://schemas.microsoft.com/office/powerpoint/2010/main" val="3982887013"/>
       </p:ext>
     </p:extLst>
   </p:cSld>
@@ -4738,10 +5544,10 @@
       </p:grpSpPr>
       <p:sp>
         <p:nvSpPr>
-          <p:cNvPr id="2" name="TextBox 1">
-            <a:extLst>
-              <a:ext uri="{FF2B5EF4-FFF2-40B4-BE49-F238E27FC236}">
-                <a16:creationId xmlns:a16="http://schemas.microsoft.com/office/drawing/2014/main" id="{E03B3FC0-A19A-0D68-D5BE-C9362748E2B5}"/>
+          <p:cNvPr id="12" name="TextBox 11">
+            <a:extLst>
+              <a:ext uri="{FF2B5EF4-FFF2-40B4-BE49-F238E27FC236}">
+                <a16:creationId xmlns:a16="http://schemas.microsoft.com/office/drawing/2014/main" id="{706A4D02-961D-456E-92D6-353375DDEE25}"/>
               </a:ext>
             </a:extLst>
           </p:cNvPr>
@@ -4775,12 +5581,142 @@
           </a:p>
         </p:txBody>
       </p:sp>
-      <p:sp>
-        <p:nvSpPr>
-          <p:cNvPr id="3" name="TextBox 2">
-            <a:extLst>
-              <a:ext uri="{FF2B5EF4-FFF2-40B4-BE49-F238E27FC236}">
-                <a16:creationId xmlns:a16="http://schemas.microsoft.com/office/drawing/2014/main" id="{688D616B-8979-3A02-FC3B-CEA112A0AB0D}"/>
+      <p:cxnSp>
+        <p:nvCxnSpPr>
+          <p:cNvPr id="22" name="Straight Arrow Connector 21">
+            <a:extLst>
+              <a:ext uri="{FF2B5EF4-FFF2-40B4-BE49-F238E27FC236}">
+                <a16:creationId xmlns:a16="http://schemas.microsoft.com/office/drawing/2014/main" id="{A55FF6FE-ABED-05BE-32C9-B6F28F172723}"/>
+              </a:ext>
+            </a:extLst>
+          </p:cNvPr>
+          <p:cNvCxnSpPr/>
+          <p:nvPr/>
+        </p:nvCxnSpPr>
+        <p:spPr>
+          <a:xfrm>
+            <a:off x="4391372" y="5026121"/>
+            <a:ext cx="4464000" cy="0"/>
+          </a:xfrm>
+          <a:prstGeom prst="straightConnector1">
+            <a:avLst/>
+          </a:prstGeom>
+          <a:ln w="25400" cap="rnd">
+            <a:solidFill>
+              <a:schemeClr val="tx1"/>
+            </a:solidFill>
+            <a:tailEnd type="arrow" w="lg" len="lg"/>
+          </a:ln>
+        </p:spPr>
+        <p:style>
+          <a:lnRef idx="1">
+            <a:schemeClr val="accent1"/>
+          </a:lnRef>
+          <a:fillRef idx="0">
+            <a:schemeClr val="accent1"/>
+          </a:fillRef>
+          <a:effectRef idx="0">
+            <a:schemeClr val="accent1"/>
+          </a:effectRef>
+          <a:fontRef idx="minor">
+            <a:schemeClr val="tx1"/>
+          </a:fontRef>
+        </p:style>
+      </p:cxnSp>
+      <p:cxnSp>
+        <p:nvCxnSpPr>
+          <p:cNvPr id="23" name="Straight Arrow Connector 22">
+            <a:extLst>
+              <a:ext uri="{FF2B5EF4-FFF2-40B4-BE49-F238E27FC236}">
+                <a16:creationId xmlns:a16="http://schemas.microsoft.com/office/drawing/2014/main" id="{3B11E5E3-2960-3717-242D-5568D05BE418}"/>
+              </a:ext>
+            </a:extLst>
+          </p:cNvPr>
+          <p:cNvCxnSpPr>
+            <a:cxnSpLocks/>
+          </p:cNvCxnSpPr>
+          <p:nvPr/>
+        </p:nvCxnSpPr>
+        <p:spPr>
+          <a:xfrm flipV="1">
+            <a:off x="4749178" y="4877034"/>
+            <a:ext cx="0" cy="301487"/>
+          </a:xfrm>
+          <a:prstGeom prst="straightConnector1">
+            <a:avLst/>
+          </a:prstGeom>
+          <a:ln w="25400" cap="rnd">
+            <a:solidFill>
+              <a:schemeClr val="tx1"/>
+            </a:solidFill>
+            <a:tailEnd type="none" w="lg" len="lg"/>
+          </a:ln>
+        </p:spPr>
+        <p:style>
+          <a:lnRef idx="1">
+            <a:schemeClr val="accent1"/>
+          </a:lnRef>
+          <a:fillRef idx="0">
+            <a:schemeClr val="accent1"/>
+          </a:fillRef>
+          <a:effectRef idx="0">
+            <a:schemeClr val="accent1"/>
+          </a:effectRef>
+          <a:fontRef idx="minor">
+            <a:schemeClr val="tx1"/>
+          </a:fontRef>
+        </p:style>
+      </p:cxnSp>
+      <p:cxnSp>
+        <p:nvCxnSpPr>
+          <p:cNvPr id="24" name="Straight Arrow Connector 23">
+            <a:extLst>
+              <a:ext uri="{FF2B5EF4-FFF2-40B4-BE49-F238E27FC236}">
+                <a16:creationId xmlns:a16="http://schemas.microsoft.com/office/drawing/2014/main" id="{B547C32D-A926-AEDC-7A83-8545EB5B1CAC}"/>
+              </a:ext>
+            </a:extLst>
+          </p:cNvPr>
+          <p:cNvCxnSpPr>
+            <a:cxnSpLocks/>
+          </p:cNvCxnSpPr>
+          <p:nvPr/>
+        </p:nvCxnSpPr>
+        <p:spPr>
+          <a:xfrm flipV="1">
+            <a:off x="6813847" y="4877034"/>
+            <a:ext cx="0" cy="301487"/>
+          </a:xfrm>
+          <a:prstGeom prst="straightConnector1">
+            <a:avLst/>
+          </a:prstGeom>
+          <a:ln w="25400" cap="rnd">
+            <a:solidFill>
+              <a:schemeClr val="tx1"/>
+            </a:solidFill>
+            <a:tailEnd type="none" w="lg" len="lg"/>
+          </a:ln>
+        </p:spPr>
+        <p:style>
+          <a:lnRef idx="1">
+            <a:schemeClr val="accent1"/>
+          </a:lnRef>
+          <a:fillRef idx="0">
+            <a:schemeClr val="accent1"/>
+          </a:fillRef>
+          <a:effectRef idx="0">
+            <a:schemeClr val="accent1"/>
+          </a:effectRef>
+          <a:fontRef idx="minor">
+            <a:schemeClr val="tx1"/>
+          </a:fontRef>
+        </p:style>
+      </p:cxnSp>
+      <p:sp>
+        <p:nvSpPr>
+          <p:cNvPr id="25" name="TextBox 24">
+            <a:extLst>
+              <a:ext uri="{FF2B5EF4-FFF2-40B4-BE49-F238E27FC236}">
+                <a16:creationId xmlns:a16="http://schemas.microsoft.com/office/drawing/2014/main" id="{17438D28-9229-EDE5-21EA-1F3B6405FCD6}"/>
               </a:ext>
             </a:extLst>
           </p:cNvPr>
@@ -4789,8 +5725,8 @@
         </p:nvSpPr>
         <p:spPr>
           <a:xfrm>
-            <a:off x="625365" y="1602304"/>
-            <a:ext cx="1673887" cy="461665"/>
+            <a:off x="7707434" y="4441346"/>
+            <a:ext cx="914396" cy="461665"/>
           </a:xfrm>
           <a:prstGeom prst="rect">
             <a:avLst/>
@@ -4803,9 +5739,1059 @@
           </a:bodyPr>
           <a:lstStyle/>
           <a:p>
+            <a:pPr algn="r"/>
+            <a:r>
+              <a:rPr lang="hu-HU" sz="2400" dirty="0"/>
+              <a:t>Time</a:t>
+            </a:r>
+            <a:endParaRPr lang="en-US" sz="2400" dirty="0"/>
+          </a:p>
+        </p:txBody>
+      </p:sp>
+      <p:sp>
+        <p:nvSpPr>
+          <p:cNvPr id="26" name="TextBox 25">
+            <a:extLst>
+              <a:ext uri="{FF2B5EF4-FFF2-40B4-BE49-F238E27FC236}">
+                <a16:creationId xmlns:a16="http://schemas.microsoft.com/office/drawing/2014/main" id="{78ED060C-EC26-352F-E429-EF13D97716E7}"/>
+              </a:ext>
+            </a:extLst>
+          </p:cNvPr>
+          <p:cNvSpPr txBox="1"/>
+          <p:nvPr/>
+        </p:nvSpPr>
+        <p:spPr>
+          <a:xfrm>
+            <a:off x="4305241" y="5270446"/>
+            <a:ext cx="881264" cy="461665"/>
+          </a:xfrm>
+          <a:prstGeom prst="rect">
+            <a:avLst/>
+          </a:prstGeom>
+          <a:noFill/>
+        </p:spPr>
+        <p:txBody>
+          <a:bodyPr wrap="square" rtlCol="0">
+            <a:spAutoFit/>
+          </a:bodyPr>
+          <a:lstStyle/>
+          <a:p>
+            <a:pPr algn="ctr"/>
+            <a:r>
+              <a:rPr lang="hu-HU" sz="2400" dirty="0"/>
+              <a:t>0</a:t>
+            </a:r>
+            <a:endParaRPr lang="en-US" sz="2400" dirty="0"/>
+          </a:p>
+        </p:txBody>
+      </p:sp>
+      <p:sp>
+        <p:nvSpPr>
+          <p:cNvPr id="27" name="TextBox 26">
+            <a:extLst>
+              <a:ext uri="{FF2B5EF4-FFF2-40B4-BE49-F238E27FC236}">
+                <a16:creationId xmlns:a16="http://schemas.microsoft.com/office/drawing/2014/main" id="{83687220-C7E5-B563-7DFC-99F5967052E6}"/>
+              </a:ext>
+            </a:extLst>
+          </p:cNvPr>
+          <p:cNvSpPr txBox="1"/>
+          <p:nvPr/>
+        </p:nvSpPr>
+        <p:spPr>
+          <a:xfrm>
+            <a:off x="6376885" y="5270446"/>
+            <a:ext cx="881264" cy="461665"/>
+          </a:xfrm>
+          <a:prstGeom prst="rect">
+            <a:avLst/>
+          </a:prstGeom>
+          <a:noFill/>
+        </p:spPr>
+        <p:txBody>
+          <a:bodyPr wrap="square" rtlCol="0">
+            <a:spAutoFit/>
+          </a:bodyPr>
+          <a:lstStyle/>
+          <a:p>
+            <a:pPr algn="ctr"/>
+            <a:r>
+              <a:rPr lang="hu-HU" sz="2400" dirty="0"/>
+              <a:t>1</a:t>
+            </a:r>
+            <a:endParaRPr lang="en-US" sz="2400" dirty="0"/>
+          </a:p>
+        </p:txBody>
+      </p:sp>
+      <p:sp>
+        <p:nvSpPr>
+          <p:cNvPr id="30" name="TextBox 29">
+            <a:extLst>
+              <a:ext uri="{FF2B5EF4-FFF2-40B4-BE49-F238E27FC236}">
+                <a16:creationId xmlns:a16="http://schemas.microsoft.com/office/drawing/2014/main" id="{0DE7E593-4DF4-5EE2-9A6F-3D6A62BF3827}"/>
+              </a:ext>
+            </a:extLst>
+          </p:cNvPr>
+          <p:cNvSpPr txBox="1"/>
+          <p:nvPr/>
+        </p:nvSpPr>
+        <p:spPr>
+          <a:xfrm>
+            <a:off x="4256443" y="1252728"/>
+            <a:ext cx="1000531" cy="461665"/>
+          </a:xfrm>
+          <a:prstGeom prst="rect">
+            <a:avLst/>
+          </a:prstGeom>
+          <a:noFill/>
+        </p:spPr>
+        <p:txBody>
+          <a:bodyPr wrap="square" rtlCol="0">
+            <a:spAutoFit/>
+          </a:bodyPr>
+          <a:lstStyle/>
+          <a:p>
+            <a:pPr algn="ctr"/>
+            <a:r>
+              <a:rPr lang="hu-HU" sz="2400" dirty="0"/>
+              <a:t>Alice</a:t>
+            </a:r>
+            <a:endParaRPr lang="en-US" sz="2400" dirty="0"/>
+          </a:p>
+        </p:txBody>
+      </p:sp>
+      <p:sp>
+        <p:nvSpPr>
+          <p:cNvPr id="31" name="TextBox 30">
+            <a:extLst>
+              <a:ext uri="{FF2B5EF4-FFF2-40B4-BE49-F238E27FC236}">
+                <a16:creationId xmlns:a16="http://schemas.microsoft.com/office/drawing/2014/main" id="{B3D11117-A649-533A-39CC-8E67C361FBA7}"/>
+              </a:ext>
+            </a:extLst>
+          </p:cNvPr>
+          <p:cNvSpPr txBox="1"/>
+          <p:nvPr/>
+        </p:nvSpPr>
+        <p:spPr>
+          <a:xfrm>
+            <a:off x="4257371" y="4383493"/>
+            <a:ext cx="1000531" cy="461665"/>
+          </a:xfrm>
+          <a:prstGeom prst="rect">
+            <a:avLst/>
+          </a:prstGeom>
+          <a:noFill/>
+        </p:spPr>
+        <p:txBody>
+          <a:bodyPr wrap="square" rtlCol="0">
+            <a:spAutoFit/>
+          </a:bodyPr>
+          <a:lstStyle/>
+          <a:p>
+            <a:pPr algn="ctr"/>
+            <a:r>
+              <a:rPr lang="hu-HU" sz="2400" dirty="0"/>
+              <a:t>Bob</a:t>
+            </a:r>
+            <a:endParaRPr lang="en-US" sz="2400" dirty="0"/>
+          </a:p>
+        </p:txBody>
+      </p:sp>
+      <p:cxnSp>
+        <p:nvCxnSpPr>
+          <p:cNvPr id="32" name="Straight Arrow Connector 31">
+            <a:extLst>
+              <a:ext uri="{FF2B5EF4-FFF2-40B4-BE49-F238E27FC236}">
+                <a16:creationId xmlns:a16="http://schemas.microsoft.com/office/drawing/2014/main" id="{2D27A85E-0789-177E-BA38-88261BC7524B}"/>
+              </a:ext>
+            </a:extLst>
+          </p:cNvPr>
+          <p:cNvCxnSpPr>
+            <a:cxnSpLocks/>
+          </p:cNvCxnSpPr>
+          <p:nvPr/>
+        </p:nvCxnSpPr>
+        <p:spPr>
+          <a:xfrm>
+            <a:off x="4745873" y="2346677"/>
+            <a:ext cx="0" cy="1417980"/>
+          </a:xfrm>
+          <a:prstGeom prst="straightConnector1">
+            <a:avLst/>
+          </a:prstGeom>
+          <a:ln w="25400" cap="rnd">
+            <a:solidFill>
+              <a:schemeClr val="tx1"/>
+            </a:solidFill>
+            <a:headEnd w="lg" len="lg"/>
+            <a:tailEnd type="arrow" w="lg" len="lg"/>
+          </a:ln>
+        </p:spPr>
+        <p:style>
+          <a:lnRef idx="1">
+            <a:schemeClr val="accent1"/>
+          </a:lnRef>
+          <a:fillRef idx="0">
+            <a:schemeClr val="accent1"/>
+          </a:fillRef>
+          <a:effectRef idx="0">
+            <a:schemeClr val="accent1"/>
+          </a:effectRef>
+          <a:fontRef idx="minor">
+            <a:schemeClr val="tx1"/>
+          </a:fontRef>
+        </p:style>
+      </p:cxnSp>
+      <p:cxnSp>
+        <p:nvCxnSpPr>
+          <p:cNvPr id="35" name="Straight Arrow Connector 34">
+            <a:extLst>
+              <a:ext uri="{FF2B5EF4-FFF2-40B4-BE49-F238E27FC236}">
+                <a16:creationId xmlns:a16="http://schemas.microsoft.com/office/drawing/2014/main" id="{F231E58E-6969-8B7B-BD6B-7D3960568FB7}"/>
+              </a:ext>
+            </a:extLst>
+          </p:cNvPr>
+          <p:cNvCxnSpPr>
+            <a:cxnSpLocks/>
+          </p:cNvCxnSpPr>
+          <p:nvPr/>
+        </p:nvCxnSpPr>
+        <p:spPr>
+          <a:xfrm>
+            <a:off x="6805155" y="2328015"/>
+            <a:ext cx="0" cy="1417980"/>
+          </a:xfrm>
+          <a:prstGeom prst="straightConnector1">
+            <a:avLst/>
+          </a:prstGeom>
+          <a:ln w="25400" cap="rnd">
+            <a:solidFill>
+              <a:schemeClr val="tx1"/>
+            </a:solidFill>
+            <a:headEnd type="arrow" w="lg" len="lg"/>
+            <a:tailEnd type="none" w="lg" len="lg"/>
+          </a:ln>
+        </p:spPr>
+        <p:style>
+          <a:lnRef idx="1">
+            <a:schemeClr val="accent1"/>
+          </a:lnRef>
+          <a:fillRef idx="0">
+            <a:schemeClr val="accent1"/>
+          </a:fillRef>
+          <a:effectRef idx="0">
+            <a:schemeClr val="accent1"/>
+          </a:effectRef>
+          <a:fontRef idx="minor">
+            <a:schemeClr val="tx1"/>
+          </a:fontRef>
+        </p:style>
+      </p:cxnSp>
+      <p:sp>
+        <p:nvSpPr>
+          <p:cNvPr id="39" name="Oval 38">
+            <a:extLst>
+              <a:ext uri="{FF2B5EF4-FFF2-40B4-BE49-F238E27FC236}">
+                <a16:creationId xmlns:a16="http://schemas.microsoft.com/office/drawing/2014/main" id="{FEAF57DE-A6CC-6CD4-CE8B-31704AA26C16}"/>
+              </a:ext>
+            </a:extLst>
+          </p:cNvPr>
+          <p:cNvSpPr/>
+          <p:nvPr/>
+        </p:nvSpPr>
+        <p:spPr>
+          <a:xfrm>
+            <a:off x="4453905" y="1664758"/>
+            <a:ext cx="605608" cy="585407"/>
+          </a:xfrm>
+          <a:prstGeom prst="ellipse">
+            <a:avLst/>
+          </a:prstGeom>
+          <a:solidFill>
+            <a:srgbClr val="FF6161"/>
+          </a:solidFill>
+          <a:ln w="38100">
+            <a:solidFill>
+              <a:srgbClr val="C00000"/>
+            </a:solidFill>
+          </a:ln>
+        </p:spPr>
+        <p:style>
+          <a:lnRef idx="2">
+            <a:schemeClr val="accent1">
+              <a:shade val="15000"/>
+            </a:schemeClr>
+          </a:lnRef>
+          <a:fillRef idx="1">
+            <a:schemeClr val="accent1"/>
+          </a:fillRef>
+          <a:effectRef idx="0">
+            <a:schemeClr val="accent1"/>
+          </a:effectRef>
+          <a:fontRef idx="minor">
+            <a:schemeClr val="lt1"/>
+          </a:fontRef>
+        </p:style>
+        <p:txBody>
+          <a:bodyPr rtlCol="0" anchor="ctr"/>
+          <a:lstStyle/>
+          <a:p>
+            <a:pPr algn="ctr"/>
+            <a:endParaRPr lang="en-US"/>
+          </a:p>
+        </p:txBody>
+      </p:sp>
+      <p:sp>
+        <p:nvSpPr>
+          <p:cNvPr id="41" name="Oval 40">
+            <a:extLst>
+              <a:ext uri="{FF2B5EF4-FFF2-40B4-BE49-F238E27FC236}">
+                <a16:creationId xmlns:a16="http://schemas.microsoft.com/office/drawing/2014/main" id="{09FB6A3C-2B15-91A6-4D64-9753B4FF5E75}"/>
+              </a:ext>
+            </a:extLst>
+          </p:cNvPr>
+          <p:cNvSpPr/>
+          <p:nvPr/>
+        </p:nvSpPr>
+        <p:spPr>
+          <a:xfrm>
+            <a:off x="6497935" y="1665495"/>
+            <a:ext cx="605608" cy="585407"/>
+          </a:xfrm>
+          <a:prstGeom prst="ellipse">
+            <a:avLst/>
+          </a:prstGeom>
+          <a:solidFill>
+            <a:srgbClr val="FF6161"/>
+          </a:solidFill>
+          <a:ln w="38100">
+            <a:solidFill>
+              <a:srgbClr val="C00000"/>
+            </a:solidFill>
+          </a:ln>
+        </p:spPr>
+        <p:style>
+          <a:lnRef idx="2">
+            <a:schemeClr val="accent1">
+              <a:shade val="15000"/>
+            </a:schemeClr>
+          </a:lnRef>
+          <a:fillRef idx="1">
+            <a:schemeClr val="accent1"/>
+          </a:fillRef>
+          <a:effectRef idx="0">
+            <a:schemeClr val="accent1"/>
+          </a:effectRef>
+          <a:fontRef idx="minor">
+            <a:schemeClr val="lt1"/>
+          </a:fontRef>
+        </p:style>
+        <p:txBody>
+          <a:bodyPr rtlCol="0" anchor="ctr"/>
+          <a:lstStyle/>
+          <a:p>
+            <a:pPr algn="ctr"/>
+            <a:endParaRPr lang="en-US"/>
+          </a:p>
+        </p:txBody>
+      </p:sp>
+      <p:sp>
+        <p:nvSpPr>
+          <p:cNvPr id="42" name="Oval 41">
+            <a:extLst>
+              <a:ext uri="{FF2B5EF4-FFF2-40B4-BE49-F238E27FC236}">
+                <a16:creationId xmlns:a16="http://schemas.microsoft.com/office/drawing/2014/main" id="{C6BE660A-3E1E-1B29-4B1D-7F7EF28C3568}"/>
+              </a:ext>
+            </a:extLst>
+          </p:cNvPr>
+          <p:cNvSpPr/>
+          <p:nvPr/>
+        </p:nvSpPr>
+        <p:spPr>
+          <a:xfrm>
+            <a:off x="4453905" y="3845409"/>
+            <a:ext cx="605608" cy="585407"/>
+          </a:xfrm>
+          <a:prstGeom prst="ellipse">
+            <a:avLst/>
+          </a:prstGeom>
+          <a:solidFill>
+            <a:srgbClr val="00B0F0"/>
+          </a:solidFill>
+          <a:ln w="38100">
+            <a:solidFill>
+              <a:schemeClr val="accent1">
+                <a:lumMod val="50000"/>
+              </a:schemeClr>
+            </a:solidFill>
+          </a:ln>
+        </p:spPr>
+        <p:style>
+          <a:lnRef idx="2">
+            <a:schemeClr val="accent1">
+              <a:shade val="15000"/>
+            </a:schemeClr>
+          </a:lnRef>
+          <a:fillRef idx="1">
+            <a:schemeClr val="accent1"/>
+          </a:fillRef>
+          <a:effectRef idx="0">
+            <a:schemeClr val="accent1"/>
+          </a:effectRef>
+          <a:fontRef idx="minor">
+            <a:schemeClr val="lt1"/>
+          </a:fontRef>
+        </p:style>
+        <p:txBody>
+          <a:bodyPr rtlCol="0" anchor="ctr"/>
+          <a:lstStyle/>
+          <a:p>
+            <a:pPr algn="ctr"/>
+            <a:endParaRPr lang="en-US"/>
+          </a:p>
+        </p:txBody>
+      </p:sp>
+      <p:sp>
+        <p:nvSpPr>
+          <p:cNvPr id="43" name="Oval 42">
+            <a:extLst>
+              <a:ext uri="{FF2B5EF4-FFF2-40B4-BE49-F238E27FC236}">
+                <a16:creationId xmlns:a16="http://schemas.microsoft.com/office/drawing/2014/main" id="{3C39E87D-5531-1BAF-8436-2A23496168EB}"/>
+              </a:ext>
+            </a:extLst>
+          </p:cNvPr>
+          <p:cNvSpPr/>
+          <p:nvPr/>
+        </p:nvSpPr>
+        <p:spPr>
+          <a:xfrm>
+            <a:off x="6512630" y="3845409"/>
+            <a:ext cx="605608" cy="585407"/>
+          </a:xfrm>
+          <a:prstGeom prst="ellipse">
+            <a:avLst/>
+          </a:prstGeom>
+          <a:solidFill>
+            <a:srgbClr val="00B0F0"/>
+          </a:solidFill>
+          <a:ln w="38100">
+            <a:solidFill>
+              <a:schemeClr val="accent1">
+                <a:lumMod val="50000"/>
+              </a:schemeClr>
+            </a:solidFill>
+          </a:ln>
+        </p:spPr>
+        <p:style>
+          <a:lnRef idx="2">
+            <a:schemeClr val="accent1">
+              <a:shade val="15000"/>
+            </a:schemeClr>
+          </a:lnRef>
+          <a:fillRef idx="1">
+            <a:schemeClr val="accent1"/>
+          </a:fillRef>
+          <a:effectRef idx="0">
+            <a:schemeClr val="accent1"/>
+          </a:effectRef>
+          <a:fontRef idx="minor">
+            <a:schemeClr val="lt1"/>
+          </a:fontRef>
+        </p:style>
+        <p:txBody>
+          <a:bodyPr rtlCol="0" anchor="ctr"/>
+          <a:lstStyle/>
+          <a:p>
+            <a:pPr algn="ctr"/>
+            <a:endParaRPr lang="en-US"/>
+          </a:p>
+        </p:txBody>
+      </p:sp>
+      <p:sp>
+        <p:nvSpPr>
+          <p:cNvPr id="2" name="TextBox 1">
+            <a:extLst>
+              <a:ext uri="{FF2B5EF4-FFF2-40B4-BE49-F238E27FC236}">
+                <a16:creationId xmlns:a16="http://schemas.microsoft.com/office/drawing/2014/main" id="{8F86EEBA-1F6C-269C-3C96-3A48542CD200}"/>
+              </a:ext>
+            </a:extLst>
+          </p:cNvPr>
+          <p:cNvSpPr txBox="1"/>
+          <p:nvPr/>
+        </p:nvSpPr>
+        <p:spPr>
+          <a:xfrm>
+            <a:off x="1623521" y="2876083"/>
+            <a:ext cx="2663390" cy="830997"/>
+          </a:xfrm>
+          <a:prstGeom prst="rect">
+            <a:avLst/>
+          </a:prstGeom>
+          <a:noFill/>
+        </p:spPr>
+        <p:txBody>
+          <a:bodyPr wrap="square" rtlCol="0">
+            <a:spAutoFit/>
+          </a:bodyPr>
+          <a:lstStyle/>
+          <a:p>
+            <a:pPr algn="r"/>
+            <a:r>
+              <a:rPr lang="en-US" sz="2400" dirty="0">
+                <a:solidFill>
+                  <a:srgbClr val="4CA22E"/>
+                </a:solidFill>
+              </a:rPr>
+              <a:t>Transferring 2x the exact same thing</a:t>
+            </a:r>
+          </a:p>
+        </p:txBody>
+      </p:sp>
+      <p:cxnSp>
+        <p:nvCxnSpPr>
+          <p:cNvPr id="3" name="Straight Arrow Connector 2">
+            <a:extLst>
+              <a:ext uri="{FF2B5EF4-FFF2-40B4-BE49-F238E27FC236}">
+                <a16:creationId xmlns:a16="http://schemas.microsoft.com/office/drawing/2014/main" id="{AB67D0F5-4D5F-81C8-4D1B-B5DAEAFD080E}"/>
+              </a:ext>
+            </a:extLst>
+          </p:cNvPr>
+          <p:cNvCxnSpPr>
+            <a:cxnSpLocks/>
+          </p:cNvCxnSpPr>
+          <p:nvPr/>
+        </p:nvCxnSpPr>
+        <p:spPr>
+          <a:xfrm>
+            <a:off x="6553921" y="2365339"/>
+            <a:ext cx="0" cy="1417980"/>
+          </a:xfrm>
+          <a:prstGeom prst="straightConnector1">
+            <a:avLst/>
+          </a:prstGeom>
+          <a:ln w="25400" cap="rnd">
+            <a:solidFill>
+              <a:srgbClr val="4CA22E"/>
+            </a:solidFill>
+            <a:prstDash val="lgDash"/>
+            <a:headEnd w="lg" len="lg"/>
+            <a:tailEnd type="arrow" w="lg" len="lg"/>
+          </a:ln>
+        </p:spPr>
+        <p:style>
+          <a:lnRef idx="1">
+            <a:schemeClr val="accent1"/>
+          </a:lnRef>
+          <a:fillRef idx="0">
+            <a:schemeClr val="accent1"/>
+          </a:fillRef>
+          <a:effectRef idx="0">
+            <a:schemeClr val="accent1"/>
+          </a:effectRef>
+          <a:fontRef idx="minor">
+            <a:schemeClr val="tx1"/>
+          </a:fontRef>
+        </p:style>
+      </p:cxnSp>
+      <p:cxnSp>
+        <p:nvCxnSpPr>
+          <p:cNvPr id="4" name="Straight Arrow Connector 3">
+            <a:extLst>
+              <a:ext uri="{FF2B5EF4-FFF2-40B4-BE49-F238E27FC236}">
+                <a16:creationId xmlns:a16="http://schemas.microsoft.com/office/drawing/2014/main" id="{C32334A4-A192-8BFC-1FD3-944BA1499B60}"/>
+              </a:ext>
+            </a:extLst>
+          </p:cNvPr>
+          <p:cNvCxnSpPr>
+            <a:cxnSpLocks/>
+          </p:cNvCxnSpPr>
+          <p:nvPr/>
+        </p:nvCxnSpPr>
+        <p:spPr>
+          <a:xfrm>
+            <a:off x="4475351" y="2337346"/>
+            <a:ext cx="0" cy="1417980"/>
+          </a:xfrm>
+          <a:prstGeom prst="straightConnector1">
+            <a:avLst/>
+          </a:prstGeom>
+          <a:ln w="25400" cap="rnd">
+            <a:solidFill>
+              <a:srgbClr val="4CA22E"/>
+            </a:solidFill>
+            <a:prstDash val="lgDash"/>
+            <a:headEnd type="arrow" w="lg" len="lg"/>
+            <a:tailEnd type="none" w="lg" len="lg"/>
+          </a:ln>
+        </p:spPr>
+        <p:style>
+          <a:lnRef idx="1">
+            <a:schemeClr val="accent1"/>
+          </a:lnRef>
+          <a:fillRef idx="0">
+            <a:schemeClr val="accent1"/>
+          </a:fillRef>
+          <a:effectRef idx="0">
+            <a:schemeClr val="accent1"/>
+          </a:effectRef>
+          <a:fontRef idx="minor">
+            <a:schemeClr val="tx1"/>
+          </a:fontRef>
+        </p:style>
+      </p:cxnSp>
+      <p:cxnSp>
+        <p:nvCxnSpPr>
+          <p:cNvPr id="9" name="Straight Arrow Connector 8">
+            <a:extLst>
+              <a:ext uri="{FF2B5EF4-FFF2-40B4-BE49-F238E27FC236}">
+                <a16:creationId xmlns:a16="http://schemas.microsoft.com/office/drawing/2014/main" id="{FE98CA68-3E69-F79C-CB0A-6BD136FBC802}"/>
+              </a:ext>
+            </a:extLst>
+          </p:cNvPr>
+          <p:cNvCxnSpPr>
+            <a:cxnSpLocks/>
+          </p:cNvCxnSpPr>
+          <p:nvPr/>
+        </p:nvCxnSpPr>
+        <p:spPr>
+          <a:xfrm>
+            <a:off x="4745873" y="2346677"/>
+            <a:ext cx="0" cy="1417980"/>
+          </a:xfrm>
+          <a:prstGeom prst="straightConnector1">
+            <a:avLst/>
+          </a:prstGeom>
+          <a:ln w="25400" cap="rnd">
+            <a:solidFill>
+              <a:schemeClr val="tx1"/>
+            </a:solidFill>
+            <a:headEnd w="lg" len="lg"/>
+            <a:tailEnd type="arrow" w="lg" len="lg"/>
+          </a:ln>
+        </p:spPr>
+        <p:style>
+          <a:lnRef idx="1">
+            <a:schemeClr val="accent1"/>
+          </a:lnRef>
+          <a:fillRef idx="0">
+            <a:schemeClr val="accent1"/>
+          </a:fillRef>
+          <a:effectRef idx="0">
+            <a:schemeClr val="accent1"/>
+          </a:effectRef>
+          <a:fontRef idx="minor">
+            <a:schemeClr val="tx1"/>
+          </a:fontRef>
+        </p:style>
+      </p:cxnSp>
+      <p:sp>
+        <p:nvSpPr>
+          <p:cNvPr id="10" name="TextBox 9">
+            <a:extLst>
+              <a:ext uri="{FF2B5EF4-FFF2-40B4-BE49-F238E27FC236}">
+                <a16:creationId xmlns:a16="http://schemas.microsoft.com/office/drawing/2014/main" id="{99030E64-E204-8C42-4E2D-9610D561974C}"/>
+              </a:ext>
+            </a:extLst>
+          </p:cNvPr>
+          <p:cNvSpPr txBox="1"/>
+          <p:nvPr/>
+        </p:nvSpPr>
+        <p:spPr>
+          <a:xfrm>
+            <a:off x="4682061" y="2452120"/>
+            <a:ext cx="605608" cy="461665"/>
+          </a:xfrm>
+          <a:prstGeom prst="rect">
+            <a:avLst/>
+          </a:prstGeom>
+          <a:noFill/>
+        </p:spPr>
+        <p:txBody>
+          <a:bodyPr wrap="square" rtlCol="0">
+            <a:spAutoFit/>
+          </a:bodyPr>
+          <a:lstStyle/>
+          <a:p>
+            <a:pPr algn="ctr"/>
             <a:r>
               <a:rPr lang="en-US" sz="2400" dirty="0"/>
-              <a:t>Portfolios</a:t>
+              <a:t>1</a:t>
+            </a:r>
+          </a:p>
+        </p:txBody>
+      </p:sp>
+      <p:sp>
+        <p:nvSpPr>
+          <p:cNvPr id="11" name="TextBox 10">
+            <a:extLst>
+              <a:ext uri="{FF2B5EF4-FFF2-40B4-BE49-F238E27FC236}">
+                <a16:creationId xmlns:a16="http://schemas.microsoft.com/office/drawing/2014/main" id="{24FB376A-32A1-05A1-68C8-45BE571F6D51}"/>
+              </a:ext>
+            </a:extLst>
+          </p:cNvPr>
+          <p:cNvSpPr txBox="1"/>
+          <p:nvPr/>
+        </p:nvSpPr>
+        <p:spPr>
+          <a:xfrm>
+            <a:off x="2602612" y="2447584"/>
+            <a:ext cx="1674975" cy="461665"/>
+          </a:xfrm>
+          <a:prstGeom prst="rect">
+            <a:avLst/>
+          </a:prstGeom>
+          <a:noFill/>
+        </p:spPr>
+        <p:txBody>
+          <a:bodyPr wrap="square" rtlCol="0">
+            <a:spAutoFit/>
+          </a:bodyPr>
+          <a:lstStyle/>
+          <a:p>
+            <a:pPr algn="r"/>
+            <a:r>
+              <a:rPr lang="hu-HU" sz="2400" dirty="0"/>
+              <a:t>Payments</a:t>
+            </a:r>
+            <a:endParaRPr lang="en-US" sz="2400" dirty="0"/>
+          </a:p>
+        </p:txBody>
+      </p:sp>
+      <p:cxnSp>
+        <p:nvCxnSpPr>
+          <p:cNvPr id="14" name="Straight Arrow Connector 13">
+            <a:extLst>
+              <a:ext uri="{FF2B5EF4-FFF2-40B4-BE49-F238E27FC236}">
+                <a16:creationId xmlns:a16="http://schemas.microsoft.com/office/drawing/2014/main" id="{F893D985-9854-B181-560F-33EDA67475E4}"/>
+              </a:ext>
+            </a:extLst>
+          </p:cNvPr>
+          <p:cNvCxnSpPr>
+            <a:cxnSpLocks/>
+          </p:cNvCxnSpPr>
+          <p:nvPr/>
+        </p:nvCxnSpPr>
+        <p:spPr>
+          <a:xfrm>
+            <a:off x="6805155" y="2328015"/>
+            <a:ext cx="0" cy="1417980"/>
+          </a:xfrm>
+          <a:prstGeom prst="straightConnector1">
+            <a:avLst/>
+          </a:prstGeom>
+          <a:ln w="25400" cap="rnd">
+            <a:solidFill>
+              <a:schemeClr val="tx1"/>
+            </a:solidFill>
+            <a:headEnd type="arrow" w="lg" len="lg"/>
+            <a:tailEnd type="none" w="lg" len="lg"/>
+          </a:ln>
+        </p:spPr>
+        <p:style>
+          <a:lnRef idx="1">
+            <a:schemeClr val="accent1"/>
+          </a:lnRef>
+          <a:fillRef idx="0">
+            <a:schemeClr val="accent1"/>
+          </a:fillRef>
+          <a:effectRef idx="0">
+            <a:schemeClr val="accent1"/>
+          </a:effectRef>
+          <a:fontRef idx="minor">
+            <a:schemeClr val="tx1"/>
+          </a:fontRef>
+        </p:style>
+      </p:cxnSp>
+      <p:sp>
+        <p:nvSpPr>
+          <p:cNvPr id="15" name="TextBox 14">
+            <a:extLst>
+              <a:ext uri="{FF2B5EF4-FFF2-40B4-BE49-F238E27FC236}">
+                <a16:creationId xmlns:a16="http://schemas.microsoft.com/office/drawing/2014/main" id="{C847CFA2-53E5-7410-0F2E-78640909DD7A}"/>
+              </a:ext>
+            </a:extLst>
+          </p:cNvPr>
+          <p:cNvSpPr txBox="1"/>
+          <p:nvPr/>
+        </p:nvSpPr>
+        <p:spPr>
+          <a:xfrm>
+            <a:off x="6890876" y="2452121"/>
+            <a:ext cx="914396" cy="461665"/>
+          </a:xfrm>
+          <a:prstGeom prst="rect">
+            <a:avLst/>
+          </a:prstGeom>
+          <a:noFill/>
+        </p:spPr>
+        <p:txBody>
+          <a:bodyPr wrap="square" rtlCol="0">
+            <a:spAutoFit/>
+          </a:bodyPr>
+          <a:lstStyle/>
+          <a:p>
+            <a:r>
+              <a:rPr lang="en-US" sz="2400" dirty="0"/>
+              <a:t>1 + q</a:t>
+            </a:r>
+          </a:p>
+        </p:txBody>
+      </p:sp>
+      <p:sp>
+        <p:nvSpPr>
+          <p:cNvPr id="16" name="TextBox 15">
+            <a:extLst>
+              <a:ext uri="{FF2B5EF4-FFF2-40B4-BE49-F238E27FC236}">
+                <a16:creationId xmlns:a16="http://schemas.microsoft.com/office/drawing/2014/main" id="{405B1429-A763-D7D6-3F26-A02D3AFB6FEA}"/>
+              </a:ext>
+            </a:extLst>
+          </p:cNvPr>
+          <p:cNvSpPr txBox="1"/>
+          <p:nvPr/>
+        </p:nvSpPr>
+        <p:spPr>
+          <a:xfrm>
+            <a:off x="8567246" y="2914998"/>
+            <a:ext cx="2663390" cy="830997"/>
+          </a:xfrm>
+          <a:prstGeom prst="rect">
+            <a:avLst/>
+          </a:prstGeom>
+          <a:noFill/>
+        </p:spPr>
+        <p:txBody>
+          <a:bodyPr wrap="square" rtlCol="0">
+            <a:spAutoFit/>
+          </a:bodyPr>
+          <a:lstStyle/>
+          <a:p>
+            <a:pPr algn="r"/>
+            <a:r>
+              <a:rPr lang="en-US" sz="2400" dirty="0">
+                <a:solidFill>
+                  <a:srgbClr val="4CA22E"/>
+                </a:solidFill>
+              </a:rPr>
+              <a:t>( asset: something that has value )</a:t>
+            </a:r>
+          </a:p>
+        </p:txBody>
+      </p:sp>
+    </p:spTree>
+    <p:extLst>
+      <p:ext uri="{BB962C8B-B14F-4D97-AF65-F5344CB8AC3E}">
+        <p14:creationId xmlns:p14="http://schemas.microsoft.com/office/powerpoint/2010/main" val="3240525398"/>
+      </p:ext>
+    </p:extLst>
+  </p:cSld>
+  <p:clrMapOvr>
+    <a:masterClrMapping/>
+  </p:clrMapOvr>
+</p:sld>
+</file>
+
+<file path=ppt/slides/slide8.xml><?xml version="1.0" encoding="utf-8"?>
+<p:sld xmlns:a="http://schemas.openxmlformats.org/drawingml/2006/main" xmlns:r="http://schemas.openxmlformats.org/officeDocument/2006/relationships" xmlns:p="http://schemas.openxmlformats.org/presentationml/2006/main">
+  <p:cSld>
+    <p:spTree>
+      <p:nvGrpSpPr>
+        <p:cNvPr id="1" name=""/>
+        <p:cNvGrpSpPr/>
+        <p:nvPr/>
+      </p:nvGrpSpPr>
+      <p:grpSpPr>
+        <a:xfrm>
+          <a:off x="0" y="0"/>
+          <a:ext cx="0" cy="0"/>
+          <a:chOff x="0" y="0"/>
+          <a:chExt cx="0" cy="0"/>
+        </a:xfrm>
+      </p:grpSpPr>
+      <p:sp>
+        <p:nvSpPr>
+          <p:cNvPr id="2" name="TextBox 1">
+            <a:extLst>
+              <a:ext uri="{FF2B5EF4-FFF2-40B4-BE49-F238E27FC236}">
+                <a16:creationId xmlns:a16="http://schemas.microsoft.com/office/drawing/2014/main" id="{E03B3FC0-A19A-0D68-D5BE-C9362748E2B5}"/>
+              </a:ext>
+            </a:extLst>
+          </p:cNvPr>
+          <p:cNvSpPr txBox="1"/>
+          <p:nvPr/>
+        </p:nvSpPr>
+        <p:spPr>
+          <a:xfrm>
+            <a:off x="105100" y="156234"/>
+            <a:ext cx="12002814" cy="369332"/>
+          </a:xfrm>
+          <a:prstGeom prst="rect">
+            <a:avLst/>
+          </a:prstGeom>
+          <a:noFill/>
+        </p:spPr>
+        <p:txBody>
+          <a:bodyPr wrap="square" rtlCol="0">
+            <a:spAutoFit/>
+          </a:bodyPr>
+          <a:lstStyle/>
+          <a:p>
+            <a:r>
+              <a:rPr lang="en-US" dirty="0">
+                <a:solidFill>
+                  <a:schemeClr val="bg1"/>
+                </a:solidFill>
+              </a:rPr>
+              <a:t>Intro</a:t>
+            </a:r>
+          </a:p>
+        </p:txBody>
+      </p:sp>
+      <p:sp>
+        <p:nvSpPr>
+          <p:cNvPr id="3" name="TextBox 2">
+            <a:extLst>
+              <a:ext uri="{FF2B5EF4-FFF2-40B4-BE49-F238E27FC236}">
+                <a16:creationId xmlns:a16="http://schemas.microsoft.com/office/drawing/2014/main" id="{7F8B13E4-29B3-5435-324C-4149E3AE4146}"/>
+              </a:ext>
+            </a:extLst>
+          </p:cNvPr>
+          <p:cNvSpPr txBox="1"/>
+          <p:nvPr/>
+        </p:nvSpPr>
+        <p:spPr>
+          <a:xfrm>
+            <a:off x="625365" y="1602304"/>
+            <a:ext cx="2183149" cy="830997"/>
+          </a:xfrm>
+          <a:prstGeom prst="rect">
+            <a:avLst/>
+          </a:prstGeom>
+          <a:noFill/>
+        </p:spPr>
+        <p:txBody>
+          <a:bodyPr wrap="square" rtlCol="0">
+            <a:spAutoFit/>
+          </a:bodyPr>
+          <a:lstStyle/>
+          <a:p>
+            <a:r>
+              <a:rPr lang="en-US" sz="2400" b="1" dirty="0"/>
+              <a:t>Risk</a:t>
+            </a:r>
+          </a:p>
+          <a:p>
+            <a:r>
+              <a:rPr lang="en-US" sz="2400" dirty="0">
+                <a:solidFill>
+                  <a:schemeClr val="accent6">
+                    <a:lumMod val="75000"/>
+                  </a:schemeClr>
+                </a:solidFill>
+              </a:rPr>
+              <a:t>( single asset )</a:t>
+            </a:r>
+          </a:p>
+        </p:txBody>
+      </p:sp>
+    </p:spTree>
+    <p:extLst>
+      <p:ext uri="{BB962C8B-B14F-4D97-AF65-F5344CB8AC3E}">
+        <p14:creationId xmlns:p14="http://schemas.microsoft.com/office/powerpoint/2010/main" val="1126488000"/>
+      </p:ext>
+    </p:extLst>
+  </p:cSld>
+  <p:clrMapOvr>
+    <a:masterClrMapping/>
+  </p:clrMapOvr>
+</p:sld>
+</file>
+
+<file path=ppt/slides/slide9.xml><?xml version="1.0" encoding="utf-8"?>
+<p:sld xmlns:a="http://schemas.openxmlformats.org/drawingml/2006/main" xmlns:r="http://schemas.openxmlformats.org/officeDocument/2006/relationships" xmlns:p="http://schemas.openxmlformats.org/presentationml/2006/main">
+  <p:cSld>
+    <p:spTree>
+      <p:nvGrpSpPr>
+        <p:cNvPr id="1" name=""/>
+        <p:cNvGrpSpPr/>
+        <p:nvPr/>
+      </p:nvGrpSpPr>
+      <p:grpSpPr>
+        <a:xfrm>
+          <a:off x="0" y="0"/>
+          <a:ext cx="0" cy="0"/>
+          <a:chOff x="0" y="0"/>
+          <a:chExt cx="0" cy="0"/>
+        </a:xfrm>
+      </p:grpSpPr>
+      <p:sp>
+        <p:nvSpPr>
+          <p:cNvPr id="2" name="TextBox 1">
+            <a:extLst>
+              <a:ext uri="{FF2B5EF4-FFF2-40B4-BE49-F238E27FC236}">
+                <a16:creationId xmlns:a16="http://schemas.microsoft.com/office/drawing/2014/main" id="{E03B3FC0-A19A-0D68-D5BE-C9362748E2B5}"/>
+              </a:ext>
+            </a:extLst>
+          </p:cNvPr>
+          <p:cNvSpPr txBox="1"/>
+          <p:nvPr/>
+        </p:nvSpPr>
+        <p:spPr>
+          <a:xfrm>
+            <a:off x="105100" y="156234"/>
+            <a:ext cx="12002814" cy="369332"/>
+          </a:xfrm>
+          <a:prstGeom prst="rect">
+            <a:avLst/>
+          </a:prstGeom>
+          <a:noFill/>
+        </p:spPr>
+        <p:txBody>
+          <a:bodyPr wrap="square" rtlCol="0">
+            <a:spAutoFit/>
+          </a:bodyPr>
+          <a:lstStyle/>
+          <a:p>
+            <a:r>
+              <a:rPr lang="en-US" dirty="0">
+                <a:solidFill>
+                  <a:schemeClr val="bg1"/>
+                </a:solidFill>
+              </a:rPr>
+              <a:t>Intro</a:t>
+            </a:r>
+          </a:p>
+        </p:txBody>
+      </p:sp>
+      <p:sp>
+        <p:nvSpPr>
+          <p:cNvPr id="3" name="TextBox 2">
+            <a:extLst>
+              <a:ext uri="{FF2B5EF4-FFF2-40B4-BE49-F238E27FC236}">
+                <a16:creationId xmlns:a16="http://schemas.microsoft.com/office/drawing/2014/main" id="{688D616B-8979-3A02-FC3B-CEA112A0AB0D}"/>
+              </a:ext>
+            </a:extLst>
+          </p:cNvPr>
+          <p:cNvSpPr txBox="1"/>
+          <p:nvPr/>
+        </p:nvSpPr>
+        <p:spPr>
+          <a:xfrm>
+            <a:off x="625365" y="1602304"/>
+            <a:ext cx="1673887" cy="461665"/>
+          </a:xfrm>
+          <a:prstGeom prst="rect">
+            <a:avLst/>
+          </a:prstGeom>
+          <a:noFill/>
+        </p:spPr>
+        <p:txBody>
+          <a:bodyPr wrap="square" rtlCol="0">
+            <a:spAutoFit/>
+          </a:bodyPr>
+          <a:lstStyle/>
+          <a:p>
+            <a:r>
+              <a:rPr lang="en-US" sz="2400" b="1" dirty="0"/>
+              <a:t>Portfolio</a:t>
             </a:r>
           </a:p>
         </p:txBody>

</xml_diff>

<commit_message>
updated slides on asset, risk, set up what/how/why
</commit_message>
<xml_diff>
--- a/MMS_2024_09_10/Farkas_2024_09_10.pptx
+++ b/MMS_2024_09_10/Farkas_2024_09_10.pptx
@@ -14,6 +14,9 @@
     <p:sldId id="266" r:id="rId8"/>
     <p:sldId id="263" r:id="rId9"/>
     <p:sldId id="264" r:id="rId10"/>
+    <p:sldId id="267" r:id="rId11"/>
+    <p:sldId id="268" r:id="rId12"/>
+    <p:sldId id="269" r:id="rId13"/>
   </p:sldIdLst>
   <p:sldSz cx="12192000" cy="6858000"/>
   <p:notesSz cx="6858000" cy="9144000"/>
@@ -3573,7 +3576,7 @@
             <a:pPr algn="ctr"/>
             <a:r>
               <a:rPr lang="en-US" sz="2000" i="1" dirty="0"/>
-              <a:t>Source: BMETE15MF78</a:t>
+              <a:t>See also: BMETE15MF78</a:t>
             </a:r>
           </a:p>
         </p:txBody>
@@ -3582,6 +3585,439 @@
     <p:extLst>
       <p:ext uri="{BB962C8B-B14F-4D97-AF65-F5344CB8AC3E}">
         <p14:creationId xmlns:p14="http://schemas.microsoft.com/office/powerpoint/2010/main" val="2512097233"/>
+      </p:ext>
+    </p:extLst>
+  </p:cSld>
+  <p:clrMapOvr>
+    <a:masterClrMapping/>
+  </p:clrMapOvr>
+</p:sld>
+</file>
+
+<file path=ppt/slides/slide10.xml><?xml version="1.0" encoding="utf-8"?>
+<p:sld xmlns:a="http://schemas.openxmlformats.org/drawingml/2006/main" xmlns:r="http://schemas.openxmlformats.org/officeDocument/2006/relationships" xmlns:p="http://schemas.openxmlformats.org/presentationml/2006/main">
+  <p:cSld>
+    <p:spTree>
+      <p:nvGrpSpPr>
+        <p:cNvPr id="1" name=""/>
+        <p:cNvGrpSpPr/>
+        <p:nvPr/>
+      </p:nvGrpSpPr>
+      <p:grpSpPr>
+        <a:xfrm>
+          <a:off x="0" y="0"/>
+          <a:ext cx="0" cy="0"/>
+          <a:chOff x="0" y="0"/>
+          <a:chExt cx="0" cy="0"/>
+        </a:xfrm>
+      </p:grpSpPr>
+      <p:sp>
+        <p:nvSpPr>
+          <p:cNvPr id="2" name="TextBox 1">
+            <a:extLst>
+              <a:ext uri="{FF2B5EF4-FFF2-40B4-BE49-F238E27FC236}">
+                <a16:creationId xmlns:a16="http://schemas.microsoft.com/office/drawing/2014/main" id="{E03B3FC0-A19A-0D68-D5BE-C9362748E2B5}"/>
+              </a:ext>
+            </a:extLst>
+          </p:cNvPr>
+          <p:cNvSpPr txBox="1"/>
+          <p:nvPr/>
+        </p:nvSpPr>
+        <p:spPr>
+          <a:xfrm>
+            <a:off x="105100" y="156234"/>
+            <a:ext cx="12002814" cy="369332"/>
+          </a:xfrm>
+          <a:prstGeom prst="rect">
+            <a:avLst/>
+          </a:prstGeom>
+          <a:noFill/>
+        </p:spPr>
+        <p:txBody>
+          <a:bodyPr wrap="square" rtlCol="0">
+            <a:spAutoFit/>
+          </a:bodyPr>
+          <a:lstStyle/>
+          <a:p>
+            <a:r>
+              <a:rPr lang="en-US" dirty="0">
+                <a:solidFill>
+                  <a:schemeClr val="bg1"/>
+                </a:solidFill>
+              </a:rPr>
+              <a:t>Intro</a:t>
+            </a:r>
+          </a:p>
+        </p:txBody>
+      </p:sp>
+      <p:sp>
+        <p:nvSpPr>
+          <p:cNvPr id="3" name="TextBox 2">
+            <a:extLst>
+              <a:ext uri="{FF2B5EF4-FFF2-40B4-BE49-F238E27FC236}">
+                <a16:creationId xmlns:a16="http://schemas.microsoft.com/office/drawing/2014/main" id="{688D616B-8979-3A02-FC3B-CEA112A0AB0D}"/>
+              </a:ext>
+            </a:extLst>
+          </p:cNvPr>
+          <p:cNvSpPr txBox="1"/>
+          <p:nvPr/>
+        </p:nvSpPr>
+        <p:spPr>
+          <a:xfrm>
+            <a:off x="625366" y="1602304"/>
+            <a:ext cx="1334064" cy="461665"/>
+          </a:xfrm>
+          <a:prstGeom prst="rect">
+            <a:avLst/>
+          </a:prstGeom>
+          <a:noFill/>
+        </p:spPr>
+        <p:txBody>
+          <a:bodyPr wrap="square" rtlCol="0">
+            <a:spAutoFit/>
+          </a:bodyPr>
+          <a:lstStyle/>
+          <a:p>
+            <a:r>
+              <a:rPr lang="en-US" sz="2400" b="1" dirty="0"/>
+              <a:t>What ?</a:t>
+            </a:r>
+          </a:p>
+        </p:txBody>
+      </p:sp>
+      <p:sp>
+        <p:nvSpPr>
+          <p:cNvPr id="6" name="TextBox 5">
+            <a:extLst>
+              <a:ext uri="{FF2B5EF4-FFF2-40B4-BE49-F238E27FC236}">
+                <a16:creationId xmlns:a16="http://schemas.microsoft.com/office/drawing/2014/main" id="{4B2B73C1-FD4B-9D9A-3377-037FB76AE0B4}"/>
+              </a:ext>
+            </a:extLst>
+          </p:cNvPr>
+          <p:cNvSpPr txBox="1"/>
+          <p:nvPr/>
+        </p:nvSpPr>
+        <p:spPr>
+          <a:xfrm>
+            <a:off x="5302269" y="4343070"/>
+            <a:ext cx="5278645" cy="461665"/>
+          </a:xfrm>
+          <a:prstGeom prst="rect">
+            <a:avLst/>
+          </a:prstGeom>
+          <a:noFill/>
+        </p:spPr>
+        <p:txBody>
+          <a:bodyPr wrap="square" rtlCol="0">
+            <a:spAutoFit/>
+          </a:bodyPr>
+          <a:lstStyle/>
+          <a:p>
+            <a:r>
+              <a:rPr lang="en-US" sz="2400" dirty="0"/>
+              <a:t>What’s the goal here ?</a:t>
+            </a:r>
+          </a:p>
+        </p:txBody>
+      </p:sp>
+    </p:spTree>
+    <p:extLst>
+      <p:ext uri="{BB962C8B-B14F-4D97-AF65-F5344CB8AC3E}">
+        <p14:creationId xmlns:p14="http://schemas.microsoft.com/office/powerpoint/2010/main" val="2388973311"/>
+      </p:ext>
+    </p:extLst>
+  </p:cSld>
+  <p:clrMapOvr>
+    <a:masterClrMapping/>
+  </p:clrMapOvr>
+</p:sld>
+</file>
+
+<file path=ppt/slides/slide11.xml><?xml version="1.0" encoding="utf-8"?>
+<p:sld xmlns:a="http://schemas.openxmlformats.org/drawingml/2006/main" xmlns:r="http://schemas.openxmlformats.org/officeDocument/2006/relationships" xmlns:p="http://schemas.openxmlformats.org/presentationml/2006/main">
+  <p:cSld>
+    <p:spTree>
+      <p:nvGrpSpPr>
+        <p:cNvPr id="1" name=""/>
+        <p:cNvGrpSpPr/>
+        <p:nvPr/>
+      </p:nvGrpSpPr>
+      <p:grpSpPr>
+        <a:xfrm>
+          <a:off x="0" y="0"/>
+          <a:ext cx="0" cy="0"/>
+          <a:chOff x="0" y="0"/>
+          <a:chExt cx="0" cy="0"/>
+        </a:xfrm>
+      </p:grpSpPr>
+      <p:sp>
+        <p:nvSpPr>
+          <p:cNvPr id="2" name="TextBox 1">
+            <a:extLst>
+              <a:ext uri="{FF2B5EF4-FFF2-40B4-BE49-F238E27FC236}">
+                <a16:creationId xmlns:a16="http://schemas.microsoft.com/office/drawing/2014/main" id="{E03B3FC0-A19A-0D68-D5BE-C9362748E2B5}"/>
+              </a:ext>
+            </a:extLst>
+          </p:cNvPr>
+          <p:cNvSpPr txBox="1"/>
+          <p:nvPr/>
+        </p:nvSpPr>
+        <p:spPr>
+          <a:xfrm>
+            <a:off x="105100" y="156234"/>
+            <a:ext cx="12002814" cy="369332"/>
+          </a:xfrm>
+          <a:prstGeom prst="rect">
+            <a:avLst/>
+          </a:prstGeom>
+          <a:noFill/>
+        </p:spPr>
+        <p:txBody>
+          <a:bodyPr wrap="square" rtlCol="0">
+            <a:spAutoFit/>
+          </a:bodyPr>
+          <a:lstStyle/>
+          <a:p>
+            <a:r>
+              <a:rPr lang="en-US" dirty="0">
+                <a:solidFill>
+                  <a:schemeClr val="bg1"/>
+                </a:solidFill>
+              </a:rPr>
+              <a:t>Intro</a:t>
+            </a:r>
+          </a:p>
+        </p:txBody>
+      </p:sp>
+      <p:sp>
+        <p:nvSpPr>
+          <p:cNvPr id="3" name="TextBox 2">
+            <a:extLst>
+              <a:ext uri="{FF2B5EF4-FFF2-40B4-BE49-F238E27FC236}">
+                <a16:creationId xmlns:a16="http://schemas.microsoft.com/office/drawing/2014/main" id="{688D616B-8979-3A02-FC3B-CEA112A0AB0D}"/>
+              </a:ext>
+            </a:extLst>
+          </p:cNvPr>
+          <p:cNvSpPr txBox="1"/>
+          <p:nvPr/>
+        </p:nvSpPr>
+        <p:spPr>
+          <a:xfrm>
+            <a:off x="625365" y="1602304"/>
+            <a:ext cx="1673887" cy="461665"/>
+          </a:xfrm>
+          <a:prstGeom prst="rect">
+            <a:avLst/>
+          </a:prstGeom>
+          <a:noFill/>
+        </p:spPr>
+        <p:txBody>
+          <a:bodyPr wrap="square" rtlCol="0">
+            <a:spAutoFit/>
+          </a:bodyPr>
+          <a:lstStyle/>
+          <a:p>
+            <a:r>
+              <a:rPr lang="en-US" sz="2400" b="1" dirty="0"/>
+              <a:t>How ?</a:t>
+            </a:r>
+          </a:p>
+        </p:txBody>
+      </p:sp>
+      <p:sp>
+        <p:nvSpPr>
+          <p:cNvPr id="4" name="TextBox 3">
+            <a:extLst>
+              <a:ext uri="{FF2B5EF4-FFF2-40B4-BE49-F238E27FC236}">
+                <a16:creationId xmlns:a16="http://schemas.microsoft.com/office/drawing/2014/main" id="{168B5341-2125-EB4A-41E0-C390575129C9}"/>
+              </a:ext>
+            </a:extLst>
+          </p:cNvPr>
+          <p:cNvSpPr txBox="1"/>
+          <p:nvPr/>
+        </p:nvSpPr>
+        <p:spPr>
+          <a:xfrm>
+            <a:off x="3545633" y="4343070"/>
+            <a:ext cx="7035281" cy="461665"/>
+          </a:xfrm>
+          <a:prstGeom prst="rect">
+            <a:avLst/>
+          </a:prstGeom>
+          <a:noFill/>
+        </p:spPr>
+        <p:txBody>
+          <a:bodyPr wrap="square" rtlCol="0">
+            <a:spAutoFit/>
+          </a:bodyPr>
+          <a:lstStyle/>
+          <a:p>
+            <a:r>
+              <a:rPr lang="en-US" sz="2400" dirty="0"/>
+              <a:t>Lagrange </a:t>
+            </a:r>
+            <a:r>
+              <a:rPr lang="en-US" sz="2400" dirty="0" err="1"/>
+              <a:t>mult</a:t>
+            </a:r>
+            <a:r>
+              <a:rPr lang="en-US" sz="2400" dirty="0"/>
+              <a:t>, Variable changes, Numerical points</a:t>
+            </a:r>
+          </a:p>
+        </p:txBody>
+      </p:sp>
+    </p:spTree>
+    <p:extLst>
+      <p:ext uri="{BB962C8B-B14F-4D97-AF65-F5344CB8AC3E}">
+        <p14:creationId xmlns:p14="http://schemas.microsoft.com/office/powerpoint/2010/main" val="3787761154"/>
+      </p:ext>
+    </p:extLst>
+  </p:cSld>
+  <p:clrMapOvr>
+    <a:masterClrMapping/>
+  </p:clrMapOvr>
+</p:sld>
+</file>
+
+<file path=ppt/slides/slide12.xml><?xml version="1.0" encoding="utf-8"?>
+<p:sld xmlns:a="http://schemas.openxmlformats.org/drawingml/2006/main" xmlns:r="http://schemas.openxmlformats.org/officeDocument/2006/relationships" xmlns:p="http://schemas.openxmlformats.org/presentationml/2006/main">
+  <p:cSld>
+    <p:spTree>
+      <p:nvGrpSpPr>
+        <p:cNvPr id="1" name=""/>
+        <p:cNvGrpSpPr/>
+        <p:nvPr/>
+      </p:nvGrpSpPr>
+      <p:grpSpPr>
+        <a:xfrm>
+          <a:off x="0" y="0"/>
+          <a:ext cx="0" cy="0"/>
+          <a:chOff x="0" y="0"/>
+          <a:chExt cx="0" cy="0"/>
+        </a:xfrm>
+      </p:grpSpPr>
+      <p:sp>
+        <p:nvSpPr>
+          <p:cNvPr id="2" name="TextBox 1">
+            <a:extLst>
+              <a:ext uri="{FF2B5EF4-FFF2-40B4-BE49-F238E27FC236}">
+                <a16:creationId xmlns:a16="http://schemas.microsoft.com/office/drawing/2014/main" id="{E03B3FC0-A19A-0D68-D5BE-C9362748E2B5}"/>
+              </a:ext>
+            </a:extLst>
+          </p:cNvPr>
+          <p:cNvSpPr txBox="1"/>
+          <p:nvPr/>
+        </p:nvSpPr>
+        <p:spPr>
+          <a:xfrm>
+            <a:off x="105100" y="156234"/>
+            <a:ext cx="12002814" cy="369332"/>
+          </a:xfrm>
+          <a:prstGeom prst="rect">
+            <a:avLst/>
+          </a:prstGeom>
+          <a:noFill/>
+        </p:spPr>
+        <p:txBody>
+          <a:bodyPr wrap="square" rtlCol="0">
+            <a:spAutoFit/>
+          </a:bodyPr>
+          <a:lstStyle/>
+          <a:p>
+            <a:r>
+              <a:rPr lang="en-US" dirty="0">
+                <a:solidFill>
+                  <a:schemeClr val="bg1"/>
+                </a:solidFill>
+              </a:rPr>
+              <a:t>Intro</a:t>
+            </a:r>
+          </a:p>
+        </p:txBody>
+      </p:sp>
+      <p:sp>
+        <p:nvSpPr>
+          <p:cNvPr id="3" name="TextBox 2">
+            <a:extLst>
+              <a:ext uri="{FF2B5EF4-FFF2-40B4-BE49-F238E27FC236}">
+                <a16:creationId xmlns:a16="http://schemas.microsoft.com/office/drawing/2014/main" id="{688D616B-8979-3A02-FC3B-CEA112A0AB0D}"/>
+              </a:ext>
+            </a:extLst>
+          </p:cNvPr>
+          <p:cNvSpPr txBox="1"/>
+          <p:nvPr/>
+        </p:nvSpPr>
+        <p:spPr>
+          <a:xfrm>
+            <a:off x="625365" y="1602304"/>
+            <a:ext cx="1673887" cy="461665"/>
+          </a:xfrm>
+          <a:prstGeom prst="rect">
+            <a:avLst/>
+          </a:prstGeom>
+          <a:noFill/>
+        </p:spPr>
+        <p:txBody>
+          <a:bodyPr wrap="square" rtlCol="0">
+            <a:spAutoFit/>
+          </a:bodyPr>
+          <a:lstStyle/>
+          <a:p>
+            <a:r>
+              <a:rPr lang="en-US" sz="2400" b="1" dirty="0"/>
+              <a:t>Why ?</a:t>
+            </a:r>
+          </a:p>
+        </p:txBody>
+      </p:sp>
+      <p:sp>
+        <p:nvSpPr>
+          <p:cNvPr id="4" name="TextBox 3">
+            <a:extLst>
+              <a:ext uri="{FF2B5EF4-FFF2-40B4-BE49-F238E27FC236}">
+                <a16:creationId xmlns:a16="http://schemas.microsoft.com/office/drawing/2014/main" id="{342800EC-B89B-DF85-F6F6-31825630168A}"/>
+              </a:ext>
+            </a:extLst>
+          </p:cNvPr>
+          <p:cNvSpPr txBox="1"/>
+          <p:nvPr/>
+        </p:nvSpPr>
+        <p:spPr>
+          <a:xfrm>
+            <a:off x="5302269" y="4343070"/>
+            <a:ext cx="5278645" cy="461665"/>
+          </a:xfrm>
+          <a:prstGeom prst="rect">
+            <a:avLst/>
+          </a:prstGeom>
+          <a:noFill/>
+        </p:spPr>
+        <p:txBody>
+          <a:bodyPr wrap="square" rtlCol="0">
+            <a:spAutoFit/>
+          </a:bodyPr>
+          <a:lstStyle/>
+          <a:p>
+            <a:r>
+              <a:rPr lang="en-US" sz="2400" dirty="0"/>
+              <a:t>q allows discounting, </a:t>
+            </a:r>
+            <a:r>
+              <a:rPr lang="en-US" sz="2400" dirty="0" err="1"/>
+              <a:t>eg</a:t>
+            </a:r>
+            <a:r>
+              <a:rPr lang="en-US" sz="2400" dirty="0"/>
+              <a:t>, bond pricing</a:t>
+            </a:r>
+          </a:p>
+        </p:txBody>
+      </p:sp>
+    </p:spTree>
+    <p:extLst>
+      <p:ext uri="{BB962C8B-B14F-4D97-AF65-F5344CB8AC3E}">
+        <p14:creationId xmlns:p14="http://schemas.microsoft.com/office/powerpoint/2010/main" val="1846333562"/>
       </p:ext>
     </p:extLst>
   </p:cSld>
@@ -3750,7 +4186,7 @@
         </p:nvSpPr>
         <p:spPr>
           <a:xfrm>
-            <a:off x="6316712" y="1602305"/>
+            <a:off x="6559313" y="1602305"/>
             <a:ext cx="4516387" cy="461665"/>
           </a:xfrm>
           <a:prstGeom prst="rect">
@@ -3801,7 +4237,7 @@
         </p:nvSpPr>
         <p:spPr>
           <a:xfrm>
-            <a:off x="625365" y="1602304"/>
+            <a:off x="867966" y="1602304"/>
             <a:ext cx="804043" cy="461665"/>
           </a:xfrm>
           <a:prstGeom prst="rect">
@@ -3836,8 +4272,8 @@
         </p:nvSpPr>
         <p:spPr>
           <a:xfrm>
-            <a:off x="625365" y="2685214"/>
-            <a:ext cx="1389924" cy="830997"/>
+            <a:off x="541390" y="2685214"/>
+            <a:ext cx="2108505" cy="461665"/>
           </a:xfrm>
           <a:prstGeom prst="rect">
             <a:avLst/>
@@ -3852,14 +4288,7 @@
           <a:p>
             <a:r>
               <a:rPr lang="en-US" sz="2400" dirty="0"/>
-              <a:t>HU SSC</a:t>
-            </a:r>
-            <a:endParaRPr lang="hu-HU" sz="2400" dirty="0"/>
-          </a:p>
-          <a:p>
-            <a:r>
-              <a:rPr lang="en-US" sz="2400" dirty="0"/>
-              <a:t>Head</a:t>
+              <a:t>HU SSC Head</a:t>
             </a:r>
           </a:p>
         </p:txBody>
@@ -3878,7 +4307,7 @@
         </p:nvSpPr>
         <p:spPr>
           <a:xfrm>
-            <a:off x="6341894" y="2690469"/>
+            <a:off x="6584495" y="2690469"/>
             <a:ext cx="2849411" cy="461665"/>
           </a:xfrm>
           <a:prstGeom prst="rect">
@@ -3929,7 +4358,7 @@
         </p:nvSpPr>
         <p:spPr>
           <a:xfrm>
-            <a:off x="3000696" y="1634623"/>
+            <a:off x="3243297" y="1634623"/>
             <a:ext cx="1739466" cy="461665"/>
           </a:xfrm>
           <a:prstGeom prst="rect">
@@ -3964,7 +4393,7 @@
         </p:nvSpPr>
         <p:spPr>
           <a:xfrm>
-            <a:off x="3000695" y="2685213"/>
+            <a:off x="3243296" y="2685213"/>
             <a:ext cx="2969178" cy="461665"/>
           </a:xfrm>
           <a:prstGeom prst="rect">
@@ -3999,7 +4428,7 @@
         </p:nvSpPr>
         <p:spPr>
           <a:xfrm>
-            <a:off x="4471219" y="4074121"/>
+            <a:off x="4471219" y="4167431"/>
             <a:ext cx="4333556" cy="461665"/>
           </a:xfrm>
           <a:prstGeom prst="rect">
@@ -4034,7 +4463,7 @@
         </p:nvSpPr>
         <p:spPr>
           <a:xfrm>
-            <a:off x="4471219" y="4866205"/>
+            <a:off x="4471219" y="4959515"/>
             <a:ext cx="6276655" cy="461665"/>
           </a:xfrm>
           <a:prstGeom prst="rect">
@@ -4151,8 +4580,8 @@
         </p:nvSpPr>
         <p:spPr>
           <a:xfrm>
-            <a:off x="3584027" y="1846565"/>
-            <a:ext cx="5023945" cy="1938992"/>
+            <a:off x="3594533" y="2555687"/>
+            <a:ext cx="5192969" cy="1938992"/>
           </a:xfrm>
           <a:prstGeom prst="rect">
             <a:avLst/>
@@ -4167,30 +4596,30 @@
           <a:p>
             <a:pPr algn="ctr"/>
             <a:r>
-              <a:rPr lang="en-US" sz="2400" b="1" dirty="0"/>
-              <a:t>Modern Portfolio Theory</a:t>
+              <a:rPr lang="en-US" sz="2400" dirty="0"/>
+              <a:t>Modern Portfolio Theory (MPT)</a:t>
             </a:r>
           </a:p>
           <a:p>
             <a:pPr algn="ctr"/>
-            <a:endParaRPr lang="en-US" sz="2400" b="1" dirty="0"/>
+            <a:endParaRPr lang="en-US" sz="2400" dirty="0"/>
           </a:p>
           <a:p>
             <a:pPr algn="ctr"/>
             <a:r>
-              <a:rPr lang="en-US" sz="2400" b="1" dirty="0"/>
-              <a:t>&amp;</a:t>
+              <a:rPr lang="en-US" sz="2400" dirty="0"/>
+              <a:t>Capital Asset Pricing Model (CAPM)</a:t>
             </a:r>
           </a:p>
           <a:p>
             <a:pPr algn="ctr"/>
-            <a:endParaRPr lang="en-US" sz="2400" b="1" dirty="0"/>
+            <a:endParaRPr lang="en-US" sz="2400" dirty="0"/>
           </a:p>
           <a:p>
             <a:pPr algn="ctr"/>
             <a:r>
-              <a:rPr lang="en-US" sz="2400" b="1" dirty="0"/>
-              <a:t>Capital Asset Pricing Model</a:t>
+              <a:rPr lang="en-US" sz="2400" dirty="0"/>
+              <a:t>1950s / 60s</a:t>
             </a:r>
           </a:p>
         </p:txBody>
@@ -4249,10 +4678,10 @@
       </p:sp>
       <p:sp>
         <p:nvSpPr>
-          <p:cNvPr id="2" name="TextBox 1">
-            <a:extLst>
-              <a:ext uri="{FF2B5EF4-FFF2-40B4-BE49-F238E27FC236}">
-                <a16:creationId xmlns:a16="http://schemas.microsoft.com/office/drawing/2014/main" id="{632C3D97-C308-DE22-0F53-98586ABF1575}"/>
+          <p:cNvPr id="3" name="TextBox 2">
+            <a:extLst>
+              <a:ext uri="{FF2B5EF4-FFF2-40B4-BE49-F238E27FC236}">
+                <a16:creationId xmlns:a16="http://schemas.microsoft.com/office/drawing/2014/main" id="{1AC805F4-0DB8-C954-AC91-283C6CA97B4B}"/>
               </a:ext>
             </a:extLst>
           </p:cNvPr>
@@ -4261,8 +4690,8 @@
         </p:nvSpPr>
         <p:spPr>
           <a:xfrm>
-            <a:off x="4461638" y="4906501"/>
-            <a:ext cx="3289737" cy="400110"/>
+            <a:off x="386737" y="1394170"/>
+            <a:ext cx="5192969" cy="461665"/>
           </a:xfrm>
           <a:prstGeom prst="rect">
             <a:avLst/>
@@ -4277,8 +4706,44 @@
           <a:p>
             <a:pPr algn="ctr"/>
             <a:r>
+              <a:rPr lang="en-US" sz="2400" b="1" dirty="0"/>
+              <a:t>Efficient Markets Hypothesis (EMH)</a:t>
+            </a:r>
+          </a:p>
+        </p:txBody>
+      </p:sp>
+      <p:sp>
+        <p:nvSpPr>
+          <p:cNvPr id="4" name="TextBox 3">
+            <a:extLst>
+              <a:ext uri="{FF2B5EF4-FFF2-40B4-BE49-F238E27FC236}">
+                <a16:creationId xmlns:a16="http://schemas.microsoft.com/office/drawing/2014/main" id="{F98D5EE9-3AA2-590A-3DD2-10F0E3742BA7}"/>
+              </a:ext>
+            </a:extLst>
+          </p:cNvPr>
+          <p:cNvSpPr txBox="1"/>
+          <p:nvPr/>
+        </p:nvSpPr>
+        <p:spPr>
+          <a:xfrm>
+            <a:off x="4461638" y="5419686"/>
+            <a:ext cx="3289737" cy="400110"/>
+          </a:xfrm>
+          <a:prstGeom prst="rect">
+            <a:avLst/>
+          </a:prstGeom>
+          <a:noFill/>
+        </p:spPr>
+        <p:txBody>
+          <a:bodyPr wrap="square" rtlCol="0">
+            <a:spAutoFit/>
+          </a:bodyPr>
+          <a:lstStyle/>
+          <a:p>
+            <a:pPr algn="ctr"/>
+            <a:r>
               <a:rPr lang="en-US" sz="2000" i="1" dirty="0"/>
-              <a:t>Source: BMETE15MF78</a:t>
+              <a:t>See also: BMETE15MF78</a:t>
             </a:r>
           </a:p>
         </p:txBody>
@@ -4888,8 +5353,8 @@
         </p:nvSpPr>
         <p:spPr>
           <a:xfrm>
-            <a:off x="7707434" y="4441346"/>
-            <a:ext cx="914396" cy="461665"/>
+            <a:off x="7725722" y="4441346"/>
+            <a:ext cx="2478982" cy="461665"/>
           </a:xfrm>
           <a:prstGeom prst="rect">
             <a:avLst/>
@@ -4902,12 +5367,14 @@
           </a:bodyPr>
           <a:lstStyle/>
           <a:p>
-            <a:pPr algn="r"/>
             <a:r>
               <a:rPr lang="hu-HU" sz="2400" dirty="0"/>
               <a:t>Time</a:t>
             </a:r>
-            <a:endParaRPr lang="en-US" sz="2400" dirty="0"/>
+            <a:r>
+              <a:rPr lang="en-US" sz="2400" dirty="0"/>
+              <a:t> ( in years )</a:t>
+            </a:r>
           </a:p>
         </p:txBody>
       </p:sp>
@@ -5479,10 +5946,10 @@
       </p:sp>
       <p:sp>
         <p:nvSpPr>
-          <p:cNvPr id="47" name="TextBox 46">
-            <a:extLst>
-              <a:ext uri="{FF2B5EF4-FFF2-40B4-BE49-F238E27FC236}">
-                <a16:creationId xmlns:a16="http://schemas.microsoft.com/office/drawing/2014/main" id="{EE10D786-8E8B-DE21-8CD0-462D9343039E}"/>
+          <p:cNvPr id="2" name="TextBox 1">
+            <a:extLst>
+              <a:ext uri="{FF2B5EF4-FFF2-40B4-BE49-F238E27FC236}">
+                <a16:creationId xmlns:a16="http://schemas.microsoft.com/office/drawing/2014/main" id="{EBC30DA8-61A2-6560-EF30-AA972E093911}"/>
               </a:ext>
             </a:extLst>
           </p:cNvPr>
@@ -5491,8 +5958,8 @@
         </p:nvSpPr>
         <p:spPr>
           <a:xfrm>
-            <a:off x="8864437" y="2447583"/>
-            <a:ext cx="2369354" cy="461665"/>
+            <a:off x="8001002" y="2447583"/>
+            <a:ext cx="3232790" cy="461665"/>
           </a:xfrm>
           <a:prstGeom prst="rect">
             <a:avLst/>
@@ -5505,9 +5972,10 @@
           </a:bodyPr>
           <a:lstStyle/>
           <a:p>
+            <a:pPr algn="r"/>
             <a:r>
               <a:rPr lang="en-US" sz="2400" dirty="0"/>
-              <a:t>( 1y simple rate )</a:t>
+              <a:t>q : 1-year simple rate</a:t>
             </a:r>
           </a:p>
         </p:txBody>
@@ -6220,8 +6688,8 @@
         </p:nvSpPr>
         <p:spPr>
           <a:xfrm>
-            <a:off x="1623521" y="2876083"/>
-            <a:ext cx="2663390" cy="830997"/>
+            <a:off x="493777" y="2876083"/>
+            <a:ext cx="3793134" cy="1200329"/>
           </a:xfrm>
           <a:prstGeom prst="rect">
             <a:avLst/>
@@ -6241,7 +6709,7 @@
                   <a:srgbClr val="4CA22E"/>
                 </a:solidFill>
               </a:rPr>
-              <a:t>Transferring 2x the exact same thing</a:t>
+              <a:t>Often the exact same thing (asset) is transferred twice in the opposite direction</a:t>
             </a:r>
           </a:p>
         </p:txBody>
@@ -6268,11 +6736,11 @@
           <a:prstGeom prst="straightConnector1">
             <a:avLst/>
           </a:prstGeom>
-          <a:ln w="25400" cap="rnd">
+          <a:ln w="38100" cap="rnd">
             <a:solidFill>
               <a:srgbClr val="4CA22E"/>
             </a:solidFill>
-            <a:prstDash val="lgDash"/>
+            <a:prstDash val="sysDash"/>
             <a:headEnd w="lg" len="lg"/>
             <a:tailEnd type="arrow" w="lg" len="lg"/>
           </a:ln>
@@ -6314,11 +6782,11 @@
           <a:prstGeom prst="straightConnector1">
             <a:avLst/>
           </a:prstGeom>
-          <a:ln w="25400" cap="rnd">
+          <a:ln w="38100" cap="rnd">
             <a:solidFill>
               <a:srgbClr val="4CA22E"/>
             </a:solidFill>
-            <a:prstDash val="lgDash"/>
+            <a:prstDash val="sysDash"/>
             <a:headEnd type="arrow" w="lg" len="lg"/>
             <a:tailEnd type="none" w="lg" len="lg"/>
           </a:ln>
@@ -6550,7 +7018,7 @@
         </p:nvSpPr>
         <p:spPr>
           <a:xfrm>
-            <a:off x="8567246" y="2914998"/>
+            <a:off x="8570402" y="2889510"/>
             <a:ext cx="2663390" cy="830997"/>
           </a:xfrm>
           <a:prstGeom prst="rect">
@@ -6571,7 +7039,78 @@
                   <a:srgbClr val="4CA22E"/>
                 </a:solidFill>
               </a:rPr>
-              <a:t>( asset: something that has value )</a:t>
+              <a:t>asset : something that has value</a:t>
+            </a:r>
+          </a:p>
+        </p:txBody>
+      </p:sp>
+      <p:sp>
+        <p:nvSpPr>
+          <p:cNvPr id="6" name="TextBox 5">
+            <a:extLst>
+              <a:ext uri="{FF2B5EF4-FFF2-40B4-BE49-F238E27FC236}">
+                <a16:creationId xmlns:a16="http://schemas.microsoft.com/office/drawing/2014/main" id="{6BE78319-9CEF-6BCB-4E4E-54FA88698FD0}"/>
+              </a:ext>
+            </a:extLst>
+          </p:cNvPr>
+          <p:cNvSpPr txBox="1"/>
+          <p:nvPr/>
+        </p:nvSpPr>
+        <p:spPr>
+          <a:xfrm>
+            <a:off x="8001002" y="2447583"/>
+            <a:ext cx="3232790" cy="461665"/>
+          </a:xfrm>
+          <a:prstGeom prst="rect">
+            <a:avLst/>
+          </a:prstGeom>
+          <a:noFill/>
+        </p:spPr>
+        <p:txBody>
+          <a:bodyPr wrap="square" rtlCol="0">
+            <a:spAutoFit/>
+          </a:bodyPr>
+          <a:lstStyle/>
+          <a:p>
+            <a:pPr algn="r"/>
+            <a:r>
+              <a:rPr lang="en-US" sz="2400" dirty="0"/>
+              <a:t>q : 1-year simple rate</a:t>
+            </a:r>
+          </a:p>
+        </p:txBody>
+      </p:sp>
+      <p:sp>
+        <p:nvSpPr>
+          <p:cNvPr id="7" name="TextBox 6">
+            <a:extLst>
+              <a:ext uri="{FF2B5EF4-FFF2-40B4-BE49-F238E27FC236}">
+                <a16:creationId xmlns:a16="http://schemas.microsoft.com/office/drawing/2014/main" id="{3C6218BF-1CC9-12F5-BCDC-5FE2A06424A6}"/>
+              </a:ext>
+            </a:extLst>
+          </p:cNvPr>
+          <p:cNvSpPr txBox="1"/>
+          <p:nvPr/>
+        </p:nvSpPr>
+        <p:spPr>
+          <a:xfrm>
+            <a:off x="625365" y="1602304"/>
+            <a:ext cx="1210061" cy="461665"/>
+          </a:xfrm>
+          <a:prstGeom prst="rect">
+            <a:avLst/>
+          </a:prstGeom>
+          <a:noFill/>
+        </p:spPr>
+        <p:txBody>
+          <a:bodyPr wrap="square" rtlCol="0">
+            <a:spAutoFit/>
+          </a:bodyPr>
+          <a:lstStyle/>
+          <a:p>
+            <a:r>
+              <a:rPr lang="en-US" sz="2400" b="1" dirty="0"/>
+              <a:t>Asset</a:t>
             </a:r>
           </a:p>
         </p:txBody>
@@ -6660,7 +7199,7 @@
         <p:spPr>
           <a:xfrm>
             <a:off x="625365" y="1602304"/>
-            <a:ext cx="2183149" cy="830997"/>
+            <a:ext cx="3782043" cy="830997"/>
           </a:xfrm>
           <a:prstGeom prst="rect">
             <a:avLst/>
@@ -6687,7 +7226,250 @@
                   </a:schemeClr>
                 </a:solidFill>
               </a:rPr>
-              <a:t>( single asset )</a:t>
+              <a:t>( for a single asset )</a:t>
+            </a:r>
+          </a:p>
+        </p:txBody>
+      </p:sp>
+      <p:pic>
+        <p:nvPicPr>
+          <p:cNvPr id="6" name="Picture 5" descr="A black background with a black square&#10;&#10;Description automatically generated with medium confidence">
+            <a:extLst>
+              <a:ext uri="{FF2B5EF4-FFF2-40B4-BE49-F238E27FC236}">
+                <a16:creationId xmlns:a16="http://schemas.microsoft.com/office/drawing/2014/main" id="{5F37A9FC-81A9-B2AA-C4F1-14BB7D7E37D8}"/>
+              </a:ext>
+            </a:extLst>
+          </p:cNvPr>
+          <p:cNvPicPr>
+            <a:picLocks noChangeAspect="1"/>
+          </p:cNvPicPr>
+          <p:nvPr/>
+        </p:nvPicPr>
+        <p:blipFill>
+          <a:blip r:embed="rId2">
+            <a:extLst>
+              <a:ext uri="{28A0092B-C50C-407E-A947-70E740481C1C}">
+                <a14:useLocalDpi xmlns:a14="http://schemas.microsoft.com/office/drawing/2010/main" val="0"/>
+              </a:ext>
+            </a:extLst>
+          </a:blip>
+          <a:stretch>
+            <a:fillRect/>
+          </a:stretch>
+        </p:blipFill>
+        <p:spPr>
+          <a:xfrm>
+            <a:off x="6494599" y="2433301"/>
+            <a:ext cx="1143640" cy="1143640"/>
+          </a:xfrm>
+          <a:prstGeom prst="rect">
+            <a:avLst/>
+          </a:prstGeom>
+        </p:spPr>
+      </p:pic>
+      <p:sp>
+        <p:nvSpPr>
+          <p:cNvPr id="7" name="TextBox 6">
+            <a:extLst>
+              <a:ext uri="{FF2B5EF4-FFF2-40B4-BE49-F238E27FC236}">
+                <a16:creationId xmlns:a16="http://schemas.microsoft.com/office/drawing/2014/main" id="{5C3840BA-8FB1-4AF5-7AAD-844E0460CFB4}"/>
+              </a:ext>
+            </a:extLst>
+          </p:cNvPr>
+          <p:cNvSpPr txBox="1"/>
+          <p:nvPr/>
+        </p:nvSpPr>
+        <p:spPr>
+          <a:xfrm>
+            <a:off x="3864127" y="1586574"/>
+            <a:ext cx="6843497" cy="830997"/>
+          </a:xfrm>
+          <a:prstGeom prst="rect">
+            <a:avLst/>
+          </a:prstGeom>
+          <a:noFill/>
+        </p:spPr>
+        <p:txBody>
+          <a:bodyPr wrap="square" rtlCol="0">
+            <a:spAutoFit/>
+          </a:bodyPr>
+          <a:lstStyle/>
+          <a:p>
+            <a:pPr algn="ctr"/>
+            <a:r>
+              <a:rPr lang="en-US" sz="2400" dirty="0"/>
+              <a:t>All contracts contain (sometimes just implicitly) numbers that will be known only in the future</a:t>
+            </a:r>
+          </a:p>
+        </p:txBody>
+      </p:sp>
+      <p:sp>
+        <p:nvSpPr>
+          <p:cNvPr id="8" name="TextBox 7">
+            <a:extLst>
+              <a:ext uri="{FF2B5EF4-FFF2-40B4-BE49-F238E27FC236}">
+                <a16:creationId xmlns:a16="http://schemas.microsoft.com/office/drawing/2014/main" id="{2F1A3146-9F4B-8F1D-A187-D4E6276FD0D4}"/>
+              </a:ext>
+            </a:extLst>
+          </p:cNvPr>
+          <p:cNvSpPr txBox="1"/>
+          <p:nvPr/>
+        </p:nvSpPr>
+        <p:spPr>
+          <a:xfrm>
+            <a:off x="342793" y="4024931"/>
+            <a:ext cx="6723626" cy="830997"/>
+          </a:xfrm>
+          <a:prstGeom prst="rect">
+            <a:avLst/>
+          </a:prstGeom>
+          <a:noFill/>
+        </p:spPr>
+        <p:txBody>
+          <a:bodyPr wrap="square" rtlCol="0">
+            <a:spAutoFit/>
+          </a:bodyPr>
+          <a:lstStyle/>
+          <a:p>
+            <a:pPr algn="ctr"/>
+            <a:r>
+              <a:rPr lang="en-US" sz="2400" dirty="0"/>
+              <a:t>Risk quantifies the </a:t>
+            </a:r>
+            <a:r>
+              <a:rPr lang="en-US" sz="2400" b="1" u="sng" dirty="0">
+                <a:solidFill>
+                  <a:srgbClr val="0070C0"/>
+                </a:solidFill>
+              </a:rPr>
+              <a:t>uncertainty</a:t>
+            </a:r>
+            <a:r>
+              <a:rPr lang="en-US" sz="2400" dirty="0"/>
+              <a:t> of a </a:t>
+            </a:r>
+            <a:r>
+              <a:rPr lang="en-US" sz="2400" b="1" u="sng" dirty="0">
+                <a:solidFill>
+                  <a:srgbClr val="FF0000"/>
+                </a:solidFill>
+              </a:rPr>
+              <a:t>future</a:t>
+            </a:r>
+            <a:r>
+              <a:rPr lang="en-US" sz="2400" dirty="0"/>
+              <a:t> value,</a:t>
+            </a:r>
+          </a:p>
+          <a:p>
+            <a:pPr algn="ctr"/>
+            <a:r>
+              <a:rPr lang="en-US" sz="2400" dirty="0"/>
+              <a:t>for example, the future price of an asset</a:t>
+            </a:r>
+          </a:p>
+        </p:txBody>
+      </p:sp>
+      <p:sp>
+        <p:nvSpPr>
+          <p:cNvPr id="9" name="TextBox 8">
+            <a:extLst>
+              <a:ext uri="{FF2B5EF4-FFF2-40B4-BE49-F238E27FC236}">
+                <a16:creationId xmlns:a16="http://schemas.microsoft.com/office/drawing/2014/main" id="{AF2F6895-CB52-5F4C-791B-7ED95DFC4E12}"/>
+              </a:ext>
+            </a:extLst>
+          </p:cNvPr>
+          <p:cNvSpPr txBox="1"/>
+          <p:nvPr/>
+        </p:nvSpPr>
+        <p:spPr>
+          <a:xfrm>
+            <a:off x="8034528" y="4024930"/>
+            <a:ext cx="3670923" cy="830997"/>
+          </a:xfrm>
+          <a:prstGeom prst="rect">
+            <a:avLst/>
+          </a:prstGeom>
+          <a:noFill/>
+        </p:spPr>
+        <p:txBody>
+          <a:bodyPr wrap="square" rtlCol="0">
+            <a:spAutoFit/>
+          </a:bodyPr>
+          <a:lstStyle/>
+          <a:p>
+            <a:pPr algn="ctr"/>
+            <a:r>
+              <a:rPr lang="en-US" sz="2400" dirty="0"/>
+              <a:t>We don’t know the future, but we can </a:t>
+            </a:r>
+            <a:r>
+              <a:rPr lang="en-US" sz="2400" b="1" u="sng" dirty="0">
+                <a:solidFill>
+                  <a:srgbClr val="FF0000"/>
+                </a:solidFill>
+              </a:rPr>
+              <a:t>forecast</a:t>
+            </a:r>
+            <a:r>
+              <a:rPr lang="en-US" sz="2400" dirty="0"/>
+              <a:t> </a:t>
+            </a:r>
+          </a:p>
+        </p:txBody>
+      </p:sp>
+      <p:sp>
+        <p:nvSpPr>
+          <p:cNvPr id="11" name="TextBox 10">
+            <a:extLst>
+              <a:ext uri="{FF2B5EF4-FFF2-40B4-BE49-F238E27FC236}">
+                <a16:creationId xmlns:a16="http://schemas.microsoft.com/office/drawing/2014/main" id="{FEA23696-5BED-D3FC-9814-E7C90830D546}"/>
+              </a:ext>
+            </a:extLst>
+          </p:cNvPr>
+          <p:cNvSpPr txBox="1"/>
+          <p:nvPr/>
+        </p:nvSpPr>
+        <p:spPr>
+          <a:xfrm>
+            <a:off x="2024397" y="5366845"/>
+            <a:ext cx="7265907" cy="830997"/>
+          </a:xfrm>
+          <a:prstGeom prst="rect">
+            <a:avLst/>
+          </a:prstGeom>
+          <a:noFill/>
+        </p:spPr>
+        <p:txBody>
+          <a:bodyPr wrap="square" rtlCol="0">
+            <a:spAutoFit/>
+          </a:bodyPr>
+          <a:lstStyle/>
+          <a:p>
+            <a:pPr algn="ctr"/>
+            <a:r>
+              <a:rPr lang="en-US" sz="2400" dirty="0"/>
+              <a:t>A simple forecast for the uncertainty of an asset’s future price is the same asset’s </a:t>
+            </a:r>
+            <a:r>
+              <a:rPr lang="en-US" sz="2400" b="1" u="sng" dirty="0">
+                <a:solidFill>
+                  <a:srgbClr val="FF0000"/>
+                </a:solidFill>
+              </a:rPr>
+              <a:t>past</a:t>
+            </a:r>
+            <a:r>
+              <a:rPr lang="en-US" sz="2400" dirty="0"/>
+              <a:t> </a:t>
+            </a:r>
+            <a:r>
+              <a:rPr lang="en-US" sz="2400" b="1" u="sng" dirty="0">
+                <a:solidFill>
+                  <a:srgbClr val="0070C0"/>
+                </a:solidFill>
+              </a:rPr>
+              <a:t>volatility</a:t>
             </a:r>
           </a:p>
         </p:txBody>
@@ -6792,6 +7574,112 @@
             <a:r>
               <a:rPr lang="en-US" sz="2400" b="1" dirty="0"/>
               <a:t>Portfolio</a:t>
+            </a:r>
+          </a:p>
+        </p:txBody>
+      </p:sp>
+      <p:sp>
+        <p:nvSpPr>
+          <p:cNvPr id="4" name="TextBox 3">
+            <a:extLst>
+              <a:ext uri="{FF2B5EF4-FFF2-40B4-BE49-F238E27FC236}">
+                <a16:creationId xmlns:a16="http://schemas.microsoft.com/office/drawing/2014/main" id="{354FA2B6-0E71-6714-6C96-99036DB2AE98}"/>
+              </a:ext>
+            </a:extLst>
+          </p:cNvPr>
+          <p:cNvSpPr txBox="1"/>
+          <p:nvPr/>
+        </p:nvSpPr>
+        <p:spPr>
+          <a:xfrm>
+            <a:off x="1203020" y="2363609"/>
+            <a:ext cx="6149502" cy="461665"/>
+          </a:xfrm>
+          <a:prstGeom prst="rect">
+            <a:avLst/>
+          </a:prstGeom>
+          <a:noFill/>
+        </p:spPr>
+        <p:txBody>
+          <a:bodyPr wrap="square" rtlCol="0">
+            <a:spAutoFit/>
+          </a:bodyPr>
+          <a:lstStyle/>
+          <a:p>
+            <a:r>
+              <a:rPr lang="en-US" sz="2400"/>
+              <a:t>A linear combination of (financial) assets</a:t>
+            </a:r>
+            <a:endParaRPr lang="en-US" sz="2400" dirty="0"/>
+          </a:p>
+        </p:txBody>
+      </p:sp>
+      <p:sp>
+        <p:nvSpPr>
+          <p:cNvPr id="5" name="TextBox 4">
+            <a:extLst>
+              <a:ext uri="{FF2B5EF4-FFF2-40B4-BE49-F238E27FC236}">
+                <a16:creationId xmlns:a16="http://schemas.microsoft.com/office/drawing/2014/main" id="{67AEE8D2-968F-3D97-9173-5B59FF60FB34}"/>
+              </a:ext>
+            </a:extLst>
+          </p:cNvPr>
+          <p:cNvSpPr txBox="1"/>
+          <p:nvPr/>
+        </p:nvSpPr>
+        <p:spPr>
+          <a:xfrm>
+            <a:off x="1203020" y="2894081"/>
+            <a:ext cx="3956809" cy="461665"/>
+          </a:xfrm>
+          <a:prstGeom prst="rect">
+            <a:avLst/>
+          </a:prstGeom>
+          <a:noFill/>
+        </p:spPr>
+        <p:txBody>
+          <a:bodyPr wrap="square" rtlCol="0">
+            <a:spAutoFit/>
+          </a:bodyPr>
+          <a:lstStyle/>
+          <a:p>
+            <a:r>
+              <a:rPr lang="en-US" sz="2400" dirty="0"/>
+              <a:t>In math: sum of weights is 1</a:t>
+            </a:r>
+          </a:p>
+        </p:txBody>
+      </p:sp>
+      <p:sp>
+        <p:nvSpPr>
+          <p:cNvPr id="8" name="TextBox 7">
+            <a:extLst>
+              <a:ext uri="{FF2B5EF4-FFF2-40B4-BE49-F238E27FC236}">
+                <a16:creationId xmlns:a16="http://schemas.microsoft.com/office/drawing/2014/main" id="{4F957182-C294-642B-A68B-6A6060964C99}"/>
+              </a:ext>
+            </a:extLst>
+          </p:cNvPr>
+          <p:cNvSpPr txBox="1"/>
+          <p:nvPr/>
+        </p:nvSpPr>
+        <p:spPr>
+          <a:xfrm>
+            <a:off x="5302269" y="4343070"/>
+            <a:ext cx="3956809" cy="461665"/>
+          </a:xfrm>
+          <a:prstGeom prst="rect">
+            <a:avLst/>
+          </a:prstGeom>
+          <a:noFill/>
+        </p:spPr>
+        <p:txBody>
+          <a:bodyPr wrap="square" rtlCol="0">
+            <a:spAutoFit/>
+          </a:bodyPr>
+          <a:lstStyle/>
+          <a:p>
+            <a:r>
+              <a:rPr lang="en-US" sz="2400" dirty="0"/>
+              <a:t>Start notations here !!!</a:t>
             </a:r>
           </a:p>
         </p:txBody>

</xml_diff>

<commit_message>
updated slide 3 as requested
</commit_message>
<xml_diff>
--- a/MMS_2024_09_10/Farkas_2024_09_10.pptx
+++ b/MMS_2024_09_10/Farkas_2024_09_10.pptx
@@ -8,15 +8,14 @@
     <p:sldId id="258" r:id="rId2"/>
     <p:sldId id="260" r:id="rId3"/>
     <p:sldId id="261" r:id="rId4"/>
-    <p:sldId id="265" r:id="rId5"/>
-    <p:sldId id="259" r:id="rId6"/>
-    <p:sldId id="262" r:id="rId7"/>
-    <p:sldId id="266" r:id="rId8"/>
-    <p:sldId id="263" r:id="rId9"/>
-    <p:sldId id="264" r:id="rId10"/>
-    <p:sldId id="267" r:id="rId11"/>
-    <p:sldId id="268" r:id="rId12"/>
-    <p:sldId id="269" r:id="rId13"/>
+    <p:sldId id="259" r:id="rId5"/>
+    <p:sldId id="262" r:id="rId6"/>
+    <p:sldId id="266" r:id="rId7"/>
+    <p:sldId id="263" r:id="rId8"/>
+    <p:sldId id="264" r:id="rId9"/>
+    <p:sldId id="267" r:id="rId10"/>
+    <p:sldId id="268" r:id="rId11"/>
+    <p:sldId id="269" r:id="rId12"/>
   </p:sldIdLst>
   <p:sldSz cx="12192000" cy="6858000"/>
   <p:notesSz cx="6858000" cy="9144000"/>
@@ -302,7 +301,7 @@
           <a:p>
             <a:fld id="{0163D073-7F8B-4D43-A6FF-3B651CD8FEF9}" type="datetimeFigureOut">
               <a:rPr lang="en-US" smtClean="0"/>
-              <a:t>7/21/2024</a:t>
+              <a:t>9/1/2024</a:t>
             </a:fld>
             <a:endParaRPr lang="en-US"/>
           </a:p>
@@ -540,7 +539,7 @@
           <a:p>
             <a:fld id="{0163D073-7F8B-4D43-A6FF-3B651CD8FEF9}" type="datetimeFigureOut">
               <a:rPr lang="en-US" smtClean="0"/>
-              <a:t>7/21/2024</a:t>
+              <a:t>9/1/2024</a:t>
             </a:fld>
             <a:endParaRPr lang="en-US"/>
           </a:p>
@@ -778,7 +777,7 @@
           <a:p>
             <a:fld id="{0163D073-7F8B-4D43-A6FF-3B651CD8FEF9}" type="datetimeFigureOut">
               <a:rPr lang="en-US" smtClean="0"/>
-              <a:t>7/21/2024</a:t>
+              <a:t>9/1/2024</a:t>
             </a:fld>
             <a:endParaRPr lang="en-US"/>
           </a:p>
@@ -1083,7 +1082,7 @@
           <a:p>
             <a:fld id="{0163D073-7F8B-4D43-A6FF-3B651CD8FEF9}" type="datetimeFigureOut">
               <a:rPr lang="en-US" smtClean="0"/>
-              <a:t>7/21/2024</a:t>
+              <a:t>9/1/2024</a:t>
             </a:fld>
             <a:endParaRPr lang="en-US"/>
           </a:p>
@@ -1386,7 +1385,7 @@
           <a:p>
             <a:fld id="{0163D073-7F8B-4D43-A6FF-3B651CD8FEF9}" type="datetimeFigureOut">
               <a:rPr lang="en-US" smtClean="0"/>
-              <a:t>7/21/2024</a:t>
+              <a:t>9/1/2024</a:t>
             </a:fld>
             <a:endParaRPr lang="en-US"/>
           </a:p>
@@ -1837,7 +1836,7 @@
           <a:p>
             <a:fld id="{0163D073-7F8B-4D43-A6FF-3B651CD8FEF9}" type="datetimeFigureOut">
               <a:rPr lang="en-US" smtClean="0"/>
-              <a:t>7/21/2024</a:t>
+              <a:t>9/1/2024</a:t>
             </a:fld>
             <a:endParaRPr lang="en-US"/>
           </a:p>
@@ -2010,7 +2009,7 @@
           <a:p>
             <a:fld id="{0163D073-7F8B-4D43-A6FF-3B651CD8FEF9}" type="datetimeFigureOut">
               <a:rPr lang="en-US" smtClean="0"/>
-              <a:t>7/21/2024</a:t>
+              <a:t>9/1/2024</a:t>
             </a:fld>
             <a:endParaRPr lang="en-US"/>
           </a:p>
@@ -2147,7 +2146,7 @@
           <a:p>
             <a:fld id="{0163D073-7F8B-4D43-A6FF-3B651CD8FEF9}" type="datetimeFigureOut">
               <a:rPr lang="en-US" smtClean="0"/>
-              <a:t>7/21/2024</a:t>
+              <a:t>9/1/2024</a:t>
             </a:fld>
             <a:endParaRPr lang="en-US"/>
           </a:p>
@@ -2491,7 +2490,7 @@
           <a:p>
             <a:fld id="{0163D073-7F8B-4D43-A6FF-3B651CD8FEF9}" type="datetimeFigureOut">
               <a:rPr lang="en-US" smtClean="0"/>
-              <a:t>7/21/2024</a:t>
+              <a:t>9/1/2024</a:t>
             </a:fld>
             <a:endParaRPr lang="en-US"/>
           </a:p>
@@ -2812,7 +2811,7 @@
           <a:p>
             <a:fld id="{0163D073-7F8B-4D43-A6FF-3B651CD8FEF9}" type="datetimeFigureOut">
               <a:rPr lang="en-US" smtClean="0"/>
-              <a:t>7/21/2024</a:t>
+              <a:t>9/1/2024</a:t>
             </a:fld>
             <a:endParaRPr lang="en-US"/>
           </a:p>
@@ -3508,7 +3507,7 @@
         <p:spPr>
           <a:xfrm>
             <a:off x="105100" y="156234"/>
-            <a:ext cx="12002814" cy="369332"/>
+            <a:ext cx="1398847" cy="338554"/>
           </a:xfrm>
           <a:prstGeom prst="rect">
             <a:avLst/>
@@ -3522,25 +3521,31 @@
           <a:lstStyle/>
           <a:p>
             <a:r>
-              <a:rPr lang="en-US" dirty="0">
+              <a:rPr lang="en-US" sz="1600" dirty="0">
                 <a:solidFill>
                   <a:schemeClr val="bg1"/>
                 </a:solidFill>
+                <a:latin typeface="Verdana" panose="020B0604030504040204" pitchFamily="34" charset="0"/>
+                <a:ea typeface="Verdana" panose="020B0604030504040204" pitchFamily="34" charset="0"/>
               </a:rPr>
               <a:t>Farkas Ill</a:t>
             </a:r>
             <a:r>
-              <a:rPr lang="hu-HU" dirty="0">
+              <a:rPr lang="hu-HU" sz="1600" dirty="0">
                 <a:solidFill>
                   <a:schemeClr val="bg1"/>
                 </a:solidFill>
+                <a:latin typeface="Verdana" panose="020B0604030504040204" pitchFamily="34" charset="0"/>
+                <a:ea typeface="Verdana" panose="020B0604030504040204" pitchFamily="34" charset="0"/>
               </a:rPr>
-              <a:t>és										Citibank HU MQA</a:t>
-            </a:r>
-            <a:endParaRPr lang="en-US" dirty="0">
+              <a:t>és</a:t>
+            </a:r>
+            <a:endParaRPr lang="en-US" sz="1600" dirty="0">
               <a:solidFill>
                 <a:schemeClr val="bg1"/>
               </a:solidFill>
+              <a:latin typeface="Verdana" panose="020B0604030504040204" pitchFamily="34" charset="0"/>
+              <a:ea typeface="Verdana" panose="020B0604030504040204" pitchFamily="34" charset="0"/>
             </a:endParaRPr>
           </a:p>
         </p:txBody>
@@ -3581,6 +3586,48 @@
           </a:p>
         </p:txBody>
       </p:sp>
+      <p:pic>
+        <p:nvPicPr>
+          <p:cNvPr id="4" name="Citi Logo">
+            <a:extLst>
+              <a:ext uri="{FF2B5EF4-FFF2-40B4-BE49-F238E27FC236}">
+                <a16:creationId xmlns:a16="http://schemas.microsoft.com/office/drawing/2014/main" id="{1989E808-FCF8-C68D-0002-B081CF3F95DE}"/>
+              </a:ext>
+              <a:ext uri="{C183D7F6-B498-43B3-948B-1728B52AA6E4}">
+                <adec:decorative xmlns:adec="http://schemas.microsoft.com/office/drawing/2017/decorative" val="1"/>
+              </a:ext>
+            </a:extLst>
+          </p:cNvPr>
+          <p:cNvPicPr>
+            <a:picLocks noChangeAspect="1"/>
+          </p:cNvPicPr>
+          <p:nvPr/>
+        </p:nvPicPr>
+        <p:blipFill>
+          <a:blip r:embed="rId2">
+            <a:extLst>
+              <a:ext uri="{28A0092B-C50C-407E-A947-70E740481C1C}">
+                <a14:useLocalDpi xmlns:a14="http://schemas.microsoft.com/office/drawing/2010/main" val="0"/>
+              </a:ext>
+            </a:extLst>
+          </a:blip>
+          <a:stretch>
+            <a:fillRect/>
+          </a:stretch>
+        </p:blipFill>
+        <p:spPr>
+          <a:xfrm>
+            <a:off x="11334414" y="89085"/>
+            <a:ext cx="736151" cy="475044"/>
+          </a:xfrm>
+          <a:prstGeom prst="rect">
+            <a:avLst/>
+          </a:prstGeom>
+          <a:solidFill>
+            <a:schemeClr val="bg1"/>
+          </a:solidFill>
+        </p:spPr>
+      </p:pic>
     </p:spTree>
     <p:extLst>
       <p:ext uri="{BB962C8B-B14F-4D97-AF65-F5344CB8AC3E}">
@@ -3664,145 +3711,6 @@
         </p:nvSpPr>
         <p:spPr>
           <a:xfrm>
-            <a:off x="625366" y="1602304"/>
-            <a:ext cx="1334064" cy="461665"/>
-          </a:xfrm>
-          <a:prstGeom prst="rect">
-            <a:avLst/>
-          </a:prstGeom>
-          <a:noFill/>
-        </p:spPr>
-        <p:txBody>
-          <a:bodyPr wrap="square" rtlCol="0">
-            <a:spAutoFit/>
-          </a:bodyPr>
-          <a:lstStyle/>
-          <a:p>
-            <a:r>
-              <a:rPr lang="en-US" sz="2400" b="1" dirty="0"/>
-              <a:t>What ?</a:t>
-            </a:r>
-          </a:p>
-        </p:txBody>
-      </p:sp>
-      <p:sp>
-        <p:nvSpPr>
-          <p:cNvPr id="6" name="TextBox 5">
-            <a:extLst>
-              <a:ext uri="{FF2B5EF4-FFF2-40B4-BE49-F238E27FC236}">
-                <a16:creationId xmlns:a16="http://schemas.microsoft.com/office/drawing/2014/main" id="{4B2B73C1-FD4B-9D9A-3377-037FB76AE0B4}"/>
-              </a:ext>
-            </a:extLst>
-          </p:cNvPr>
-          <p:cNvSpPr txBox="1"/>
-          <p:nvPr/>
-        </p:nvSpPr>
-        <p:spPr>
-          <a:xfrm>
-            <a:off x="5302269" y="4343070"/>
-            <a:ext cx="5278645" cy="461665"/>
-          </a:xfrm>
-          <a:prstGeom prst="rect">
-            <a:avLst/>
-          </a:prstGeom>
-          <a:noFill/>
-        </p:spPr>
-        <p:txBody>
-          <a:bodyPr wrap="square" rtlCol="0">
-            <a:spAutoFit/>
-          </a:bodyPr>
-          <a:lstStyle/>
-          <a:p>
-            <a:r>
-              <a:rPr lang="en-US" sz="2400" dirty="0"/>
-              <a:t>What’s the goal here ?</a:t>
-            </a:r>
-          </a:p>
-        </p:txBody>
-      </p:sp>
-    </p:spTree>
-    <p:extLst>
-      <p:ext uri="{BB962C8B-B14F-4D97-AF65-F5344CB8AC3E}">
-        <p14:creationId xmlns:p14="http://schemas.microsoft.com/office/powerpoint/2010/main" val="2388973311"/>
-      </p:ext>
-    </p:extLst>
-  </p:cSld>
-  <p:clrMapOvr>
-    <a:masterClrMapping/>
-  </p:clrMapOvr>
-</p:sld>
-</file>
-
-<file path=ppt/slides/slide11.xml><?xml version="1.0" encoding="utf-8"?>
-<p:sld xmlns:a="http://schemas.openxmlformats.org/drawingml/2006/main" xmlns:r="http://schemas.openxmlformats.org/officeDocument/2006/relationships" xmlns:p="http://schemas.openxmlformats.org/presentationml/2006/main">
-  <p:cSld>
-    <p:spTree>
-      <p:nvGrpSpPr>
-        <p:cNvPr id="1" name=""/>
-        <p:cNvGrpSpPr/>
-        <p:nvPr/>
-      </p:nvGrpSpPr>
-      <p:grpSpPr>
-        <a:xfrm>
-          <a:off x="0" y="0"/>
-          <a:ext cx="0" cy="0"/>
-          <a:chOff x="0" y="0"/>
-          <a:chExt cx="0" cy="0"/>
-        </a:xfrm>
-      </p:grpSpPr>
-      <p:sp>
-        <p:nvSpPr>
-          <p:cNvPr id="2" name="TextBox 1">
-            <a:extLst>
-              <a:ext uri="{FF2B5EF4-FFF2-40B4-BE49-F238E27FC236}">
-                <a16:creationId xmlns:a16="http://schemas.microsoft.com/office/drawing/2014/main" id="{E03B3FC0-A19A-0D68-D5BE-C9362748E2B5}"/>
-              </a:ext>
-            </a:extLst>
-          </p:cNvPr>
-          <p:cNvSpPr txBox="1"/>
-          <p:nvPr/>
-        </p:nvSpPr>
-        <p:spPr>
-          <a:xfrm>
-            <a:off x="105100" y="156234"/>
-            <a:ext cx="12002814" cy="369332"/>
-          </a:xfrm>
-          <a:prstGeom prst="rect">
-            <a:avLst/>
-          </a:prstGeom>
-          <a:noFill/>
-        </p:spPr>
-        <p:txBody>
-          <a:bodyPr wrap="square" rtlCol="0">
-            <a:spAutoFit/>
-          </a:bodyPr>
-          <a:lstStyle/>
-          <a:p>
-            <a:r>
-              <a:rPr lang="en-US" dirty="0">
-                <a:solidFill>
-                  <a:schemeClr val="bg1"/>
-                </a:solidFill>
-              </a:rPr>
-              <a:t>Intro</a:t>
-            </a:r>
-          </a:p>
-        </p:txBody>
-      </p:sp>
-      <p:sp>
-        <p:nvSpPr>
-          <p:cNvPr id="3" name="TextBox 2">
-            <a:extLst>
-              <a:ext uri="{FF2B5EF4-FFF2-40B4-BE49-F238E27FC236}">
-                <a16:creationId xmlns:a16="http://schemas.microsoft.com/office/drawing/2014/main" id="{688D616B-8979-3A02-FC3B-CEA112A0AB0D}"/>
-              </a:ext>
-            </a:extLst>
-          </p:cNvPr>
-          <p:cNvSpPr txBox="1"/>
-          <p:nvPr/>
-        </p:nvSpPr>
-        <p:spPr>
-          <a:xfrm>
             <a:off x="625365" y="1602304"/>
             <a:ext cx="1673887" cy="461665"/>
           </a:xfrm>
@@ -3880,7 +3788,7 @@
 </p:sld>
 </file>
 
-<file path=ppt/slides/slide12.xml><?xml version="1.0" encoding="utf-8"?>
+<file path=ppt/slides/slide11.xml><?xml version="1.0" encoding="utf-8"?>
 <p:sld xmlns:a="http://schemas.openxmlformats.org/drawingml/2006/main" xmlns:r="http://schemas.openxmlformats.org/officeDocument/2006/relationships" xmlns:p="http://schemas.openxmlformats.org/presentationml/2006/main">
   <p:cSld>
     <p:spTree>
@@ -4074,7 +3982,35 @@
           <a:p>
             <a:r>
               <a:rPr lang="en-US" sz="2400" dirty="0"/>
-              <a:t>2004 		PhD Eotvos University	Advisor: Tamas Vicsek</a:t>
+              <a:t>2004		</a:t>
+            </a:r>
+            <a:r>
+              <a:rPr lang="hu-HU" sz="2400" dirty="0"/>
+              <a:t>Physics </a:t>
+            </a:r>
+            <a:r>
+              <a:rPr lang="en-US" sz="2400" dirty="0"/>
+              <a:t>PhD </a:t>
+            </a:r>
+            <a:r>
+              <a:rPr lang="hu-HU" sz="2400" dirty="0" err="1"/>
+              <a:t>at</a:t>
+            </a:r>
+            <a:r>
+              <a:rPr lang="hu-HU" sz="2400" dirty="0"/>
+              <a:t> </a:t>
+            </a:r>
+            <a:r>
+              <a:rPr lang="en-US" sz="2400" dirty="0"/>
+              <a:t>Eotvos University</a:t>
+            </a:r>
+            <a:r>
+              <a:rPr lang="hu-HU" sz="2400" dirty="0"/>
+              <a:t>, </a:t>
+            </a:r>
+            <a:r>
+              <a:rPr lang="en-US" sz="2400" dirty="0"/>
+              <a:t>Advisor: Tamas Vicsek</a:t>
             </a:r>
           </a:p>
           <a:p>
@@ -4083,7 +4019,15 @@
           <a:p>
             <a:r>
               <a:rPr lang="en-US" sz="2400" dirty="0"/>
-              <a:t> – 2017	Eotvos Univ., Hung. Acad. of Sci.</a:t>
+              <a:t> – 2017	Eotvos Univ.</a:t>
+            </a:r>
+            <a:r>
+              <a:rPr lang="hu-HU" sz="2400" dirty="0"/>
+              <a:t> /</a:t>
+            </a:r>
+            <a:r>
+              <a:rPr lang="en-US" sz="2400" dirty="0"/>
+              <a:t> Hung. Acad. of Sci.</a:t>
             </a:r>
           </a:p>
           <a:p>
@@ -4098,7 +4042,7 @@
           <a:p>
             <a:r>
               <a:rPr lang="en-US" sz="2400" dirty="0"/>
-              <a:t>2017 –		Citibank HU MQA (Markets Quantitative Analysis) </a:t>
+              <a:t>2017 –		Citi HU MQA (Markets Quantitative Analysis) </a:t>
             </a:r>
           </a:p>
         </p:txBody>
@@ -4202,15 +4146,7 @@
           <a:p>
             <a:r>
               <a:rPr lang="en-US" sz="2400" dirty="0"/>
-              <a:t>2</a:t>
-            </a:r>
-            <a:r>
-              <a:rPr lang="hu-HU" sz="2400" dirty="0"/>
-              <a:t>4</a:t>
-            </a:r>
-            <a:r>
-              <a:rPr lang="en-US" sz="2400" dirty="0"/>
-              <a:t>0</a:t>
+              <a:t>229</a:t>
             </a:r>
             <a:r>
               <a:rPr lang="hu-HU" sz="2400" dirty="0"/>
@@ -4272,8 +4208,8 @@
         </p:nvSpPr>
         <p:spPr>
           <a:xfrm>
-            <a:off x="541390" y="2685214"/>
-            <a:ext cx="2108505" cy="461665"/>
+            <a:off x="210520" y="2625054"/>
+            <a:ext cx="2460489" cy="646331"/>
           </a:xfrm>
           <a:prstGeom prst="rect">
             <a:avLst/>
@@ -4287,8 +4223,8 @@
           <a:lstStyle/>
           <a:p>
             <a:r>
-              <a:rPr lang="en-US" sz="2400" dirty="0"/>
-              <a:t>HU SSC Head</a:t>
+              <a:rPr lang="en-US" dirty="0"/>
+              <a:t>Managing Director and Country Officer in HU</a:t>
             </a:r>
           </a:p>
         </p:txBody>
@@ -4323,15 +4259,7 @@
           <a:p>
             <a:r>
               <a:rPr lang="en-US" sz="2400" dirty="0"/>
-              <a:t>3</a:t>
-            </a:r>
-            <a:r>
-              <a:rPr lang="hu-HU" sz="2400" dirty="0"/>
-              <a:t>1</a:t>
-            </a:r>
-            <a:r>
-              <a:rPr lang="en-US" sz="2400" dirty="0"/>
-              <a:t>00</a:t>
+              <a:t>3 000+</a:t>
             </a:r>
             <a:r>
               <a:rPr lang="hu-HU" sz="2400" dirty="0"/>
@@ -4411,89 +4339,6 @@
               <a:rPr lang="en-US" sz="2400" dirty="0"/>
               <a:t>Veronika Spanarova</a:t>
             </a:r>
-          </a:p>
-        </p:txBody>
-      </p:sp>
-      <p:sp>
-        <p:nvSpPr>
-          <p:cNvPr id="4" name="TextBox 3">
-            <a:extLst>
-              <a:ext uri="{FF2B5EF4-FFF2-40B4-BE49-F238E27FC236}">
-                <a16:creationId xmlns:a16="http://schemas.microsoft.com/office/drawing/2014/main" id="{AAA8C009-BE60-78A8-81AD-936DEBCC0580}"/>
-              </a:ext>
-            </a:extLst>
-          </p:cNvPr>
-          <p:cNvSpPr txBox="1"/>
-          <p:nvPr/>
-        </p:nvSpPr>
-        <p:spPr>
-          <a:xfrm>
-            <a:off x="4471219" y="4167431"/>
-            <a:ext cx="4333556" cy="461665"/>
-          </a:xfrm>
-          <a:prstGeom prst="rect">
-            <a:avLst/>
-          </a:prstGeom>
-          <a:noFill/>
-        </p:spPr>
-        <p:txBody>
-          <a:bodyPr wrap="square" rtlCol="0">
-            <a:spAutoFit/>
-          </a:bodyPr>
-          <a:lstStyle/>
-          <a:p>
-            <a:r>
-              <a:rPr lang="en-US" sz="2400" dirty="0"/>
-              <a:t>Arena Corner   (M2 Stadionok)</a:t>
-            </a:r>
-          </a:p>
-        </p:txBody>
-      </p:sp>
-      <p:sp>
-        <p:nvSpPr>
-          <p:cNvPr id="6" name="TextBox 5">
-            <a:extLst>
-              <a:ext uri="{FF2B5EF4-FFF2-40B4-BE49-F238E27FC236}">
-                <a16:creationId xmlns:a16="http://schemas.microsoft.com/office/drawing/2014/main" id="{A96EE1FD-1F17-D981-EA48-A7B8EEE0A846}"/>
-              </a:ext>
-            </a:extLst>
-          </p:cNvPr>
-          <p:cNvSpPr txBox="1"/>
-          <p:nvPr/>
-        </p:nvSpPr>
-        <p:spPr>
-          <a:xfrm>
-            <a:off x="4471219" y="4959515"/>
-            <a:ext cx="6276655" cy="461665"/>
-          </a:xfrm>
-          <a:prstGeom prst="rect">
-            <a:avLst/>
-          </a:prstGeom>
-          <a:noFill/>
-        </p:spPr>
-        <p:txBody>
-          <a:bodyPr wrap="square" rtlCol="0">
-            <a:spAutoFit/>
-          </a:bodyPr>
-          <a:lstStyle/>
-          <a:p>
-            <a:r>
-              <a:rPr lang="en-US" sz="2400" dirty="0"/>
-              <a:t>Promenade Gardens </a:t>
-            </a:r>
-            <a:r>
-              <a:rPr lang="hu-HU" sz="2400" dirty="0"/>
-              <a:t>  </a:t>
-            </a:r>
-            <a:r>
-              <a:rPr lang="en-US" sz="2400" dirty="0"/>
-              <a:t>(M3 D</a:t>
-            </a:r>
-            <a:r>
-              <a:rPr lang="hu-HU" sz="2400" dirty="0"/>
-              <a:t>ózsa György út)</a:t>
-            </a:r>
-            <a:endParaRPr lang="en-US" sz="2400" dirty="0"/>
           </a:p>
         </p:txBody>
       </p:sp>
@@ -4536,6 +4381,36 @@
           </a:p>
         </p:txBody>
       </p:sp>
+      <p:pic>
+        <p:nvPicPr>
+          <p:cNvPr id="11" name="Picture 10">
+            <a:extLst>
+              <a:ext uri="{FF2B5EF4-FFF2-40B4-BE49-F238E27FC236}">
+                <a16:creationId xmlns:a16="http://schemas.microsoft.com/office/drawing/2014/main" id="{F3688CA2-6CE8-9EC5-940A-E0A3003BDE21}"/>
+              </a:ext>
+            </a:extLst>
+          </p:cNvPr>
+          <p:cNvPicPr>
+            <a:picLocks noChangeAspect="1"/>
+          </p:cNvPicPr>
+          <p:nvPr/>
+        </p:nvPicPr>
+        <p:blipFill>
+          <a:blip r:embed="rId2"/>
+          <a:stretch>
+            <a:fillRect/>
+          </a:stretch>
+        </p:blipFill>
+        <p:spPr>
+          <a:xfrm>
+            <a:off x="7415350" y="4169664"/>
+            <a:ext cx="3844622" cy="1864244"/>
+          </a:xfrm>
+          <a:prstGeom prst="rect">
+            <a:avLst/>
+          </a:prstGeom>
+        </p:spPr>
+      </p:pic>
     </p:spTree>
     <p:extLst>
       <p:ext uri="{BB962C8B-B14F-4D97-AF65-F5344CB8AC3E}">
@@ -4550,218 +4425,6 @@
 </file>
 
 <file path=ppt/slides/slide4.xml><?xml version="1.0" encoding="utf-8"?>
-<p:sld xmlns:a="http://schemas.openxmlformats.org/drawingml/2006/main" xmlns:r="http://schemas.openxmlformats.org/officeDocument/2006/relationships" xmlns:p="http://schemas.openxmlformats.org/presentationml/2006/main">
-  <p:cSld>
-    <p:spTree>
-      <p:nvGrpSpPr>
-        <p:cNvPr id="1" name=""/>
-        <p:cNvGrpSpPr/>
-        <p:nvPr/>
-      </p:nvGrpSpPr>
-      <p:grpSpPr>
-        <a:xfrm>
-          <a:off x="0" y="0"/>
-          <a:ext cx="0" cy="0"/>
-          <a:chOff x="0" y="0"/>
-          <a:chExt cx="0" cy="0"/>
-        </a:xfrm>
-      </p:grpSpPr>
-      <p:sp>
-        <p:nvSpPr>
-          <p:cNvPr id="7" name="TextBox 6">
-            <a:extLst>
-              <a:ext uri="{FF2B5EF4-FFF2-40B4-BE49-F238E27FC236}">
-                <a16:creationId xmlns:a16="http://schemas.microsoft.com/office/drawing/2014/main" id="{15AC98AD-93EB-1FC4-CCAE-A24A07B5ED9D}"/>
-              </a:ext>
-            </a:extLst>
-          </p:cNvPr>
-          <p:cNvSpPr txBox="1"/>
-          <p:nvPr/>
-        </p:nvSpPr>
-        <p:spPr>
-          <a:xfrm>
-            <a:off x="3594533" y="2555687"/>
-            <a:ext cx="5192969" cy="1938992"/>
-          </a:xfrm>
-          <a:prstGeom prst="rect">
-            <a:avLst/>
-          </a:prstGeom>
-          <a:noFill/>
-        </p:spPr>
-        <p:txBody>
-          <a:bodyPr wrap="square" rtlCol="0">
-            <a:spAutoFit/>
-          </a:bodyPr>
-          <a:lstStyle/>
-          <a:p>
-            <a:pPr algn="ctr"/>
-            <a:r>
-              <a:rPr lang="en-US" sz="2400" dirty="0"/>
-              <a:t>Modern Portfolio Theory (MPT)</a:t>
-            </a:r>
-          </a:p>
-          <a:p>
-            <a:pPr algn="ctr"/>
-            <a:endParaRPr lang="en-US" sz="2400" dirty="0"/>
-          </a:p>
-          <a:p>
-            <a:pPr algn="ctr"/>
-            <a:r>
-              <a:rPr lang="en-US" sz="2400" dirty="0"/>
-              <a:t>Capital Asset Pricing Model (CAPM)</a:t>
-            </a:r>
-          </a:p>
-          <a:p>
-            <a:pPr algn="ctr"/>
-            <a:endParaRPr lang="en-US" sz="2400" dirty="0"/>
-          </a:p>
-          <a:p>
-            <a:pPr algn="ctr"/>
-            <a:r>
-              <a:rPr lang="en-US" sz="2400" dirty="0"/>
-              <a:t>1950s / 60s</a:t>
-            </a:r>
-          </a:p>
-        </p:txBody>
-      </p:sp>
-      <p:sp>
-        <p:nvSpPr>
-          <p:cNvPr id="8" name="TextBox 7">
-            <a:extLst>
-              <a:ext uri="{FF2B5EF4-FFF2-40B4-BE49-F238E27FC236}">
-                <a16:creationId xmlns:a16="http://schemas.microsoft.com/office/drawing/2014/main" id="{12B97E98-1D37-81AE-7102-185720B74B78}"/>
-              </a:ext>
-            </a:extLst>
-          </p:cNvPr>
-          <p:cNvSpPr txBox="1"/>
-          <p:nvPr/>
-        </p:nvSpPr>
-        <p:spPr>
-          <a:xfrm>
-            <a:off x="105100" y="156234"/>
-            <a:ext cx="12002814" cy="369332"/>
-          </a:xfrm>
-          <a:prstGeom prst="rect">
-            <a:avLst/>
-          </a:prstGeom>
-          <a:noFill/>
-        </p:spPr>
-        <p:txBody>
-          <a:bodyPr wrap="square" rtlCol="0">
-            <a:spAutoFit/>
-          </a:bodyPr>
-          <a:lstStyle/>
-          <a:p>
-            <a:r>
-              <a:rPr lang="en-US" dirty="0">
-                <a:solidFill>
-                  <a:schemeClr val="bg1"/>
-                </a:solidFill>
-              </a:rPr>
-              <a:t>Farkas Ill</a:t>
-            </a:r>
-            <a:r>
-              <a:rPr lang="hu-HU" dirty="0">
-                <a:solidFill>
-                  <a:schemeClr val="bg1"/>
-                </a:solidFill>
-              </a:rPr>
-              <a:t>és										Citibank HU MQA</a:t>
-            </a:r>
-            <a:endParaRPr lang="en-US" dirty="0">
-              <a:solidFill>
-                <a:schemeClr val="bg1"/>
-              </a:solidFill>
-            </a:endParaRPr>
-          </a:p>
-        </p:txBody>
-      </p:sp>
-      <p:sp>
-        <p:nvSpPr>
-          <p:cNvPr id="3" name="TextBox 2">
-            <a:extLst>
-              <a:ext uri="{FF2B5EF4-FFF2-40B4-BE49-F238E27FC236}">
-                <a16:creationId xmlns:a16="http://schemas.microsoft.com/office/drawing/2014/main" id="{1AC805F4-0DB8-C954-AC91-283C6CA97B4B}"/>
-              </a:ext>
-            </a:extLst>
-          </p:cNvPr>
-          <p:cNvSpPr txBox="1"/>
-          <p:nvPr/>
-        </p:nvSpPr>
-        <p:spPr>
-          <a:xfrm>
-            <a:off x="386737" y="1394170"/>
-            <a:ext cx="5192969" cy="461665"/>
-          </a:xfrm>
-          <a:prstGeom prst="rect">
-            <a:avLst/>
-          </a:prstGeom>
-          <a:noFill/>
-        </p:spPr>
-        <p:txBody>
-          <a:bodyPr wrap="square" rtlCol="0">
-            <a:spAutoFit/>
-          </a:bodyPr>
-          <a:lstStyle/>
-          <a:p>
-            <a:pPr algn="ctr"/>
-            <a:r>
-              <a:rPr lang="en-US" sz="2400" b="1" dirty="0"/>
-              <a:t>Efficient Markets Hypothesis (EMH)</a:t>
-            </a:r>
-          </a:p>
-        </p:txBody>
-      </p:sp>
-      <p:sp>
-        <p:nvSpPr>
-          <p:cNvPr id="4" name="TextBox 3">
-            <a:extLst>
-              <a:ext uri="{FF2B5EF4-FFF2-40B4-BE49-F238E27FC236}">
-                <a16:creationId xmlns:a16="http://schemas.microsoft.com/office/drawing/2014/main" id="{F98D5EE9-3AA2-590A-3DD2-10F0E3742BA7}"/>
-              </a:ext>
-            </a:extLst>
-          </p:cNvPr>
-          <p:cNvSpPr txBox="1"/>
-          <p:nvPr/>
-        </p:nvSpPr>
-        <p:spPr>
-          <a:xfrm>
-            <a:off x="4461638" y="5419686"/>
-            <a:ext cx="3289737" cy="400110"/>
-          </a:xfrm>
-          <a:prstGeom prst="rect">
-            <a:avLst/>
-          </a:prstGeom>
-          <a:noFill/>
-        </p:spPr>
-        <p:txBody>
-          <a:bodyPr wrap="square" rtlCol="0">
-            <a:spAutoFit/>
-          </a:bodyPr>
-          <a:lstStyle/>
-          <a:p>
-            <a:pPr algn="ctr"/>
-            <a:r>
-              <a:rPr lang="en-US" sz="2000" i="1" dirty="0"/>
-              <a:t>See also: BMETE15MF78</a:t>
-            </a:r>
-          </a:p>
-        </p:txBody>
-      </p:sp>
-    </p:spTree>
-    <p:extLst>
-      <p:ext uri="{BB962C8B-B14F-4D97-AF65-F5344CB8AC3E}">
-        <p14:creationId xmlns:p14="http://schemas.microsoft.com/office/powerpoint/2010/main" val="1241681796"/>
-      </p:ext>
-    </p:extLst>
-  </p:cSld>
-  <p:clrMapOvr>
-    <a:masterClrMapping/>
-  </p:clrMapOvr>
-</p:sld>
-</file>
-
-<file path=ppt/slides/slide5.xml><?xml version="1.0" encoding="utf-8"?>
 <p:sld xmlns:a="http://schemas.openxmlformats.org/drawingml/2006/main" xmlns:r="http://schemas.openxmlformats.org/officeDocument/2006/relationships" xmlns:p="http://schemas.openxmlformats.org/presentationml/2006/main">
   <p:cSld>
     <p:spTree>
@@ -5118,7 +4781,7 @@
 </p:sld>
 </file>
 
-<file path=ppt/slides/slide6.xml><?xml version="1.0" encoding="utf-8"?>
+<file path=ppt/slides/slide5.xml><?xml version="1.0" encoding="utf-8"?>
 <p:sld xmlns:a="http://schemas.openxmlformats.org/drawingml/2006/main" xmlns:r="http://schemas.openxmlformats.org/officeDocument/2006/relationships" xmlns:p="http://schemas.openxmlformats.org/presentationml/2006/main">
   <p:cSld>
     <p:spTree>
@@ -5984,6 +5647,1141 @@
     <p:extLst>
       <p:ext uri="{BB962C8B-B14F-4D97-AF65-F5344CB8AC3E}">
         <p14:creationId xmlns:p14="http://schemas.microsoft.com/office/powerpoint/2010/main" val="3982887013"/>
+      </p:ext>
+    </p:extLst>
+  </p:cSld>
+  <p:clrMapOvr>
+    <a:masterClrMapping/>
+  </p:clrMapOvr>
+</p:sld>
+</file>
+
+<file path=ppt/slides/slide6.xml><?xml version="1.0" encoding="utf-8"?>
+<p:sld xmlns:a="http://schemas.openxmlformats.org/drawingml/2006/main" xmlns:r="http://schemas.openxmlformats.org/officeDocument/2006/relationships" xmlns:p="http://schemas.openxmlformats.org/presentationml/2006/main">
+  <p:cSld>
+    <p:spTree>
+      <p:nvGrpSpPr>
+        <p:cNvPr id="1" name=""/>
+        <p:cNvGrpSpPr/>
+        <p:nvPr/>
+      </p:nvGrpSpPr>
+      <p:grpSpPr>
+        <a:xfrm>
+          <a:off x="0" y="0"/>
+          <a:ext cx="0" cy="0"/>
+          <a:chOff x="0" y="0"/>
+          <a:chExt cx="0" cy="0"/>
+        </a:xfrm>
+      </p:grpSpPr>
+      <p:sp>
+        <p:nvSpPr>
+          <p:cNvPr id="12" name="TextBox 11">
+            <a:extLst>
+              <a:ext uri="{FF2B5EF4-FFF2-40B4-BE49-F238E27FC236}">
+                <a16:creationId xmlns:a16="http://schemas.microsoft.com/office/drawing/2014/main" id="{706A4D02-961D-456E-92D6-353375DDEE25}"/>
+              </a:ext>
+            </a:extLst>
+          </p:cNvPr>
+          <p:cNvSpPr txBox="1"/>
+          <p:nvPr/>
+        </p:nvSpPr>
+        <p:spPr>
+          <a:xfrm>
+            <a:off x="105100" y="156234"/>
+            <a:ext cx="12002814" cy="369332"/>
+          </a:xfrm>
+          <a:prstGeom prst="rect">
+            <a:avLst/>
+          </a:prstGeom>
+          <a:noFill/>
+        </p:spPr>
+        <p:txBody>
+          <a:bodyPr wrap="square" rtlCol="0">
+            <a:spAutoFit/>
+          </a:bodyPr>
+          <a:lstStyle/>
+          <a:p>
+            <a:r>
+              <a:rPr lang="en-US" dirty="0">
+                <a:solidFill>
+                  <a:schemeClr val="bg1"/>
+                </a:solidFill>
+              </a:rPr>
+              <a:t>Intro</a:t>
+            </a:r>
+          </a:p>
+        </p:txBody>
+      </p:sp>
+      <p:cxnSp>
+        <p:nvCxnSpPr>
+          <p:cNvPr id="22" name="Straight Arrow Connector 21">
+            <a:extLst>
+              <a:ext uri="{FF2B5EF4-FFF2-40B4-BE49-F238E27FC236}">
+                <a16:creationId xmlns:a16="http://schemas.microsoft.com/office/drawing/2014/main" id="{A55FF6FE-ABED-05BE-32C9-B6F28F172723}"/>
+              </a:ext>
+            </a:extLst>
+          </p:cNvPr>
+          <p:cNvCxnSpPr/>
+          <p:nvPr/>
+        </p:nvCxnSpPr>
+        <p:spPr>
+          <a:xfrm>
+            <a:off x="4391372" y="5026121"/>
+            <a:ext cx="4464000" cy="0"/>
+          </a:xfrm>
+          <a:prstGeom prst="straightConnector1">
+            <a:avLst/>
+          </a:prstGeom>
+          <a:ln w="25400" cap="rnd">
+            <a:solidFill>
+              <a:schemeClr val="tx1"/>
+            </a:solidFill>
+            <a:tailEnd type="arrow" w="lg" len="lg"/>
+          </a:ln>
+        </p:spPr>
+        <p:style>
+          <a:lnRef idx="1">
+            <a:schemeClr val="accent1"/>
+          </a:lnRef>
+          <a:fillRef idx="0">
+            <a:schemeClr val="accent1"/>
+          </a:fillRef>
+          <a:effectRef idx="0">
+            <a:schemeClr val="accent1"/>
+          </a:effectRef>
+          <a:fontRef idx="minor">
+            <a:schemeClr val="tx1"/>
+          </a:fontRef>
+        </p:style>
+      </p:cxnSp>
+      <p:cxnSp>
+        <p:nvCxnSpPr>
+          <p:cNvPr id="23" name="Straight Arrow Connector 22">
+            <a:extLst>
+              <a:ext uri="{FF2B5EF4-FFF2-40B4-BE49-F238E27FC236}">
+                <a16:creationId xmlns:a16="http://schemas.microsoft.com/office/drawing/2014/main" id="{3B11E5E3-2960-3717-242D-5568D05BE418}"/>
+              </a:ext>
+            </a:extLst>
+          </p:cNvPr>
+          <p:cNvCxnSpPr>
+            <a:cxnSpLocks/>
+          </p:cNvCxnSpPr>
+          <p:nvPr/>
+        </p:nvCxnSpPr>
+        <p:spPr>
+          <a:xfrm flipV="1">
+            <a:off x="4749178" y="4877034"/>
+            <a:ext cx="0" cy="301487"/>
+          </a:xfrm>
+          <a:prstGeom prst="straightConnector1">
+            <a:avLst/>
+          </a:prstGeom>
+          <a:ln w="25400" cap="rnd">
+            <a:solidFill>
+              <a:schemeClr val="tx1"/>
+            </a:solidFill>
+            <a:tailEnd type="none" w="lg" len="lg"/>
+          </a:ln>
+        </p:spPr>
+        <p:style>
+          <a:lnRef idx="1">
+            <a:schemeClr val="accent1"/>
+          </a:lnRef>
+          <a:fillRef idx="0">
+            <a:schemeClr val="accent1"/>
+          </a:fillRef>
+          <a:effectRef idx="0">
+            <a:schemeClr val="accent1"/>
+          </a:effectRef>
+          <a:fontRef idx="minor">
+            <a:schemeClr val="tx1"/>
+          </a:fontRef>
+        </p:style>
+      </p:cxnSp>
+      <p:cxnSp>
+        <p:nvCxnSpPr>
+          <p:cNvPr id="24" name="Straight Arrow Connector 23">
+            <a:extLst>
+              <a:ext uri="{FF2B5EF4-FFF2-40B4-BE49-F238E27FC236}">
+                <a16:creationId xmlns:a16="http://schemas.microsoft.com/office/drawing/2014/main" id="{B547C32D-A926-AEDC-7A83-8545EB5B1CAC}"/>
+              </a:ext>
+            </a:extLst>
+          </p:cNvPr>
+          <p:cNvCxnSpPr>
+            <a:cxnSpLocks/>
+          </p:cNvCxnSpPr>
+          <p:nvPr/>
+        </p:nvCxnSpPr>
+        <p:spPr>
+          <a:xfrm flipV="1">
+            <a:off x="6813847" y="4877034"/>
+            <a:ext cx="0" cy="301487"/>
+          </a:xfrm>
+          <a:prstGeom prst="straightConnector1">
+            <a:avLst/>
+          </a:prstGeom>
+          <a:ln w="25400" cap="rnd">
+            <a:solidFill>
+              <a:schemeClr val="tx1"/>
+            </a:solidFill>
+            <a:tailEnd type="none" w="lg" len="lg"/>
+          </a:ln>
+        </p:spPr>
+        <p:style>
+          <a:lnRef idx="1">
+            <a:schemeClr val="accent1"/>
+          </a:lnRef>
+          <a:fillRef idx="0">
+            <a:schemeClr val="accent1"/>
+          </a:fillRef>
+          <a:effectRef idx="0">
+            <a:schemeClr val="accent1"/>
+          </a:effectRef>
+          <a:fontRef idx="minor">
+            <a:schemeClr val="tx1"/>
+          </a:fontRef>
+        </p:style>
+      </p:cxnSp>
+      <p:sp>
+        <p:nvSpPr>
+          <p:cNvPr id="25" name="TextBox 24">
+            <a:extLst>
+              <a:ext uri="{FF2B5EF4-FFF2-40B4-BE49-F238E27FC236}">
+                <a16:creationId xmlns:a16="http://schemas.microsoft.com/office/drawing/2014/main" id="{17438D28-9229-EDE5-21EA-1F3B6405FCD6}"/>
+              </a:ext>
+            </a:extLst>
+          </p:cNvPr>
+          <p:cNvSpPr txBox="1"/>
+          <p:nvPr/>
+        </p:nvSpPr>
+        <p:spPr>
+          <a:xfrm>
+            <a:off x="7707434" y="4441346"/>
+            <a:ext cx="914396" cy="461665"/>
+          </a:xfrm>
+          <a:prstGeom prst="rect">
+            <a:avLst/>
+          </a:prstGeom>
+          <a:noFill/>
+        </p:spPr>
+        <p:txBody>
+          <a:bodyPr wrap="square" rtlCol="0">
+            <a:spAutoFit/>
+          </a:bodyPr>
+          <a:lstStyle/>
+          <a:p>
+            <a:pPr algn="r"/>
+            <a:r>
+              <a:rPr lang="hu-HU" sz="2400" dirty="0"/>
+              <a:t>Time</a:t>
+            </a:r>
+            <a:endParaRPr lang="en-US" sz="2400" dirty="0"/>
+          </a:p>
+        </p:txBody>
+      </p:sp>
+      <p:sp>
+        <p:nvSpPr>
+          <p:cNvPr id="26" name="TextBox 25">
+            <a:extLst>
+              <a:ext uri="{FF2B5EF4-FFF2-40B4-BE49-F238E27FC236}">
+                <a16:creationId xmlns:a16="http://schemas.microsoft.com/office/drawing/2014/main" id="{78ED060C-EC26-352F-E429-EF13D97716E7}"/>
+              </a:ext>
+            </a:extLst>
+          </p:cNvPr>
+          <p:cNvSpPr txBox="1"/>
+          <p:nvPr/>
+        </p:nvSpPr>
+        <p:spPr>
+          <a:xfrm>
+            <a:off x="4305241" y="5270446"/>
+            <a:ext cx="881264" cy="461665"/>
+          </a:xfrm>
+          <a:prstGeom prst="rect">
+            <a:avLst/>
+          </a:prstGeom>
+          <a:noFill/>
+        </p:spPr>
+        <p:txBody>
+          <a:bodyPr wrap="square" rtlCol="0">
+            <a:spAutoFit/>
+          </a:bodyPr>
+          <a:lstStyle/>
+          <a:p>
+            <a:pPr algn="ctr"/>
+            <a:r>
+              <a:rPr lang="hu-HU" sz="2400" dirty="0"/>
+              <a:t>0</a:t>
+            </a:r>
+            <a:endParaRPr lang="en-US" sz="2400" dirty="0"/>
+          </a:p>
+        </p:txBody>
+      </p:sp>
+      <p:sp>
+        <p:nvSpPr>
+          <p:cNvPr id="27" name="TextBox 26">
+            <a:extLst>
+              <a:ext uri="{FF2B5EF4-FFF2-40B4-BE49-F238E27FC236}">
+                <a16:creationId xmlns:a16="http://schemas.microsoft.com/office/drawing/2014/main" id="{83687220-C7E5-B563-7DFC-99F5967052E6}"/>
+              </a:ext>
+            </a:extLst>
+          </p:cNvPr>
+          <p:cNvSpPr txBox="1"/>
+          <p:nvPr/>
+        </p:nvSpPr>
+        <p:spPr>
+          <a:xfrm>
+            <a:off x="6376885" y="5270446"/>
+            <a:ext cx="881264" cy="461665"/>
+          </a:xfrm>
+          <a:prstGeom prst="rect">
+            <a:avLst/>
+          </a:prstGeom>
+          <a:noFill/>
+        </p:spPr>
+        <p:txBody>
+          <a:bodyPr wrap="square" rtlCol="0">
+            <a:spAutoFit/>
+          </a:bodyPr>
+          <a:lstStyle/>
+          <a:p>
+            <a:pPr algn="ctr"/>
+            <a:r>
+              <a:rPr lang="hu-HU" sz="2400" dirty="0"/>
+              <a:t>1</a:t>
+            </a:r>
+            <a:endParaRPr lang="en-US" sz="2400" dirty="0"/>
+          </a:p>
+        </p:txBody>
+      </p:sp>
+      <p:sp>
+        <p:nvSpPr>
+          <p:cNvPr id="30" name="TextBox 29">
+            <a:extLst>
+              <a:ext uri="{FF2B5EF4-FFF2-40B4-BE49-F238E27FC236}">
+                <a16:creationId xmlns:a16="http://schemas.microsoft.com/office/drawing/2014/main" id="{0DE7E593-4DF4-5EE2-9A6F-3D6A62BF3827}"/>
+              </a:ext>
+            </a:extLst>
+          </p:cNvPr>
+          <p:cNvSpPr txBox="1"/>
+          <p:nvPr/>
+        </p:nvSpPr>
+        <p:spPr>
+          <a:xfrm>
+            <a:off x="4256443" y="1252728"/>
+            <a:ext cx="1000531" cy="461665"/>
+          </a:xfrm>
+          <a:prstGeom prst="rect">
+            <a:avLst/>
+          </a:prstGeom>
+          <a:noFill/>
+        </p:spPr>
+        <p:txBody>
+          <a:bodyPr wrap="square" rtlCol="0">
+            <a:spAutoFit/>
+          </a:bodyPr>
+          <a:lstStyle/>
+          <a:p>
+            <a:pPr algn="ctr"/>
+            <a:r>
+              <a:rPr lang="hu-HU" sz="2400" dirty="0"/>
+              <a:t>Alice</a:t>
+            </a:r>
+            <a:endParaRPr lang="en-US" sz="2400" dirty="0"/>
+          </a:p>
+        </p:txBody>
+      </p:sp>
+      <p:sp>
+        <p:nvSpPr>
+          <p:cNvPr id="31" name="TextBox 30">
+            <a:extLst>
+              <a:ext uri="{FF2B5EF4-FFF2-40B4-BE49-F238E27FC236}">
+                <a16:creationId xmlns:a16="http://schemas.microsoft.com/office/drawing/2014/main" id="{B3D11117-A649-533A-39CC-8E67C361FBA7}"/>
+              </a:ext>
+            </a:extLst>
+          </p:cNvPr>
+          <p:cNvSpPr txBox="1"/>
+          <p:nvPr/>
+        </p:nvSpPr>
+        <p:spPr>
+          <a:xfrm>
+            <a:off x="4257371" y="4383493"/>
+            <a:ext cx="1000531" cy="461665"/>
+          </a:xfrm>
+          <a:prstGeom prst="rect">
+            <a:avLst/>
+          </a:prstGeom>
+          <a:noFill/>
+        </p:spPr>
+        <p:txBody>
+          <a:bodyPr wrap="square" rtlCol="0">
+            <a:spAutoFit/>
+          </a:bodyPr>
+          <a:lstStyle/>
+          <a:p>
+            <a:pPr algn="ctr"/>
+            <a:r>
+              <a:rPr lang="hu-HU" sz="2400" dirty="0"/>
+              <a:t>Bob</a:t>
+            </a:r>
+            <a:endParaRPr lang="en-US" sz="2400" dirty="0"/>
+          </a:p>
+        </p:txBody>
+      </p:sp>
+      <p:cxnSp>
+        <p:nvCxnSpPr>
+          <p:cNvPr id="32" name="Straight Arrow Connector 31">
+            <a:extLst>
+              <a:ext uri="{FF2B5EF4-FFF2-40B4-BE49-F238E27FC236}">
+                <a16:creationId xmlns:a16="http://schemas.microsoft.com/office/drawing/2014/main" id="{2D27A85E-0789-177E-BA38-88261BC7524B}"/>
+              </a:ext>
+            </a:extLst>
+          </p:cNvPr>
+          <p:cNvCxnSpPr>
+            <a:cxnSpLocks/>
+          </p:cNvCxnSpPr>
+          <p:nvPr/>
+        </p:nvCxnSpPr>
+        <p:spPr>
+          <a:xfrm>
+            <a:off x="4745873" y="2346677"/>
+            <a:ext cx="0" cy="1417980"/>
+          </a:xfrm>
+          <a:prstGeom prst="straightConnector1">
+            <a:avLst/>
+          </a:prstGeom>
+          <a:ln w="25400" cap="rnd">
+            <a:solidFill>
+              <a:schemeClr val="tx1"/>
+            </a:solidFill>
+            <a:headEnd w="lg" len="lg"/>
+            <a:tailEnd type="arrow" w="lg" len="lg"/>
+          </a:ln>
+        </p:spPr>
+        <p:style>
+          <a:lnRef idx="1">
+            <a:schemeClr val="accent1"/>
+          </a:lnRef>
+          <a:fillRef idx="0">
+            <a:schemeClr val="accent1"/>
+          </a:fillRef>
+          <a:effectRef idx="0">
+            <a:schemeClr val="accent1"/>
+          </a:effectRef>
+          <a:fontRef idx="minor">
+            <a:schemeClr val="tx1"/>
+          </a:fontRef>
+        </p:style>
+      </p:cxnSp>
+      <p:cxnSp>
+        <p:nvCxnSpPr>
+          <p:cNvPr id="35" name="Straight Arrow Connector 34">
+            <a:extLst>
+              <a:ext uri="{FF2B5EF4-FFF2-40B4-BE49-F238E27FC236}">
+                <a16:creationId xmlns:a16="http://schemas.microsoft.com/office/drawing/2014/main" id="{F231E58E-6969-8B7B-BD6B-7D3960568FB7}"/>
+              </a:ext>
+            </a:extLst>
+          </p:cNvPr>
+          <p:cNvCxnSpPr>
+            <a:cxnSpLocks/>
+          </p:cNvCxnSpPr>
+          <p:nvPr/>
+        </p:nvCxnSpPr>
+        <p:spPr>
+          <a:xfrm>
+            <a:off x="6805155" y="2328015"/>
+            <a:ext cx="0" cy="1417980"/>
+          </a:xfrm>
+          <a:prstGeom prst="straightConnector1">
+            <a:avLst/>
+          </a:prstGeom>
+          <a:ln w="25400" cap="rnd">
+            <a:solidFill>
+              <a:schemeClr val="tx1"/>
+            </a:solidFill>
+            <a:headEnd type="arrow" w="lg" len="lg"/>
+            <a:tailEnd type="none" w="lg" len="lg"/>
+          </a:ln>
+        </p:spPr>
+        <p:style>
+          <a:lnRef idx="1">
+            <a:schemeClr val="accent1"/>
+          </a:lnRef>
+          <a:fillRef idx="0">
+            <a:schemeClr val="accent1"/>
+          </a:fillRef>
+          <a:effectRef idx="0">
+            <a:schemeClr val="accent1"/>
+          </a:effectRef>
+          <a:fontRef idx="minor">
+            <a:schemeClr val="tx1"/>
+          </a:fontRef>
+        </p:style>
+      </p:cxnSp>
+      <p:sp>
+        <p:nvSpPr>
+          <p:cNvPr id="39" name="Oval 38">
+            <a:extLst>
+              <a:ext uri="{FF2B5EF4-FFF2-40B4-BE49-F238E27FC236}">
+                <a16:creationId xmlns:a16="http://schemas.microsoft.com/office/drawing/2014/main" id="{FEAF57DE-A6CC-6CD4-CE8B-31704AA26C16}"/>
+              </a:ext>
+            </a:extLst>
+          </p:cNvPr>
+          <p:cNvSpPr/>
+          <p:nvPr/>
+        </p:nvSpPr>
+        <p:spPr>
+          <a:xfrm>
+            <a:off x="4453905" y="1664758"/>
+            <a:ext cx="605608" cy="585407"/>
+          </a:xfrm>
+          <a:prstGeom prst="ellipse">
+            <a:avLst/>
+          </a:prstGeom>
+          <a:solidFill>
+            <a:srgbClr val="FF6161"/>
+          </a:solidFill>
+          <a:ln w="38100">
+            <a:solidFill>
+              <a:srgbClr val="C00000"/>
+            </a:solidFill>
+          </a:ln>
+        </p:spPr>
+        <p:style>
+          <a:lnRef idx="2">
+            <a:schemeClr val="accent1">
+              <a:shade val="15000"/>
+            </a:schemeClr>
+          </a:lnRef>
+          <a:fillRef idx="1">
+            <a:schemeClr val="accent1"/>
+          </a:fillRef>
+          <a:effectRef idx="0">
+            <a:schemeClr val="accent1"/>
+          </a:effectRef>
+          <a:fontRef idx="minor">
+            <a:schemeClr val="lt1"/>
+          </a:fontRef>
+        </p:style>
+        <p:txBody>
+          <a:bodyPr rtlCol="0" anchor="ctr"/>
+          <a:lstStyle/>
+          <a:p>
+            <a:pPr algn="ctr"/>
+            <a:endParaRPr lang="en-US"/>
+          </a:p>
+        </p:txBody>
+      </p:sp>
+      <p:sp>
+        <p:nvSpPr>
+          <p:cNvPr id="41" name="Oval 40">
+            <a:extLst>
+              <a:ext uri="{FF2B5EF4-FFF2-40B4-BE49-F238E27FC236}">
+                <a16:creationId xmlns:a16="http://schemas.microsoft.com/office/drawing/2014/main" id="{09FB6A3C-2B15-91A6-4D64-9753B4FF5E75}"/>
+              </a:ext>
+            </a:extLst>
+          </p:cNvPr>
+          <p:cNvSpPr/>
+          <p:nvPr/>
+        </p:nvSpPr>
+        <p:spPr>
+          <a:xfrm>
+            <a:off x="6497935" y="1665495"/>
+            <a:ext cx="605608" cy="585407"/>
+          </a:xfrm>
+          <a:prstGeom prst="ellipse">
+            <a:avLst/>
+          </a:prstGeom>
+          <a:solidFill>
+            <a:srgbClr val="FF6161"/>
+          </a:solidFill>
+          <a:ln w="38100">
+            <a:solidFill>
+              <a:srgbClr val="C00000"/>
+            </a:solidFill>
+          </a:ln>
+        </p:spPr>
+        <p:style>
+          <a:lnRef idx="2">
+            <a:schemeClr val="accent1">
+              <a:shade val="15000"/>
+            </a:schemeClr>
+          </a:lnRef>
+          <a:fillRef idx="1">
+            <a:schemeClr val="accent1"/>
+          </a:fillRef>
+          <a:effectRef idx="0">
+            <a:schemeClr val="accent1"/>
+          </a:effectRef>
+          <a:fontRef idx="minor">
+            <a:schemeClr val="lt1"/>
+          </a:fontRef>
+        </p:style>
+        <p:txBody>
+          <a:bodyPr rtlCol="0" anchor="ctr"/>
+          <a:lstStyle/>
+          <a:p>
+            <a:pPr algn="ctr"/>
+            <a:endParaRPr lang="en-US"/>
+          </a:p>
+        </p:txBody>
+      </p:sp>
+      <p:sp>
+        <p:nvSpPr>
+          <p:cNvPr id="42" name="Oval 41">
+            <a:extLst>
+              <a:ext uri="{FF2B5EF4-FFF2-40B4-BE49-F238E27FC236}">
+                <a16:creationId xmlns:a16="http://schemas.microsoft.com/office/drawing/2014/main" id="{C6BE660A-3E1E-1B29-4B1D-7F7EF28C3568}"/>
+              </a:ext>
+            </a:extLst>
+          </p:cNvPr>
+          <p:cNvSpPr/>
+          <p:nvPr/>
+        </p:nvSpPr>
+        <p:spPr>
+          <a:xfrm>
+            <a:off x="4453905" y="3845409"/>
+            <a:ext cx="605608" cy="585407"/>
+          </a:xfrm>
+          <a:prstGeom prst="ellipse">
+            <a:avLst/>
+          </a:prstGeom>
+          <a:solidFill>
+            <a:srgbClr val="00B0F0"/>
+          </a:solidFill>
+          <a:ln w="38100">
+            <a:solidFill>
+              <a:schemeClr val="accent1">
+                <a:lumMod val="50000"/>
+              </a:schemeClr>
+            </a:solidFill>
+          </a:ln>
+        </p:spPr>
+        <p:style>
+          <a:lnRef idx="2">
+            <a:schemeClr val="accent1">
+              <a:shade val="15000"/>
+            </a:schemeClr>
+          </a:lnRef>
+          <a:fillRef idx="1">
+            <a:schemeClr val="accent1"/>
+          </a:fillRef>
+          <a:effectRef idx="0">
+            <a:schemeClr val="accent1"/>
+          </a:effectRef>
+          <a:fontRef idx="minor">
+            <a:schemeClr val="lt1"/>
+          </a:fontRef>
+        </p:style>
+        <p:txBody>
+          <a:bodyPr rtlCol="0" anchor="ctr"/>
+          <a:lstStyle/>
+          <a:p>
+            <a:pPr algn="ctr"/>
+            <a:endParaRPr lang="en-US"/>
+          </a:p>
+        </p:txBody>
+      </p:sp>
+      <p:sp>
+        <p:nvSpPr>
+          <p:cNvPr id="43" name="Oval 42">
+            <a:extLst>
+              <a:ext uri="{FF2B5EF4-FFF2-40B4-BE49-F238E27FC236}">
+                <a16:creationId xmlns:a16="http://schemas.microsoft.com/office/drawing/2014/main" id="{3C39E87D-5531-1BAF-8436-2A23496168EB}"/>
+              </a:ext>
+            </a:extLst>
+          </p:cNvPr>
+          <p:cNvSpPr/>
+          <p:nvPr/>
+        </p:nvSpPr>
+        <p:spPr>
+          <a:xfrm>
+            <a:off x="6512630" y="3845409"/>
+            <a:ext cx="605608" cy="585407"/>
+          </a:xfrm>
+          <a:prstGeom prst="ellipse">
+            <a:avLst/>
+          </a:prstGeom>
+          <a:solidFill>
+            <a:srgbClr val="00B0F0"/>
+          </a:solidFill>
+          <a:ln w="38100">
+            <a:solidFill>
+              <a:schemeClr val="accent1">
+                <a:lumMod val="50000"/>
+              </a:schemeClr>
+            </a:solidFill>
+          </a:ln>
+        </p:spPr>
+        <p:style>
+          <a:lnRef idx="2">
+            <a:schemeClr val="accent1">
+              <a:shade val="15000"/>
+            </a:schemeClr>
+          </a:lnRef>
+          <a:fillRef idx="1">
+            <a:schemeClr val="accent1"/>
+          </a:fillRef>
+          <a:effectRef idx="0">
+            <a:schemeClr val="accent1"/>
+          </a:effectRef>
+          <a:fontRef idx="minor">
+            <a:schemeClr val="lt1"/>
+          </a:fontRef>
+        </p:style>
+        <p:txBody>
+          <a:bodyPr rtlCol="0" anchor="ctr"/>
+          <a:lstStyle/>
+          <a:p>
+            <a:pPr algn="ctr"/>
+            <a:endParaRPr lang="en-US"/>
+          </a:p>
+        </p:txBody>
+      </p:sp>
+      <p:sp>
+        <p:nvSpPr>
+          <p:cNvPr id="2" name="TextBox 1">
+            <a:extLst>
+              <a:ext uri="{FF2B5EF4-FFF2-40B4-BE49-F238E27FC236}">
+                <a16:creationId xmlns:a16="http://schemas.microsoft.com/office/drawing/2014/main" id="{8F86EEBA-1F6C-269C-3C96-3A48542CD200}"/>
+              </a:ext>
+            </a:extLst>
+          </p:cNvPr>
+          <p:cNvSpPr txBox="1"/>
+          <p:nvPr/>
+        </p:nvSpPr>
+        <p:spPr>
+          <a:xfrm>
+            <a:off x="493777" y="2876083"/>
+            <a:ext cx="3793134" cy="1200329"/>
+          </a:xfrm>
+          <a:prstGeom prst="rect">
+            <a:avLst/>
+          </a:prstGeom>
+          <a:noFill/>
+        </p:spPr>
+        <p:txBody>
+          <a:bodyPr wrap="square" rtlCol="0">
+            <a:spAutoFit/>
+          </a:bodyPr>
+          <a:lstStyle/>
+          <a:p>
+            <a:pPr algn="r"/>
+            <a:r>
+              <a:rPr lang="en-US" sz="2400" dirty="0">
+                <a:solidFill>
+                  <a:srgbClr val="4CA22E"/>
+                </a:solidFill>
+              </a:rPr>
+              <a:t>Often the exact same thing (asset) is transferred twice in the opposite direction</a:t>
+            </a:r>
+          </a:p>
+        </p:txBody>
+      </p:sp>
+      <p:cxnSp>
+        <p:nvCxnSpPr>
+          <p:cNvPr id="3" name="Straight Arrow Connector 2">
+            <a:extLst>
+              <a:ext uri="{FF2B5EF4-FFF2-40B4-BE49-F238E27FC236}">
+                <a16:creationId xmlns:a16="http://schemas.microsoft.com/office/drawing/2014/main" id="{AB67D0F5-4D5F-81C8-4D1B-B5DAEAFD080E}"/>
+              </a:ext>
+            </a:extLst>
+          </p:cNvPr>
+          <p:cNvCxnSpPr>
+            <a:cxnSpLocks/>
+          </p:cNvCxnSpPr>
+          <p:nvPr/>
+        </p:nvCxnSpPr>
+        <p:spPr>
+          <a:xfrm>
+            <a:off x="6553921" y="2365339"/>
+            <a:ext cx="0" cy="1417980"/>
+          </a:xfrm>
+          <a:prstGeom prst="straightConnector1">
+            <a:avLst/>
+          </a:prstGeom>
+          <a:ln w="38100" cap="rnd">
+            <a:solidFill>
+              <a:srgbClr val="4CA22E"/>
+            </a:solidFill>
+            <a:prstDash val="sysDash"/>
+            <a:headEnd w="lg" len="lg"/>
+            <a:tailEnd type="arrow" w="lg" len="lg"/>
+          </a:ln>
+        </p:spPr>
+        <p:style>
+          <a:lnRef idx="1">
+            <a:schemeClr val="accent1"/>
+          </a:lnRef>
+          <a:fillRef idx="0">
+            <a:schemeClr val="accent1"/>
+          </a:fillRef>
+          <a:effectRef idx="0">
+            <a:schemeClr val="accent1"/>
+          </a:effectRef>
+          <a:fontRef idx="minor">
+            <a:schemeClr val="tx1"/>
+          </a:fontRef>
+        </p:style>
+      </p:cxnSp>
+      <p:cxnSp>
+        <p:nvCxnSpPr>
+          <p:cNvPr id="4" name="Straight Arrow Connector 3">
+            <a:extLst>
+              <a:ext uri="{FF2B5EF4-FFF2-40B4-BE49-F238E27FC236}">
+                <a16:creationId xmlns:a16="http://schemas.microsoft.com/office/drawing/2014/main" id="{C32334A4-A192-8BFC-1FD3-944BA1499B60}"/>
+              </a:ext>
+            </a:extLst>
+          </p:cNvPr>
+          <p:cNvCxnSpPr>
+            <a:cxnSpLocks/>
+          </p:cNvCxnSpPr>
+          <p:nvPr/>
+        </p:nvCxnSpPr>
+        <p:spPr>
+          <a:xfrm>
+            <a:off x="4475351" y="2337346"/>
+            <a:ext cx="0" cy="1417980"/>
+          </a:xfrm>
+          <a:prstGeom prst="straightConnector1">
+            <a:avLst/>
+          </a:prstGeom>
+          <a:ln w="38100" cap="rnd">
+            <a:solidFill>
+              <a:srgbClr val="4CA22E"/>
+            </a:solidFill>
+            <a:prstDash val="sysDash"/>
+            <a:headEnd type="arrow" w="lg" len="lg"/>
+            <a:tailEnd type="none" w="lg" len="lg"/>
+          </a:ln>
+        </p:spPr>
+        <p:style>
+          <a:lnRef idx="1">
+            <a:schemeClr val="accent1"/>
+          </a:lnRef>
+          <a:fillRef idx="0">
+            <a:schemeClr val="accent1"/>
+          </a:fillRef>
+          <a:effectRef idx="0">
+            <a:schemeClr val="accent1"/>
+          </a:effectRef>
+          <a:fontRef idx="minor">
+            <a:schemeClr val="tx1"/>
+          </a:fontRef>
+        </p:style>
+      </p:cxnSp>
+      <p:cxnSp>
+        <p:nvCxnSpPr>
+          <p:cNvPr id="9" name="Straight Arrow Connector 8">
+            <a:extLst>
+              <a:ext uri="{FF2B5EF4-FFF2-40B4-BE49-F238E27FC236}">
+                <a16:creationId xmlns:a16="http://schemas.microsoft.com/office/drawing/2014/main" id="{FE98CA68-3E69-F79C-CB0A-6BD136FBC802}"/>
+              </a:ext>
+            </a:extLst>
+          </p:cNvPr>
+          <p:cNvCxnSpPr>
+            <a:cxnSpLocks/>
+          </p:cNvCxnSpPr>
+          <p:nvPr/>
+        </p:nvCxnSpPr>
+        <p:spPr>
+          <a:xfrm>
+            <a:off x="4745873" y="2346677"/>
+            <a:ext cx="0" cy="1417980"/>
+          </a:xfrm>
+          <a:prstGeom prst="straightConnector1">
+            <a:avLst/>
+          </a:prstGeom>
+          <a:ln w="25400" cap="rnd">
+            <a:solidFill>
+              <a:schemeClr val="tx1"/>
+            </a:solidFill>
+            <a:headEnd w="lg" len="lg"/>
+            <a:tailEnd type="arrow" w="lg" len="lg"/>
+          </a:ln>
+        </p:spPr>
+        <p:style>
+          <a:lnRef idx="1">
+            <a:schemeClr val="accent1"/>
+          </a:lnRef>
+          <a:fillRef idx="0">
+            <a:schemeClr val="accent1"/>
+          </a:fillRef>
+          <a:effectRef idx="0">
+            <a:schemeClr val="accent1"/>
+          </a:effectRef>
+          <a:fontRef idx="minor">
+            <a:schemeClr val="tx1"/>
+          </a:fontRef>
+        </p:style>
+      </p:cxnSp>
+      <p:sp>
+        <p:nvSpPr>
+          <p:cNvPr id="10" name="TextBox 9">
+            <a:extLst>
+              <a:ext uri="{FF2B5EF4-FFF2-40B4-BE49-F238E27FC236}">
+                <a16:creationId xmlns:a16="http://schemas.microsoft.com/office/drawing/2014/main" id="{99030E64-E204-8C42-4E2D-9610D561974C}"/>
+              </a:ext>
+            </a:extLst>
+          </p:cNvPr>
+          <p:cNvSpPr txBox="1"/>
+          <p:nvPr/>
+        </p:nvSpPr>
+        <p:spPr>
+          <a:xfrm>
+            <a:off x="4682061" y="2452120"/>
+            <a:ext cx="605608" cy="461665"/>
+          </a:xfrm>
+          <a:prstGeom prst="rect">
+            <a:avLst/>
+          </a:prstGeom>
+          <a:noFill/>
+        </p:spPr>
+        <p:txBody>
+          <a:bodyPr wrap="square" rtlCol="0">
+            <a:spAutoFit/>
+          </a:bodyPr>
+          <a:lstStyle/>
+          <a:p>
+            <a:pPr algn="ctr"/>
+            <a:r>
+              <a:rPr lang="en-US" sz="2400" dirty="0"/>
+              <a:t>1</a:t>
+            </a:r>
+          </a:p>
+        </p:txBody>
+      </p:sp>
+      <p:sp>
+        <p:nvSpPr>
+          <p:cNvPr id="11" name="TextBox 10">
+            <a:extLst>
+              <a:ext uri="{FF2B5EF4-FFF2-40B4-BE49-F238E27FC236}">
+                <a16:creationId xmlns:a16="http://schemas.microsoft.com/office/drawing/2014/main" id="{24FB376A-32A1-05A1-68C8-45BE571F6D51}"/>
+              </a:ext>
+            </a:extLst>
+          </p:cNvPr>
+          <p:cNvSpPr txBox="1"/>
+          <p:nvPr/>
+        </p:nvSpPr>
+        <p:spPr>
+          <a:xfrm>
+            <a:off x="2602612" y="2447584"/>
+            <a:ext cx="1674975" cy="461665"/>
+          </a:xfrm>
+          <a:prstGeom prst="rect">
+            <a:avLst/>
+          </a:prstGeom>
+          <a:noFill/>
+        </p:spPr>
+        <p:txBody>
+          <a:bodyPr wrap="square" rtlCol="0">
+            <a:spAutoFit/>
+          </a:bodyPr>
+          <a:lstStyle/>
+          <a:p>
+            <a:pPr algn="r"/>
+            <a:r>
+              <a:rPr lang="hu-HU" sz="2400" dirty="0"/>
+              <a:t>Payments</a:t>
+            </a:r>
+            <a:endParaRPr lang="en-US" sz="2400" dirty="0"/>
+          </a:p>
+        </p:txBody>
+      </p:sp>
+      <p:cxnSp>
+        <p:nvCxnSpPr>
+          <p:cNvPr id="14" name="Straight Arrow Connector 13">
+            <a:extLst>
+              <a:ext uri="{FF2B5EF4-FFF2-40B4-BE49-F238E27FC236}">
+                <a16:creationId xmlns:a16="http://schemas.microsoft.com/office/drawing/2014/main" id="{F893D985-9854-B181-560F-33EDA67475E4}"/>
+              </a:ext>
+            </a:extLst>
+          </p:cNvPr>
+          <p:cNvCxnSpPr>
+            <a:cxnSpLocks/>
+          </p:cNvCxnSpPr>
+          <p:nvPr/>
+        </p:nvCxnSpPr>
+        <p:spPr>
+          <a:xfrm>
+            <a:off x="6805155" y="2328015"/>
+            <a:ext cx="0" cy="1417980"/>
+          </a:xfrm>
+          <a:prstGeom prst="straightConnector1">
+            <a:avLst/>
+          </a:prstGeom>
+          <a:ln w="25400" cap="rnd">
+            <a:solidFill>
+              <a:schemeClr val="tx1"/>
+            </a:solidFill>
+            <a:headEnd type="arrow" w="lg" len="lg"/>
+            <a:tailEnd type="none" w="lg" len="lg"/>
+          </a:ln>
+        </p:spPr>
+        <p:style>
+          <a:lnRef idx="1">
+            <a:schemeClr val="accent1"/>
+          </a:lnRef>
+          <a:fillRef idx="0">
+            <a:schemeClr val="accent1"/>
+          </a:fillRef>
+          <a:effectRef idx="0">
+            <a:schemeClr val="accent1"/>
+          </a:effectRef>
+          <a:fontRef idx="minor">
+            <a:schemeClr val="tx1"/>
+          </a:fontRef>
+        </p:style>
+      </p:cxnSp>
+      <p:sp>
+        <p:nvSpPr>
+          <p:cNvPr id="15" name="TextBox 14">
+            <a:extLst>
+              <a:ext uri="{FF2B5EF4-FFF2-40B4-BE49-F238E27FC236}">
+                <a16:creationId xmlns:a16="http://schemas.microsoft.com/office/drawing/2014/main" id="{C847CFA2-53E5-7410-0F2E-78640909DD7A}"/>
+              </a:ext>
+            </a:extLst>
+          </p:cNvPr>
+          <p:cNvSpPr txBox="1"/>
+          <p:nvPr/>
+        </p:nvSpPr>
+        <p:spPr>
+          <a:xfrm>
+            <a:off x="6890876" y="2452121"/>
+            <a:ext cx="914396" cy="461665"/>
+          </a:xfrm>
+          <a:prstGeom prst="rect">
+            <a:avLst/>
+          </a:prstGeom>
+          <a:noFill/>
+        </p:spPr>
+        <p:txBody>
+          <a:bodyPr wrap="square" rtlCol="0">
+            <a:spAutoFit/>
+          </a:bodyPr>
+          <a:lstStyle/>
+          <a:p>
+            <a:r>
+              <a:rPr lang="en-US" sz="2400" dirty="0"/>
+              <a:t>1 + q</a:t>
+            </a:r>
+          </a:p>
+        </p:txBody>
+      </p:sp>
+      <p:sp>
+        <p:nvSpPr>
+          <p:cNvPr id="16" name="TextBox 15">
+            <a:extLst>
+              <a:ext uri="{FF2B5EF4-FFF2-40B4-BE49-F238E27FC236}">
+                <a16:creationId xmlns:a16="http://schemas.microsoft.com/office/drawing/2014/main" id="{405B1429-A763-D7D6-3F26-A02D3AFB6FEA}"/>
+              </a:ext>
+            </a:extLst>
+          </p:cNvPr>
+          <p:cNvSpPr txBox="1"/>
+          <p:nvPr/>
+        </p:nvSpPr>
+        <p:spPr>
+          <a:xfrm>
+            <a:off x="8570402" y="2889510"/>
+            <a:ext cx="2663390" cy="830997"/>
+          </a:xfrm>
+          <a:prstGeom prst="rect">
+            <a:avLst/>
+          </a:prstGeom>
+          <a:noFill/>
+        </p:spPr>
+        <p:txBody>
+          <a:bodyPr wrap="square" rtlCol="0">
+            <a:spAutoFit/>
+          </a:bodyPr>
+          <a:lstStyle/>
+          <a:p>
+            <a:pPr algn="r"/>
+            <a:r>
+              <a:rPr lang="en-US" sz="2400" dirty="0">
+                <a:solidFill>
+                  <a:srgbClr val="4CA22E"/>
+                </a:solidFill>
+              </a:rPr>
+              <a:t>asset : something that has value</a:t>
+            </a:r>
+          </a:p>
+        </p:txBody>
+      </p:sp>
+      <p:sp>
+        <p:nvSpPr>
+          <p:cNvPr id="6" name="TextBox 5">
+            <a:extLst>
+              <a:ext uri="{FF2B5EF4-FFF2-40B4-BE49-F238E27FC236}">
+                <a16:creationId xmlns:a16="http://schemas.microsoft.com/office/drawing/2014/main" id="{6BE78319-9CEF-6BCB-4E4E-54FA88698FD0}"/>
+              </a:ext>
+            </a:extLst>
+          </p:cNvPr>
+          <p:cNvSpPr txBox="1"/>
+          <p:nvPr/>
+        </p:nvSpPr>
+        <p:spPr>
+          <a:xfrm>
+            <a:off x="8001002" y="2447583"/>
+            <a:ext cx="3232790" cy="461665"/>
+          </a:xfrm>
+          <a:prstGeom prst="rect">
+            <a:avLst/>
+          </a:prstGeom>
+          <a:noFill/>
+        </p:spPr>
+        <p:txBody>
+          <a:bodyPr wrap="square" rtlCol="0">
+            <a:spAutoFit/>
+          </a:bodyPr>
+          <a:lstStyle/>
+          <a:p>
+            <a:pPr algn="r"/>
+            <a:r>
+              <a:rPr lang="en-US" sz="2400" dirty="0"/>
+              <a:t>q : 1-year simple rate</a:t>
+            </a:r>
+          </a:p>
+        </p:txBody>
+      </p:sp>
+      <p:sp>
+        <p:nvSpPr>
+          <p:cNvPr id="7" name="TextBox 6">
+            <a:extLst>
+              <a:ext uri="{FF2B5EF4-FFF2-40B4-BE49-F238E27FC236}">
+                <a16:creationId xmlns:a16="http://schemas.microsoft.com/office/drawing/2014/main" id="{3C6218BF-1CC9-12F5-BCDC-5FE2A06424A6}"/>
+              </a:ext>
+            </a:extLst>
+          </p:cNvPr>
+          <p:cNvSpPr txBox="1"/>
+          <p:nvPr/>
+        </p:nvSpPr>
+        <p:spPr>
+          <a:xfrm>
+            <a:off x="625365" y="1602304"/>
+            <a:ext cx="1210061" cy="461665"/>
+          </a:xfrm>
+          <a:prstGeom prst="rect">
+            <a:avLst/>
+          </a:prstGeom>
+          <a:noFill/>
+        </p:spPr>
+        <p:txBody>
+          <a:bodyPr wrap="square" rtlCol="0">
+            <a:spAutoFit/>
+          </a:bodyPr>
+          <a:lstStyle/>
+          <a:p>
+            <a:r>
+              <a:rPr lang="en-US" sz="2400" b="1" dirty="0"/>
+              <a:t>Asset</a:t>
+            </a:r>
+          </a:p>
+        </p:txBody>
+      </p:sp>
+    </p:spTree>
+    <p:extLst>
+      <p:ext uri="{BB962C8B-B14F-4D97-AF65-F5344CB8AC3E}">
+        <p14:creationId xmlns:p14="http://schemas.microsoft.com/office/powerpoint/2010/main" val="3240525398"/>
       </p:ext>
     </p:extLst>
   </p:cSld>
@@ -6012,10 +6810,10 @@
       </p:grpSpPr>
       <p:sp>
         <p:nvSpPr>
-          <p:cNvPr id="12" name="TextBox 11">
-            <a:extLst>
-              <a:ext uri="{FF2B5EF4-FFF2-40B4-BE49-F238E27FC236}">
-                <a16:creationId xmlns:a16="http://schemas.microsoft.com/office/drawing/2014/main" id="{706A4D02-961D-456E-92D6-353375DDEE25}"/>
+          <p:cNvPr id="2" name="TextBox 1">
+            <a:extLst>
+              <a:ext uri="{FF2B5EF4-FFF2-40B4-BE49-F238E27FC236}">
+                <a16:creationId xmlns:a16="http://schemas.microsoft.com/office/drawing/2014/main" id="{E03B3FC0-A19A-0D68-D5BE-C9362748E2B5}"/>
               </a:ext>
             </a:extLst>
           </p:cNvPr>
@@ -6049,142 +6847,12 @@
           </a:p>
         </p:txBody>
       </p:sp>
-      <p:cxnSp>
-        <p:nvCxnSpPr>
-          <p:cNvPr id="22" name="Straight Arrow Connector 21">
-            <a:extLst>
-              <a:ext uri="{FF2B5EF4-FFF2-40B4-BE49-F238E27FC236}">
-                <a16:creationId xmlns:a16="http://schemas.microsoft.com/office/drawing/2014/main" id="{A55FF6FE-ABED-05BE-32C9-B6F28F172723}"/>
-              </a:ext>
-            </a:extLst>
-          </p:cNvPr>
-          <p:cNvCxnSpPr/>
-          <p:nvPr/>
-        </p:nvCxnSpPr>
-        <p:spPr>
-          <a:xfrm>
-            <a:off x="4391372" y="5026121"/>
-            <a:ext cx="4464000" cy="0"/>
-          </a:xfrm>
-          <a:prstGeom prst="straightConnector1">
-            <a:avLst/>
-          </a:prstGeom>
-          <a:ln w="25400" cap="rnd">
-            <a:solidFill>
-              <a:schemeClr val="tx1"/>
-            </a:solidFill>
-            <a:tailEnd type="arrow" w="lg" len="lg"/>
-          </a:ln>
-        </p:spPr>
-        <p:style>
-          <a:lnRef idx="1">
-            <a:schemeClr val="accent1"/>
-          </a:lnRef>
-          <a:fillRef idx="0">
-            <a:schemeClr val="accent1"/>
-          </a:fillRef>
-          <a:effectRef idx="0">
-            <a:schemeClr val="accent1"/>
-          </a:effectRef>
-          <a:fontRef idx="minor">
-            <a:schemeClr val="tx1"/>
-          </a:fontRef>
-        </p:style>
-      </p:cxnSp>
-      <p:cxnSp>
-        <p:nvCxnSpPr>
-          <p:cNvPr id="23" name="Straight Arrow Connector 22">
-            <a:extLst>
-              <a:ext uri="{FF2B5EF4-FFF2-40B4-BE49-F238E27FC236}">
-                <a16:creationId xmlns:a16="http://schemas.microsoft.com/office/drawing/2014/main" id="{3B11E5E3-2960-3717-242D-5568D05BE418}"/>
-              </a:ext>
-            </a:extLst>
-          </p:cNvPr>
-          <p:cNvCxnSpPr>
-            <a:cxnSpLocks/>
-          </p:cNvCxnSpPr>
-          <p:nvPr/>
-        </p:nvCxnSpPr>
-        <p:spPr>
-          <a:xfrm flipV="1">
-            <a:off x="4749178" y="4877034"/>
-            <a:ext cx="0" cy="301487"/>
-          </a:xfrm>
-          <a:prstGeom prst="straightConnector1">
-            <a:avLst/>
-          </a:prstGeom>
-          <a:ln w="25400" cap="rnd">
-            <a:solidFill>
-              <a:schemeClr val="tx1"/>
-            </a:solidFill>
-            <a:tailEnd type="none" w="lg" len="lg"/>
-          </a:ln>
-        </p:spPr>
-        <p:style>
-          <a:lnRef idx="1">
-            <a:schemeClr val="accent1"/>
-          </a:lnRef>
-          <a:fillRef idx="0">
-            <a:schemeClr val="accent1"/>
-          </a:fillRef>
-          <a:effectRef idx="0">
-            <a:schemeClr val="accent1"/>
-          </a:effectRef>
-          <a:fontRef idx="minor">
-            <a:schemeClr val="tx1"/>
-          </a:fontRef>
-        </p:style>
-      </p:cxnSp>
-      <p:cxnSp>
-        <p:nvCxnSpPr>
-          <p:cNvPr id="24" name="Straight Arrow Connector 23">
-            <a:extLst>
-              <a:ext uri="{FF2B5EF4-FFF2-40B4-BE49-F238E27FC236}">
-                <a16:creationId xmlns:a16="http://schemas.microsoft.com/office/drawing/2014/main" id="{B547C32D-A926-AEDC-7A83-8545EB5B1CAC}"/>
-              </a:ext>
-            </a:extLst>
-          </p:cNvPr>
-          <p:cNvCxnSpPr>
-            <a:cxnSpLocks/>
-          </p:cNvCxnSpPr>
-          <p:nvPr/>
-        </p:nvCxnSpPr>
-        <p:spPr>
-          <a:xfrm flipV="1">
-            <a:off x="6813847" y="4877034"/>
-            <a:ext cx="0" cy="301487"/>
-          </a:xfrm>
-          <a:prstGeom prst="straightConnector1">
-            <a:avLst/>
-          </a:prstGeom>
-          <a:ln w="25400" cap="rnd">
-            <a:solidFill>
-              <a:schemeClr val="tx1"/>
-            </a:solidFill>
-            <a:tailEnd type="none" w="lg" len="lg"/>
-          </a:ln>
-        </p:spPr>
-        <p:style>
-          <a:lnRef idx="1">
-            <a:schemeClr val="accent1"/>
-          </a:lnRef>
-          <a:fillRef idx="0">
-            <a:schemeClr val="accent1"/>
-          </a:fillRef>
-          <a:effectRef idx="0">
-            <a:schemeClr val="accent1"/>
-          </a:effectRef>
-          <a:fontRef idx="minor">
-            <a:schemeClr val="tx1"/>
-          </a:fontRef>
-        </p:style>
-      </p:cxnSp>
-      <p:sp>
-        <p:nvSpPr>
-          <p:cNvPr id="25" name="TextBox 24">
-            <a:extLst>
-              <a:ext uri="{FF2B5EF4-FFF2-40B4-BE49-F238E27FC236}">
-                <a16:creationId xmlns:a16="http://schemas.microsoft.com/office/drawing/2014/main" id="{17438D28-9229-EDE5-21EA-1F3B6405FCD6}"/>
+      <p:sp>
+        <p:nvSpPr>
+          <p:cNvPr id="3" name="TextBox 2">
+            <a:extLst>
+              <a:ext uri="{FF2B5EF4-FFF2-40B4-BE49-F238E27FC236}">
+                <a16:creationId xmlns:a16="http://schemas.microsoft.com/office/drawing/2014/main" id="{7F8B13E4-29B3-5435-324C-4149E3AE4146}"/>
               </a:ext>
             </a:extLst>
           </p:cNvPr>
@@ -6193,8 +6861,8 @@
         </p:nvSpPr>
         <p:spPr>
           <a:xfrm>
-            <a:off x="7707434" y="4441346"/>
-            <a:ext cx="914396" cy="461665"/>
+            <a:off x="625365" y="1602304"/>
+            <a:ext cx="3782043" cy="830997"/>
           </a:xfrm>
           <a:prstGeom prst="rect">
             <a:avLst/>
@@ -6207,21 +6875,67 @@
           </a:bodyPr>
           <a:lstStyle/>
           <a:p>
-            <a:pPr algn="r"/>
-            <a:r>
-              <a:rPr lang="hu-HU" sz="2400" dirty="0"/>
-              <a:t>Time</a:t>
-            </a:r>
-            <a:endParaRPr lang="en-US" sz="2400" dirty="0"/>
-          </a:p>
-        </p:txBody>
-      </p:sp>
-      <p:sp>
-        <p:nvSpPr>
-          <p:cNvPr id="26" name="TextBox 25">
-            <a:extLst>
-              <a:ext uri="{FF2B5EF4-FFF2-40B4-BE49-F238E27FC236}">
-                <a16:creationId xmlns:a16="http://schemas.microsoft.com/office/drawing/2014/main" id="{78ED060C-EC26-352F-E429-EF13D97716E7}"/>
+            <a:r>
+              <a:rPr lang="en-US" sz="2400" b="1" dirty="0"/>
+              <a:t>Risk</a:t>
+            </a:r>
+          </a:p>
+          <a:p>
+            <a:r>
+              <a:rPr lang="en-US" sz="2400" dirty="0">
+                <a:solidFill>
+                  <a:schemeClr val="accent6">
+                    <a:lumMod val="75000"/>
+                  </a:schemeClr>
+                </a:solidFill>
+              </a:rPr>
+              <a:t>( for a single asset )</a:t>
+            </a:r>
+          </a:p>
+        </p:txBody>
+      </p:sp>
+      <p:pic>
+        <p:nvPicPr>
+          <p:cNvPr id="6" name="Picture 5" descr="A black background with a black square&#10;&#10;Description automatically generated with medium confidence">
+            <a:extLst>
+              <a:ext uri="{FF2B5EF4-FFF2-40B4-BE49-F238E27FC236}">
+                <a16:creationId xmlns:a16="http://schemas.microsoft.com/office/drawing/2014/main" id="{5F37A9FC-81A9-B2AA-C4F1-14BB7D7E37D8}"/>
+              </a:ext>
+            </a:extLst>
+          </p:cNvPr>
+          <p:cNvPicPr>
+            <a:picLocks noChangeAspect="1"/>
+          </p:cNvPicPr>
+          <p:nvPr/>
+        </p:nvPicPr>
+        <p:blipFill>
+          <a:blip r:embed="rId2">
+            <a:extLst>
+              <a:ext uri="{28A0092B-C50C-407E-A947-70E740481C1C}">
+                <a14:useLocalDpi xmlns:a14="http://schemas.microsoft.com/office/drawing/2010/main" val="0"/>
+              </a:ext>
+            </a:extLst>
+          </a:blip>
+          <a:stretch>
+            <a:fillRect/>
+          </a:stretch>
+        </p:blipFill>
+        <p:spPr>
+          <a:xfrm>
+            <a:off x="6494599" y="2433301"/>
+            <a:ext cx="1143640" cy="1143640"/>
+          </a:xfrm>
+          <a:prstGeom prst="rect">
+            <a:avLst/>
+          </a:prstGeom>
+        </p:spPr>
+      </p:pic>
+      <p:sp>
+        <p:nvSpPr>
+          <p:cNvPr id="7" name="TextBox 6">
+            <a:extLst>
+              <a:ext uri="{FF2B5EF4-FFF2-40B4-BE49-F238E27FC236}">
+                <a16:creationId xmlns:a16="http://schemas.microsoft.com/office/drawing/2014/main" id="{5C3840BA-8FB1-4AF5-7AAD-844E0460CFB4}"/>
               </a:ext>
             </a:extLst>
           </p:cNvPr>
@@ -6230,8 +6944,8 @@
         </p:nvSpPr>
         <p:spPr>
           <a:xfrm>
-            <a:off x="4305241" y="5270446"/>
-            <a:ext cx="881264" cy="461665"/>
+            <a:off x="3864127" y="1586574"/>
+            <a:ext cx="6843497" cy="830997"/>
           </a:xfrm>
           <a:prstGeom prst="rect">
             <a:avLst/>
@@ -6246,19 +6960,18 @@
           <a:p>
             <a:pPr algn="ctr"/>
             <a:r>
-              <a:rPr lang="hu-HU" sz="2400" dirty="0"/>
-              <a:t>0</a:t>
-            </a:r>
-            <a:endParaRPr lang="en-US" sz="2400" dirty="0"/>
-          </a:p>
-        </p:txBody>
-      </p:sp>
-      <p:sp>
-        <p:nvSpPr>
-          <p:cNvPr id="27" name="TextBox 26">
-            <a:extLst>
-              <a:ext uri="{FF2B5EF4-FFF2-40B4-BE49-F238E27FC236}">
-                <a16:creationId xmlns:a16="http://schemas.microsoft.com/office/drawing/2014/main" id="{83687220-C7E5-B563-7DFC-99F5967052E6}"/>
+              <a:rPr lang="en-US" sz="2400" dirty="0"/>
+              <a:t>All contracts contain (sometimes just implicitly) numbers that will be known only in the future</a:t>
+            </a:r>
+          </a:p>
+        </p:txBody>
+      </p:sp>
+      <p:sp>
+        <p:nvSpPr>
+          <p:cNvPr id="8" name="TextBox 7">
+            <a:extLst>
+              <a:ext uri="{FF2B5EF4-FFF2-40B4-BE49-F238E27FC236}">
+                <a16:creationId xmlns:a16="http://schemas.microsoft.com/office/drawing/2014/main" id="{2F1A3146-9F4B-8F1D-A187-D4E6276FD0D4}"/>
               </a:ext>
             </a:extLst>
           </p:cNvPr>
@@ -6267,8 +6980,8 @@
         </p:nvSpPr>
         <p:spPr>
           <a:xfrm>
-            <a:off x="6376885" y="5270446"/>
-            <a:ext cx="881264" cy="461665"/>
+            <a:off x="342793" y="4024931"/>
+            <a:ext cx="6723626" cy="830997"/>
           </a:xfrm>
           <a:prstGeom prst="rect">
             <a:avLst/>
@@ -6283,19 +6996,49 @@
           <a:p>
             <a:pPr algn="ctr"/>
             <a:r>
-              <a:rPr lang="hu-HU" sz="2400" dirty="0"/>
-              <a:t>1</a:t>
-            </a:r>
-            <a:endParaRPr lang="en-US" sz="2400" dirty="0"/>
-          </a:p>
-        </p:txBody>
-      </p:sp>
-      <p:sp>
-        <p:nvSpPr>
-          <p:cNvPr id="30" name="TextBox 29">
-            <a:extLst>
-              <a:ext uri="{FF2B5EF4-FFF2-40B4-BE49-F238E27FC236}">
-                <a16:creationId xmlns:a16="http://schemas.microsoft.com/office/drawing/2014/main" id="{0DE7E593-4DF4-5EE2-9A6F-3D6A62BF3827}"/>
+              <a:rPr lang="en-US" sz="2400" dirty="0"/>
+              <a:t>Risk quantifies the </a:t>
+            </a:r>
+            <a:r>
+              <a:rPr lang="en-US" sz="2400" b="1" u="sng" dirty="0">
+                <a:solidFill>
+                  <a:srgbClr val="0070C0"/>
+                </a:solidFill>
+              </a:rPr>
+              <a:t>uncertainty</a:t>
+            </a:r>
+            <a:r>
+              <a:rPr lang="en-US" sz="2400" dirty="0"/>
+              <a:t> of a </a:t>
+            </a:r>
+            <a:r>
+              <a:rPr lang="en-US" sz="2400" b="1" u="sng" dirty="0">
+                <a:solidFill>
+                  <a:srgbClr val="FF0000"/>
+                </a:solidFill>
+              </a:rPr>
+              <a:t>future</a:t>
+            </a:r>
+            <a:r>
+              <a:rPr lang="en-US" sz="2400" dirty="0"/>
+              <a:t> value,</a:t>
+            </a:r>
+          </a:p>
+          <a:p>
+            <a:pPr algn="ctr"/>
+            <a:r>
+              <a:rPr lang="en-US" sz="2400" dirty="0"/>
+              <a:t>for example, the future price of an asset</a:t>
+            </a:r>
+          </a:p>
+        </p:txBody>
+      </p:sp>
+      <p:sp>
+        <p:nvSpPr>
+          <p:cNvPr id="9" name="TextBox 8">
+            <a:extLst>
+              <a:ext uri="{FF2B5EF4-FFF2-40B4-BE49-F238E27FC236}">
+                <a16:creationId xmlns:a16="http://schemas.microsoft.com/office/drawing/2014/main" id="{AF2F6895-CB52-5F4C-791B-7ED95DFC4E12}"/>
               </a:ext>
             </a:extLst>
           </p:cNvPr>
@@ -6304,8 +7047,8 @@
         </p:nvSpPr>
         <p:spPr>
           <a:xfrm>
-            <a:off x="4256443" y="1252728"/>
-            <a:ext cx="1000531" cy="461665"/>
+            <a:off x="8034528" y="4024930"/>
+            <a:ext cx="3670923" cy="830997"/>
           </a:xfrm>
           <a:prstGeom prst="rect">
             <a:avLst/>
@@ -6320,19 +7063,30 @@
           <a:p>
             <a:pPr algn="ctr"/>
             <a:r>
-              <a:rPr lang="hu-HU" sz="2400" dirty="0"/>
-              <a:t>Alice</a:t>
-            </a:r>
-            <a:endParaRPr lang="en-US" sz="2400" dirty="0"/>
-          </a:p>
-        </p:txBody>
-      </p:sp>
-      <p:sp>
-        <p:nvSpPr>
-          <p:cNvPr id="31" name="TextBox 30">
-            <a:extLst>
-              <a:ext uri="{FF2B5EF4-FFF2-40B4-BE49-F238E27FC236}">
-                <a16:creationId xmlns:a16="http://schemas.microsoft.com/office/drawing/2014/main" id="{B3D11117-A649-533A-39CC-8E67C361FBA7}"/>
+              <a:rPr lang="en-US" sz="2400" dirty="0"/>
+              <a:t>We don’t know the future, but we can </a:t>
+            </a:r>
+            <a:r>
+              <a:rPr lang="en-US" sz="2400" b="1" u="sng" dirty="0">
+                <a:solidFill>
+                  <a:srgbClr val="FF0000"/>
+                </a:solidFill>
+              </a:rPr>
+              <a:t>forecast</a:t>
+            </a:r>
+            <a:r>
+              <a:rPr lang="en-US" sz="2400" dirty="0"/>
+              <a:t> </a:t>
+            </a:r>
+          </a:p>
+        </p:txBody>
+      </p:sp>
+      <p:sp>
+        <p:nvSpPr>
+          <p:cNvPr id="11" name="TextBox 10">
+            <a:extLst>
+              <a:ext uri="{FF2B5EF4-FFF2-40B4-BE49-F238E27FC236}">
+                <a16:creationId xmlns:a16="http://schemas.microsoft.com/office/drawing/2014/main" id="{FEA23696-5BED-D3FC-9814-E7C90830D546}"/>
               </a:ext>
             </a:extLst>
           </p:cNvPr>
@@ -6341,8 +7095,8 @@
         </p:nvSpPr>
         <p:spPr>
           <a:xfrm>
-            <a:off x="4257371" y="4383493"/>
-            <a:ext cx="1000531" cy="461665"/>
+            <a:off x="2024397" y="5366845"/>
+            <a:ext cx="7265907" cy="830997"/>
           </a:xfrm>
           <a:prstGeom prst="rect">
             <a:avLst/>
@@ -6357,760 +7111,28 @@
           <a:p>
             <a:pPr algn="ctr"/>
             <a:r>
-              <a:rPr lang="hu-HU" sz="2400" dirty="0"/>
-              <a:t>Bob</a:t>
-            </a:r>
-            <a:endParaRPr lang="en-US" sz="2400" dirty="0"/>
-          </a:p>
-        </p:txBody>
-      </p:sp>
-      <p:cxnSp>
-        <p:nvCxnSpPr>
-          <p:cNvPr id="32" name="Straight Arrow Connector 31">
-            <a:extLst>
-              <a:ext uri="{FF2B5EF4-FFF2-40B4-BE49-F238E27FC236}">
-                <a16:creationId xmlns:a16="http://schemas.microsoft.com/office/drawing/2014/main" id="{2D27A85E-0789-177E-BA38-88261BC7524B}"/>
-              </a:ext>
-            </a:extLst>
-          </p:cNvPr>
-          <p:cNvCxnSpPr>
-            <a:cxnSpLocks/>
-          </p:cNvCxnSpPr>
-          <p:nvPr/>
-        </p:nvCxnSpPr>
-        <p:spPr>
-          <a:xfrm>
-            <a:off x="4745873" y="2346677"/>
-            <a:ext cx="0" cy="1417980"/>
-          </a:xfrm>
-          <a:prstGeom prst="straightConnector1">
-            <a:avLst/>
-          </a:prstGeom>
-          <a:ln w="25400" cap="rnd">
-            <a:solidFill>
-              <a:schemeClr val="tx1"/>
-            </a:solidFill>
-            <a:headEnd w="lg" len="lg"/>
-            <a:tailEnd type="arrow" w="lg" len="lg"/>
-          </a:ln>
-        </p:spPr>
-        <p:style>
-          <a:lnRef idx="1">
-            <a:schemeClr val="accent1"/>
-          </a:lnRef>
-          <a:fillRef idx="0">
-            <a:schemeClr val="accent1"/>
-          </a:fillRef>
-          <a:effectRef idx="0">
-            <a:schemeClr val="accent1"/>
-          </a:effectRef>
-          <a:fontRef idx="minor">
-            <a:schemeClr val="tx1"/>
-          </a:fontRef>
-        </p:style>
-      </p:cxnSp>
-      <p:cxnSp>
-        <p:nvCxnSpPr>
-          <p:cNvPr id="35" name="Straight Arrow Connector 34">
-            <a:extLst>
-              <a:ext uri="{FF2B5EF4-FFF2-40B4-BE49-F238E27FC236}">
-                <a16:creationId xmlns:a16="http://schemas.microsoft.com/office/drawing/2014/main" id="{F231E58E-6969-8B7B-BD6B-7D3960568FB7}"/>
-              </a:ext>
-            </a:extLst>
-          </p:cNvPr>
-          <p:cNvCxnSpPr>
-            <a:cxnSpLocks/>
-          </p:cNvCxnSpPr>
-          <p:nvPr/>
-        </p:nvCxnSpPr>
-        <p:spPr>
-          <a:xfrm>
-            <a:off x="6805155" y="2328015"/>
-            <a:ext cx="0" cy="1417980"/>
-          </a:xfrm>
-          <a:prstGeom prst="straightConnector1">
-            <a:avLst/>
-          </a:prstGeom>
-          <a:ln w="25400" cap="rnd">
-            <a:solidFill>
-              <a:schemeClr val="tx1"/>
-            </a:solidFill>
-            <a:headEnd type="arrow" w="lg" len="lg"/>
-            <a:tailEnd type="none" w="lg" len="lg"/>
-          </a:ln>
-        </p:spPr>
-        <p:style>
-          <a:lnRef idx="1">
-            <a:schemeClr val="accent1"/>
-          </a:lnRef>
-          <a:fillRef idx="0">
-            <a:schemeClr val="accent1"/>
-          </a:fillRef>
-          <a:effectRef idx="0">
-            <a:schemeClr val="accent1"/>
-          </a:effectRef>
-          <a:fontRef idx="minor">
-            <a:schemeClr val="tx1"/>
-          </a:fontRef>
-        </p:style>
-      </p:cxnSp>
-      <p:sp>
-        <p:nvSpPr>
-          <p:cNvPr id="39" name="Oval 38">
-            <a:extLst>
-              <a:ext uri="{FF2B5EF4-FFF2-40B4-BE49-F238E27FC236}">
-                <a16:creationId xmlns:a16="http://schemas.microsoft.com/office/drawing/2014/main" id="{FEAF57DE-A6CC-6CD4-CE8B-31704AA26C16}"/>
-              </a:ext>
-            </a:extLst>
-          </p:cNvPr>
-          <p:cNvSpPr/>
-          <p:nvPr/>
-        </p:nvSpPr>
-        <p:spPr>
-          <a:xfrm>
-            <a:off x="4453905" y="1664758"/>
-            <a:ext cx="605608" cy="585407"/>
-          </a:xfrm>
-          <a:prstGeom prst="ellipse">
-            <a:avLst/>
-          </a:prstGeom>
-          <a:solidFill>
-            <a:srgbClr val="FF6161"/>
-          </a:solidFill>
-          <a:ln w="38100">
-            <a:solidFill>
-              <a:srgbClr val="C00000"/>
-            </a:solidFill>
-          </a:ln>
-        </p:spPr>
-        <p:style>
-          <a:lnRef idx="2">
-            <a:schemeClr val="accent1">
-              <a:shade val="15000"/>
-            </a:schemeClr>
-          </a:lnRef>
-          <a:fillRef idx="1">
-            <a:schemeClr val="accent1"/>
-          </a:fillRef>
-          <a:effectRef idx="0">
-            <a:schemeClr val="accent1"/>
-          </a:effectRef>
-          <a:fontRef idx="minor">
-            <a:schemeClr val="lt1"/>
-          </a:fontRef>
-        </p:style>
-        <p:txBody>
-          <a:bodyPr rtlCol="0" anchor="ctr"/>
-          <a:lstStyle/>
-          <a:p>
-            <a:pPr algn="ctr"/>
-            <a:endParaRPr lang="en-US"/>
-          </a:p>
-        </p:txBody>
-      </p:sp>
-      <p:sp>
-        <p:nvSpPr>
-          <p:cNvPr id="41" name="Oval 40">
-            <a:extLst>
-              <a:ext uri="{FF2B5EF4-FFF2-40B4-BE49-F238E27FC236}">
-                <a16:creationId xmlns:a16="http://schemas.microsoft.com/office/drawing/2014/main" id="{09FB6A3C-2B15-91A6-4D64-9753B4FF5E75}"/>
-              </a:ext>
-            </a:extLst>
-          </p:cNvPr>
-          <p:cNvSpPr/>
-          <p:nvPr/>
-        </p:nvSpPr>
-        <p:spPr>
-          <a:xfrm>
-            <a:off x="6497935" y="1665495"/>
-            <a:ext cx="605608" cy="585407"/>
-          </a:xfrm>
-          <a:prstGeom prst="ellipse">
-            <a:avLst/>
-          </a:prstGeom>
-          <a:solidFill>
-            <a:srgbClr val="FF6161"/>
-          </a:solidFill>
-          <a:ln w="38100">
-            <a:solidFill>
-              <a:srgbClr val="C00000"/>
-            </a:solidFill>
-          </a:ln>
-        </p:spPr>
-        <p:style>
-          <a:lnRef idx="2">
-            <a:schemeClr val="accent1">
-              <a:shade val="15000"/>
-            </a:schemeClr>
-          </a:lnRef>
-          <a:fillRef idx="1">
-            <a:schemeClr val="accent1"/>
-          </a:fillRef>
-          <a:effectRef idx="0">
-            <a:schemeClr val="accent1"/>
-          </a:effectRef>
-          <a:fontRef idx="minor">
-            <a:schemeClr val="lt1"/>
-          </a:fontRef>
-        </p:style>
-        <p:txBody>
-          <a:bodyPr rtlCol="0" anchor="ctr"/>
-          <a:lstStyle/>
-          <a:p>
-            <a:pPr algn="ctr"/>
-            <a:endParaRPr lang="en-US"/>
-          </a:p>
-        </p:txBody>
-      </p:sp>
-      <p:sp>
-        <p:nvSpPr>
-          <p:cNvPr id="42" name="Oval 41">
-            <a:extLst>
-              <a:ext uri="{FF2B5EF4-FFF2-40B4-BE49-F238E27FC236}">
-                <a16:creationId xmlns:a16="http://schemas.microsoft.com/office/drawing/2014/main" id="{C6BE660A-3E1E-1B29-4B1D-7F7EF28C3568}"/>
-              </a:ext>
-            </a:extLst>
-          </p:cNvPr>
-          <p:cNvSpPr/>
-          <p:nvPr/>
-        </p:nvSpPr>
-        <p:spPr>
-          <a:xfrm>
-            <a:off x="4453905" y="3845409"/>
-            <a:ext cx="605608" cy="585407"/>
-          </a:xfrm>
-          <a:prstGeom prst="ellipse">
-            <a:avLst/>
-          </a:prstGeom>
-          <a:solidFill>
-            <a:srgbClr val="00B0F0"/>
-          </a:solidFill>
-          <a:ln w="38100">
-            <a:solidFill>
-              <a:schemeClr val="accent1">
-                <a:lumMod val="50000"/>
-              </a:schemeClr>
-            </a:solidFill>
-          </a:ln>
-        </p:spPr>
-        <p:style>
-          <a:lnRef idx="2">
-            <a:schemeClr val="accent1">
-              <a:shade val="15000"/>
-            </a:schemeClr>
-          </a:lnRef>
-          <a:fillRef idx="1">
-            <a:schemeClr val="accent1"/>
-          </a:fillRef>
-          <a:effectRef idx="0">
-            <a:schemeClr val="accent1"/>
-          </a:effectRef>
-          <a:fontRef idx="minor">
-            <a:schemeClr val="lt1"/>
-          </a:fontRef>
-        </p:style>
-        <p:txBody>
-          <a:bodyPr rtlCol="0" anchor="ctr"/>
-          <a:lstStyle/>
-          <a:p>
-            <a:pPr algn="ctr"/>
-            <a:endParaRPr lang="en-US"/>
-          </a:p>
-        </p:txBody>
-      </p:sp>
-      <p:sp>
-        <p:nvSpPr>
-          <p:cNvPr id="43" name="Oval 42">
-            <a:extLst>
-              <a:ext uri="{FF2B5EF4-FFF2-40B4-BE49-F238E27FC236}">
-                <a16:creationId xmlns:a16="http://schemas.microsoft.com/office/drawing/2014/main" id="{3C39E87D-5531-1BAF-8436-2A23496168EB}"/>
-              </a:ext>
-            </a:extLst>
-          </p:cNvPr>
-          <p:cNvSpPr/>
-          <p:nvPr/>
-        </p:nvSpPr>
-        <p:spPr>
-          <a:xfrm>
-            <a:off x="6512630" y="3845409"/>
-            <a:ext cx="605608" cy="585407"/>
-          </a:xfrm>
-          <a:prstGeom prst="ellipse">
-            <a:avLst/>
-          </a:prstGeom>
-          <a:solidFill>
-            <a:srgbClr val="00B0F0"/>
-          </a:solidFill>
-          <a:ln w="38100">
-            <a:solidFill>
-              <a:schemeClr val="accent1">
-                <a:lumMod val="50000"/>
-              </a:schemeClr>
-            </a:solidFill>
-          </a:ln>
-        </p:spPr>
-        <p:style>
-          <a:lnRef idx="2">
-            <a:schemeClr val="accent1">
-              <a:shade val="15000"/>
-            </a:schemeClr>
-          </a:lnRef>
-          <a:fillRef idx="1">
-            <a:schemeClr val="accent1"/>
-          </a:fillRef>
-          <a:effectRef idx="0">
-            <a:schemeClr val="accent1"/>
-          </a:effectRef>
-          <a:fontRef idx="minor">
-            <a:schemeClr val="lt1"/>
-          </a:fontRef>
-        </p:style>
-        <p:txBody>
-          <a:bodyPr rtlCol="0" anchor="ctr"/>
-          <a:lstStyle/>
-          <a:p>
-            <a:pPr algn="ctr"/>
-            <a:endParaRPr lang="en-US"/>
-          </a:p>
-        </p:txBody>
-      </p:sp>
-      <p:sp>
-        <p:nvSpPr>
-          <p:cNvPr id="2" name="TextBox 1">
-            <a:extLst>
-              <a:ext uri="{FF2B5EF4-FFF2-40B4-BE49-F238E27FC236}">
-                <a16:creationId xmlns:a16="http://schemas.microsoft.com/office/drawing/2014/main" id="{8F86EEBA-1F6C-269C-3C96-3A48542CD200}"/>
-              </a:ext>
-            </a:extLst>
-          </p:cNvPr>
-          <p:cNvSpPr txBox="1"/>
-          <p:nvPr/>
-        </p:nvSpPr>
-        <p:spPr>
-          <a:xfrm>
-            <a:off x="493777" y="2876083"/>
-            <a:ext cx="3793134" cy="1200329"/>
-          </a:xfrm>
-          <a:prstGeom prst="rect">
-            <a:avLst/>
-          </a:prstGeom>
-          <a:noFill/>
-        </p:spPr>
-        <p:txBody>
-          <a:bodyPr wrap="square" rtlCol="0">
-            <a:spAutoFit/>
-          </a:bodyPr>
-          <a:lstStyle/>
-          <a:p>
-            <a:pPr algn="r"/>
-            <a:r>
-              <a:rPr lang="en-US" sz="2400" dirty="0">
+              <a:rPr lang="en-US" sz="2400" dirty="0"/>
+              <a:t>A simple forecast for the uncertainty of an asset’s future price is the same asset’s </a:t>
+            </a:r>
+            <a:r>
+              <a:rPr lang="en-US" sz="2400" b="1" u="sng" dirty="0">
                 <a:solidFill>
-                  <a:srgbClr val="4CA22E"/>
+                  <a:srgbClr val="FF0000"/>
                 </a:solidFill>
               </a:rPr>
-              <a:t>Often the exact same thing (asset) is transferred twice in the opposite direction</a:t>
-            </a:r>
-          </a:p>
-        </p:txBody>
-      </p:sp>
-      <p:cxnSp>
-        <p:nvCxnSpPr>
-          <p:cNvPr id="3" name="Straight Arrow Connector 2">
-            <a:extLst>
-              <a:ext uri="{FF2B5EF4-FFF2-40B4-BE49-F238E27FC236}">
-                <a16:creationId xmlns:a16="http://schemas.microsoft.com/office/drawing/2014/main" id="{AB67D0F5-4D5F-81C8-4D1B-B5DAEAFD080E}"/>
-              </a:ext>
-            </a:extLst>
-          </p:cNvPr>
-          <p:cNvCxnSpPr>
-            <a:cxnSpLocks/>
-          </p:cNvCxnSpPr>
-          <p:nvPr/>
-        </p:nvCxnSpPr>
-        <p:spPr>
-          <a:xfrm>
-            <a:off x="6553921" y="2365339"/>
-            <a:ext cx="0" cy="1417980"/>
-          </a:xfrm>
-          <a:prstGeom prst="straightConnector1">
-            <a:avLst/>
-          </a:prstGeom>
-          <a:ln w="38100" cap="rnd">
-            <a:solidFill>
-              <a:srgbClr val="4CA22E"/>
-            </a:solidFill>
-            <a:prstDash val="sysDash"/>
-            <a:headEnd w="lg" len="lg"/>
-            <a:tailEnd type="arrow" w="lg" len="lg"/>
-          </a:ln>
-        </p:spPr>
-        <p:style>
-          <a:lnRef idx="1">
-            <a:schemeClr val="accent1"/>
-          </a:lnRef>
-          <a:fillRef idx="0">
-            <a:schemeClr val="accent1"/>
-          </a:fillRef>
-          <a:effectRef idx="0">
-            <a:schemeClr val="accent1"/>
-          </a:effectRef>
-          <a:fontRef idx="minor">
-            <a:schemeClr val="tx1"/>
-          </a:fontRef>
-        </p:style>
-      </p:cxnSp>
-      <p:cxnSp>
-        <p:nvCxnSpPr>
-          <p:cNvPr id="4" name="Straight Arrow Connector 3">
-            <a:extLst>
-              <a:ext uri="{FF2B5EF4-FFF2-40B4-BE49-F238E27FC236}">
-                <a16:creationId xmlns:a16="http://schemas.microsoft.com/office/drawing/2014/main" id="{C32334A4-A192-8BFC-1FD3-944BA1499B60}"/>
-              </a:ext>
-            </a:extLst>
-          </p:cNvPr>
-          <p:cNvCxnSpPr>
-            <a:cxnSpLocks/>
-          </p:cNvCxnSpPr>
-          <p:nvPr/>
-        </p:nvCxnSpPr>
-        <p:spPr>
-          <a:xfrm>
-            <a:off x="4475351" y="2337346"/>
-            <a:ext cx="0" cy="1417980"/>
-          </a:xfrm>
-          <a:prstGeom prst="straightConnector1">
-            <a:avLst/>
-          </a:prstGeom>
-          <a:ln w="38100" cap="rnd">
-            <a:solidFill>
-              <a:srgbClr val="4CA22E"/>
-            </a:solidFill>
-            <a:prstDash val="sysDash"/>
-            <a:headEnd type="arrow" w="lg" len="lg"/>
-            <a:tailEnd type="none" w="lg" len="lg"/>
-          </a:ln>
-        </p:spPr>
-        <p:style>
-          <a:lnRef idx="1">
-            <a:schemeClr val="accent1"/>
-          </a:lnRef>
-          <a:fillRef idx="0">
-            <a:schemeClr val="accent1"/>
-          </a:fillRef>
-          <a:effectRef idx="0">
-            <a:schemeClr val="accent1"/>
-          </a:effectRef>
-          <a:fontRef idx="minor">
-            <a:schemeClr val="tx1"/>
-          </a:fontRef>
-        </p:style>
-      </p:cxnSp>
-      <p:cxnSp>
-        <p:nvCxnSpPr>
-          <p:cNvPr id="9" name="Straight Arrow Connector 8">
-            <a:extLst>
-              <a:ext uri="{FF2B5EF4-FFF2-40B4-BE49-F238E27FC236}">
-                <a16:creationId xmlns:a16="http://schemas.microsoft.com/office/drawing/2014/main" id="{FE98CA68-3E69-F79C-CB0A-6BD136FBC802}"/>
-              </a:ext>
-            </a:extLst>
-          </p:cNvPr>
-          <p:cNvCxnSpPr>
-            <a:cxnSpLocks/>
-          </p:cNvCxnSpPr>
-          <p:nvPr/>
-        </p:nvCxnSpPr>
-        <p:spPr>
-          <a:xfrm>
-            <a:off x="4745873" y="2346677"/>
-            <a:ext cx="0" cy="1417980"/>
-          </a:xfrm>
-          <a:prstGeom prst="straightConnector1">
-            <a:avLst/>
-          </a:prstGeom>
-          <a:ln w="25400" cap="rnd">
-            <a:solidFill>
-              <a:schemeClr val="tx1"/>
-            </a:solidFill>
-            <a:headEnd w="lg" len="lg"/>
-            <a:tailEnd type="arrow" w="lg" len="lg"/>
-          </a:ln>
-        </p:spPr>
-        <p:style>
-          <a:lnRef idx="1">
-            <a:schemeClr val="accent1"/>
-          </a:lnRef>
-          <a:fillRef idx="0">
-            <a:schemeClr val="accent1"/>
-          </a:fillRef>
-          <a:effectRef idx="0">
-            <a:schemeClr val="accent1"/>
-          </a:effectRef>
-          <a:fontRef idx="minor">
-            <a:schemeClr val="tx1"/>
-          </a:fontRef>
-        </p:style>
-      </p:cxnSp>
-      <p:sp>
-        <p:nvSpPr>
-          <p:cNvPr id="10" name="TextBox 9">
-            <a:extLst>
-              <a:ext uri="{FF2B5EF4-FFF2-40B4-BE49-F238E27FC236}">
-                <a16:creationId xmlns:a16="http://schemas.microsoft.com/office/drawing/2014/main" id="{99030E64-E204-8C42-4E2D-9610D561974C}"/>
-              </a:ext>
-            </a:extLst>
-          </p:cNvPr>
-          <p:cNvSpPr txBox="1"/>
-          <p:nvPr/>
-        </p:nvSpPr>
-        <p:spPr>
-          <a:xfrm>
-            <a:off x="4682061" y="2452120"/>
-            <a:ext cx="605608" cy="461665"/>
-          </a:xfrm>
-          <a:prstGeom prst="rect">
-            <a:avLst/>
-          </a:prstGeom>
-          <a:noFill/>
-        </p:spPr>
-        <p:txBody>
-          <a:bodyPr wrap="square" rtlCol="0">
-            <a:spAutoFit/>
-          </a:bodyPr>
-          <a:lstStyle/>
-          <a:p>
-            <a:pPr algn="ctr"/>
+              <a:t>past</a:t>
+            </a:r>
             <a:r>
               <a:rPr lang="en-US" sz="2400" dirty="0"/>
-              <a:t>1</a:t>
-            </a:r>
-          </a:p>
-        </p:txBody>
-      </p:sp>
-      <p:sp>
-        <p:nvSpPr>
-          <p:cNvPr id="11" name="TextBox 10">
-            <a:extLst>
-              <a:ext uri="{FF2B5EF4-FFF2-40B4-BE49-F238E27FC236}">
-                <a16:creationId xmlns:a16="http://schemas.microsoft.com/office/drawing/2014/main" id="{24FB376A-32A1-05A1-68C8-45BE571F6D51}"/>
-              </a:ext>
-            </a:extLst>
-          </p:cNvPr>
-          <p:cNvSpPr txBox="1"/>
-          <p:nvPr/>
-        </p:nvSpPr>
-        <p:spPr>
-          <a:xfrm>
-            <a:off x="2602612" y="2447584"/>
-            <a:ext cx="1674975" cy="461665"/>
-          </a:xfrm>
-          <a:prstGeom prst="rect">
-            <a:avLst/>
-          </a:prstGeom>
-          <a:noFill/>
-        </p:spPr>
-        <p:txBody>
-          <a:bodyPr wrap="square" rtlCol="0">
-            <a:spAutoFit/>
-          </a:bodyPr>
-          <a:lstStyle/>
-          <a:p>
-            <a:pPr algn="r"/>
-            <a:r>
-              <a:rPr lang="hu-HU" sz="2400" dirty="0"/>
-              <a:t>Payments</a:t>
-            </a:r>
-            <a:endParaRPr lang="en-US" sz="2400" dirty="0"/>
-          </a:p>
-        </p:txBody>
-      </p:sp>
-      <p:cxnSp>
-        <p:nvCxnSpPr>
-          <p:cNvPr id="14" name="Straight Arrow Connector 13">
-            <a:extLst>
-              <a:ext uri="{FF2B5EF4-FFF2-40B4-BE49-F238E27FC236}">
-                <a16:creationId xmlns:a16="http://schemas.microsoft.com/office/drawing/2014/main" id="{F893D985-9854-B181-560F-33EDA67475E4}"/>
-              </a:ext>
-            </a:extLst>
-          </p:cNvPr>
-          <p:cNvCxnSpPr>
-            <a:cxnSpLocks/>
-          </p:cNvCxnSpPr>
-          <p:nvPr/>
-        </p:nvCxnSpPr>
-        <p:spPr>
-          <a:xfrm>
-            <a:off x="6805155" y="2328015"/>
-            <a:ext cx="0" cy="1417980"/>
-          </a:xfrm>
-          <a:prstGeom prst="straightConnector1">
-            <a:avLst/>
-          </a:prstGeom>
-          <a:ln w="25400" cap="rnd">
-            <a:solidFill>
-              <a:schemeClr val="tx1"/>
-            </a:solidFill>
-            <a:headEnd type="arrow" w="lg" len="lg"/>
-            <a:tailEnd type="none" w="lg" len="lg"/>
-          </a:ln>
-        </p:spPr>
-        <p:style>
-          <a:lnRef idx="1">
-            <a:schemeClr val="accent1"/>
-          </a:lnRef>
-          <a:fillRef idx="0">
-            <a:schemeClr val="accent1"/>
-          </a:fillRef>
-          <a:effectRef idx="0">
-            <a:schemeClr val="accent1"/>
-          </a:effectRef>
-          <a:fontRef idx="minor">
-            <a:schemeClr val="tx1"/>
-          </a:fontRef>
-        </p:style>
-      </p:cxnSp>
-      <p:sp>
-        <p:nvSpPr>
-          <p:cNvPr id="15" name="TextBox 14">
-            <a:extLst>
-              <a:ext uri="{FF2B5EF4-FFF2-40B4-BE49-F238E27FC236}">
-                <a16:creationId xmlns:a16="http://schemas.microsoft.com/office/drawing/2014/main" id="{C847CFA2-53E5-7410-0F2E-78640909DD7A}"/>
-              </a:ext>
-            </a:extLst>
-          </p:cNvPr>
-          <p:cNvSpPr txBox="1"/>
-          <p:nvPr/>
-        </p:nvSpPr>
-        <p:spPr>
-          <a:xfrm>
-            <a:off x="6890876" y="2452121"/>
-            <a:ext cx="914396" cy="461665"/>
-          </a:xfrm>
-          <a:prstGeom prst="rect">
-            <a:avLst/>
-          </a:prstGeom>
-          <a:noFill/>
-        </p:spPr>
-        <p:txBody>
-          <a:bodyPr wrap="square" rtlCol="0">
-            <a:spAutoFit/>
-          </a:bodyPr>
-          <a:lstStyle/>
-          <a:p>
-            <a:r>
-              <a:rPr lang="en-US" sz="2400" dirty="0"/>
-              <a:t>1 + q</a:t>
-            </a:r>
-          </a:p>
-        </p:txBody>
-      </p:sp>
-      <p:sp>
-        <p:nvSpPr>
-          <p:cNvPr id="16" name="TextBox 15">
-            <a:extLst>
-              <a:ext uri="{FF2B5EF4-FFF2-40B4-BE49-F238E27FC236}">
-                <a16:creationId xmlns:a16="http://schemas.microsoft.com/office/drawing/2014/main" id="{405B1429-A763-D7D6-3F26-A02D3AFB6FEA}"/>
-              </a:ext>
-            </a:extLst>
-          </p:cNvPr>
-          <p:cNvSpPr txBox="1"/>
-          <p:nvPr/>
-        </p:nvSpPr>
-        <p:spPr>
-          <a:xfrm>
-            <a:off x="8570402" y="2889510"/>
-            <a:ext cx="2663390" cy="830997"/>
-          </a:xfrm>
-          <a:prstGeom prst="rect">
-            <a:avLst/>
-          </a:prstGeom>
-          <a:noFill/>
-        </p:spPr>
-        <p:txBody>
-          <a:bodyPr wrap="square" rtlCol="0">
-            <a:spAutoFit/>
-          </a:bodyPr>
-          <a:lstStyle/>
-          <a:p>
-            <a:pPr algn="r"/>
-            <a:r>
-              <a:rPr lang="en-US" sz="2400" dirty="0">
+              <a:t> </a:t>
+            </a:r>
+            <a:r>
+              <a:rPr lang="en-US" sz="2400" b="1" u="sng" dirty="0">
                 <a:solidFill>
-                  <a:srgbClr val="4CA22E"/>
+                  <a:srgbClr val="0070C0"/>
                 </a:solidFill>
               </a:rPr>
-              <a:t>asset : something that has value</a:t>
-            </a:r>
-          </a:p>
-        </p:txBody>
-      </p:sp>
-      <p:sp>
-        <p:nvSpPr>
-          <p:cNvPr id="6" name="TextBox 5">
-            <a:extLst>
-              <a:ext uri="{FF2B5EF4-FFF2-40B4-BE49-F238E27FC236}">
-                <a16:creationId xmlns:a16="http://schemas.microsoft.com/office/drawing/2014/main" id="{6BE78319-9CEF-6BCB-4E4E-54FA88698FD0}"/>
-              </a:ext>
-            </a:extLst>
-          </p:cNvPr>
-          <p:cNvSpPr txBox="1"/>
-          <p:nvPr/>
-        </p:nvSpPr>
-        <p:spPr>
-          <a:xfrm>
-            <a:off x="8001002" y="2447583"/>
-            <a:ext cx="3232790" cy="461665"/>
-          </a:xfrm>
-          <a:prstGeom prst="rect">
-            <a:avLst/>
-          </a:prstGeom>
-          <a:noFill/>
-        </p:spPr>
-        <p:txBody>
-          <a:bodyPr wrap="square" rtlCol="0">
-            <a:spAutoFit/>
-          </a:bodyPr>
-          <a:lstStyle/>
-          <a:p>
-            <a:pPr algn="r"/>
-            <a:r>
-              <a:rPr lang="en-US" sz="2400" dirty="0"/>
-              <a:t>q : 1-year simple rate</a:t>
-            </a:r>
-          </a:p>
-        </p:txBody>
-      </p:sp>
-      <p:sp>
-        <p:nvSpPr>
-          <p:cNvPr id="7" name="TextBox 6">
-            <a:extLst>
-              <a:ext uri="{FF2B5EF4-FFF2-40B4-BE49-F238E27FC236}">
-                <a16:creationId xmlns:a16="http://schemas.microsoft.com/office/drawing/2014/main" id="{3C6218BF-1CC9-12F5-BCDC-5FE2A06424A6}"/>
-              </a:ext>
-            </a:extLst>
-          </p:cNvPr>
-          <p:cNvSpPr txBox="1"/>
-          <p:nvPr/>
-        </p:nvSpPr>
-        <p:spPr>
-          <a:xfrm>
-            <a:off x="625365" y="1602304"/>
-            <a:ext cx="1210061" cy="461665"/>
-          </a:xfrm>
-          <a:prstGeom prst="rect">
-            <a:avLst/>
-          </a:prstGeom>
-          <a:noFill/>
-        </p:spPr>
-        <p:txBody>
-          <a:bodyPr wrap="square" rtlCol="0">
-            <a:spAutoFit/>
-          </a:bodyPr>
-          <a:lstStyle/>
-          <a:p>
-            <a:r>
-              <a:rPr lang="en-US" sz="2400" b="1" dirty="0"/>
-              <a:t>Asset</a:t>
+              <a:t>volatility</a:t>
             </a:r>
           </a:p>
         </p:txBody>
@@ -7118,7 +7140,7 @@
     </p:spTree>
     <p:extLst>
       <p:ext uri="{BB962C8B-B14F-4D97-AF65-F5344CB8AC3E}">
-        <p14:creationId xmlns:p14="http://schemas.microsoft.com/office/powerpoint/2010/main" val="3240525398"/>
+        <p14:creationId xmlns:p14="http://schemas.microsoft.com/office/powerpoint/2010/main" val="1126488000"/>
       </p:ext>
     </p:extLst>
   </p:cSld>
@@ -7189,7 +7211,7 @@
           <p:cNvPr id="3" name="TextBox 2">
             <a:extLst>
               <a:ext uri="{FF2B5EF4-FFF2-40B4-BE49-F238E27FC236}">
-                <a16:creationId xmlns:a16="http://schemas.microsoft.com/office/drawing/2014/main" id="{7F8B13E4-29B3-5435-324C-4149E3AE4146}"/>
+                <a16:creationId xmlns:a16="http://schemas.microsoft.com/office/drawing/2014/main" id="{688D616B-8979-3A02-FC3B-CEA112A0AB0D}"/>
               </a:ext>
             </a:extLst>
           </p:cNvPr>
@@ -7199,7 +7221,7 @@
         <p:spPr>
           <a:xfrm>
             <a:off x="625365" y="1602304"/>
-            <a:ext cx="3782043" cy="830997"/>
+            <a:ext cx="1673887" cy="461665"/>
           </a:xfrm>
           <a:prstGeom prst="rect">
             <a:avLst/>
@@ -7214,65 +7236,17 @@
           <a:p>
             <a:r>
               <a:rPr lang="en-US" sz="2400" b="1" dirty="0"/>
-              <a:t>Risk</a:t>
-            </a:r>
-          </a:p>
-          <a:p>
-            <a:r>
-              <a:rPr lang="en-US" sz="2400" dirty="0">
-                <a:solidFill>
-                  <a:schemeClr val="accent6">
-                    <a:lumMod val="75000"/>
-                  </a:schemeClr>
-                </a:solidFill>
-              </a:rPr>
-              <a:t>( for a single asset )</a:t>
-            </a:r>
-          </a:p>
-        </p:txBody>
-      </p:sp>
-      <p:pic>
-        <p:nvPicPr>
-          <p:cNvPr id="6" name="Picture 5" descr="A black background with a black square&#10;&#10;Description automatically generated with medium confidence">
-            <a:extLst>
-              <a:ext uri="{FF2B5EF4-FFF2-40B4-BE49-F238E27FC236}">
-                <a16:creationId xmlns:a16="http://schemas.microsoft.com/office/drawing/2014/main" id="{5F37A9FC-81A9-B2AA-C4F1-14BB7D7E37D8}"/>
-              </a:ext>
-            </a:extLst>
-          </p:cNvPr>
-          <p:cNvPicPr>
-            <a:picLocks noChangeAspect="1"/>
-          </p:cNvPicPr>
-          <p:nvPr/>
-        </p:nvPicPr>
-        <p:blipFill>
-          <a:blip r:embed="rId2">
-            <a:extLst>
-              <a:ext uri="{28A0092B-C50C-407E-A947-70E740481C1C}">
-                <a14:useLocalDpi xmlns:a14="http://schemas.microsoft.com/office/drawing/2010/main" val="0"/>
-              </a:ext>
-            </a:extLst>
-          </a:blip>
-          <a:stretch>
-            <a:fillRect/>
-          </a:stretch>
-        </p:blipFill>
-        <p:spPr>
-          <a:xfrm>
-            <a:off x="6494599" y="2433301"/>
-            <a:ext cx="1143640" cy="1143640"/>
-          </a:xfrm>
-          <a:prstGeom prst="rect">
-            <a:avLst/>
-          </a:prstGeom>
-        </p:spPr>
-      </p:pic>
-      <p:sp>
-        <p:nvSpPr>
-          <p:cNvPr id="7" name="TextBox 6">
-            <a:extLst>
-              <a:ext uri="{FF2B5EF4-FFF2-40B4-BE49-F238E27FC236}">
-                <a16:creationId xmlns:a16="http://schemas.microsoft.com/office/drawing/2014/main" id="{5C3840BA-8FB1-4AF5-7AAD-844E0460CFB4}"/>
+              <a:t>Portfolio</a:t>
+            </a:r>
+          </a:p>
+        </p:txBody>
+      </p:sp>
+      <p:sp>
+        <p:nvSpPr>
+          <p:cNvPr id="4" name="TextBox 3">
+            <a:extLst>
+              <a:ext uri="{FF2B5EF4-FFF2-40B4-BE49-F238E27FC236}">
+                <a16:creationId xmlns:a16="http://schemas.microsoft.com/office/drawing/2014/main" id="{354FA2B6-0E71-6714-6C96-99036DB2AE98}"/>
               </a:ext>
             </a:extLst>
           </p:cNvPr>
@@ -7281,8 +7255,8 @@
         </p:nvSpPr>
         <p:spPr>
           <a:xfrm>
-            <a:off x="3864127" y="1586574"/>
-            <a:ext cx="6843497" cy="830997"/>
+            <a:off x="1203020" y="2363609"/>
+            <a:ext cx="6149502" cy="461665"/>
           </a:xfrm>
           <a:prstGeom prst="rect">
             <a:avLst/>
@@ -7295,20 +7269,20 @@
           </a:bodyPr>
           <a:lstStyle/>
           <a:p>
-            <a:pPr algn="ctr"/>
-            <a:r>
-              <a:rPr lang="en-US" sz="2400" dirty="0"/>
-              <a:t>All contracts contain (sometimes just implicitly) numbers that will be known only in the future</a:t>
-            </a:r>
-          </a:p>
-        </p:txBody>
-      </p:sp>
-      <p:sp>
-        <p:nvSpPr>
-          <p:cNvPr id="8" name="TextBox 7">
-            <a:extLst>
-              <a:ext uri="{FF2B5EF4-FFF2-40B4-BE49-F238E27FC236}">
-                <a16:creationId xmlns:a16="http://schemas.microsoft.com/office/drawing/2014/main" id="{2F1A3146-9F4B-8F1D-A187-D4E6276FD0D4}"/>
+            <a:r>
+              <a:rPr lang="en-US" sz="2400"/>
+              <a:t>A linear combination of (financial) assets</a:t>
+            </a:r>
+            <a:endParaRPr lang="en-US" sz="2400" dirty="0"/>
+          </a:p>
+        </p:txBody>
+      </p:sp>
+      <p:sp>
+        <p:nvSpPr>
+          <p:cNvPr id="5" name="TextBox 4">
+            <a:extLst>
+              <a:ext uri="{FF2B5EF4-FFF2-40B4-BE49-F238E27FC236}">
+                <a16:creationId xmlns:a16="http://schemas.microsoft.com/office/drawing/2014/main" id="{67AEE8D2-968F-3D97-9173-5B59FF60FB34}"/>
               </a:ext>
             </a:extLst>
           </p:cNvPr>
@@ -7317,8 +7291,8 @@
         </p:nvSpPr>
         <p:spPr>
           <a:xfrm>
-            <a:off x="342793" y="4024931"/>
-            <a:ext cx="6723626" cy="830997"/>
+            <a:off x="1203020" y="2894081"/>
+            <a:ext cx="3956809" cy="461665"/>
           </a:xfrm>
           <a:prstGeom prst="rect">
             <a:avLst/>
@@ -7331,51 +7305,19 @@
           </a:bodyPr>
           <a:lstStyle/>
           <a:p>
-            <a:pPr algn="ctr"/>
             <a:r>
               <a:rPr lang="en-US" sz="2400" dirty="0"/>
-              <a:t>Risk quantifies the </a:t>
-            </a:r>
-            <a:r>
-              <a:rPr lang="en-US" sz="2400" b="1" u="sng" dirty="0">
-                <a:solidFill>
-                  <a:srgbClr val="0070C0"/>
-                </a:solidFill>
-              </a:rPr>
-              <a:t>uncertainty</a:t>
-            </a:r>
-            <a:r>
-              <a:rPr lang="en-US" sz="2400" dirty="0"/>
-              <a:t> of a </a:t>
-            </a:r>
-            <a:r>
-              <a:rPr lang="en-US" sz="2400" b="1" u="sng" dirty="0">
-                <a:solidFill>
-                  <a:srgbClr val="FF0000"/>
-                </a:solidFill>
-              </a:rPr>
-              <a:t>future</a:t>
-            </a:r>
-            <a:r>
-              <a:rPr lang="en-US" sz="2400" dirty="0"/>
-              <a:t> value,</a:t>
-            </a:r>
-          </a:p>
-          <a:p>
-            <a:pPr algn="ctr"/>
-            <a:r>
-              <a:rPr lang="en-US" sz="2400" dirty="0"/>
-              <a:t>for example, the future price of an asset</a:t>
-            </a:r>
-          </a:p>
-        </p:txBody>
-      </p:sp>
-      <p:sp>
-        <p:nvSpPr>
-          <p:cNvPr id="9" name="TextBox 8">
-            <a:extLst>
-              <a:ext uri="{FF2B5EF4-FFF2-40B4-BE49-F238E27FC236}">
-                <a16:creationId xmlns:a16="http://schemas.microsoft.com/office/drawing/2014/main" id="{AF2F6895-CB52-5F4C-791B-7ED95DFC4E12}"/>
+              <a:t>In math: sum of weights is 1</a:t>
+            </a:r>
+          </a:p>
+        </p:txBody>
+      </p:sp>
+      <p:sp>
+        <p:nvSpPr>
+          <p:cNvPr id="8" name="TextBox 7">
+            <a:extLst>
+              <a:ext uri="{FF2B5EF4-FFF2-40B4-BE49-F238E27FC236}">
+                <a16:creationId xmlns:a16="http://schemas.microsoft.com/office/drawing/2014/main" id="{4F957182-C294-642B-A68B-6A6060964C99}"/>
               </a:ext>
             </a:extLst>
           </p:cNvPr>
@@ -7384,8 +7326,8 @@
         </p:nvSpPr>
         <p:spPr>
           <a:xfrm>
-            <a:off x="8034528" y="4024930"/>
-            <a:ext cx="3670923" cy="830997"/>
+            <a:off x="5302269" y="4343070"/>
+            <a:ext cx="3956809" cy="461665"/>
           </a:xfrm>
           <a:prstGeom prst="rect">
             <a:avLst/>
@@ -7398,78 +7340,9 @@
           </a:bodyPr>
           <a:lstStyle/>
           <a:p>
-            <a:pPr algn="ctr"/>
             <a:r>
               <a:rPr lang="en-US" sz="2400" dirty="0"/>
-              <a:t>We don’t know the future, but we can </a:t>
-            </a:r>
-            <a:r>
-              <a:rPr lang="en-US" sz="2400" b="1" u="sng" dirty="0">
-                <a:solidFill>
-                  <a:srgbClr val="FF0000"/>
-                </a:solidFill>
-              </a:rPr>
-              <a:t>forecast</a:t>
-            </a:r>
-            <a:r>
-              <a:rPr lang="en-US" sz="2400" dirty="0"/>
-              <a:t> </a:t>
-            </a:r>
-          </a:p>
-        </p:txBody>
-      </p:sp>
-      <p:sp>
-        <p:nvSpPr>
-          <p:cNvPr id="11" name="TextBox 10">
-            <a:extLst>
-              <a:ext uri="{FF2B5EF4-FFF2-40B4-BE49-F238E27FC236}">
-                <a16:creationId xmlns:a16="http://schemas.microsoft.com/office/drawing/2014/main" id="{FEA23696-5BED-D3FC-9814-E7C90830D546}"/>
-              </a:ext>
-            </a:extLst>
-          </p:cNvPr>
-          <p:cNvSpPr txBox="1"/>
-          <p:nvPr/>
-        </p:nvSpPr>
-        <p:spPr>
-          <a:xfrm>
-            <a:off x="2024397" y="5366845"/>
-            <a:ext cx="7265907" cy="830997"/>
-          </a:xfrm>
-          <a:prstGeom prst="rect">
-            <a:avLst/>
-          </a:prstGeom>
-          <a:noFill/>
-        </p:spPr>
-        <p:txBody>
-          <a:bodyPr wrap="square" rtlCol="0">
-            <a:spAutoFit/>
-          </a:bodyPr>
-          <a:lstStyle/>
-          <a:p>
-            <a:pPr algn="ctr"/>
-            <a:r>
-              <a:rPr lang="en-US" sz="2400" dirty="0"/>
-              <a:t>A simple forecast for the uncertainty of an asset’s future price is the same asset’s </a:t>
-            </a:r>
-            <a:r>
-              <a:rPr lang="en-US" sz="2400" b="1" u="sng" dirty="0">
-                <a:solidFill>
-                  <a:srgbClr val="FF0000"/>
-                </a:solidFill>
-              </a:rPr>
-              <a:t>past</a:t>
-            </a:r>
-            <a:r>
-              <a:rPr lang="en-US" sz="2400" dirty="0"/>
-              <a:t> </a:t>
-            </a:r>
-            <a:r>
-              <a:rPr lang="en-US" sz="2400" b="1" u="sng" dirty="0">
-                <a:solidFill>
-                  <a:srgbClr val="0070C0"/>
-                </a:solidFill>
-              </a:rPr>
-              <a:t>volatility</a:t>
+              <a:t>Start notations here !!!</a:t>
             </a:r>
           </a:p>
         </p:txBody>
@@ -7477,7 +7350,7 @@
     </p:spTree>
     <p:extLst>
       <p:ext uri="{BB962C8B-B14F-4D97-AF65-F5344CB8AC3E}">
-        <p14:creationId xmlns:p14="http://schemas.microsoft.com/office/powerpoint/2010/main" val="1126488000"/>
+        <p14:creationId xmlns:p14="http://schemas.microsoft.com/office/powerpoint/2010/main" val="684952077"/>
       </p:ext>
     </p:extLst>
   </p:cSld>
@@ -7557,8 +7430,8 @@
         </p:nvSpPr>
         <p:spPr>
           <a:xfrm>
-            <a:off x="625365" y="1602304"/>
-            <a:ext cx="1673887" cy="461665"/>
+            <a:off x="625366" y="1602304"/>
+            <a:ext cx="1334064" cy="461665"/>
           </a:xfrm>
           <a:prstGeom prst="rect">
             <a:avLst/>
@@ -7573,17 +7446,17 @@
           <a:p>
             <a:r>
               <a:rPr lang="en-US" sz="2400" b="1" dirty="0"/>
-              <a:t>Portfolio</a:t>
-            </a:r>
-          </a:p>
-        </p:txBody>
-      </p:sp>
-      <p:sp>
-        <p:nvSpPr>
-          <p:cNvPr id="4" name="TextBox 3">
-            <a:extLst>
-              <a:ext uri="{FF2B5EF4-FFF2-40B4-BE49-F238E27FC236}">
-                <a16:creationId xmlns:a16="http://schemas.microsoft.com/office/drawing/2014/main" id="{354FA2B6-0E71-6714-6C96-99036DB2AE98}"/>
+              <a:t>What ?</a:t>
+            </a:r>
+          </a:p>
+        </p:txBody>
+      </p:sp>
+      <p:sp>
+        <p:nvSpPr>
+          <p:cNvPr id="6" name="TextBox 5">
+            <a:extLst>
+              <a:ext uri="{FF2B5EF4-FFF2-40B4-BE49-F238E27FC236}">
+                <a16:creationId xmlns:a16="http://schemas.microsoft.com/office/drawing/2014/main" id="{4B2B73C1-FD4B-9D9A-3377-037FB76AE0B4}"/>
               </a:ext>
             </a:extLst>
           </p:cNvPr>
@@ -7592,8 +7465,8 @@
         </p:nvSpPr>
         <p:spPr>
           <a:xfrm>
-            <a:off x="1203020" y="2363609"/>
-            <a:ext cx="6149502" cy="461665"/>
+            <a:off x="5302269" y="4343070"/>
+            <a:ext cx="5278645" cy="461665"/>
           </a:xfrm>
           <a:prstGeom prst="rect">
             <a:avLst/>
@@ -7607,79 +7480,8 @@
           <a:lstStyle/>
           <a:p>
             <a:r>
-              <a:rPr lang="en-US" sz="2400"/>
-              <a:t>A linear combination of (financial) assets</a:t>
-            </a:r>
-            <a:endParaRPr lang="en-US" sz="2400" dirty="0"/>
-          </a:p>
-        </p:txBody>
-      </p:sp>
-      <p:sp>
-        <p:nvSpPr>
-          <p:cNvPr id="5" name="TextBox 4">
-            <a:extLst>
-              <a:ext uri="{FF2B5EF4-FFF2-40B4-BE49-F238E27FC236}">
-                <a16:creationId xmlns:a16="http://schemas.microsoft.com/office/drawing/2014/main" id="{67AEE8D2-968F-3D97-9173-5B59FF60FB34}"/>
-              </a:ext>
-            </a:extLst>
-          </p:cNvPr>
-          <p:cNvSpPr txBox="1"/>
-          <p:nvPr/>
-        </p:nvSpPr>
-        <p:spPr>
-          <a:xfrm>
-            <a:off x="1203020" y="2894081"/>
-            <a:ext cx="3956809" cy="461665"/>
-          </a:xfrm>
-          <a:prstGeom prst="rect">
-            <a:avLst/>
-          </a:prstGeom>
-          <a:noFill/>
-        </p:spPr>
-        <p:txBody>
-          <a:bodyPr wrap="square" rtlCol="0">
-            <a:spAutoFit/>
-          </a:bodyPr>
-          <a:lstStyle/>
-          <a:p>
-            <a:r>
               <a:rPr lang="en-US" sz="2400" dirty="0"/>
-              <a:t>In math: sum of weights is 1</a:t>
-            </a:r>
-          </a:p>
-        </p:txBody>
-      </p:sp>
-      <p:sp>
-        <p:nvSpPr>
-          <p:cNvPr id="8" name="TextBox 7">
-            <a:extLst>
-              <a:ext uri="{FF2B5EF4-FFF2-40B4-BE49-F238E27FC236}">
-                <a16:creationId xmlns:a16="http://schemas.microsoft.com/office/drawing/2014/main" id="{4F957182-C294-642B-A68B-6A6060964C99}"/>
-              </a:ext>
-            </a:extLst>
-          </p:cNvPr>
-          <p:cNvSpPr txBox="1"/>
-          <p:nvPr/>
-        </p:nvSpPr>
-        <p:spPr>
-          <a:xfrm>
-            <a:off x="5302269" y="4343070"/>
-            <a:ext cx="3956809" cy="461665"/>
-          </a:xfrm>
-          <a:prstGeom prst="rect">
-            <a:avLst/>
-          </a:prstGeom>
-          <a:noFill/>
-        </p:spPr>
-        <p:txBody>
-          <a:bodyPr wrap="square" rtlCol="0">
-            <a:spAutoFit/>
-          </a:bodyPr>
-          <a:lstStyle/>
-          <a:p>
-            <a:r>
-              <a:rPr lang="en-US" sz="2400" dirty="0"/>
-              <a:t>Start notations here !!!</a:t>
+              <a:t>What’s the goal here ?</a:t>
             </a:r>
           </a:p>
         </p:txBody>
@@ -7687,7 +7489,7 @@
     </p:spTree>
     <p:extLst>
       <p:ext uri="{BB962C8B-B14F-4D97-AF65-F5344CB8AC3E}">
-        <p14:creationId xmlns:p14="http://schemas.microsoft.com/office/powerpoint/2010/main" val="684952077"/>
+        <p14:creationId xmlns:p14="http://schemas.microsoft.com/office/powerpoint/2010/main" val="2388973311"/>
       </p:ext>
     </p:extLst>
   </p:cSld>

</xml_diff>

<commit_message>
updated until Risk slide
</commit_message>
<xml_diff>
--- a/MMS_2024_09_10/Farkas_2024_09_10.pptx
+++ b/MMS_2024_09_10/Farkas_2024_09_10.pptx
@@ -12,10 +12,8 @@
     <p:sldId id="262" r:id="rId6"/>
     <p:sldId id="266" r:id="rId7"/>
     <p:sldId id="263" r:id="rId8"/>
-    <p:sldId id="264" r:id="rId9"/>
+    <p:sldId id="270" r:id="rId9"/>
     <p:sldId id="267" r:id="rId10"/>
-    <p:sldId id="268" r:id="rId11"/>
-    <p:sldId id="269" r:id="rId12"/>
   </p:sldIdLst>
   <p:sldSz cx="12192000" cy="6858000"/>
   <p:notesSz cx="6858000" cy="9144000"/>
@@ -3641,300 +3639,6 @@
 </p:sld>
 </file>
 
-<file path=ppt/slides/slide10.xml><?xml version="1.0" encoding="utf-8"?>
-<p:sld xmlns:a="http://schemas.openxmlformats.org/drawingml/2006/main" xmlns:r="http://schemas.openxmlformats.org/officeDocument/2006/relationships" xmlns:p="http://schemas.openxmlformats.org/presentationml/2006/main">
-  <p:cSld>
-    <p:spTree>
-      <p:nvGrpSpPr>
-        <p:cNvPr id="1" name=""/>
-        <p:cNvGrpSpPr/>
-        <p:nvPr/>
-      </p:nvGrpSpPr>
-      <p:grpSpPr>
-        <a:xfrm>
-          <a:off x="0" y="0"/>
-          <a:ext cx="0" cy="0"/>
-          <a:chOff x="0" y="0"/>
-          <a:chExt cx="0" cy="0"/>
-        </a:xfrm>
-      </p:grpSpPr>
-      <p:sp>
-        <p:nvSpPr>
-          <p:cNvPr id="2" name="TextBox 1">
-            <a:extLst>
-              <a:ext uri="{FF2B5EF4-FFF2-40B4-BE49-F238E27FC236}">
-                <a16:creationId xmlns:a16="http://schemas.microsoft.com/office/drawing/2014/main" id="{E03B3FC0-A19A-0D68-D5BE-C9362748E2B5}"/>
-              </a:ext>
-            </a:extLst>
-          </p:cNvPr>
-          <p:cNvSpPr txBox="1"/>
-          <p:nvPr/>
-        </p:nvSpPr>
-        <p:spPr>
-          <a:xfrm>
-            <a:off x="105100" y="156234"/>
-            <a:ext cx="12002814" cy="369332"/>
-          </a:xfrm>
-          <a:prstGeom prst="rect">
-            <a:avLst/>
-          </a:prstGeom>
-          <a:noFill/>
-        </p:spPr>
-        <p:txBody>
-          <a:bodyPr wrap="square" rtlCol="0">
-            <a:spAutoFit/>
-          </a:bodyPr>
-          <a:lstStyle/>
-          <a:p>
-            <a:r>
-              <a:rPr lang="en-US" dirty="0">
-                <a:solidFill>
-                  <a:schemeClr val="bg1"/>
-                </a:solidFill>
-              </a:rPr>
-              <a:t>Intro</a:t>
-            </a:r>
-          </a:p>
-        </p:txBody>
-      </p:sp>
-      <p:sp>
-        <p:nvSpPr>
-          <p:cNvPr id="3" name="TextBox 2">
-            <a:extLst>
-              <a:ext uri="{FF2B5EF4-FFF2-40B4-BE49-F238E27FC236}">
-                <a16:creationId xmlns:a16="http://schemas.microsoft.com/office/drawing/2014/main" id="{688D616B-8979-3A02-FC3B-CEA112A0AB0D}"/>
-              </a:ext>
-            </a:extLst>
-          </p:cNvPr>
-          <p:cNvSpPr txBox="1"/>
-          <p:nvPr/>
-        </p:nvSpPr>
-        <p:spPr>
-          <a:xfrm>
-            <a:off x="625365" y="1602304"/>
-            <a:ext cx="1673887" cy="461665"/>
-          </a:xfrm>
-          <a:prstGeom prst="rect">
-            <a:avLst/>
-          </a:prstGeom>
-          <a:noFill/>
-        </p:spPr>
-        <p:txBody>
-          <a:bodyPr wrap="square" rtlCol="0">
-            <a:spAutoFit/>
-          </a:bodyPr>
-          <a:lstStyle/>
-          <a:p>
-            <a:r>
-              <a:rPr lang="en-US" sz="2400" b="1" dirty="0"/>
-              <a:t>How ?</a:t>
-            </a:r>
-          </a:p>
-        </p:txBody>
-      </p:sp>
-      <p:sp>
-        <p:nvSpPr>
-          <p:cNvPr id="4" name="TextBox 3">
-            <a:extLst>
-              <a:ext uri="{FF2B5EF4-FFF2-40B4-BE49-F238E27FC236}">
-                <a16:creationId xmlns:a16="http://schemas.microsoft.com/office/drawing/2014/main" id="{168B5341-2125-EB4A-41E0-C390575129C9}"/>
-              </a:ext>
-            </a:extLst>
-          </p:cNvPr>
-          <p:cNvSpPr txBox="1"/>
-          <p:nvPr/>
-        </p:nvSpPr>
-        <p:spPr>
-          <a:xfrm>
-            <a:off x="3545633" y="4343070"/>
-            <a:ext cx="7035281" cy="461665"/>
-          </a:xfrm>
-          <a:prstGeom prst="rect">
-            <a:avLst/>
-          </a:prstGeom>
-          <a:noFill/>
-        </p:spPr>
-        <p:txBody>
-          <a:bodyPr wrap="square" rtlCol="0">
-            <a:spAutoFit/>
-          </a:bodyPr>
-          <a:lstStyle/>
-          <a:p>
-            <a:r>
-              <a:rPr lang="en-US" sz="2400" dirty="0"/>
-              <a:t>Lagrange </a:t>
-            </a:r>
-            <a:r>
-              <a:rPr lang="en-US" sz="2400" dirty="0" err="1"/>
-              <a:t>mult</a:t>
-            </a:r>
-            <a:r>
-              <a:rPr lang="en-US" sz="2400" dirty="0"/>
-              <a:t>, Variable changes, Numerical points</a:t>
-            </a:r>
-          </a:p>
-        </p:txBody>
-      </p:sp>
-    </p:spTree>
-    <p:extLst>
-      <p:ext uri="{BB962C8B-B14F-4D97-AF65-F5344CB8AC3E}">
-        <p14:creationId xmlns:p14="http://schemas.microsoft.com/office/powerpoint/2010/main" val="3787761154"/>
-      </p:ext>
-    </p:extLst>
-  </p:cSld>
-  <p:clrMapOvr>
-    <a:masterClrMapping/>
-  </p:clrMapOvr>
-</p:sld>
-</file>
-
-<file path=ppt/slides/slide11.xml><?xml version="1.0" encoding="utf-8"?>
-<p:sld xmlns:a="http://schemas.openxmlformats.org/drawingml/2006/main" xmlns:r="http://schemas.openxmlformats.org/officeDocument/2006/relationships" xmlns:p="http://schemas.openxmlformats.org/presentationml/2006/main">
-  <p:cSld>
-    <p:spTree>
-      <p:nvGrpSpPr>
-        <p:cNvPr id="1" name=""/>
-        <p:cNvGrpSpPr/>
-        <p:nvPr/>
-      </p:nvGrpSpPr>
-      <p:grpSpPr>
-        <a:xfrm>
-          <a:off x="0" y="0"/>
-          <a:ext cx="0" cy="0"/>
-          <a:chOff x="0" y="0"/>
-          <a:chExt cx="0" cy="0"/>
-        </a:xfrm>
-      </p:grpSpPr>
-      <p:sp>
-        <p:nvSpPr>
-          <p:cNvPr id="2" name="TextBox 1">
-            <a:extLst>
-              <a:ext uri="{FF2B5EF4-FFF2-40B4-BE49-F238E27FC236}">
-                <a16:creationId xmlns:a16="http://schemas.microsoft.com/office/drawing/2014/main" id="{E03B3FC0-A19A-0D68-D5BE-C9362748E2B5}"/>
-              </a:ext>
-            </a:extLst>
-          </p:cNvPr>
-          <p:cNvSpPr txBox="1"/>
-          <p:nvPr/>
-        </p:nvSpPr>
-        <p:spPr>
-          <a:xfrm>
-            <a:off x="105100" y="156234"/>
-            <a:ext cx="12002814" cy="369332"/>
-          </a:xfrm>
-          <a:prstGeom prst="rect">
-            <a:avLst/>
-          </a:prstGeom>
-          <a:noFill/>
-        </p:spPr>
-        <p:txBody>
-          <a:bodyPr wrap="square" rtlCol="0">
-            <a:spAutoFit/>
-          </a:bodyPr>
-          <a:lstStyle/>
-          <a:p>
-            <a:r>
-              <a:rPr lang="en-US" dirty="0">
-                <a:solidFill>
-                  <a:schemeClr val="bg1"/>
-                </a:solidFill>
-              </a:rPr>
-              <a:t>Intro</a:t>
-            </a:r>
-          </a:p>
-        </p:txBody>
-      </p:sp>
-      <p:sp>
-        <p:nvSpPr>
-          <p:cNvPr id="3" name="TextBox 2">
-            <a:extLst>
-              <a:ext uri="{FF2B5EF4-FFF2-40B4-BE49-F238E27FC236}">
-                <a16:creationId xmlns:a16="http://schemas.microsoft.com/office/drawing/2014/main" id="{688D616B-8979-3A02-FC3B-CEA112A0AB0D}"/>
-              </a:ext>
-            </a:extLst>
-          </p:cNvPr>
-          <p:cNvSpPr txBox="1"/>
-          <p:nvPr/>
-        </p:nvSpPr>
-        <p:spPr>
-          <a:xfrm>
-            <a:off x="625365" y="1602304"/>
-            <a:ext cx="1673887" cy="461665"/>
-          </a:xfrm>
-          <a:prstGeom prst="rect">
-            <a:avLst/>
-          </a:prstGeom>
-          <a:noFill/>
-        </p:spPr>
-        <p:txBody>
-          <a:bodyPr wrap="square" rtlCol="0">
-            <a:spAutoFit/>
-          </a:bodyPr>
-          <a:lstStyle/>
-          <a:p>
-            <a:r>
-              <a:rPr lang="en-US" sz="2400" b="1" dirty="0"/>
-              <a:t>Why ?</a:t>
-            </a:r>
-          </a:p>
-        </p:txBody>
-      </p:sp>
-      <p:sp>
-        <p:nvSpPr>
-          <p:cNvPr id="4" name="TextBox 3">
-            <a:extLst>
-              <a:ext uri="{FF2B5EF4-FFF2-40B4-BE49-F238E27FC236}">
-                <a16:creationId xmlns:a16="http://schemas.microsoft.com/office/drawing/2014/main" id="{342800EC-B89B-DF85-F6F6-31825630168A}"/>
-              </a:ext>
-            </a:extLst>
-          </p:cNvPr>
-          <p:cNvSpPr txBox="1"/>
-          <p:nvPr/>
-        </p:nvSpPr>
-        <p:spPr>
-          <a:xfrm>
-            <a:off x="5302269" y="4343070"/>
-            <a:ext cx="5278645" cy="461665"/>
-          </a:xfrm>
-          <a:prstGeom prst="rect">
-            <a:avLst/>
-          </a:prstGeom>
-          <a:noFill/>
-        </p:spPr>
-        <p:txBody>
-          <a:bodyPr wrap="square" rtlCol="0">
-            <a:spAutoFit/>
-          </a:bodyPr>
-          <a:lstStyle/>
-          <a:p>
-            <a:r>
-              <a:rPr lang="en-US" sz="2400" dirty="0"/>
-              <a:t>q allows discounting, </a:t>
-            </a:r>
-            <a:r>
-              <a:rPr lang="en-US" sz="2400" dirty="0" err="1"/>
-              <a:t>eg</a:t>
-            </a:r>
-            <a:r>
-              <a:rPr lang="en-US" sz="2400" dirty="0"/>
-              <a:t>, bond pricing</a:t>
-            </a:r>
-          </a:p>
-        </p:txBody>
-      </p:sp>
-    </p:spTree>
-    <p:extLst>
-      <p:ext uri="{BB962C8B-B14F-4D97-AF65-F5344CB8AC3E}">
-        <p14:creationId xmlns:p14="http://schemas.microsoft.com/office/powerpoint/2010/main" val="1846333562"/>
-      </p:ext>
-    </p:extLst>
-  </p:cSld>
-  <p:clrMapOvr>
-    <a:masterClrMapping/>
-  </p:clrMapOvr>
-</p:sld>
-</file>
-
 <file path=ppt/slides/slide2.xml><?xml version="1.0" encoding="utf-8"?>
 <p:sld xmlns:a="http://schemas.openxmlformats.org/drawingml/2006/main" xmlns:r="http://schemas.openxmlformats.org/officeDocument/2006/relationships" xmlns:p="http://schemas.openxmlformats.org/presentationml/2006/main">
   <p:cSld>
@@ -4491,7 +4195,7 @@
         </p:nvSpPr>
         <p:spPr>
           <a:xfrm>
-            <a:off x="7068204" y="3757767"/>
+            <a:off x="6641592" y="4449237"/>
             <a:ext cx="1014249" cy="461665"/>
           </a:xfrm>
           <a:prstGeom prst="rect">
@@ -4617,8 +4321,8 @@
         </p:nvSpPr>
         <p:spPr>
           <a:xfrm>
-            <a:off x="4988465" y="2619438"/>
-            <a:ext cx="1495104" cy="461665"/>
+            <a:off x="6782322" y="2612871"/>
+            <a:ext cx="2747357" cy="461665"/>
           </a:xfrm>
           <a:prstGeom prst="rect">
             <a:avLst/>
@@ -4634,7 +4338,7 @@
             <a:pPr algn="ctr"/>
             <a:r>
               <a:rPr lang="en-US" sz="2400" dirty="0"/>
-              <a:t>Portfolios</a:t>
+              <a:t>Efficient Portfolios</a:t>
             </a:r>
           </a:p>
         </p:txBody>
@@ -4851,7 +4555,7 @@
         </p:nvSpPr>
         <p:spPr>
           <a:xfrm>
-            <a:off x="625365" y="1602304"/>
+            <a:off x="625365" y="1629736"/>
             <a:ext cx="1210061" cy="461665"/>
           </a:xfrm>
           <a:prstGeom prst="rect">
@@ -4886,7 +4590,7 @@
         </p:nvCxnSpPr>
         <p:spPr>
           <a:xfrm>
-            <a:off x="4391372" y="5026121"/>
+            <a:off x="4391372" y="5163281"/>
             <a:ext cx="4464000" cy="0"/>
           </a:xfrm>
           <a:prstGeom prst="straightConnector1">
@@ -4930,7 +4634,7 @@
         </p:nvCxnSpPr>
         <p:spPr>
           <a:xfrm flipV="1">
-            <a:off x="4749178" y="4877034"/>
+            <a:off x="4749178" y="5014194"/>
             <a:ext cx="0" cy="301487"/>
           </a:xfrm>
           <a:prstGeom prst="straightConnector1">
@@ -4974,7 +4678,7 @@
         </p:nvCxnSpPr>
         <p:spPr>
           <a:xfrm flipV="1">
-            <a:off x="6813847" y="4877034"/>
+            <a:off x="6813847" y="5014194"/>
             <a:ext cx="0" cy="301487"/>
           </a:xfrm>
           <a:prstGeom prst="straightConnector1">
@@ -5016,7 +4720,7 @@
         </p:nvSpPr>
         <p:spPr>
           <a:xfrm>
-            <a:off x="7725722" y="4441346"/>
+            <a:off x="7762298" y="4578506"/>
             <a:ext cx="2478982" cy="461665"/>
           </a:xfrm>
           <a:prstGeom prst="rect">
@@ -5055,7 +4759,7 @@
         </p:nvSpPr>
         <p:spPr>
           <a:xfrm>
-            <a:off x="4305241" y="5270446"/>
+            <a:off x="4305241" y="5407606"/>
             <a:ext cx="881264" cy="461665"/>
           </a:xfrm>
           <a:prstGeom prst="rect">
@@ -5092,7 +4796,7 @@
         </p:nvSpPr>
         <p:spPr>
           <a:xfrm>
-            <a:off x="6376885" y="5270446"/>
+            <a:off x="6376885" y="5407606"/>
             <a:ext cx="881264" cy="461665"/>
           </a:xfrm>
           <a:prstGeom prst="rect">
@@ -5129,7 +4833,7 @@
         </p:nvSpPr>
         <p:spPr>
           <a:xfrm>
-            <a:off x="4256443" y="1252728"/>
+            <a:off x="4256443" y="1389888"/>
             <a:ext cx="1000531" cy="461665"/>
           </a:xfrm>
           <a:prstGeom prst="rect">
@@ -5166,7 +4870,7 @@
         </p:nvSpPr>
         <p:spPr>
           <a:xfrm>
-            <a:off x="4257371" y="4383493"/>
+            <a:off x="4257371" y="4520653"/>
             <a:ext cx="1000531" cy="461665"/>
           </a:xfrm>
           <a:prstGeom prst="rect">
@@ -5205,7 +4909,7 @@
         </p:nvCxnSpPr>
         <p:spPr>
           <a:xfrm>
-            <a:off x="4745873" y="2346677"/>
+            <a:off x="4745873" y="2483837"/>
             <a:ext cx="0" cy="1417980"/>
           </a:xfrm>
           <a:prstGeom prst="straightConnector1">
@@ -5250,7 +4954,7 @@
         </p:nvCxnSpPr>
         <p:spPr>
           <a:xfrm>
-            <a:off x="6805155" y="2328015"/>
+            <a:off x="6805155" y="2465175"/>
             <a:ext cx="0" cy="1417980"/>
           </a:xfrm>
           <a:prstGeom prst="straightConnector1">
@@ -5293,7 +4997,7 @@
         </p:nvSpPr>
         <p:spPr>
           <a:xfrm>
-            <a:off x="4453905" y="1664758"/>
+            <a:off x="4453905" y="1801918"/>
             <a:ext cx="605608" cy="585407"/>
           </a:xfrm>
           <a:prstGeom prst="ellipse">
@@ -5347,7 +5051,7 @@
         </p:nvSpPr>
         <p:spPr>
           <a:xfrm>
-            <a:off x="6497935" y="1665495"/>
+            <a:off x="6497935" y="1802655"/>
             <a:ext cx="605608" cy="585407"/>
           </a:xfrm>
           <a:prstGeom prst="ellipse">
@@ -5401,7 +5105,7 @@
         </p:nvSpPr>
         <p:spPr>
           <a:xfrm>
-            <a:off x="4453905" y="3845409"/>
+            <a:off x="4453905" y="3982569"/>
             <a:ext cx="605608" cy="585407"/>
           </a:xfrm>
           <a:prstGeom prst="ellipse">
@@ -5457,7 +5161,7 @@
         </p:nvSpPr>
         <p:spPr>
           <a:xfrm>
-            <a:off x="6512630" y="3845409"/>
+            <a:off x="6512630" y="3982569"/>
             <a:ext cx="605608" cy="585407"/>
           </a:xfrm>
           <a:prstGeom prst="ellipse">
@@ -5513,7 +5217,7 @@
         </p:nvSpPr>
         <p:spPr>
           <a:xfrm>
-            <a:off x="4682061" y="2452120"/>
+            <a:off x="4682061" y="2589280"/>
             <a:ext cx="605608" cy="461665"/>
           </a:xfrm>
           <a:prstGeom prst="rect">
@@ -5549,7 +5253,7 @@
         </p:nvSpPr>
         <p:spPr>
           <a:xfrm>
-            <a:off x="2602612" y="2447584"/>
+            <a:off x="2602612" y="2584744"/>
             <a:ext cx="1674975" cy="461665"/>
           </a:xfrm>
           <a:prstGeom prst="rect">
@@ -5586,7 +5290,7 @@
         </p:nvSpPr>
         <p:spPr>
           <a:xfrm>
-            <a:off x="6890876" y="2452121"/>
+            <a:off x="6890876" y="2589281"/>
             <a:ext cx="914396" cy="461665"/>
           </a:xfrm>
           <a:prstGeom prst="rect">
@@ -5621,7 +5325,7 @@
         </p:nvSpPr>
         <p:spPr>
           <a:xfrm>
-            <a:off x="8001002" y="2447583"/>
+            <a:off x="8001002" y="2584743"/>
             <a:ext cx="3232790" cy="461665"/>
           </a:xfrm>
           <a:prstGeom prst="rect">
@@ -5726,7 +5430,7 @@
         </p:nvCxnSpPr>
         <p:spPr>
           <a:xfrm>
-            <a:off x="4391372" y="5026121"/>
+            <a:off x="4391372" y="5163281"/>
             <a:ext cx="4464000" cy="0"/>
           </a:xfrm>
           <a:prstGeom prst="straightConnector1">
@@ -5770,7 +5474,7 @@
         </p:nvCxnSpPr>
         <p:spPr>
           <a:xfrm flipV="1">
-            <a:off x="4749178" y="4877034"/>
+            <a:off x="4749178" y="5014194"/>
             <a:ext cx="0" cy="301487"/>
           </a:xfrm>
           <a:prstGeom prst="straightConnector1">
@@ -5814,7 +5518,7 @@
         </p:nvCxnSpPr>
         <p:spPr>
           <a:xfrm flipV="1">
-            <a:off x="6813847" y="4877034"/>
+            <a:off x="6813847" y="5014194"/>
             <a:ext cx="0" cy="301487"/>
           </a:xfrm>
           <a:prstGeom prst="straightConnector1">
@@ -5856,7 +5560,7 @@
         </p:nvSpPr>
         <p:spPr>
           <a:xfrm>
-            <a:off x="7707434" y="4441346"/>
+            <a:off x="7670858" y="4578506"/>
             <a:ext cx="914396" cy="461665"/>
           </a:xfrm>
           <a:prstGeom prst="rect">
@@ -5893,7 +5597,7 @@
         </p:nvSpPr>
         <p:spPr>
           <a:xfrm>
-            <a:off x="4305241" y="5270446"/>
+            <a:off x="4305241" y="5407606"/>
             <a:ext cx="881264" cy="461665"/>
           </a:xfrm>
           <a:prstGeom prst="rect">
@@ -5930,7 +5634,7 @@
         </p:nvSpPr>
         <p:spPr>
           <a:xfrm>
-            <a:off x="6376885" y="5270446"/>
+            <a:off x="6376885" y="5407606"/>
             <a:ext cx="881264" cy="461665"/>
           </a:xfrm>
           <a:prstGeom prst="rect">
@@ -5967,7 +5671,7 @@
         </p:nvSpPr>
         <p:spPr>
           <a:xfrm>
-            <a:off x="4256443" y="1252728"/>
+            <a:off x="4256443" y="1389888"/>
             <a:ext cx="1000531" cy="461665"/>
           </a:xfrm>
           <a:prstGeom prst="rect">
@@ -6004,7 +5708,7 @@
         </p:nvSpPr>
         <p:spPr>
           <a:xfrm>
-            <a:off x="4257371" y="4383493"/>
+            <a:off x="4257371" y="4520653"/>
             <a:ext cx="1000531" cy="461665"/>
           </a:xfrm>
           <a:prstGeom prst="rect">
@@ -6043,7 +5747,7 @@
         </p:nvCxnSpPr>
         <p:spPr>
           <a:xfrm>
-            <a:off x="4745873" y="2346677"/>
+            <a:off x="4745873" y="2483837"/>
             <a:ext cx="0" cy="1417980"/>
           </a:xfrm>
           <a:prstGeom prst="straightConnector1">
@@ -6088,7 +5792,7 @@
         </p:nvCxnSpPr>
         <p:spPr>
           <a:xfrm>
-            <a:off x="6805155" y="2328015"/>
+            <a:off x="6805155" y="2465175"/>
             <a:ext cx="0" cy="1417980"/>
           </a:xfrm>
           <a:prstGeom prst="straightConnector1">
@@ -6131,7 +5835,7 @@
         </p:nvSpPr>
         <p:spPr>
           <a:xfrm>
-            <a:off x="4453905" y="1664758"/>
+            <a:off x="4453905" y="1801918"/>
             <a:ext cx="605608" cy="585407"/>
           </a:xfrm>
           <a:prstGeom prst="ellipse">
@@ -6185,7 +5889,7 @@
         </p:nvSpPr>
         <p:spPr>
           <a:xfrm>
-            <a:off x="6497935" y="1665495"/>
+            <a:off x="6497935" y="1802655"/>
             <a:ext cx="605608" cy="585407"/>
           </a:xfrm>
           <a:prstGeom prst="ellipse">
@@ -6239,7 +5943,7 @@
         </p:nvSpPr>
         <p:spPr>
           <a:xfrm>
-            <a:off x="4453905" y="3845409"/>
+            <a:off x="4453905" y="3982569"/>
             <a:ext cx="605608" cy="585407"/>
           </a:xfrm>
           <a:prstGeom prst="ellipse">
@@ -6295,7 +5999,7 @@
         </p:nvSpPr>
         <p:spPr>
           <a:xfrm>
-            <a:off x="6512630" y="3845409"/>
+            <a:off x="6512630" y="3982569"/>
             <a:ext cx="605608" cy="585407"/>
           </a:xfrm>
           <a:prstGeom prst="ellipse">
@@ -6351,8 +6055,8 @@
         </p:nvSpPr>
         <p:spPr>
           <a:xfrm>
-            <a:off x="493777" y="2876083"/>
-            <a:ext cx="3793134" cy="1200329"/>
+            <a:off x="493777" y="3013243"/>
+            <a:ext cx="3793134" cy="1015663"/>
           </a:xfrm>
           <a:prstGeom prst="rect">
             <a:avLst/>
@@ -6367,12 +6071,12 @@
           <a:p>
             <a:pPr algn="r"/>
             <a:r>
-              <a:rPr lang="en-US" sz="2400" dirty="0">
+              <a:rPr lang="en-US" sz="2000" dirty="0">
                 <a:solidFill>
                   <a:srgbClr val="4CA22E"/>
                 </a:solidFill>
               </a:rPr>
-              <a:t>Often the exact same thing (asset) is transferred twice in the opposite direction</a:t>
+              <a:t>Usually at both payments an asset is transferred in the opposite direction</a:t>
             </a:r>
           </a:p>
         </p:txBody>
@@ -6393,7 +6097,7 @@
         </p:nvCxnSpPr>
         <p:spPr>
           <a:xfrm>
-            <a:off x="6553921" y="2365339"/>
+            <a:off x="6553921" y="2502499"/>
             <a:ext cx="0" cy="1417980"/>
           </a:xfrm>
           <a:prstGeom prst="straightConnector1">
@@ -6439,7 +6143,7 @@
         </p:nvCxnSpPr>
         <p:spPr>
           <a:xfrm>
-            <a:off x="4475351" y="2337346"/>
+            <a:off x="4475351" y="2474506"/>
             <a:ext cx="0" cy="1417980"/>
           </a:xfrm>
           <a:prstGeom prst="straightConnector1">
@@ -6485,7 +6189,7 @@
         </p:nvCxnSpPr>
         <p:spPr>
           <a:xfrm>
-            <a:off x="4745873" y="2346677"/>
+            <a:off x="4745873" y="2483837"/>
             <a:ext cx="0" cy="1417980"/>
           </a:xfrm>
           <a:prstGeom prst="straightConnector1">
@@ -6528,7 +6232,7 @@
         </p:nvSpPr>
         <p:spPr>
           <a:xfrm>
-            <a:off x="4682061" y="2452120"/>
+            <a:off x="4682061" y="2589280"/>
             <a:ext cx="605608" cy="461665"/>
           </a:xfrm>
           <a:prstGeom prst="rect">
@@ -6564,7 +6268,7 @@
         </p:nvSpPr>
         <p:spPr>
           <a:xfrm>
-            <a:off x="2602612" y="2447584"/>
+            <a:off x="2602612" y="2584744"/>
             <a:ext cx="1674975" cy="461665"/>
           </a:xfrm>
           <a:prstGeom prst="rect">
@@ -6603,7 +6307,7 @@
         </p:nvCxnSpPr>
         <p:spPr>
           <a:xfrm>
-            <a:off x="6805155" y="2328015"/>
+            <a:off x="6805155" y="2465175"/>
             <a:ext cx="0" cy="1417980"/>
           </a:xfrm>
           <a:prstGeom prst="straightConnector1">
@@ -6646,7 +6350,7 @@
         </p:nvSpPr>
         <p:spPr>
           <a:xfrm>
-            <a:off x="6890876" y="2452121"/>
+            <a:off x="6890876" y="2589281"/>
             <a:ext cx="914396" cy="461665"/>
           </a:xfrm>
           <a:prstGeom prst="rect">
@@ -6669,10 +6373,10 @@
       </p:sp>
       <p:sp>
         <p:nvSpPr>
-          <p:cNvPr id="16" name="TextBox 15">
-            <a:extLst>
-              <a:ext uri="{FF2B5EF4-FFF2-40B4-BE49-F238E27FC236}">
-                <a16:creationId xmlns:a16="http://schemas.microsoft.com/office/drawing/2014/main" id="{405B1429-A763-D7D6-3F26-A02D3AFB6FEA}"/>
+          <p:cNvPr id="6" name="TextBox 5">
+            <a:extLst>
+              <a:ext uri="{FF2B5EF4-FFF2-40B4-BE49-F238E27FC236}">
+                <a16:creationId xmlns:a16="http://schemas.microsoft.com/office/drawing/2014/main" id="{6BE78319-9CEF-6BCB-4E4E-54FA88698FD0}"/>
               </a:ext>
             </a:extLst>
           </p:cNvPr>
@@ -6681,8 +6385,8 @@
         </p:nvSpPr>
         <p:spPr>
           <a:xfrm>
-            <a:off x="8570402" y="2889510"/>
-            <a:ext cx="2663390" cy="830997"/>
+            <a:off x="8001002" y="2584743"/>
+            <a:ext cx="3232790" cy="461665"/>
           </a:xfrm>
           <a:prstGeom prst="rect">
             <a:avLst/>
@@ -6697,83 +6401,82 @@
           <a:p>
             <a:pPr algn="r"/>
             <a:r>
-              <a:rPr lang="en-US" sz="2400" dirty="0">
+              <a:rPr lang="en-US" sz="2400" dirty="0"/>
+              <a:t>q : 1-year simple rate</a:t>
+            </a:r>
+          </a:p>
+        </p:txBody>
+      </p:sp>
+      <p:sp>
+        <p:nvSpPr>
+          <p:cNvPr id="7" name="TextBox 6">
+            <a:extLst>
+              <a:ext uri="{FF2B5EF4-FFF2-40B4-BE49-F238E27FC236}">
+                <a16:creationId xmlns:a16="http://schemas.microsoft.com/office/drawing/2014/main" id="{3C6218BF-1CC9-12F5-BCDC-5FE2A06424A6}"/>
+              </a:ext>
+            </a:extLst>
+          </p:cNvPr>
+          <p:cNvSpPr txBox="1"/>
+          <p:nvPr/>
+        </p:nvSpPr>
+        <p:spPr>
+          <a:xfrm>
+            <a:off x="597933" y="1409021"/>
+            <a:ext cx="1210061" cy="461665"/>
+          </a:xfrm>
+          <a:prstGeom prst="rect">
+            <a:avLst/>
+          </a:prstGeom>
+          <a:noFill/>
+        </p:spPr>
+        <p:txBody>
+          <a:bodyPr wrap="square" rtlCol="0">
+            <a:spAutoFit/>
+          </a:bodyPr>
+          <a:lstStyle/>
+          <a:p>
+            <a:r>
+              <a:rPr lang="en-US" sz="2400" b="1" dirty="0"/>
+              <a:t>Asset</a:t>
+            </a:r>
+          </a:p>
+        </p:txBody>
+      </p:sp>
+      <p:sp>
+        <p:nvSpPr>
+          <p:cNvPr id="5" name="TextBox 4">
+            <a:extLst>
+              <a:ext uri="{FF2B5EF4-FFF2-40B4-BE49-F238E27FC236}">
+                <a16:creationId xmlns:a16="http://schemas.microsoft.com/office/drawing/2014/main" id="{405B1429-A763-D7D6-3F26-A02D3AFB6FEA}"/>
+              </a:ext>
+            </a:extLst>
+          </p:cNvPr>
+          <p:cNvSpPr txBox="1"/>
+          <p:nvPr/>
+        </p:nvSpPr>
+        <p:spPr>
+          <a:xfrm>
+            <a:off x="562166" y="1739901"/>
+            <a:ext cx="3609346" cy="400110"/>
+          </a:xfrm>
+          <a:prstGeom prst="rect">
+            <a:avLst/>
+          </a:prstGeom>
+          <a:noFill/>
+        </p:spPr>
+        <p:txBody>
+          <a:bodyPr wrap="square" rtlCol="0">
+            <a:spAutoFit/>
+          </a:bodyPr>
+          <a:lstStyle/>
+          <a:p>
+            <a:r>
+              <a:rPr lang="en-US" sz="2000" dirty="0">
                 <a:solidFill>
                   <a:srgbClr val="4CA22E"/>
                 </a:solidFill>
               </a:rPr>
-              <a:t>asset : something that has value</a:t>
-            </a:r>
-          </a:p>
-        </p:txBody>
-      </p:sp>
-      <p:sp>
-        <p:nvSpPr>
-          <p:cNvPr id="6" name="TextBox 5">
-            <a:extLst>
-              <a:ext uri="{FF2B5EF4-FFF2-40B4-BE49-F238E27FC236}">
-                <a16:creationId xmlns:a16="http://schemas.microsoft.com/office/drawing/2014/main" id="{6BE78319-9CEF-6BCB-4E4E-54FA88698FD0}"/>
-              </a:ext>
-            </a:extLst>
-          </p:cNvPr>
-          <p:cNvSpPr txBox="1"/>
-          <p:nvPr/>
-        </p:nvSpPr>
-        <p:spPr>
-          <a:xfrm>
-            <a:off x="8001002" y="2447583"/>
-            <a:ext cx="3232790" cy="461665"/>
-          </a:xfrm>
-          <a:prstGeom prst="rect">
-            <a:avLst/>
-          </a:prstGeom>
-          <a:noFill/>
-        </p:spPr>
-        <p:txBody>
-          <a:bodyPr wrap="square" rtlCol="0">
-            <a:spAutoFit/>
-          </a:bodyPr>
-          <a:lstStyle/>
-          <a:p>
-            <a:pPr algn="r"/>
-            <a:r>
-              <a:rPr lang="en-US" sz="2400" dirty="0"/>
-              <a:t>q : 1-year simple rate</a:t>
-            </a:r>
-          </a:p>
-        </p:txBody>
-      </p:sp>
-      <p:sp>
-        <p:nvSpPr>
-          <p:cNvPr id="7" name="TextBox 6">
-            <a:extLst>
-              <a:ext uri="{FF2B5EF4-FFF2-40B4-BE49-F238E27FC236}">
-                <a16:creationId xmlns:a16="http://schemas.microsoft.com/office/drawing/2014/main" id="{3C6218BF-1CC9-12F5-BCDC-5FE2A06424A6}"/>
-              </a:ext>
-            </a:extLst>
-          </p:cNvPr>
-          <p:cNvSpPr txBox="1"/>
-          <p:nvPr/>
-        </p:nvSpPr>
-        <p:spPr>
-          <a:xfrm>
-            <a:off x="625365" y="1602304"/>
-            <a:ext cx="1210061" cy="461665"/>
-          </a:xfrm>
-          <a:prstGeom prst="rect">
-            <a:avLst/>
-          </a:prstGeom>
-          <a:noFill/>
-        </p:spPr>
-        <p:txBody>
-          <a:bodyPr wrap="square" rtlCol="0">
-            <a:spAutoFit/>
-          </a:bodyPr>
-          <a:lstStyle/>
-          <a:p>
-            <a:r>
-              <a:rPr lang="en-US" sz="2400" b="1" dirty="0"/>
-              <a:t>Asset</a:t>
+              <a:t>something that has value</a:t>
             </a:r>
           </a:p>
         </p:txBody>
@@ -6862,7 +6565,7 @@
         <p:spPr>
           <a:xfrm>
             <a:off x="625365" y="1602304"/>
-            <a:ext cx="3782043" cy="830997"/>
+            <a:ext cx="1816083" cy="461665"/>
           </a:xfrm>
           <a:prstGeom prst="rect">
             <a:avLst/>
@@ -6877,59 +6580,18 @@
           <a:p>
             <a:r>
               <a:rPr lang="en-US" sz="2400" b="1" dirty="0"/>
-              <a:t>Risk</a:t>
-            </a:r>
-          </a:p>
-          <a:p>
-            <a:r>
-              <a:rPr lang="en-US" sz="2400" dirty="0">
-                <a:solidFill>
-                  <a:schemeClr val="accent6">
-                    <a:lumMod val="75000"/>
-                  </a:schemeClr>
-                </a:solidFill>
-              </a:rPr>
-              <a:t>( for a single asset )</a:t>
-            </a:r>
-          </a:p>
-        </p:txBody>
-      </p:sp>
-      <p:pic>
-        <p:nvPicPr>
-          <p:cNvPr id="6" name="Picture 5" descr="A black background with a black square&#10;&#10;Description automatically generated with medium confidence">
-            <a:extLst>
-              <a:ext uri="{FF2B5EF4-FFF2-40B4-BE49-F238E27FC236}">
-                <a16:creationId xmlns:a16="http://schemas.microsoft.com/office/drawing/2014/main" id="{5F37A9FC-81A9-B2AA-C4F1-14BB7D7E37D8}"/>
-              </a:ext>
-            </a:extLst>
-          </p:cNvPr>
-          <p:cNvPicPr>
-            <a:picLocks noChangeAspect="1"/>
-          </p:cNvPicPr>
-          <p:nvPr/>
-        </p:nvPicPr>
-        <p:blipFill>
-          <a:blip r:embed="rId2">
-            <a:extLst>
-              <a:ext uri="{28A0092B-C50C-407E-A947-70E740481C1C}">
-                <a14:useLocalDpi xmlns:a14="http://schemas.microsoft.com/office/drawing/2010/main" val="0"/>
-              </a:ext>
-            </a:extLst>
-          </a:blip>
-          <a:stretch>
-            <a:fillRect/>
-          </a:stretch>
-        </p:blipFill>
-        <p:spPr>
-          <a:xfrm>
-            <a:off x="6494599" y="2433301"/>
-            <a:ext cx="1143640" cy="1143640"/>
-          </a:xfrm>
-          <a:prstGeom prst="rect">
-            <a:avLst/>
-          </a:prstGeom>
-        </p:spPr>
-      </p:pic>
+              <a:t>Portfolio</a:t>
+            </a:r>
+            <a:endParaRPr lang="en-US" sz="2400" dirty="0">
+              <a:solidFill>
+                <a:schemeClr val="accent6">
+                  <a:lumMod val="75000"/>
+                </a:schemeClr>
+              </a:solidFill>
+            </a:endParaRPr>
+          </a:p>
+        </p:txBody>
+      </p:sp>
       <p:sp>
         <p:nvSpPr>
           <p:cNvPr id="7" name="TextBox 6">
@@ -6944,8 +6606,8 @@
         </p:nvSpPr>
         <p:spPr>
           <a:xfrm>
-            <a:off x="3864127" y="1586574"/>
-            <a:ext cx="6843497" cy="830997"/>
+            <a:off x="1056076" y="2505306"/>
+            <a:ext cx="9450380" cy="2677656"/>
           </a:xfrm>
           <a:prstGeom prst="rect">
             <a:avLst/>
@@ -6958,181 +6620,36 @@
           </a:bodyPr>
           <a:lstStyle/>
           <a:p>
-            <a:pPr algn="ctr"/>
             <a:r>
               <a:rPr lang="en-US" sz="2400" dirty="0"/>
-              <a:t>All contracts contain (sometimes just implicitly) numbers that will be known only in the future</a:t>
-            </a:r>
-          </a:p>
-        </p:txBody>
-      </p:sp>
-      <p:sp>
-        <p:nvSpPr>
-          <p:cNvPr id="8" name="TextBox 7">
-            <a:extLst>
-              <a:ext uri="{FF2B5EF4-FFF2-40B4-BE49-F238E27FC236}">
-                <a16:creationId xmlns:a16="http://schemas.microsoft.com/office/drawing/2014/main" id="{2F1A3146-9F4B-8F1D-A187-D4E6276FD0D4}"/>
-              </a:ext>
-            </a:extLst>
-          </p:cNvPr>
-          <p:cNvSpPr txBox="1"/>
-          <p:nvPr/>
-        </p:nvSpPr>
-        <p:spPr>
-          <a:xfrm>
-            <a:off x="342793" y="4024931"/>
-            <a:ext cx="6723626" cy="830997"/>
-          </a:xfrm>
-          <a:prstGeom prst="rect">
-            <a:avLst/>
-          </a:prstGeom>
-          <a:noFill/>
-        </p:spPr>
-        <p:txBody>
-          <a:bodyPr wrap="square" rtlCol="0">
-            <a:spAutoFit/>
-          </a:bodyPr>
-          <a:lstStyle/>
-          <a:p>
-            <a:pPr algn="ctr"/>
+              <a:t>A linear combination of assets</a:t>
+            </a:r>
+          </a:p>
+          <a:p>
+            <a:endParaRPr lang="en-US" sz="2400" dirty="0"/>
+          </a:p>
+          <a:p>
             <a:r>
               <a:rPr lang="en-US" sz="2400" dirty="0"/>
-              <a:t>Risk quantifies the </a:t>
-            </a:r>
-            <a:r>
-              <a:rPr lang="en-US" sz="2400" b="1" u="sng" dirty="0">
-                <a:solidFill>
-                  <a:srgbClr val="0070C0"/>
-                </a:solidFill>
-              </a:rPr>
-              <a:t>uncertainty</a:t>
-            </a:r>
+              <a:t>For example, 1 unit of MSFT and 1 unit of MOL</a:t>
+            </a:r>
+          </a:p>
+          <a:p>
+            <a:endParaRPr lang="en-US" sz="2400" dirty="0"/>
+          </a:p>
+          <a:p>
             <a:r>
               <a:rPr lang="en-US" sz="2400" dirty="0"/>
-              <a:t> of a </a:t>
-            </a:r>
-            <a:r>
-              <a:rPr lang="en-US" sz="2400" b="1" u="sng" dirty="0">
-                <a:solidFill>
-                  <a:srgbClr val="FF0000"/>
-                </a:solidFill>
-              </a:rPr>
-              <a:t>future</a:t>
-            </a:r>
+              <a:t>Normalization to sum of weights = 1 gives :   0.5 MSFT + 0.5 MOL</a:t>
+            </a:r>
+          </a:p>
+          <a:p>
+            <a:endParaRPr lang="en-US" sz="2400" dirty="0"/>
+          </a:p>
+          <a:p>
             <a:r>
               <a:rPr lang="en-US" sz="2400" dirty="0"/>
-              <a:t> value,</a:t>
-            </a:r>
-          </a:p>
-          <a:p>
-            <a:pPr algn="ctr"/>
-            <a:r>
-              <a:rPr lang="en-US" sz="2400" dirty="0"/>
-              <a:t>for example, the future price of an asset</a:t>
-            </a:r>
-          </a:p>
-        </p:txBody>
-      </p:sp>
-      <p:sp>
-        <p:nvSpPr>
-          <p:cNvPr id="9" name="TextBox 8">
-            <a:extLst>
-              <a:ext uri="{FF2B5EF4-FFF2-40B4-BE49-F238E27FC236}">
-                <a16:creationId xmlns:a16="http://schemas.microsoft.com/office/drawing/2014/main" id="{AF2F6895-CB52-5F4C-791B-7ED95DFC4E12}"/>
-              </a:ext>
-            </a:extLst>
-          </p:cNvPr>
-          <p:cNvSpPr txBox="1"/>
-          <p:nvPr/>
-        </p:nvSpPr>
-        <p:spPr>
-          <a:xfrm>
-            <a:off x="8034528" y="4024930"/>
-            <a:ext cx="3670923" cy="830997"/>
-          </a:xfrm>
-          <a:prstGeom prst="rect">
-            <a:avLst/>
-          </a:prstGeom>
-          <a:noFill/>
-        </p:spPr>
-        <p:txBody>
-          <a:bodyPr wrap="square" rtlCol="0">
-            <a:spAutoFit/>
-          </a:bodyPr>
-          <a:lstStyle/>
-          <a:p>
-            <a:pPr algn="ctr"/>
-            <a:r>
-              <a:rPr lang="en-US" sz="2400" dirty="0"/>
-              <a:t>We don’t know the future, but we can </a:t>
-            </a:r>
-            <a:r>
-              <a:rPr lang="en-US" sz="2400" b="1" u="sng" dirty="0">
-                <a:solidFill>
-                  <a:srgbClr val="FF0000"/>
-                </a:solidFill>
-              </a:rPr>
-              <a:t>forecast</a:t>
-            </a:r>
-            <a:r>
-              <a:rPr lang="en-US" sz="2400" dirty="0"/>
-              <a:t> </a:t>
-            </a:r>
-          </a:p>
-        </p:txBody>
-      </p:sp>
-      <p:sp>
-        <p:nvSpPr>
-          <p:cNvPr id="11" name="TextBox 10">
-            <a:extLst>
-              <a:ext uri="{FF2B5EF4-FFF2-40B4-BE49-F238E27FC236}">
-                <a16:creationId xmlns:a16="http://schemas.microsoft.com/office/drawing/2014/main" id="{FEA23696-5BED-D3FC-9814-E7C90830D546}"/>
-              </a:ext>
-            </a:extLst>
-          </p:cNvPr>
-          <p:cNvSpPr txBox="1"/>
-          <p:nvPr/>
-        </p:nvSpPr>
-        <p:spPr>
-          <a:xfrm>
-            <a:off x="2024397" y="5366845"/>
-            <a:ext cx="7265907" cy="830997"/>
-          </a:xfrm>
-          <a:prstGeom prst="rect">
-            <a:avLst/>
-          </a:prstGeom>
-          <a:noFill/>
-        </p:spPr>
-        <p:txBody>
-          <a:bodyPr wrap="square" rtlCol="0">
-            <a:spAutoFit/>
-          </a:bodyPr>
-          <a:lstStyle/>
-          <a:p>
-            <a:pPr algn="ctr"/>
-            <a:r>
-              <a:rPr lang="en-US" sz="2400" dirty="0"/>
-              <a:t>A simple forecast for the uncertainty of an asset’s future price is the same asset’s </a:t>
-            </a:r>
-            <a:r>
-              <a:rPr lang="en-US" sz="2400" b="1" u="sng" dirty="0">
-                <a:solidFill>
-                  <a:srgbClr val="FF0000"/>
-                </a:solidFill>
-              </a:rPr>
-              <a:t>past</a:t>
-            </a:r>
-            <a:r>
-              <a:rPr lang="en-US" sz="2400" dirty="0"/>
-              <a:t> </a:t>
-            </a:r>
-            <a:r>
-              <a:rPr lang="en-US" sz="2400" b="1" u="sng" dirty="0">
-                <a:solidFill>
-                  <a:srgbClr val="0070C0"/>
-                </a:solidFill>
-              </a:rPr>
-              <a:t>volatility</a:t>
+              <a:t>In this presentation :  only positive weights</a:t>
             </a:r>
           </a:p>
         </p:txBody>
@@ -7211,7 +6728,7 @@
           <p:cNvPr id="3" name="TextBox 2">
             <a:extLst>
               <a:ext uri="{FF2B5EF4-FFF2-40B4-BE49-F238E27FC236}">
-                <a16:creationId xmlns:a16="http://schemas.microsoft.com/office/drawing/2014/main" id="{688D616B-8979-3A02-FC3B-CEA112A0AB0D}"/>
+                <a16:creationId xmlns:a16="http://schemas.microsoft.com/office/drawing/2014/main" id="{7F8B13E4-29B3-5435-324C-4149E3AE4146}"/>
               </a:ext>
             </a:extLst>
           </p:cNvPr>
@@ -7221,7 +6738,7 @@
         <p:spPr>
           <a:xfrm>
             <a:off x="625365" y="1602304"/>
-            <a:ext cx="1673887" cy="461665"/>
+            <a:ext cx="3782043" cy="830997"/>
           </a:xfrm>
           <a:prstGeom prst="rect">
             <a:avLst/>
@@ -7236,17 +6753,65 @@
           <a:p>
             <a:r>
               <a:rPr lang="en-US" sz="2400" b="1" dirty="0"/>
-              <a:t>Portfolio</a:t>
-            </a:r>
-          </a:p>
-        </p:txBody>
-      </p:sp>
-      <p:sp>
-        <p:nvSpPr>
-          <p:cNvPr id="4" name="TextBox 3">
-            <a:extLst>
-              <a:ext uri="{FF2B5EF4-FFF2-40B4-BE49-F238E27FC236}">
-                <a16:creationId xmlns:a16="http://schemas.microsoft.com/office/drawing/2014/main" id="{354FA2B6-0E71-6714-6C96-99036DB2AE98}"/>
+              <a:t>Risk</a:t>
+            </a:r>
+          </a:p>
+          <a:p>
+            <a:r>
+              <a:rPr lang="en-US" sz="2400" dirty="0">
+                <a:solidFill>
+                  <a:schemeClr val="accent6">
+                    <a:lumMod val="75000"/>
+                  </a:schemeClr>
+                </a:solidFill>
+              </a:rPr>
+              <a:t>( for a single asset )</a:t>
+            </a:r>
+          </a:p>
+        </p:txBody>
+      </p:sp>
+      <p:pic>
+        <p:nvPicPr>
+          <p:cNvPr id="6" name="Picture 5" descr="A black background with a black square&#10;&#10;Description automatically generated with medium confidence">
+            <a:extLst>
+              <a:ext uri="{FF2B5EF4-FFF2-40B4-BE49-F238E27FC236}">
+                <a16:creationId xmlns:a16="http://schemas.microsoft.com/office/drawing/2014/main" id="{5F37A9FC-81A9-B2AA-C4F1-14BB7D7E37D8}"/>
+              </a:ext>
+            </a:extLst>
+          </p:cNvPr>
+          <p:cNvPicPr>
+            <a:picLocks noChangeAspect="1"/>
+          </p:cNvPicPr>
+          <p:nvPr/>
+        </p:nvPicPr>
+        <p:blipFill>
+          <a:blip r:embed="rId2">
+            <a:extLst>
+              <a:ext uri="{28A0092B-C50C-407E-A947-70E740481C1C}">
+                <a14:useLocalDpi xmlns:a14="http://schemas.microsoft.com/office/drawing/2010/main" val="0"/>
+              </a:ext>
+            </a:extLst>
+          </a:blip>
+          <a:stretch>
+            <a:fillRect/>
+          </a:stretch>
+        </p:blipFill>
+        <p:spPr>
+          <a:xfrm>
+            <a:off x="5922779" y="1335492"/>
+            <a:ext cx="1143640" cy="1143640"/>
+          </a:xfrm>
+          <a:prstGeom prst="rect">
+            <a:avLst/>
+          </a:prstGeom>
+        </p:spPr>
+      </p:pic>
+      <p:sp>
+        <p:nvSpPr>
+          <p:cNvPr id="7" name="TextBox 6">
+            <a:extLst>
+              <a:ext uri="{FF2B5EF4-FFF2-40B4-BE49-F238E27FC236}">
+                <a16:creationId xmlns:a16="http://schemas.microsoft.com/office/drawing/2014/main" id="{5C3840BA-8FB1-4AF5-7AAD-844E0460CFB4}"/>
               </a:ext>
             </a:extLst>
           </p:cNvPr>
@@ -7255,8 +6820,8 @@
         </p:nvSpPr>
         <p:spPr>
           <a:xfrm>
-            <a:off x="1203020" y="2363609"/>
-            <a:ext cx="6149502" cy="461665"/>
+            <a:off x="6834825" y="1444250"/>
+            <a:ext cx="5266944" cy="830997"/>
           </a:xfrm>
           <a:prstGeom prst="rect">
             <a:avLst/>
@@ -7269,20 +6834,27 @@
           </a:bodyPr>
           <a:lstStyle/>
           <a:p>
-            <a:r>
-              <a:rPr lang="en-US" sz="2400"/>
-              <a:t>A linear combination of (financial) assets</a:t>
-            </a:r>
-            <a:endParaRPr lang="en-US" sz="2400" dirty="0"/>
-          </a:p>
-        </p:txBody>
-      </p:sp>
-      <p:sp>
-        <p:nvSpPr>
-          <p:cNvPr id="5" name="TextBox 4">
-            <a:extLst>
-              <a:ext uri="{FF2B5EF4-FFF2-40B4-BE49-F238E27FC236}">
-                <a16:creationId xmlns:a16="http://schemas.microsoft.com/office/drawing/2014/main" id="{67AEE8D2-968F-3D97-9173-5B59FF60FB34}"/>
+            <a:pPr algn="ctr"/>
+            <a:r>
+              <a:rPr lang="en-US" sz="2400" dirty="0"/>
+              <a:t>Any contract contains numbers</a:t>
+            </a:r>
+          </a:p>
+          <a:p>
+            <a:pPr algn="ctr"/>
+            <a:r>
+              <a:rPr lang="en-US" sz="2400" dirty="0"/>
+              <a:t>that will be known only in the future</a:t>
+            </a:r>
+          </a:p>
+        </p:txBody>
+      </p:sp>
+      <p:sp>
+        <p:nvSpPr>
+          <p:cNvPr id="8" name="TextBox 7">
+            <a:extLst>
+              <a:ext uri="{FF2B5EF4-FFF2-40B4-BE49-F238E27FC236}">
+                <a16:creationId xmlns:a16="http://schemas.microsoft.com/office/drawing/2014/main" id="{2F1A3146-9F4B-8F1D-A187-D4E6276FD0D4}"/>
               </a:ext>
             </a:extLst>
           </p:cNvPr>
@@ -7291,8 +6863,8 @@
         </p:nvSpPr>
         <p:spPr>
           <a:xfrm>
-            <a:off x="1203020" y="2894081"/>
-            <a:ext cx="3956809" cy="461665"/>
+            <a:off x="342793" y="3193931"/>
+            <a:ext cx="6723626" cy="830997"/>
           </a:xfrm>
           <a:prstGeom prst="rect">
             <a:avLst/>
@@ -7305,19 +6877,51 @@
           </a:bodyPr>
           <a:lstStyle/>
           <a:p>
+            <a:pPr algn="ctr"/>
             <a:r>
               <a:rPr lang="en-US" sz="2400" dirty="0"/>
-              <a:t>In math: sum of weights is 1</a:t>
-            </a:r>
-          </a:p>
-        </p:txBody>
-      </p:sp>
-      <p:sp>
-        <p:nvSpPr>
-          <p:cNvPr id="8" name="TextBox 7">
-            <a:extLst>
-              <a:ext uri="{FF2B5EF4-FFF2-40B4-BE49-F238E27FC236}">
-                <a16:creationId xmlns:a16="http://schemas.microsoft.com/office/drawing/2014/main" id="{4F957182-C294-642B-A68B-6A6060964C99}"/>
+              <a:t>Risk quantifies the </a:t>
+            </a:r>
+            <a:r>
+              <a:rPr lang="en-US" sz="2400" b="1" u="sng" dirty="0">
+                <a:solidFill>
+                  <a:srgbClr val="0070C0"/>
+                </a:solidFill>
+              </a:rPr>
+              <a:t>uncertainty</a:t>
+            </a:r>
+            <a:r>
+              <a:rPr lang="en-US" sz="2400" dirty="0"/>
+              <a:t> of a </a:t>
+            </a:r>
+            <a:r>
+              <a:rPr lang="en-US" sz="2400" b="1" u="sng" dirty="0">
+                <a:solidFill>
+                  <a:srgbClr val="FF0000"/>
+                </a:solidFill>
+              </a:rPr>
+              <a:t>future</a:t>
+            </a:r>
+            <a:r>
+              <a:rPr lang="en-US" sz="2400" dirty="0"/>
+              <a:t> value,</a:t>
+            </a:r>
+          </a:p>
+          <a:p>
+            <a:pPr algn="ctr"/>
+            <a:r>
+              <a:rPr lang="en-US" sz="2400" dirty="0"/>
+              <a:t>for example, the future price of an asset</a:t>
+            </a:r>
+          </a:p>
+        </p:txBody>
+      </p:sp>
+      <p:sp>
+        <p:nvSpPr>
+          <p:cNvPr id="9" name="TextBox 8">
+            <a:extLst>
+              <a:ext uri="{FF2B5EF4-FFF2-40B4-BE49-F238E27FC236}">
+                <a16:creationId xmlns:a16="http://schemas.microsoft.com/office/drawing/2014/main" id="{AF2F6895-CB52-5F4C-791B-7ED95DFC4E12}"/>
               </a:ext>
             </a:extLst>
           </p:cNvPr>
@@ -7326,8 +6930,8 @@
         </p:nvSpPr>
         <p:spPr>
           <a:xfrm>
-            <a:off x="5302269" y="4343070"/>
-            <a:ext cx="3956809" cy="461665"/>
+            <a:off x="7732776" y="4024928"/>
+            <a:ext cx="3670923" cy="830997"/>
           </a:xfrm>
           <a:prstGeom prst="rect">
             <a:avLst/>
@@ -7340,17 +6944,218 @@
           </a:bodyPr>
           <a:lstStyle/>
           <a:p>
+            <a:pPr algn="ctr"/>
             <a:r>
               <a:rPr lang="en-US" sz="2400" dirty="0"/>
-              <a:t>Start notations here !!!</a:t>
-            </a:r>
-          </a:p>
-        </p:txBody>
-      </p:sp>
+              <a:t>We don’t know the future, but we can </a:t>
+            </a:r>
+            <a:r>
+              <a:rPr lang="en-US" sz="2400" b="1" u="sng" dirty="0">
+                <a:solidFill>
+                  <a:srgbClr val="FF0000"/>
+                </a:solidFill>
+              </a:rPr>
+              <a:t>forecast</a:t>
+            </a:r>
+            <a:r>
+              <a:rPr lang="en-US" sz="2400" dirty="0"/>
+              <a:t> </a:t>
+            </a:r>
+          </a:p>
+        </p:txBody>
+      </p:sp>
+      <p:sp>
+        <p:nvSpPr>
+          <p:cNvPr id="11" name="TextBox 10">
+            <a:extLst>
+              <a:ext uri="{FF2B5EF4-FFF2-40B4-BE49-F238E27FC236}">
+                <a16:creationId xmlns:a16="http://schemas.microsoft.com/office/drawing/2014/main" id="{FEA23696-5BED-D3FC-9814-E7C90830D546}"/>
+              </a:ext>
+            </a:extLst>
+          </p:cNvPr>
+          <p:cNvSpPr txBox="1"/>
+          <p:nvPr/>
+        </p:nvSpPr>
+        <p:spPr>
+          <a:xfrm>
+            <a:off x="71652" y="5255696"/>
+            <a:ext cx="7265907" cy="830997"/>
+          </a:xfrm>
+          <a:prstGeom prst="rect">
+            <a:avLst/>
+          </a:prstGeom>
+          <a:noFill/>
+        </p:spPr>
+        <p:txBody>
+          <a:bodyPr wrap="square" rtlCol="0">
+            <a:spAutoFit/>
+          </a:bodyPr>
+          <a:lstStyle/>
+          <a:p>
+            <a:pPr algn="ctr"/>
+            <a:r>
+              <a:rPr lang="en-US" sz="2400" dirty="0"/>
+              <a:t>A simple forecast for the uncertainty of an asset’s future price is the same asset’s </a:t>
+            </a:r>
+            <a:r>
+              <a:rPr lang="en-US" sz="2400" b="1" u="sng" dirty="0">
+                <a:solidFill>
+                  <a:srgbClr val="FF0000"/>
+                </a:solidFill>
+              </a:rPr>
+              <a:t>past</a:t>
+            </a:r>
+            <a:r>
+              <a:rPr lang="en-US" sz="2400" dirty="0"/>
+              <a:t> </a:t>
+            </a:r>
+            <a:r>
+              <a:rPr lang="en-US" sz="2400" b="1" u="sng" dirty="0">
+                <a:solidFill>
+                  <a:srgbClr val="0070C0"/>
+                </a:solidFill>
+              </a:rPr>
+              <a:t>volatility</a:t>
+            </a:r>
+          </a:p>
+        </p:txBody>
+      </p:sp>
+      <p:cxnSp>
+        <p:nvCxnSpPr>
+          <p:cNvPr id="5" name="Straight Arrow Connector 4">
+            <a:extLst>
+              <a:ext uri="{FF2B5EF4-FFF2-40B4-BE49-F238E27FC236}">
+                <a16:creationId xmlns:a16="http://schemas.microsoft.com/office/drawing/2014/main" id="{808806F7-3A2D-C22E-D25B-42BD502567CD}"/>
+              </a:ext>
+            </a:extLst>
+          </p:cNvPr>
+          <p:cNvCxnSpPr>
+            <a:cxnSpLocks/>
+          </p:cNvCxnSpPr>
+          <p:nvPr/>
+        </p:nvCxnSpPr>
+        <p:spPr>
+          <a:xfrm flipH="1">
+            <a:off x="5187820" y="2486990"/>
+            <a:ext cx="455894" cy="446463"/>
+          </a:xfrm>
+          <a:prstGeom prst="straightConnector1">
+            <a:avLst/>
+          </a:prstGeom>
+          <a:ln w="25400">
+            <a:solidFill>
+              <a:schemeClr val="tx1"/>
+            </a:solidFill>
+            <a:tailEnd type="arrow" w="lg" len="lg"/>
+          </a:ln>
+        </p:spPr>
+        <p:style>
+          <a:lnRef idx="2">
+            <a:schemeClr val="accent1"/>
+          </a:lnRef>
+          <a:fillRef idx="0">
+            <a:schemeClr val="accent1"/>
+          </a:fillRef>
+          <a:effectRef idx="1">
+            <a:schemeClr val="accent1"/>
+          </a:effectRef>
+          <a:fontRef idx="minor">
+            <a:schemeClr val="tx1"/>
+          </a:fontRef>
+        </p:style>
+      </p:cxnSp>
+      <p:cxnSp>
+        <p:nvCxnSpPr>
+          <p:cNvPr id="10" name="Straight Arrow Connector 9">
+            <a:extLst>
+              <a:ext uri="{FF2B5EF4-FFF2-40B4-BE49-F238E27FC236}">
+                <a16:creationId xmlns:a16="http://schemas.microsoft.com/office/drawing/2014/main" id="{FF60D7FF-C193-A1D1-B180-131B59E7F2EA}"/>
+              </a:ext>
+            </a:extLst>
+          </p:cNvPr>
+          <p:cNvCxnSpPr>
+            <a:cxnSpLocks/>
+          </p:cNvCxnSpPr>
+          <p:nvPr/>
+        </p:nvCxnSpPr>
+        <p:spPr>
+          <a:xfrm>
+            <a:off x="7066419" y="3834882"/>
+            <a:ext cx="500708" cy="345232"/>
+          </a:xfrm>
+          <a:prstGeom prst="straightConnector1">
+            <a:avLst/>
+          </a:prstGeom>
+          <a:ln w="25400">
+            <a:solidFill>
+              <a:schemeClr val="tx1"/>
+            </a:solidFill>
+            <a:tailEnd type="arrow" w="lg" len="lg"/>
+          </a:ln>
+        </p:spPr>
+        <p:style>
+          <a:lnRef idx="2">
+            <a:schemeClr val="accent1"/>
+          </a:lnRef>
+          <a:fillRef idx="0">
+            <a:schemeClr val="accent1"/>
+          </a:fillRef>
+          <a:effectRef idx="1">
+            <a:schemeClr val="accent1"/>
+          </a:effectRef>
+          <a:fontRef idx="minor">
+            <a:schemeClr val="tx1"/>
+          </a:fontRef>
+        </p:style>
+      </p:cxnSp>
+      <p:cxnSp>
+        <p:nvCxnSpPr>
+          <p:cNvPr id="17" name="Straight Arrow Connector 16">
+            <a:extLst>
+              <a:ext uri="{FF2B5EF4-FFF2-40B4-BE49-F238E27FC236}">
+                <a16:creationId xmlns:a16="http://schemas.microsoft.com/office/drawing/2014/main" id="{89A65010-687E-41A4-0660-85008B9EB7BC}"/>
+              </a:ext>
+            </a:extLst>
+          </p:cNvPr>
+          <p:cNvCxnSpPr>
+            <a:cxnSpLocks/>
+          </p:cNvCxnSpPr>
+          <p:nvPr/>
+        </p:nvCxnSpPr>
+        <p:spPr>
+          <a:xfrm flipH="1">
+            <a:off x="7220742" y="4821065"/>
+            <a:ext cx="512034" cy="399771"/>
+          </a:xfrm>
+          <a:prstGeom prst="straightConnector1">
+            <a:avLst/>
+          </a:prstGeom>
+          <a:ln w="25400">
+            <a:solidFill>
+              <a:schemeClr val="tx1"/>
+            </a:solidFill>
+            <a:tailEnd type="arrow" w="lg" len="lg"/>
+          </a:ln>
+        </p:spPr>
+        <p:style>
+          <a:lnRef idx="2">
+            <a:schemeClr val="accent1"/>
+          </a:lnRef>
+          <a:fillRef idx="0">
+            <a:schemeClr val="accent1"/>
+          </a:fillRef>
+          <a:effectRef idx="1">
+            <a:schemeClr val="accent1"/>
+          </a:effectRef>
+          <a:fontRef idx="minor">
+            <a:schemeClr val="tx1"/>
+          </a:fontRef>
+        </p:style>
+      </p:cxnSp>
     </p:spTree>
     <p:extLst>
       <p:ext uri="{BB962C8B-B14F-4D97-AF65-F5344CB8AC3E}">
-        <p14:creationId xmlns:p14="http://schemas.microsoft.com/office/powerpoint/2010/main" val="684952077"/>
+        <p14:creationId xmlns:p14="http://schemas.microsoft.com/office/powerpoint/2010/main" val="489962663"/>
       </p:ext>
     </p:extLst>
   </p:cSld>
@@ -7431,7 +7236,7 @@
         <p:spPr>
           <a:xfrm>
             <a:off x="625366" y="1602304"/>
-            <a:ext cx="1334064" cy="461665"/>
+            <a:ext cx="2145826" cy="830997"/>
           </a:xfrm>
           <a:prstGeom prst="rect">
             <a:avLst/>
@@ -7446,7 +7251,7 @@
           <a:p>
             <a:r>
               <a:rPr lang="en-US" sz="2400" b="1" dirty="0"/>
-              <a:t>What ?</a:t>
+              <a:t>Why forecast return ?</a:t>
             </a:r>
           </a:p>
         </p:txBody>
@@ -7481,7 +7286,15 @@
           <a:p>
             <a:r>
               <a:rPr lang="en-US" sz="2400" dirty="0"/>
-              <a:t>What’s the goal here ?</a:t>
+              <a:t>q allows discounting, </a:t>
+            </a:r>
+            <a:r>
+              <a:rPr lang="en-US" sz="2400" dirty="0" err="1"/>
+              <a:t>eg</a:t>
+            </a:r>
+            <a:r>
+              <a:rPr lang="en-US" sz="2400" dirty="0"/>
+              <a:t>, bond pricing</a:t>
             </a:r>
           </a:p>
         </p:txBody>

</xml_diff>

<commit_message>
updated up to Langrange multiplier outline slide
</commit_message>
<xml_diff>
--- a/MMS_2024_09_10/Farkas_2024_09_10.pptx
+++ b/MMS_2024_09_10/Farkas_2024_09_10.pptx
@@ -14,6 +14,8 @@
     <p:sldId id="263" r:id="rId8"/>
     <p:sldId id="270" r:id="rId9"/>
     <p:sldId id="267" r:id="rId10"/>
+    <p:sldId id="271" r:id="rId11"/>
+    <p:sldId id="272" r:id="rId12"/>
   </p:sldIdLst>
   <p:sldSz cx="12192000" cy="6858000"/>
   <p:notesSz cx="6858000" cy="9144000"/>
@@ -3639,6 +3641,1390 @@
 </p:sld>
 </file>
 
+<file path=ppt/slides/slide10.xml><?xml version="1.0" encoding="utf-8"?>
+<p:sld xmlns:a="http://schemas.openxmlformats.org/drawingml/2006/main" xmlns:r="http://schemas.openxmlformats.org/officeDocument/2006/relationships" xmlns:p="http://schemas.openxmlformats.org/presentationml/2006/main">
+  <p:cSld>
+    <p:spTree>
+      <p:nvGrpSpPr>
+        <p:cNvPr id="1" name=""/>
+        <p:cNvGrpSpPr/>
+        <p:nvPr/>
+      </p:nvGrpSpPr>
+      <p:grpSpPr>
+        <a:xfrm>
+          <a:off x="0" y="0"/>
+          <a:ext cx="0" cy="0"/>
+          <a:chOff x="0" y="0"/>
+          <a:chExt cx="0" cy="0"/>
+        </a:xfrm>
+      </p:grpSpPr>
+      <p:sp>
+        <p:nvSpPr>
+          <p:cNvPr id="3" name="TextBox 2">
+            <a:extLst>
+              <a:ext uri="{FF2B5EF4-FFF2-40B4-BE49-F238E27FC236}">
+                <a16:creationId xmlns:a16="http://schemas.microsoft.com/office/drawing/2014/main" id="{688D616B-8979-3A02-FC3B-CEA112A0AB0D}"/>
+              </a:ext>
+            </a:extLst>
+          </p:cNvPr>
+          <p:cNvSpPr txBox="1"/>
+          <p:nvPr/>
+        </p:nvSpPr>
+        <p:spPr>
+          <a:xfrm>
+            <a:off x="625365" y="1482384"/>
+            <a:ext cx="4161239" cy="1938992"/>
+          </a:xfrm>
+          <a:prstGeom prst="rect">
+            <a:avLst/>
+          </a:prstGeom>
+          <a:noFill/>
+        </p:spPr>
+        <p:txBody>
+          <a:bodyPr wrap="square" rtlCol="0">
+            <a:spAutoFit/>
+          </a:bodyPr>
+          <a:lstStyle/>
+          <a:p>
+            <a:r>
+              <a:rPr lang="hu-HU" sz="2400" i="1" dirty="0"/>
+              <a:t>N </a:t>
+            </a:r>
+            <a:r>
+              <a:rPr lang="hu-HU" sz="2400" dirty="0"/>
+              <a:t> </a:t>
+            </a:r>
+            <a:r>
+              <a:rPr lang="hu-HU" sz="2400" b="1" dirty="0" err="1"/>
+              <a:t>risky</a:t>
+            </a:r>
+            <a:r>
+              <a:rPr lang="hu-HU" sz="2400" dirty="0"/>
+              <a:t>  </a:t>
+            </a:r>
+            <a:r>
+              <a:rPr lang="hu-HU" sz="2400" dirty="0" err="1"/>
+              <a:t>assets</a:t>
+            </a:r>
+            <a:r>
+              <a:rPr lang="hu-HU" sz="2400" dirty="0"/>
+              <a:t> :</a:t>
+            </a:r>
+          </a:p>
+          <a:p>
+            <a:endParaRPr lang="hu-HU" sz="2400" dirty="0"/>
+          </a:p>
+          <a:p>
+            <a:r>
+              <a:rPr lang="hu-HU" sz="2400" b="1" dirty="0" err="1"/>
+              <a:t>Variable</a:t>
+            </a:r>
+            <a:r>
+              <a:rPr lang="hu-HU" sz="2400" dirty="0"/>
+              <a:t>  </a:t>
+            </a:r>
+            <a:r>
+              <a:rPr lang="hu-HU" sz="2400" dirty="0" err="1"/>
+              <a:t>weights</a:t>
+            </a:r>
+            <a:r>
+              <a:rPr lang="hu-HU" sz="2400" dirty="0"/>
+              <a:t>  </a:t>
+            </a:r>
+            <a:r>
+              <a:rPr lang="hu-HU" sz="2400" i="1" dirty="0" err="1"/>
+              <a:t>w</a:t>
+            </a:r>
+            <a:r>
+              <a:rPr lang="hu-HU" sz="2400" i="1" baseline="-25000" dirty="0" err="1"/>
+              <a:t>i</a:t>
+            </a:r>
+            <a:r>
+              <a:rPr lang="hu-HU" sz="2400" dirty="0"/>
+              <a:t>        </a:t>
+            </a:r>
+            <a:r>
+              <a:rPr lang="en-US" sz="2400" dirty="0"/>
+              <a:t> </a:t>
+            </a:r>
+            <a:r>
+              <a:rPr lang="hu-HU" sz="2400" dirty="0"/>
+              <a:t>       </a:t>
+            </a:r>
+            <a:r>
+              <a:rPr lang="hu-HU" sz="2400" b="1" dirty="0"/>
+              <a:t>w</a:t>
+            </a:r>
+            <a:endParaRPr lang="hu-HU" sz="2400" i="1" baseline="-25000" dirty="0"/>
+          </a:p>
+          <a:p>
+            <a:r>
+              <a:rPr lang="hu-HU" sz="2400" b="1" dirty="0"/>
+              <a:t>Fixed</a:t>
+            </a:r>
+            <a:r>
+              <a:rPr lang="hu-HU" sz="2400" dirty="0"/>
+              <a:t>  </a:t>
+            </a:r>
+            <a:r>
+              <a:rPr lang="hu-HU" sz="2400" dirty="0" err="1"/>
+              <a:t>yearly</a:t>
+            </a:r>
+            <a:r>
+              <a:rPr lang="hu-HU" sz="2400" dirty="0"/>
+              <a:t> </a:t>
+            </a:r>
+            <a:r>
+              <a:rPr lang="hu-HU" sz="2400" dirty="0" err="1"/>
+              <a:t>returns</a:t>
+            </a:r>
+            <a:r>
+              <a:rPr lang="hu-HU" sz="2400" dirty="0"/>
+              <a:t>  </a:t>
+            </a:r>
+            <a:r>
+              <a:rPr lang="hu-HU" sz="2400" i="1" dirty="0" err="1"/>
+              <a:t>r</a:t>
+            </a:r>
+            <a:r>
+              <a:rPr lang="hu-HU" sz="2400" i="1" baseline="-25000" dirty="0" err="1"/>
+              <a:t>i</a:t>
+            </a:r>
+            <a:r>
+              <a:rPr lang="hu-HU" sz="2400" dirty="0"/>
+              <a:t>     </a:t>
+            </a:r>
+            <a:r>
+              <a:rPr lang="en-US" sz="2400" dirty="0"/>
+              <a:t> </a:t>
+            </a:r>
+            <a:r>
+              <a:rPr lang="hu-HU" sz="2400" dirty="0"/>
+              <a:t>       </a:t>
+            </a:r>
+            <a:r>
+              <a:rPr lang="hu-HU" sz="2400" b="1" dirty="0"/>
+              <a:t>r</a:t>
+            </a:r>
+            <a:endParaRPr lang="hu-HU" sz="2400" i="1" dirty="0"/>
+          </a:p>
+          <a:p>
+            <a:r>
+              <a:rPr lang="hu-HU" sz="2400" dirty="0"/>
+              <a:t>         and </a:t>
+            </a:r>
+            <a:r>
+              <a:rPr lang="hu-HU" sz="2400" dirty="0" err="1"/>
+              <a:t>covariance</a:t>
+            </a:r>
+            <a:r>
+              <a:rPr lang="hu-HU" sz="2400" dirty="0"/>
+              <a:t> </a:t>
+            </a:r>
+            <a:r>
+              <a:rPr lang="hu-HU" sz="2400" i="1" dirty="0" err="1"/>
+              <a:t>w</a:t>
+            </a:r>
+            <a:r>
+              <a:rPr lang="hu-HU" sz="2400" i="1" baseline="-25000" dirty="0" err="1"/>
+              <a:t>i</a:t>
+            </a:r>
+            <a:r>
+              <a:rPr lang="hu-HU" sz="2400" i="1" baseline="-25000" dirty="0"/>
+              <a:t> j</a:t>
+            </a:r>
+            <a:r>
+              <a:rPr lang="hu-HU" sz="2400" dirty="0"/>
+              <a:t>     </a:t>
+            </a:r>
+            <a:r>
+              <a:rPr lang="en-US" sz="2400" dirty="0"/>
+              <a:t>  </a:t>
+            </a:r>
+            <a:r>
+              <a:rPr lang="hu-HU" sz="2400" dirty="0"/>
+              <a:t>     </a:t>
+            </a:r>
+            <a:r>
+              <a:rPr lang="hu-HU" sz="2400" b="1" dirty="0"/>
+              <a:t>c</a:t>
+            </a:r>
+            <a:endParaRPr lang="hu-HU" sz="2400" b="1" i="1" dirty="0"/>
+          </a:p>
+        </p:txBody>
+      </p:sp>
+      <p:sp>
+        <p:nvSpPr>
+          <p:cNvPr id="6" name="TextBox 5">
+            <a:extLst>
+              <a:ext uri="{FF2B5EF4-FFF2-40B4-BE49-F238E27FC236}">
+                <a16:creationId xmlns:a16="http://schemas.microsoft.com/office/drawing/2014/main" id="{4B2B73C1-FD4B-9D9A-3377-037FB76AE0B4}"/>
+              </a:ext>
+            </a:extLst>
+          </p:cNvPr>
+          <p:cNvSpPr txBox="1"/>
+          <p:nvPr/>
+        </p:nvSpPr>
+        <p:spPr>
+          <a:xfrm>
+            <a:off x="628804" y="4083759"/>
+            <a:ext cx="4904249" cy="800219"/>
+          </a:xfrm>
+          <a:prstGeom prst="rect">
+            <a:avLst/>
+          </a:prstGeom>
+          <a:noFill/>
+        </p:spPr>
+        <p:txBody>
+          <a:bodyPr wrap="square" rtlCol="0">
+            <a:spAutoFit/>
+          </a:bodyPr>
+          <a:lstStyle/>
+          <a:p>
+            <a:r>
+              <a:rPr lang="en-US" sz="2800" dirty="0"/>
+              <a:t>What is the max q ?</a:t>
+            </a:r>
+          </a:p>
+          <a:p>
+            <a:r>
+              <a:rPr lang="en-US" dirty="0"/>
+              <a:t>( q does have a max, for example, q ≤ max </a:t>
+            </a:r>
+            <a:r>
+              <a:rPr lang="en-US" i="1" dirty="0" err="1"/>
+              <a:t>r</a:t>
+            </a:r>
+            <a:r>
+              <a:rPr lang="en-US" i="1" baseline="-25000" dirty="0" err="1"/>
+              <a:t>i</a:t>
+            </a:r>
+            <a:r>
+              <a:rPr lang="en-US" dirty="0"/>
+              <a:t> )</a:t>
+            </a:r>
+            <a:endParaRPr lang="en-US" i="1" baseline="-25000" dirty="0"/>
+          </a:p>
+        </p:txBody>
+      </p:sp>
+      <p:sp>
+        <p:nvSpPr>
+          <p:cNvPr id="4" name="TextBox 3">
+            <a:extLst>
+              <a:ext uri="{FF2B5EF4-FFF2-40B4-BE49-F238E27FC236}">
+                <a16:creationId xmlns:a16="http://schemas.microsoft.com/office/drawing/2014/main" id="{899C39C7-B679-392C-2FFF-3763D1F8D354}"/>
+              </a:ext>
+            </a:extLst>
+          </p:cNvPr>
+          <p:cNvSpPr txBox="1"/>
+          <p:nvPr/>
+        </p:nvSpPr>
+        <p:spPr>
+          <a:xfrm>
+            <a:off x="105100" y="156234"/>
+            <a:ext cx="12002814" cy="369332"/>
+          </a:xfrm>
+          <a:prstGeom prst="rect">
+            <a:avLst/>
+          </a:prstGeom>
+          <a:noFill/>
+        </p:spPr>
+        <p:txBody>
+          <a:bodyPr wrap="square" rtlCol="0">
+            <a:spAutoFit/>
+          </a:bodyPr>
+          <a:lstStyle/>
+          <a:p>
+            <a:r>
+              <a:rPr lang="en-US" dirty="0">
+                <a:solidFill>
+                  <a:schemeClr val="bg1"/>
+                </a:solidFill>
+              </a:rPr>
+              <a:t>Modern Portfolio Theory (MPT)</a:t>
+            </a:r>
+          </a:p>
+        </p:txBody>
+      </p:sp>
+      <p:sp>
+        <p:nvSpPr>
+          <p:cNvPr id="5" name="TextBox 4">
+            <a:extLst>
+              <a:ext uri="{FF2B5EF4-FFF2-40B4-BE49-F238E27FC236}">
+                <a16:creationId xmlns:a16="http://schemas.microsoft.com/office/drawing/2014/main" id="{BC1F729B-9ADF-0356-BAF9-0C203808C111}"/>
+              </a:ext>
+            </a:extLst>
+          </p:cNvPr>
+          <p:cNvSpPr txBox="1"/>
+          <p:nvPr/>
+        </p:nvSpPr>
+        <p:spPr>
+          <a:xfrm>
+            <a:off x="4764205" y="2252488"/>
+            <a:ext cx="1114081" cy="646331"/>
+          </a:xfrm>
+          <a:prstGeom prst="rect">
+            <a:avLst/>
+          </a:prstGeom>
+          <a:noFill/>
+        </p:spPr>
+        <p:txBody>
+          <a:bodyPr wrap="square" rtlCol="0">
+            <a:spAutoFit/>
+          </a:bodyPr>
+          <a:lstStyle/>
+          <a:p>
+            <a:pPr algn="ctr"/>
+            <a:r>
+              <a:rPr lang="en-US" dirty="0"/>
+              <a:t>row</a:t>
+            </a:r>
+          </a:p>
+          <a:p>
+            <a:pPr algn="ctr"/>
+            <a:r>
+              <a:rPr lang="en-US" dirty="0"/>
+              <a:t>vectors</a:t>
+            </a:r>
+          </a:p>
+        </p:txBody>
+      </p:sp>
+      <p:sp>
+        <p:nvSpPr>
+          <p:cNvPr id="7" name="TextBox 6">
+            <a:extLst>
+              <a:ext uri="{FF2B5EF4-FFF2-40B4-BE49-F238E27FC236}">
+                <a16:creationId xmlns:a16="http://schemas.microsoft.com/office/drawing/2014/main" id="{7C329C0C-1D2D-238A-9C16-B92928553D8C}"/>
+              </a:ext>
+            </a:extLst>
+          </p:cNvPr>
+          <p:cNvSpPr txBox="1"/>
+          <p:nvPr/>
+        </p:nvSpPr>
+        <p:spPr>
+          <a:xfrm>
+            <a:off x="4793368" y="3014720"/>
+            <a:ext cx="1114081" cy="369332"/>
+          </a:xfrm>
+          <a:prstGeom prst="rect">
+            <a:avLst/>
+          </a:prstGeom>
+          <a:noFill/>
+        </p:spPr>
+        <p:txBody>
+          <a:bodyPr wrap="square" rtlCol="0">
+            <a:spAutoFit/>
+          </a:bodyPr>
+          <a:lstStyle/>
+          <a:p>
+            <a:pPr algn="ctr"/>
+            <a:r>
+              <a:rPr lang="en-US" dirty="0"/>
+              <a:t>matrix</a:t>
+            </a:r>
+          </a:p>
+        </p:txBody>
+      </p:sp>
+      <p:sp>
+        <p:nvSpPr>
+          <p:cNvPr id="8" name="TextBox 7">
+            <a:extLst>
+              <a:ext uri="{FF2B5EF4-FFF2-40B4-BE49-F238E27FC236}">
+                <a16:creationId xmlns:a16="http://schemas.microsoft.com/office/drawing/2014/main" id="{B30C2699-09F8-818D-FA71-71B255BE64AE}"/>
+              </a:ext>
+            </a:extLst>
+          </p:cNvPr>
+          <p:cNvSpPr txBox="1"/>
+          <p:nvPr/>
+        </p:nvSpPr>
+        <p:spPr>
+          <a:xfrm>
+            <a:off x="625365" y="5346502"/>
+            <a:ext cx="5644806" cy="523220"/>
+          </a:xfrm>
+          <a:prstGeom prst="rect">
+            <a:avLst/>
+          </a:prstGeom>
+          <a:noFill/>
+        </p:spPr>
+        <p:txBody>
+          <a:bodyPr wrap="square" rtlCol="0">
+            <a:spAutoFit/>
+          </a:bodyPr>
+          <a:lstStyle/>
+          <a:p>
+            <a:r>
+              <a:rPr lang="en-US" sz="2800" dirty="0"/>
+              <a:t>Equivalently : What is the min </a:t>
+            </a:r>
+            <a:r>
+              <a:rPr lang="el-GR" sz="2800" dirty="0"/>
+              <a:t>σ</a:t>
+            </a:r>
+            <a:r>
+              <a:rPr lang="en-US" sz="2800" dirty="0"/>
+              <a:t> </a:t>
+            </a:r>
+            <a:r>
+              <a:rPr lang="en-US" sz="2800" baseline="30000" dirty="0"/>
+              <a:t>2</a:t>
+            </a:r>
+            <a:r>
+              <a:rPr lang="en-US" sz="2400" dirty="0"/>
+              <a:t>  ?</a:t>
+            </a:r>
+            <a:endParaRPr lang="en-US" sz="2400" i="1" baseline="30000" dirty="0"/>
+          </a:p>
+        </p:txBody>
+      </p:sp>
+      <p:sp>
+        <p:nvSpPr>
+          <p:cNvPr id="9" name="TextBox 8">
+            <a:extLst>
+              <a:ext uri="{FF2B5EF4-FFF2-40B4-BE49-F238E27FC236}">
+                <a16:creationId xmlns:a16="http://schemas.microsoft.com/office/drawing/2014/main" id="{818CA24C-D4E8-E26B-8CCB-95EA3640D823}"/>
+              </a:ext>
+            </a:extLst>
+          </p:cNvPr>
+          <p:cNvSpPr txBox="1"/>
+          <p:nvPr/>
+        </p:nvSpPr>
+        <p:spPr>
+          <a:xfrm>
+            <a:off x="6657399" y="1457121"/>
+            <a:ext cx="1156139" cy="461665"/>
+          </a:xfrm>
+          <a:prstGeom prst="rect">
+            <a:avLst/>
+          </a:prstGeom>
+          <a:noFill/>
+        </p:spPr>
+        <p:txBody>
+          <a:bodyPr wrap="square" rtlCol="0">
+            <a:spAutoFit/>
+          </a:bodyPr>
+          <a:lstStyle/>
+          <a:p>
+            <a:pPr algn="ctr"/>
+            <a:r>
+              <a:rPr lang="en-US" sz="2400" dirty="0"/>
+              <a:t>Return</a:t>
+            </a:r>
+          </a:p>
+        </p:txBody>
+      </p:sp>
+      <p:sp>
+        <p:nvSpPr>
+          <p:cNvPr id="10" name="TextBox 9">
+            <a:extLst>
+              <a:ext uri="{FF2B5EF4-FFF2-40B4-BE49-F238E27FC236}">
+                <a16:creationId xmlns:a16="http://schemas.microsoft.com/office/drawing/2014/main" id="{17BB962A-C47C-7732-CAE1-ACCEE46FC34E}"/>
+              </a:ext>
+            </a:extLst>
+          </p:cNvPr>
+          <p:cNvSpPr txBox="1"/>
+          <p:nvPr/>
+        </p:nvSpPr>
+        <p:spPr>
+          <a:xfrm>
+            <a:off x="7763992" y="4251871"/>
+            <a:ext cx="3943326" cy="461665"/>
+          </a:xfrm>
+          <a:prstGeom prst="rect">
+            <a:avLst/>
+          </a:prstGeom>
+          <a:noFill/>
+        </p:spPr>
+        <p:txBody>
+          <a:bodyPr wrap="square" rtlCol="0">
+            <a:spAutoFit/>
+          </a:bodyPr>
+          <a:lstStyle/>
+          <a:p>
+            <a:r>
+              <a:rPr lang="en-US" sz="2400" dirty="0"/>
+              <a:t>Portfolio Risk  ( </a:t>
+            </a:r>
+            <a:r>
+              <a:rPr lang="el-GR" sz="2400" dirty="0"/>
+              <a:t>σ</a:t>
+            </a:r>
+            <a:r>
+              <a:rPr lang="en-US" sz="2400" dirty="0"/>
+              <a:t> </a:t>
+            </a:r>
+            <a:r>
+              <a:rPr lang="en-US" sz="2400" baseline="30000" dirty="0"/>
+              <a:t>2</a:t>
+            </a:r>
+            <a:r>
+              <a:rPr lang="en-US" sz="2400" dirty="0"/>
+              <a:t> = </a:t>
+            </a:r>
+            <a:r>
+              <a:rPr lang="en-US" sz="2400" b="1" dirty="0"/>
+              <a:t>w c w </a:t>
+            </a:r>
+            <a:r>
+              <a:rPr lang="en-US" sz="2400" b="1" baseline="30000" dirty="0"/>
+              <a:t>T</a:t>
+            </a:r>
+            <a:r>
+              <a:rPr lang="en-US" sz="2400" dirty="0"/>
+              <a:t> ) </a:t>
+            </a:r>
+          </a:p>
+        </p:txBody>
+      </p:sp>
+      <p:cxnSp>
+        <p:nvCxnSpPr>
+          <p:cNvPr id="11" name="Straight Arrow Connector 10">
+            <a:extLst>
+              <a:ext uri="{FF2B5EF4-FFF2-40B4-BE49-F238E27FC236}">
+                <a16:creationId xmlns:a16="http://schemas.microsoft.com/office/drawing/2014/main" id="{3FD80F41-4285-CE3B-9A9B-6CF2A7A40BBE}"/>
+              </a:ext>
+            </a:extLst>
+          </p:cNvPr>
+          <p:cNvCxnSpPr>
+            <a:cxnSpLocks/>
+          </p:cNvCxnSpPr>
+          <p:nvPr/>
+        </p:nvCxnSpPr>
+        <p:spPr>
+          <a:xfrm flipV="1">
+            <a:off x="6688929" y="1908276"/>
+            <a:ext cx="0" cy="2895566"/>
+          </a:xfrm>
+          <a:prstGeom prst="straightConnector1">
+            <a:avLst/>
+          </a:prstGeom>
+          <a:ln w="38100" cap="rnd">
+            <a:solidFill>
+              <a:schemeClr val="accent1"/>
+            </a:solidFill>
+            <a:round/>
+            <a:tailEnd type="stealth" w="lg" len="lg"/>
+          </a:ln>
+        </p:spPr>
+        <p:style>
+          <a:lnRef idx="2">
+            <a:schemeClr val="accent1"/>
+          </a:lnRef>
+          <a:fillRef idx="0">
+            <a:schemeClr val="accent1"/>
+          </a:fillRef>
+          <a:effectRef idx="1">
+            <a:schemeClr val="accent1"/>
+          </a:effectRef>
+          <a:fontRef idx="minor">
+            <a:schemeClr val="tx1"/>
+          </a:fontRef>
+        </p:style>
+      </p:cxnSp>
+      <p:cxnSp>
+        <p:nvCxnSpPr>
+          <p:cNvPr id="12" name="Straight Arrow Connector 11">
+            <a:extLst>
+              <a:ext uri="{FF2B5EF4-FFF2-40B4-BE49-F238E27FC236}">
+                <a16:creationId xmlns:a16="http://schemas.microsoft.com/office/drawing/2014/main" id="{024A0518-8E43-D144-9BEB-E3C3FC0399D3}"/>
+              </a:ext>
+            </a:extLst>
+          </p:cNvPr>
+          <p:cNvCxnSpPr>
+            <a:cxnSpLocks/>
+          </p:cNvCxnSpPr>
+          <p:nvPr/>
+        </p:nvCxnSpPr>
+        <p:spPr>
+          <a:xfrm>
+            <a:off x="6688928" y="4095637"/>
+            <a:ext cx="3708000" cy="0"/>
+          </a:xfrm>
+          <a:prstGeom prst="straightConnector1">
+            <a:avLst/>
+          </a:prstGeom>
+          <a:ln w="38100" cap="rnd">
+            <a:solidFill>
+              <a:schemeClr val="accent1"/>
+            </a:solidFill>
+            <a:round/>
+            <a:tailEnd type="stealth" w="lg" len="lg"/>
+          </a:ln>
+        </p:spPr>
+        <p:style>
+          <a:lnRef idx="2">
+            <a:schemeClr val="accent1"/>
+          </a:lnRef>
+          <a:fillRef idx="0">
+            <a:schemeClr val="accent1"/>
+          </a:fillRef>
+          <a:effectRef idx="1">
+            <a:schemeClr val="accent1"/>
+          </a:effectRef>
+          <a:fontRef idx="minor">
+            <a:schemeClr val="tx1"/>
+          </a:fontRef>
+        </p:style>
+      </p:cxnSp>
+      <p:sp>
+        <p:nvSpPr>
+          <p:cNvPr id="13" name="TextBox 12">
+            <a:extLst>
+              <a:ext uri="{FF2B5EF4-FFF2-40B4-BE49-F238E27FC236}">
+                <a16:creationId xmlns:a16="http://schemas.microsoft.com/office/drawing/2014/main" id="{B3496AB2-0F68-1A55-0556-6AE0082A274D}"/>
+              </a:ext>
+            </a:extLst>
+          </p:cNvPr>
+          <p:cNvSpPr txBox="1"/>
+          <p:nvPr/>
+        </p:nvSpPr>
+        <p:spPr>
+          <a:xfrm>
+            <a:off x="7581745" y="2145107"/>
+            <a:ext cx="2747357" cy="461665"/>
+          </a:xfrm>
+          <a:prstGeom prst="rect">
+            <a:avLst/>
+          </a:prstGeom>
+          <a:noFill/>
+        </p:spPr>
+        <p:txBody>
+          <a:bodyPr wrap="square" rtlCol="0">
+            <a:spAutoFit/>
+          </a:bodyPr>
+          <a:lstStyle/>
+          <a:p>
+            <a:pPr algn="ctr"/>
+            <a:r>
+              <a:rPr lang="en-US" sz="2400" dirty="0"/>
+              <a:t>Example Portfolio A</a:t>
+            </a:r>
+          </a:p>
+        </p:txBody>
+      </p:sp>
+      <p:sp>
+        <p:nvSpPr>
+          <p:cNvPr id="15" name="Multiplication Sign 14">
+            <a:extLst>
+              <a:ext uri="{FF2B5EF4-FFF2-40B4-BE49-F238E27FC236}">
+                <a16:creationId xmlns:a16="http://schemas.microsoft.com/office/drawing/2014/main" id="{358DBC79-A979-A17F-2253-D7293F2DAAA9}"/>
+              </a:ext>
+            </a:extLst>
+          </p:cNvPr>
+          <p:cNvSpPr/>
+          <p:nvPr/>
+        </p:nvSpPr>
+        <p:spPr>
+          <a:xfrm>
+            <a:off x="7419825" y="2575653"/>
+            <a:ext cx="360784" cy="323163"/>
+          </a:xfrm>
+          <a:prstGeom prst="mathMultiply">
+            <a:avLst>
+              <a:gd name="adj1" fmla="val 12324"/>
+            </a:avLst>
+          </a:prstGeom>
+          <a:solidFill>
+            <a:srgbClr val="0070C0"/>
+          </a:solidFill>
+          <a:ln w="12700"/>
+        </p:spPr>
+        <p:style>
+          <a:lnRef idx="2">
+            <a:schemeClr val="accent1">
+              <a:shade val="15000"/>
+            </a:schemeClr>
+          </a:lnRef>
+          <a:fillRef idx="1">
+            <a:schemeClr val="accent1"/>
+          </a:fillRef>
+          <a:effectRef idx="0">
+            <a:schemeClr val="accent1"/>
+          </a:effectRef>
+          <a:fontRef idx="minor">
+            <a:schemeClr val="lt1"/>
+          </a:fontRef>
+        </p:style>
+        <p:txBody>
+          <a:bodyPr rtlCol="0" anchor="ctr"/>
+          <a:lstStyle/>
+          <a:p>
+            <a:pPr algn="ctr"/>
+            <a:endParaRPr lang="en-US"/>
+          </a:p>
+        </p:txBody>
+      </p:sp>
+      <p:sp>
+        <p:nvSpPr>
+          <p:cNvPr id="16" name="Multiplication Sign 15">
+            <a:extLst>
+              <a:ext uri="{FF2B5EF4-FFF2-40B4-BE49-F238E27FC236}">
+                <a16:creationId xmlns:a16="http://schemas.microsoft.com/office/drawing/2014/main" id="{E3C73C6F-F96C-AE51-8424-45020DE40CA8}"/>
+              </a:ext>
+            </a:extLst>
+          </p:cNvPr>
+          <p:cNvSpPr/>
+          <p:nvPr/>
+        </p:nvSpPr>
+        <p:spPr>
+          <a:xfrm>
+            <a:off x="7874784" y="3074207"/>
+            <a:ext cx="360784" cy="323163"/>
+          </a:xfrm>
+          <a:prstGeom prst="mathMultiply">
+            <a:avLst>
+              <a:gd name="adj1" fmla="val 12324"/>
+            </a:avLst>
+          </a:prstGeom>
+          <a:solidFill>
+            <a:srgbClr val="0070C0"/>
+          </a:solidFill>
+          <a:ln w="12700"/>
+        </p:spPr>
+        <p:style>
+          <a:lnRef idx="2">
+            <a:schemeClr val="accent1">
+              <a:shade val="15000"/>
+            </a:schemeClr>
+          </a:lnRef>
+          <a:fillRef idx="1">
+            <a:schemeClr val="accent1"/>
+          </a:fillRef>
+          <a:effectRef idx="0">
+            <a:schemeClr val="accent1"/>
+          </a:effectRef>
+          <a:fontRef idx="minor">
+            <a:schemeClr val="lt1"/>
+          </a:fontRef>
+        </p:style>
+        <p:txBody>
+          <a:bodyPr rtlCol="0" anchor="ctr"/>
+          <a:lstStyle/>
+          <a:p>
+            <a:pPr algn="ctr"/>
+            <a:endParaRPr lang="en-US"/>
+          </a:p>
+        </p:txBody>
+      </p:sp>
+      <p:sp>
+        <p:nvSpPr>
+          <p:cNvPr id="17" name="TextBox 16">
+            <a:extLst>
+              <a:ext uri="{FF2B5EF4-FFF2-40B4-BE49-F238E27FC236}">
+                <a16:creationId xmlns:a16="http://schemas.microsoft.com/office/drawing/2014/main" id="{192A83CF-592E-A236-39F5-FB83370555A9}"/>
+              </a:ext>
+            </a:extLst>
+          </p:cNvPr>
+          <p:cNvSpPr txBox="1"/>
+          <p:nvPr/>
+        </p:nvSpPr>
+        <p:spPr>
+          <a:xfrm>
+            <a:off x="8130834" y="2737721"/>
+            <a:ext cx="501423" cy="461665"/>
+          </a:xfrm>
+          <a:prstGeom prst="rect">
+            <a:avLst/>
+          </a:prstGeom>
+          <a:noFill/>
+        </p:spPr>
+        <p:txBody>
+          <a:bodyPr wrap="square" rtlCol="0">
+            <a:spAutoFit/>
+          </a:bodyPr>
+          <a:lstStyle/>
+          <a:p>
+            <a:pPr algn="ctr"/>
+            <a:r>
+              <a:rPr lang="en-US" sz="2400" dirty="0"/>
+              <a:t>B</a:t>
+            </a:r>
+          </a:p>
+        </p:txBody>
+      </p:sp>
+    </p:spTree>
+    <p:extLst>
+      <p:ext uri="{BB962C8B-B14F-4D97-AF65-F5344CB8AC3E}">
+        <p14:creationId xmlns:p14="http://schemas.microsoft.com/office/powerpoint/2010/main" val="2639659869"/>
+      </p:ext>
+    </p:extLst>
+  </p:cSld>
+  <p:clrMapOvr>
+    <a:masterClrMapping/>
+  </p:clrMapOvr>
+</p:sld>
+</file>
+
+<file path=ppt/slides/slide11.xml><?xml version="1.0" encoding="utf-8"?>
+<p:sld xmlns:a="http://schemas.openxmlformats.org/drawingml/2006/main" xmlns:r="http://schemas.openxmlformats.org/officeDocument/2006/relationships" xmlns:p="http://schemas.openxmlformats.org/presentationml/2006/main">
+  <p:cSld>
+    <p:spTree>
+      <p:nvGrpSpPr>
+        <p:cNvPr id="1" name=""/>
+        <p:cNvGrpSpPr/>
+        <p:nvPr/>
+      </p:nvGrpSpPr>
+      <p:grpSpPr>
+        <a:xfrm>
+          <a:off x="0" y="0"/>
+          <a:ext cx="0" cy="0"/>
+          <a:chOff x="0" y="0"/>
+          <a:chExt cx="0" cy="0"/>
+        </a:xfrm>
+      </p:grpSpPr>
+      <p:sp>
+        <p:nvSpPr>
+          <p:cNvPr id="4" name="TextBox 3">
+            <a:extLst>
+              <a:ext uri="{FF2B5EF4-FFF2-40B4-BE49-F238E27FC236}">
+                <a16:creationId xmlns:a16="http://schemas.microsoft.com/office/drawing/2014/main" id="{899C39C7-B679-392C-2FFF-3763D1F8D354}"/>
+              </a:ext>
+            </a:extLst>
+          </p:cNvPr>
+          <p:cNvSpPr txBox="1"/>
+          <p:nvPr/>
+        </p:nvSpPr>
+        <p:spPr>
+          <a:xfrm>
+            <a:off x="105100" y="156234"/>
+            <a:ext cx="12002814" cy="369332"/>
+          </a:xfrm>
+          <a:prstGeom prst="rect">
+            <a:avLst/>
+          </a:prstGeom>
+          <a:noFill/>
+        </p:spPr>
+        <p:txBody>
+          <a:bodyPr wrap="square" rtlCol="0">
+            <a:spAutoFit/>
+          </a:bodyPr>
+          <a:lstStyle/>
+          <a:p>
+            <a:r>
+              <a:rPr lang="en-US" dirty="0">
+                <a:solidFill>
+                  <a:schemeClr val="bg1"/>
+                </a:solidFill>
+              </a:rPr>
+              <a:t>Modern Portfolio Theory (MPT)</a:t>
+            </a:r>
+          </a:p>
+        </p:txBody>
+      </p:sp>
+      <p:sp>
+        <p:nvSpPr>
+          <p:cNvPr id="8" name="TextBox 7">
+            <a:extLst>
+              <a:ext uri="{FF2B5EF4-FFF2-40B4-BE49-F238E27FC236}">
+                <a16:creationId xmlns:a16="http://schemas.microsoft.com/office/drawing/2014/main" id="{B30C2699-09F8-818D-FA71-71B255BE64AE}"/>
+              </a:ext>
+            </a:extLst>
+          </p:cNvPr>
+          <p:cNvSpPr txBox="1"/>
+          <p:nvPr/>
+        </p:nvSpPr>
+        <p:spPr>
+          <a:xfrm>
+            <a:off x="376437" y="1220236"/>
+            <a:ext cx="9067366" cy="1692771"/>
+          </a:xfrm>
+          <a:prstGeom prst="rect">
+            <a:avLst/>
+          </a:prstGeom>
+          <a:noFill/>
+        </p:spPr>
+        <p:txBody>
+          <a:bodyPr wrap="square" rtlCol="0">
+            <a:spAutoFit/>
+          </a:bodyPr>
+          <a:lstStyle/>
+          <a:p>
+            <a:r>
+              <a:rPr lang="en-US" sz="2800" dirty="0"/>
+              <a:t>What is the min </a:t>
+            </a:r>
+            <a:r>
+              <a:rPr lang="el-GR" sz="2800" dirty="0"/>
+              <a:t>σ</a:t>
+            </a:r>
+            <a:r>
+              <a:rPr lang="en-US" sz="2800" dirty="0"/>
+              <a:t> </a:t>
+            </a:r>
+            <a:r>
+              <a:rPr lang="en-US" sz="2800" baseline="30000" dirty="0"/>
+              <a:t>2</a:t>
+            </a:r>
+            <a:r>
+              <a:rPr lang="en-US" sz="2400" dirty="0"/>
+              <a:t>  ?</a:t>
+            </a:r>
+          </a:p>
+          <a:p>
+            <a:endParaRPr lang="en-US" sz="2400" i="1" baseline="30000" dirty="0"/>
+          </a:p>
+          <a:p>
+            <a:r>
+              <a:rPr lang="en-US" sz="2000" dirty="0"/>
+              <a:t>Fixed: covariance matrix and return.  Variable: weight vector.</a:t>
+            </a:r>
+          </a:p>
+          <a:p>
+            <a:endParaRPr lang="en-US" sz="2000" dirty="0"/>
+          </a:p>
+          <a:p>
+            <a:r>
+              <a:rPr lang="en-US" sz="2000" dirty="0"/>
+              <a:t>Find min </a:t>
+            </a:r>
+            <a:r>
+              <a:rPr lang="el-GR" sz="2000" dirty="0"/>
+              <a:t>σ</a:t>
+            </a:r>
+            <a:r>
+              <a:rPr lang="en-US" sz="2000" dirty="0"/>
+              <a:t> </a:t>
+            </a:r>
+            <a:r>
+              <a:rPr lang="en-US" sz="2000" baseline="30000" dirty="0"/>
+              <a:t>2 </a:t>
+            </a:r>
+            <a:r>
+              <a:rPr lang="en-US" sz="2000" dirty="0"/>
+              <a:t> with 2 constraints : sum of weights is 1 , portfolio return is q.</a:t>
+            </a:r>
+          </a:p>
+        </p:txBody>
+      </p:sp>
+      <p:sp>
+        <p:nvSpPr>
+          <p:cNvPr id="2" name="TextBox 1">
+            <a:extLst>
+              <a:ext uri="{FF2B5EF4-FFF2-40B4-BE49-F238E27FC236}">
+                <a16:creationId xmlns:a16="http://schemas.microsoft.com/office/drawing/2014/main" id="{C8208294-EAA1-C354-2A50-C1A5D43F2747}"/>
+              </a:ext>
+            </a:extLst>
+          </p:cNvPr>
+          <p:cNvSpPr txBox="1"/>
+          <p:nvPr/>
+        </p:nvSpPr>
+        <p:spPr>
+          <a:xfrm>
+            <a:off x="376437" y="3637657"/>
+            <a:ext cx="3521006" cy="523220"/>
+          </a:xfrm>
+          <a:prstGeom prst="rect">
+            <a:avLst/>
+          </a:prstGeom>
+          <a:noFill/>
+        </p:spPr>
+        <p:txBody>
+          <a:bodyPr wrap="square" rtlCol="0">
+            <a:spAutoFit/>
+          </a:bodyPr>
+          <a:lstStyle/>
+          <a:p>
+            <a:r>
+              <a:rPr lang="en-US" sz="2800" dirty="0"/>
+              <a:t>Lagrange multiplier</a:t>
+            </a:r>
+            <a:endParaRPr lang="en-US" sz="2000" dirty="0"/>
+          </a:p>
+        </p:txBody>
+      </p:sp>
+      <p:cxnSp>
+        <p:nvCxnSpPr>
+          <p:cNvPr id="19" name="Straight Arrow Connector 18">
+            <a:extLst>
+              <a:ext uri="{FF2B5EF4-FFF2-40B4-BE49-F238E27FC236}">
+                <a16:creationId xmlns:a16="http://schemas.microsoft.com/office/drawing/2014/main" id="{1F52466E-3BE5-5B91-D00A-FCD07F297895}"/>
+              </a:ext>
+            </a:extLst>
+          </p:cNvPr>
+          <p:cNvCxnSpPr>
+            <a:cxnSpLocks/>
+          </p:cNvCxnSpPr>
+          <p:nvPr/>
+        </p:nvCxnSpPr>
+        <p:spPr>
+          <a:xfrm>
+            <a:off x="1455104" y="4518796"/>
+            <a:ext cx="622175" cy="426017"/>
+          </a:xfrm>
+          <a:prstGeom prst="straightConnector1">
+            <a:avLst/>
+          </a:prstGeom>
+          <a:ln w="25400">
+            <a:solidFill>
+              <a:schemeClr val="tx1"/>
+            </a:solidFill>
+            <a:tailEnd type="arrow" w="lg" len="lg"/>
+          </a:ln>
+        </p:spPr>
+        <p:style>
+          <a:lnRef idx="2">
+            <a:schemeClr val="accent1"/>
+          </a:lnRef>
+          <a:fillRef idx="0">
+            <a:schemeClr val="accent1"/>
+          </a:fillRef>
+          <a:effectRef idx="1">
+            <a:schemeClr val="accent1"/>
+          </a:effectRef>
+          <a:fontRef idx="minor">
+            <a:schemeClr val="tx1"/>
+          </a:fontRef>
+        </p:style>
+      </p:cxnSp>
+      <p:sp>
+        <p:nvSpPr>
+          <p:cNvPr id="21" name="TextBox 20">
+            <a:extLst>
+              <a:ext uri="{FF2B5EF4-FFF2-40B4-BE49-F238E27FC236}">
+                <a16:creationId xmlns:a16="http://schemas.microsoft.com/office/drawing/2014/main" id="{362E3B05-32FB-ABB6-A61A-C42F1A2E8023}"/>
+              </a:ext>
+            </a:extLst>
+          </p:cNvPr>
+          <p:cNvSpPr txBox="1"/>
+          <p:nvPr/>
+        </p:nvSpPr>
+        <p:spPr>
+          <a:xfrm>
+            <a:off x="4212239" y="4784264"/>
+            <a:ext cx="1196672" cy="461665"/>
+          </a:xfrm>
+          <a:prstGeom prst="rect">
+            <a:avLst/>
+          </a:prstGeom>
+          <a:noFill/>
+        </p:spPr>
+        <p:txBody>
+          <a:bodyPr wrap="square" rtlCol="0">
+            <a:spAutoFit/>
+          </a:bodyPr>
+          <a:lstStyle/>
+          <a:p>
+            <a:r>
+              <a:rPr lang="en-US" sz="2400" dirty="0"/>
+              <a:t>q ( </a:t>
+            </a:r>
+            <a:r>
+              <a:rPr lang="el-GR" sz="2400" dirty="0"/>
+              <a:t>σ</a:t>
+            </a:r>
+            <a:r>
+              <a:rPr lang="en-US" sz="2400" dirty="0"/>
+              <a:t> </a:t>
+            </a:r>
+            <a:r>
+              <a:rPr lang="en-US" sz="2400" baseline="30000" dirty="0"/>
+              <a:t>2</a:t>
+            </a:r>
+            <a:r>
+              <a:rPr lang="en-US" sz="2400" dirty="0"/>
+              <a:t> )</a:t>
+            </a:r>
+          </a:p>
+        </p:txBody>
+      </p:sp>
+      <p:sp>
+        <p:nvSpPr>
+          <p:cNvPr id="22" name="TextBox 21">
+            <a:extLst>
+              <a:ext uri="{FF2B5EF4-FFF2-40B4-BE49-F238E27FC236}">
+                <a16:creationId xmlns:a16="http://schemas.microsoft.com/office/drawing/2014/main" id="{3B354EFC-67C9-F0A2-2776-CE36FF181F8A}"/>
+              </a:ext>
+            </a:extLst>
+          </p:cNvPr>
+          <p:cNvSpPr txBox="1"/>
+          <p:nvPr/>
+        </p:nvSpPr>
+        <p:spPr>
+          <a:xfrm>
+            <a:off x="2463427" y="4784264"/>
+            <a:ext cx="1196672" cy="461665"/>
+          </a:xfrm>
+          <a:prstGeom prst="rect">
+            <a:avLst/>
+          </a:prstGeom>
+          <a:noFill/>
+        </p:spPr>
+        <p:txBody>
+          <a:bodyPr wrap="square" rtlCol="0">
+            <a:spAutoFit/>
+          </a:bodyPr>
+          <a:lstStyle/>
+          <a:p>
+            <a:r>
+              <a:rPr lang="el-GR" sz="2400" dirty="0"/>
+              <a:t>σ</a:t>
+            </a:r>
+            <a:r>
+              <a:rPr lang="en-US" sz="2400" dirty="0"/>
+              <a:t> </a:t>
+            </a:r>
+            <a:r>
+              <a:rPr lang="en-US" sz="2400" baseline="30000" dirty="0"/>
+              <a:t>2</a:t>
+            </a:r>
+            <a:r>
+              <a:rPr lang="en-US" sz="2400" dirty="0"/>
+              <a:t> ( q )</a:t>
+            </a:r>
+          </a:p>
+        </p:txBody>
+      </p:sp>
+      <p:cxnSp>
+        <p:nvCxnSpPr>
+          <p:cNvPr id="23" name="Straight Arrow Connector 22">
+            <a:extLst>
+              <a:ext uri="{FF2B5EF4-FFF2-40B4-BE49-F238E27FC236}">
+                <a16:creationId xmlns:a16="http://schemas.microsoft.com/office/drawing/2014/main" id="{240BF930-3A9A-A0DA-5733-F8C687329E38}"/>
+              </a:ext>
+            </a:extLst>
+          </p:cNvPr>
+          <p:cNvCxnSpPr>
+            <a:cxnSpLocks/>
+          </p:cNvCxnSpPr>
+          <p:nvPr/>
+        </p:nvCxnSpPr>
+        <p:spPr>
+          <a:xfrm>
+            <a:off x="3630118" y="5030086"/>
+            <a:ext cx="432000" cy="0"/>
+          </a:xfrm>
+          <a:prstGeom prst="straightConnector1">
+            <a:avLst/>
+          </a:prstGeom>
+          <a:ln w="25400">
+            <a:solidFill>
+              <a:schemeClr val="tx1"/>
+            </a:solidFill>
+            <a:tailEnd type="arrow" w="lg" len="lg"/>
+          </a:ln>
+        </p:spPr>
+        <p:style>
+          <a:lnRef idx="2">
+            <a:schemeClr val="accent1"/>
+          </a:lnRef>
+          <a:fillRef idx="0">
+            <a:schemeClr val="accent1"/>
+          </a:fillRef>
+          <a:effectRef idx="1">
+            <a:schemeClr val="accent1"/>
+          </a:effectRef>
+          <a:fontRef idx="minor">
+            <a:schemeClr val="tx1"/>
+          </a:fontRef>
+        </p:style>
+      </p:cxnSp>
+      <p:cxnSp>
+        <p:nvCxnSpPr>
+          <p:cNvPr id="25" name="Straight Arrow Connector 24">
+            <a:extLst>
+              <a:ext uri="{FF2B5EF4-FFF2-40B4-BE49-F238E27FC236}">
+                <a16:creationId xmlns:a16="http://schemas.microsoft.com/office/drawing/2014/main" id="{A1A934F0-956A-DD8E-6EE2-5CFECADCB1F5}"/>
+              </a:ext>
+            </a:extLst>
+          </p:cNvPr>
+          <p:cNvCxnSpPr>
+            <a:cxnSpLocks/>
+          </p:cNvCxnSpPr>
+          <p:nvPr/>
+        </p:nvCxnSpPr>
+        <p:spPr>
+          <a:xfrm>
+            <a:off x="5476404" y="5032586"/>
+            <a:ext cx="3564000" cy="0"/>
+          </a:xfrm>
+          <a:prstGeom prst="straightConnector1">
+            <a:avLst/>
+          </a:prstGeom>
+          <a:ln w="25400">
+            <a:solidFill>
+              <a:schemeClr val="tx1"/>
+            </a:solidFill>
+            <a:tailEnd type="arrow" w="lg" len="lg"/>
+          </a:ln>
+        </p:spPr>
+        <p:style>
+          <a:lnRef idx="2">
+            <a:schemeClr val="accent1"/>
+          </a:lnRef>
+          <a:fillRef idx="0">
+            <a:schemeClr val="accent1"/>
+          </a:fillRef>
+          <a:effectRef idx="1">
+            <a:schemeClr val="accent1"/>
+          </a:effectRef>
+          <a:fontRef idx="minor">
+            <a:schemeClr val="tx1"/>
+          </a:fontRef>
+        </p:style>
+      </p:cxnSp>
+      <p:sp>
+        <p:nvSpPr>
+          <p:cNvPr id="26" name="TextBox 25">
+            <a:extLst>
+              <a:ext uri="{FF2B5EF4-FFF2-40B4-BE49-F238E27FC236}">
+                <a16:creationId xmlns:a16="http://schemas.microsoft.com/office/drawing/2014/main" id="{6C45ABE9-CC2E-51C7-04D3-487FE6BD8098}"/>
+              </a:ext>
+            </a:extLst>
+          </p:cNvPr>
+          <p:cNvSpPr txBox="1"/>
+          <p:nvPr/>
+        </p:nvSpPr>
+        <p:spPr>
+          <a:xfrm>
+            <a:off x="9475916" y="4766030"/>
+            <a:ext cx="1196672" cy="461665"/>
+          </a:xfrm>
+          <a:prstGeom prst="rect">
+            <a:avLst/>
+          </a:prstGeom>
+          <a:noFill/>
+        </p:spPr>
+        <p:txBody>
+          <a:bodyPr wrap="square" rtlCol="0">
+            <a:spAutoFit/>
+          </a:bodyPr>
+          <a:lstStyle/>
+          <a:p>
+            <a:r>
+              <a:rPr lang="en-US" sz="2400" dirty="0"/>
+              <a:t>q ( </a:t>
+            </a:r>
+            <a:r>
+              <a:rPr lang="el-GR" sz="2400" dirty="0"/>
+              <a:t>σ</a:t>
+            </a:r>
+            <a:r>
+              <a:rPr lang="en-US" sz="2400" dirty="0"/>
+              <a:t> )</a:t>
+            </a:r>
+          </a:p>
+        </p:txBody>
+      </p:sp>
+      <p:sp>
+        <p:nvSpPr>
+          <p:cNvPr id="28" name="TextBox 27">
+            <a:extLst>
+              <a:ext uri="{FF2B5EF4-FFF2-40B4-BE49-F238E27FC236}">
+                <a16:creationId xmlns:a16="http://schemas.microsoft.com/office/drawing/2014/main" id="{5915E16D-E02E-8634-660A-071B7C0AF92E}"/>
+              </a:ext>
+            </a:extLst>
+          </p:cNvPr>
+          <p:cNvSpPr txBox="1"/>
+          <p:nvPr/>
+        </p:nvSpPr>
+        <p:spPr>
+          <a:xfrm>
+            <a:off x="2731443" y="5275909"/>
+            <a:ext cx="2169392" cy="400110"/>
+          </a:xfrm>
+          <a:prstGeom prst="rect">
+            <a:avLst/>
+          </a:prstGeom>
+          <a:noFill/>
+        </p:spPr>
+        <p:txBody>
+          <a:bodyPr wrap="square" rtlCol="0">
+            <a:spAutoFit/>
+          </a:bodyPr>
+          <a:lstStyle/>
+          <a:p>
+            <a:pPr algn="ctr"/>
+            <a:r>
+              <a:rPr lang="en-US" sz="2000" dirty="0"/>
+              <a:t>Risky assets only</a:t>
+            </a:r>
+          </a:p>
+        </p:txBody>
+      </p:sp>
+      <p:sp>
+        <p:nvSpPr>
+          <p:cNvPr id="29" name="TextBox 28">
+            <a:extLst>
+              <a:ext uri="{FF2B5EF4-FFF2-40B4-BE49-F238E27FC236}">
+                <a16:creationId xmlns:a16="http://schemas.microsoft.com/office/drawing/2014/main" id="{AFBA5487-FCD0-A89D-BD2D-686F48AFF858}"/>
+              </a:ext>
+            </a:extLst>
+          </p:cNvPr>
+          <p:cNvSpPr txBox="1"/>
+          <p:nvPr/>
+        </p:nvSpPr>
+        <p:spPr>
+          <a:xfrm>
+            <a:off x="6061016" y="4556336"/>
+            <a:ext cx="2395572" cy="400110"/>
+          </a:xfrm>
+          <a:prstGeom prst="rect">
+            <a:avLst/>
+          </a:prstGeom>
+          <a:noFill/>
+        </p:spPr>
+        <p:txBody>
+          <a:bodyPr wrap="square" rtlCol="0">
+            <a:spAutoFit/>
+          </a:bodyPr>
+          <a:lstStyle/>
+          <a:p>
+            <a:r>
+              <a:rPr lang="en-US" sz="2000" dirty="0"/>
+              <a:t>Add risk-free asset</a:t>
+            </a:r>
+          </a:p>
+        </p:txBody>
+      </p:sp>
+      <p:sp>
+        <p:nvSpPr>
+          <p:cNvPr id="30" name="TextBox 29">
+            <a:extLst>
+              <a:ext uri="{FF2B5EF4-FFF2-40B4-BE49-F238E27FC236}">
+                <a16:creationId xmlns:a16="http://schemas.microsoft.com/office/drawing/2014/main" id="{C08E1227-125C-6E6B-4FDC-09C668F5752D}"/>
+              </a:ext>
+            </a:extLst>
+          </p:cNvPr>
+          <p:cNvSpPr txBox="1"/>
+          <p:nvPr/>
+        </p:nvSpPr>
+        <p:spPr>
+          <a:xfrm>
+            <a:off x="5723701" y="5118893"/>
+            <a:ext cx="2995533" cy="400110"/>
+          </a:xfrm>
+          <a:prstGeom prst="rect">
+            <a:avLst/>
+          </a:prstGeom>
+          <a:noFill/>
+        </p:spPr>
+        <p:txBody>
+          <a:bodyPr wrap="square" rtlCol="0">
+            <a:spAutoFit/>
+          </a:bodyPr>
+          <a:lstStyle/>
+          <a:p>
+            <a:pPr algn="ctr"/>
+            <a:r>
+              <a:rPr lang="en-US" sz="2000" dirty="0"/>
+              <a:t>Variable transformation</a:t>
+            </a:r>
+          </a:p>
+        </p:txBody>
+      </p:sp>
+    </p:spTree>
+    <p:extLst>
+      <p:ext uri="{BB962C8B-B14F-4D97-AF65-F5344CB8AC3E}">
+        <p14:creationId xmlns:p14="http://schemas.microsoft.com/office/powerpoint/2010/main" val="898586238"/>
+      </p:ext>
+    </p:extLst>
+  </p:cSld>
+  <p:clrMapOvr>
+    <a:masterClrMapping/>
+  </p:clrMapOvr>
+</p:sld>
+</file>
+
 <file path=ppt/slides/slide2.xml><?xml version="1.0" encoding="utf-8"?>
 <p:sld xmlns:a="http://schemas.openxmlformats.org/drawingml/2006/main" xmlns:r="http://schemas.openxmlformats.org/officeDocument/2006/relationships" xmlns:p="http://schemas.openxmlformats.org/presentationml/2006/main">
   <p:cSld>
@@ -4234,7 +5620,7 @@
         <p:spPr>
           <a:xfrm flipV="1">
             <a:off x="4277708" y="2105642"/>
-            <a:ext cx="0" cy="3552497"/>
+            <a:ext cx="0" cy="2895566"/>
           </a:xfrm>
           <a:prstGeom prst="straightConnector1">
             <a:avLst/>
@@ -7216,7 +8602,7 @@
                   <a:schemeClr val="bg1"/>
                 </a:solidFill>
               </a:rPr>
-              <a:t>Intro</a:t>
+              <a:t>Modern Portfolio Theory (MPT)</a:t>
             </a:r>
           </a:p>
         </p:txBody>
@@ -7236,7 +8622,7 @@
         <p:spPr>
           <a:xfrm>
             <a:off x="625366" y="1602304"/>
-            <a:ext cx="2145826" cy="830997"/>
+            <a:ext cx="3257086" cy="461665"/>
           </a:xfrm>
           <a:prstGeom prst="rect">
             <a:avLst/>
@@ -7270,8 +8656,8 @@
         </p:nvSpPr>
         <p:spPr>
           <a:xfrm>
-            <a:off x="5302269" y="4343070"/>
-            <a:ext cx="5278645" cy="461665"/>
+            <a:off x="1224946" y="2709022"/>
+            <a:ext cx="8833456" cy="461665"/>
           </a:xfrm>
           <a:prstGeom prst="rect">
             <a:avLst/>
@@ -7285,16 +8671,12 @@
           <a:lstStyle/>
           <a:p>
             <a:r>
+              <a:rPr lang="en-US" sz="2400" i="1" dirty="0"/>
+              <a:t>q</a:t>
+            </a:r>
+            <a:r>
               <a:rPr lang="en-US" sz="2400" dirty="0"/>
-              <a:t>q allows discounting, </a:t>
-            </a:r>
-            <a:r>
-              <a:rPr lang="en-US" sz="2400" dirty="0" err="1"/>
-              <a:t>eg</a:t>
-            </a:r>
-            <a:r>
-              <a:rPr lang="en-US" sz="2400" dirty="0"/>
-              <a:t>, bond pricing</a:t>
+              <a:t>  can be used for discounting in, for example, bond pricing</a:t>
             </a:r>
           </a:p>
         </p:txBody>

</xml_diff>

<commit_message>
updated until slide with EF risky
</commit_message>
<xml_diff>
--- a/MMS_2024_09_10/Farkas_2024_09_10.pptx
+++ b/MMS_2024_09_10/Farkas_2024_09_10.pptx
@@ -15,7 +15,9 @@
     <p:sldId id="270" r:id="rId9"/>
     <p:sldId id="267" r:id="rId10"/>
     <p:sldId id="271" r:id="rId11"/>
-    <p:sldId id="272" r:id="rId12"/>
+    <p:sldId id="274" r:id="rId12"/>
+    <p:sldId id="272" r:id="rId13"/>
+    <p:sldId id="275" r:id="rId14"/>
   </p:sldIdLst>
   <p:sldSz cx="12192000" cy="6858000"/>
   <p:notesSz cx="6858000" cy="9144000"/>
@@ -301,7 +303,7 @@
           <a:p>
             <a:fld id="{0163D073-7F8B-4D43-A6FF-3B651CD8FEF9}" type="datetimeFigureOut">
               <a:rPr lang="en-US" smtClean="0"/>
-              <a:t>9/1/2024</a:t>
+              <a:t>9/3/2024</a:t>
             </a:fld>
             <a:endParaRPr lang="en-US"/>
           </a:p>
@@ -539,7 +541,7 @@
           <a:p>
             <a:fld id="{0163D073-7F8B-4D43-A6FF-3B651CD8FEF9}" type="datetimeFigureOut">
               <a:rPr lang="en-US" smtClean="0"/>
-              <a:t>9/1/2024</a:t>
+              <a:t>9/3/2024</a:t>
             </a:fld>
             <a:endParaRPr lang="en-US"/>
           </a:p>
@@ -777,7 +779,7 @@
           <a:p>
             <a:fld id="{0163D073-7F8B-4D43-A6FF-3B651CD8FEF9}" type="datetimeFigureOut">
               <a:rPr lang="en-US" smtClean="0"/>
-              <a:t>9/1/2024</a:t>
+              <a:t>9/3/2024</a:t>
             </a:fld>
             <a:endParaRPr lang="en-US"/>
           </a:p>
@@ -1082,7 +1084,7 @@
           <a:p>
             <a:fld id="{0163D073-7F8B-4D43-A6FF-3B651CD8FEF9}" type="datetimeFigureOut">
               <a:rPr lang="en-US" smtClean="0"/>
-              <a:t>9/1/2024</a:t>
+              <a:t>9/3/2024</a:t>
             </a:fld>
             <a:endParaRPr lang="en-US"/>
           </a:p>
@@ -1385,7 +1387,7 @@
           <a:p>
             <a:fld id="{0163D073-7F8B-4D43-A6FF-3B651CD8FEF9}" type="datetimeFigureOut">
               <a:rPr lang="en-US" smtClean="0"/>
-              <a:t>9/1/2024</a:t>
+              <a:t>9/3/2024</a:t>
             </a:fld>
             <a:endParaRPr lang="en-US"/>
           </a:p>
@@ -1836,7 +1838,7 @@
           <a:p>
             <a:fld id="{0163D073-7F8B-4D43-A6FF-3B651CD8FEF9}" type="datetimeFigureOut">
               <a:rPr lang="en-US" smtClean="0"/>
-              <a:t>9/1/2024</a:t>
+              <a:t>9/3/2024</a:t>
             </a:fld>
             <a:endParaRPr lang="en-US"/>
           </a:p>
@@ -2009,7 +2011,7 @@
           <a:p>
             <a:fld id="{0163D073-7F8B-4D43-A6FF-3B651CD8FEF9}" type="datetimeFigureOut">
               <a:rPr lang="en-US" smtClean="0"/>
-              <a:t>9/1/2024</a:t>
+              <a:t>9/3/2024</a:t>
             </a:fld>
             <a:endParaRPr lang="en-US"/>
           </a:p>
@@ -2146,7 +2148,7 @@
           <a:p>
             <a:fld id="{0163D073-7F8B-4D43-A6FF-3B651CD8FEF9}" type="datetimeFigureOut">
               <a:rPr lang="en-US" smtClean="0"/>
-              <a:t>9/1/2024</a:t>
+              <a:t>9/3/2024</a:t>
             </a:fld>
             <a:endParaRPr lang="en-US"/>
           </a:p>
@@ -2490,7 +2492,7 @@
           <a:p>
             <a:fld id="{0163D073-7F8B-4D43-A6FF-3B651CD8FEF9}" type="datetimeFigureOut">
               <a:rPr lang="en-US" smtClean="0"/>
-              <a:t>9/1/2024</a:t>
+              <a:t>9/3/2024</a:t>
             </a:fld>
             <a:endParaRPr lang="en-US"/>
           </a:p>
@@ -2811,7 +2813,7 @@
           <a:p>
             <a:fld id="{0163D073-7F8B-4D43-A6FF-3B651CD8FEF9}" type="datetimeFigureOut">
               <a:rPr lang="en-US" smtClean="0"/>
-              <a:t>9/1/2024</a:t>
+              <a:t>9/3/2024</a:t>
             </a:fld>
             <a:endParaRPr lang="en-US"/>
           </a:p>
@@ -3564,8 +3566,8 @@
         </p:nvSpPr>
         <p:spPr>
           <a:xfrm>
-            <a:off x="4461638" y="4906501"/>
-            <a:ext cx="3289737" cy="400110"/>
+            <a:off x="2750477" y="5551071"/>
+            <a:ext cx="6691044" cy="707886"/>
           </a:xfrm>
           <a:prstGeom prst="rect">
             <a:avLst/>
@@ -3580,9 +3582,50 @@
           <a:p>
             <a:pPr algn="ctr"/>
             <a:r>
-              <a:rPr lang="en-US" sz="2000" i="1" dirty="0"/>
-              <a:t>See also: BMETE15MF78</a:t>
-            </a:r>
+              <a:rPr lang="en-US" sz="2000" dirty="0">
+                <a:latin typeface="Courier New" panose="02070309020205020404" pitchFamily="49" charset="0"/>
+                <a:cs typeface="Courier New" panose="02070309020205020404" pitchFamily="49" charset="0"/>
+              </a:rPr>
+              <a:t>BMETE15MF78</a:t>
+            </a:r>
+          </a:p>
+          <a:p>
+            <a:pPr algn="ctr"/>
+            <a:r>
+              <a:rPr lang="en-US" sz="2000" dirty="0">
+                <a:latin typeface="Courier New" panose="02070309020205020404" pitchFamily="49" charset="0"/>
+                <a:cs typeface="Courier New" panose="02070309020205020404" pitchFamily="49" charset="0"/>
+              </a:rPr>
+              <a:t>github.com/</a:t>
+            </a:r>
+            <a:r>
+              <a:rPr lang="en-US" sz="2000" dirty="0" err="1">
+                <a:latin typeface="Courier New" panose="02070309020205020404" pitchFamily="49" charset="0"/>
+                <a:cs typeface="Courier New" panose="02070309020205020404" pitchFamily="49" charset="0"/>
+                <a:sym typeface="Wingdings" panose="05000000000000000000" pitchFamily="2" charset="2"/>
+              </a:rPr>
+              <a:t>fij</a:t>
+            </a:r>
+            <a:r>
+              <a:rPr lang="en-US" sz="2000" dirty="0">
+                <a:latin typeface="Courier New" panose="02070309020205020404" pitchFamily="49" charset="0"/>
+                <a:cs typeface="Courier New" panose="02070309020205020404" pitchFamily="49" charset="0"/>
+                <a:sym typeface="Wingdings" panose="05000000000000000000" pitchFamily="2" charset="2"/>
+              </a:rPr>
+              <a:t>/</a:t>
+            </a:r>
+            <a:r>
+              <a:rPr lang="en-US" sz="2000" dirty="0" err="1">
+                <a:latin typeface="Courier New" panose="02070309020205020404" pitchFamily="49" charset="0"/>
+                <a:cs typeface="Courier New" panose="02070309020205020404" pitchFamily="49" charset="0"/>
+                <a:sym typeface="Wingdings" panose="05000000000000000000" pitchFamily="2" charset="2"/>
+              </a:rPr>
+              <a:t>btup</a:t>
+            </a:r>
+            <a:endParaRPr lang="en-US" sz="2000" dirty="0">
+              <a:latin typeface="Courier New" panose="02070309020205020404" pitchFamily="49" charset="0"/>
+              <a:cs typeface="Courier New" panose="02070309020205020404" pitchFamily="49" charset="0"/>
+            </a:endParaRPr>
           </a:p>
         </p:txBody>
       </p:sp>
@@ -4280,8 +4323,8 @@
         </p:nvSpPr>
         <p:spPr>
           <a:xfrm>
-            <a:off x="7581745" y="2145107"/>
-            <a:ext cx="2747357" cy="461665"/>
+            <a:off x="8635206" y="2484565"/>
+            <a:ext cx="1847068" cy="707886"/>
           </a:xfrm>
           <a:prstGeom prst="rect">
             <a:avLst/>
@@ -4296,8 +4339,15 @@
           <a:p>
             <a:pPr algn="ctr"/>
             <a:r>
-              <a:rPr lang="en-US" sz="2400" dirty="0"/>
-              <a:t>Example Portfolio A</a:t>
+              <a:rPr lang="en-US" sz="2000" i="1" dirty="0"/>
+              <a:t>example</a:t>
+            </a:r>
+          </a:p>
+          <a:p>
+            <a:pPr algn="ctr"/>
+            <a:r>
+              <a:rPr lang="en-US" sz="2000" i="1" dirty="0"/>
+              <a:t>portfolios</a:t>
             </a:r>
           </a:p>
         </p:txBody>
@@ -4316,7 +4366,7 @@
         </p:nvSpPr>
         <p:spPr>
           <a:xfrm>
-            <a:off x="7419825" y="2575653"/>
+            <a:off x="7419825" y="2530683"/>
             <a:ext cx="360784" cy="323163"/>
           </a:xfrm>
           <a:prstGeom prst="mathMultiply">
@@ -4368,7 +4418,7 @@
         </p:nvSpPr>
         <p:spPr>
           <a:xfrm>
-            <a:off x="7874784" y="3074207"/>
+            <a:off x="7455063" y="3284067"/>
             <a:ext cx="360784" cy="323163"/>
           </a:xfrm>
           <a:prstGeom prst="mathMultiply">
@@ -4420,7 +4470,7 @@
         </p:nvSpPr>
         <p:spPr>
           <a:xfrm>
-            <a:off x="8130834" y="2737721"/>
+            <a:off x="7651153" y="2977561"/>
             <a:ext cx="501423" cy="461665"/>
           </a:xfrm>
           <a:prstGeom prst="rect">
@@ -4438,6 +4488,42 @@
             <a:r>
               <a:rPr lang="en-US" sz="2400" dirty="0"/>
               <a:t>B</a:t>
+            </a:r>
+          </a:p>
+        </p:txBody>
+      </p:sp>
+      <p:sp>
+        <p:nvSpPr>
+          <p:cNvPr id="18" name="TextBox 17">
+            <a:extLst>
+              <a:ext uri="{FF2B5EF4-FFF2-40B4-BE49-F238E27FC236}">
+                <a16:creationId xmlns:a16="http://schemas.microsoft.com/office/drawing/2014/main" id="{EE15F276-3787-76B5-1334-57257FCA86AD}"/>
+              </a:ext>
+            </a:extLst>
+          </p:cNvPr>
+          <p:cNvSpPr txBox="1"/>
+          <p:nvPr/>
+        </p:nvSpPr>
+        <p:spPr>
+          <a:xfrm>
+            <a:off x="7638663" y="2230552"/>
+            <a:ext cx="501423" cy="461665"/>
+          </a:xfrm>
+          <a:prstGeom prst="rect">
+            <a:avLst/>
+          </a:prstGeom>
+          <a:noFill/>
+        </p:spPr>
+        <p:txBody>
+          <a:bodyPr wrap="square" rtlCol="0">
+            <a:spAutoFit/>
+          </a:bodyPr>
+          <a:lstStyle/>
+          <a:p>
+            <a:pPr algn="ctr"/>
+            <a:r>
+              <a:rPr lang="en-US" sz="2400" dirty="0"/>
+              <a:t>A</a:t>
             </a:r>
           </a:p>
         </p:txBody>
@@ -4525,7 +4611,7 @@
         </p:nvSpPr>
         <p:spPr>
           <a:xfrm>
-            <a:off x="376437" y="1220236"/>
+            <a:off x="376437" y="1257560"/>
             <a:ext cx="9067366" cy="1692771"/>
           </a:xfrm>
           <a:prstGeom prst="rect">
@@ -4610,7 +4696,7 @@
         </p:nvSpPr>
         <p:spPr>
           <a:xfrm>
-            <a:off x="376437" y="3637657"/>
+            <a:off x="376437" y="3730967"/>
             <a:ext cx="3521006" cy="523220"/>
           </a:xfrm>
           <a:prstGeom prst="rect">
@@ -4626,7 +4712,7 @@
           <a:p>
             <a:r>
               <a:rPr lang="en-US" sz="2800" dirty="0"/>
-              <a:t>Lagrange multiplier</a:t>
+              <a:t>Lagrange method</a:t>
             </a:r>
             <a:endParaRPr lang="en-US" sz="2000" dirty="0"/>
           </a:p>
@@ -4648,7 +4734,7 @@
         </p:nvCxnSpPr>
         <p:spPr>
           <a:xfrm>
-            <a:off x="1455104" y="4518796"/>
+            <a:off x="1455104" y="4612106"/>
             <a:ext cx="622175" cy="426017"/>
           </a:xfrm>
           <a:prstGeom prst="straightConnector1">
@@ -4690,7 +4776,7 @@
         </p:nvSpPr>
         <p:spPr>
           <a:xfrm>
-            <a:off x="4212239" y="4784264"/>
+            <a:off x="4212239" y="4877574"/>
             <a:ext cx="1196672" cy="461665"/>
           </a:xfrm>
           <a:prstGeom prst="rect">
@@ -4741,7 +4827,7 @@
         </p:nvSpPr>
         <p:spPr>
           <a:xfrm>
-            <a:off x="2463427" y="4784264"/>
+            <a:off x="2463427" y="4877574"/>
             <a:ext cx="1196672" cy="461665"/>
           </a:xfrm>
           <a:prstGeom prst="rect">
@@ -4790,7 +4876,7 @@
         </p:nvCxnSpPr>
         <p:spPr>
           <a:xfrm>
-            <a:off x="3630118" y="5030086"/>
+            <a:off x="3630118" y="5123396"/>
             <a:ext cx="432000" cy="0"/>
           </a:xfrm>
           <a:prstGeom prst="straightConnector1">
@@ -4834,7 +4920,7 @@
         </p:nvCxnSpPr>
         <p:spPr>
           <a:xfrm>
-            <a:off x="5476404" y="5032586"/>
+            <a:off x="5476404" y="5125896"/>
             <a:ext cx="3564000" cy="0"/>
           </a:xfrm>
           <a:prstGeom prst="straightConnector1">
@@ -4876,7 +4962,7 @@
         </p:nvSpPr>
         <p:spPr>
           <a:xfrm>
-            <a:off x="9475916" y="4766030"/>
+            <a:off x="9475916" y="4859340"/>
             <a:ext cx="1196672" cy="461665"/>
           </a:xfrm>
           <a:prstGeom prst="rect">
@@ -4919,7 +5005,7 @@
         </p:nvSpPr>
         <p:spPr>
           <a:xfrm>
-            <a:off x="2731443" y="5275909"/>
+            <a:off x="2731443" y="5369219"/>
             <a:ext cx="2169392" cy="400110"/>
           </a:xfrm>
           <a:prstGeom prst="rect">
@@ -4955,7 +5041,7 @@
         </p:nvSpPr>
         <p:spPr>
           <a:xfrm>
-            <a:off x="6061016" y="4556336"/>
+            <a:off x="6061016" y="4649646"/>
             <a:ext cx="2395572" cy="400110"/>
           </a:xfrm>
           <a:prstGeom prst="rect">
@@ -4990,7 +5076,7 @@
         </p:nvSpPr>
         <p:spPr>
           <a:xfrm>
-            <a:off x="5723701" y="5118893"/>
+            <a:off x="5723701" y="5212203"/>
             <a:ext cx="2995533" cy="400110"/>
           </a:xfrm>
           <a:prstGeom prst="rect">
@@ -5012,10 +5098,662 @@
           </a:p>
         </p:txBody>
       </p:sp>
+    </p:spTree>
+    <p:extLst>
+      <p:ext uri="{BB962C8B-B14F-4D97-AF65-F5344CB8AC3E}">
+        <p14:creationId xmlns:p14="http://schemas.microsoft.com/office/powerpoint/2010/main" val="2570349807"/>
+      </p:ext>
+    </p:extLst>
+  </p:cSld>
+  <p:clrMapOvr>
+    <a:masterClrMapping/>
+  </p:clrMapOvr>
+</p:sld>
+</file>
+
+<file path=ppt/slides/slide12.xml><?xml version="1.0" encoding="utf-8"?>
+<p:sld xmlns:a="http://schemas.openxmlformats.org/drawingml/2006/main" xmlns:r="http://schemas.openxmlformats.org/officeDocument/2006/relationships" xmlns:p="http://schemas.openxmlformats.org/presentationml/2006/main">
+  <p:cSld>
+    <p:spTree>
+      <p:nvGrpSpPr>
+        <p:cNvPr id="1" name=""/>
+        <p:cNvGrpSpPr/>
+        <p:nvPr/>
+      </p:nvGrpSpPr>
+      <p:grpSpPr>
+        <a:xfrm>
+          <a:off x="0" y="0"/>
+          <a:ext cx="0" cy="0"/>
+          <a:chOff x="0" y="0"/>
+          <a:chExt cx="0" cy="0"/>
+        </a:xfrm>
+      </p:grpSpPr>
+      <p:sp>
+        <p:nvSpPr>
+          <p:cNvPr id="4" name="TextBox 3">
+            <a:extLst>
+              <a:ext uri="{FF2B5EF4-FFF2-40B4-BE49-F238E27FC236}">
+                <a16:creationId xmlns:a16="http://schemas.microsoft.com/office/drawing/2014/main" id="{899C39C7-B679-392C-2FFF-3763D1F8D354}"/>
+              </a:ext>
+            </a:extLst>
+          </p:cNvPr>
+          <p:cNvSpPr txBox="1"/>
+          <p:nvPr/>
+        </p:nvSpPr>
+        <p:spPr>
+          <a:xfrm>
+            <a:off x="105100" y="156234"/>
+            <a:ext cx="12002814" cy="369332"/>
+          </a:xfrm>
+          <a:prstGeom prst="rect">
+            <a:avLst/>
+          </a:prstGeom>
+          <a:noFill/>
+        </p:spPr>
+        <p:txBody>
+          <a:bodyPr wrap="square" rtlCol="0">
+            <a:spAutoFit/>
+          </a:bodyPr>
+          <a:lstStyle/>
+          <a:p>
+            <a:r>
+              <a:rPr lang="en-US" dirty="0">
+                <a:solidFill>
+                  <a:schemeClr val="bg1"/>
+                </a:solidFill>
+              </a:rPr>
+              <a:t>Modern Portfolio Theory (MPT)</a:t>
+            </a:r>
+          </a:p>
+        </p:txBody>
+      </p:sp>
+      <p:sp>
+        <p:nvSpPr>
+          <p:cNvPr id="36" name="TextBox 35">
+            <a:extLst>
+              <a:ext uri="{FF2B5EF4-FFF2-40B4-BE49-F238E27FC236}">
+                <a16:creationId xmlns:a16="http://schemas.microsoft.com/office/drawing/2014/main" id="{68707800-AB8D-57D0-536F-C8DA6C6FCBB0}"/>
+              </a:ext>
+            </a:extLst>
+          </p:cNvPr>
+          <p:cNvSpPr txBox="1"/>
+          <p:nvPr/>
+        </p:nvSpPr>
+        <p:spPr>
+          <a:xfrm>
+            <a:off x="376437" y="1259245"/>
+            <a:ext cx="3805819" cy="523220"/>
+          </a:xfrm>
+          <a:prstGeom prst="rect">
+            <a:avLst/>
+          </a:prstGeom>
+          <a:noFill/>
+        </p:spPr>
+        <p:txBody>
+          <a:bodyPr wrap="square" rtlCol="0">
+            <a:spAutoFit/>
+          </a:bodyPr>
+          <a:lstStyle/>
+          <a:p>
+            <a:r>
+              <a:rPr lang="en-US" sz="2800" dirty="0"/>
+              <a:t>What is the min </a:t>
+            </a:r>
+            <a:r>
+              <a:rPr lang="el-GR" sz="2800" dirty="0"/>
+              <a:t>σ</a:t>
+            </a:r>
+            <a:r>
+              <a:rPr lang="en-US" sz="2800" dirty="0"/>
+              <a:t> </a:t>
+            </a:r>
+            <a:r>
+              <a:rPr lang="en-US" sz="2800" baseline="30000" dirty="0"/>
+              <a:t>2</a:t>
+            </a:r>
+            <a:r>
+              <a:rPr lang="en-US" sz="2400" dirty="0"/>
+              <a:t>  ?</a:t>
+            </a:r>
+            <a:endParaRPr lang="en-US" sz="2000" dirty="0"/>
+          </a:p>
+        </p:txBody>
+      </p:sp>
+      <p:grpSp>
+        <p:nvGrpSpPr>
+          <p:cNvPr id="3" name="Group 2">
+            <a:extLst>
+              <a:ext uri="{FF2B5EF4-FFF2-40B4-BE49-F238E27FC236}">
+                <a16:creationId xmlns:a16="http://schemas.microsoft.com/office/drawing/2014/main" id="{0F966E14-EF1E-B5E0-71A4-2EEA84760B57}"/>
+              </a:ext>
+            </a:extLst>
+          </p:cNvPr>
+          <p:cNvGrpSpPr/>
+          <p:nvPr/>
+        </p:nvGrpSpPr>
+        <p:grpSpPr>
+          <a:xfrm>
+            <a:off x="431044" y="1857592"/>
+            <a:ext cx="11396552" cy="4174697"/>
+            <a:chOff x="431044" y="1857592"/>
+            <a:chExt cx="11396552" cy="4174697"/>
+          </a:xfrm>
+        </p:grpSpPr>
+        <p:pic>
+          <p:nvPicPr>
+            <p:cNvPr id="32" name="Picture 31">
+              <a:extLst>
+                <a:ext uri="{FF2B5EF4-FFF2-40B4-BE49-F238E27FC236}">
+                  <a16:creationId xmlns:a16="http://schemas.microsoft.com/office/drawing/2014/main" id="{D2968376-ED94-3441-F8F8-D498FC60F389}"/>
+                </a:ext>
+              </a:extLst>
+            </p:cNvPr>
+            <p:cNvPicPr>
+              <a:picLocks noChangeAspect="1"/>
+            </p:cNvPicPr>
+            <p:nvPr/>
+          </p:nvPicPr>
+          <p:blipFill>
+            <a:blip r:embed="rId2"/>
+            <a:stretch>
+              <a:fillRect/>
+            </a:stretch>
+          </p:blipFill>
+          <p:spPr>
+            <a:xfrm>
+              <a:off x="431044" y="1857597"/>
+              <a:ext cx="11396552" cy="4174692"/>
+            </a:xfrm>
+            <a:prstGeom prst="rect">
+              <a:avLst/>
+            </a:prstGeom>
+          </p:spPr>
+        </p:pic>
+        <p:sp>
+          <p:nvSpPr>
+            <p:cNvPr id="2" name="Rectangle 1">
+              <a:extLst>
+                <a:ext uri="{FF2B5EF4-FFF2-40B4-BE49-F238E27FC236}">
+                  <a16:creationId xmlns:a16="http://schemas.microsoft.com/office/drawing/2014/main" id="{ECB58990-1BF8-B8EA-C060-60403C2F0390}"/>
+                </a:ext>
+              </a:extLst>
+            </p:cNvPr>
+            <p:cNvSpPr/>
+            <p:nvPr/>
+          </p:nvSpPr>
+          <p:spPr>
+            <a:xfrm>
+              <a:off x="494522" y="1857592"/>
+              <a:ext cx="7762510" cy="303974"/>
+            </a:xfrm>
+            <a:prstGeom prst="rect">
+              <a:avLst/>
+            </a:prstGeom>
+            <a:solidFill>
+              <a:schemeClr val="bg1"/>
+            </a:solidFill>
+            <a:ln>
+              <a:noFill/>
+            </a:ln>
+          </p:spPr>
+          <p:style>
+            <a:lnRef idx="2">
+              <a:schemeClr val="accent1">
+                <a:shade val="15000"/>
+              </a:schemeClr>
+            </a:lnRef>
+            <a:fillRef idx="1">
+              <a:schemeClr val="accent1"/>
+            </a:fillRef>
+            <a:effectRef idx="0">
+              <a:schemeClr val="accent1"/>
+            </a:effectRef>
+            <a:fontRef idx="minor">
+              <a:schemeClr val="lt1"/>
+            </a:fontRef>
+          </p:style>
+          <p:txBody>
+            <a:bodyPr rtlCol="0" anchor="ctr"/>
+            <a:lstStyle/>
+            <a:p>
+              <a:pPr algn="ctr"/>
+              <a:endParaRPr lang="en-US"/>
+            </a:p>
+          </p:txBody>
+        </p:sp>
+      </p:grpSp>
     </p:spTree>
     <p:extLst>
       <p:ext uri="{BB962C8B-B14F-4D97-AF65-F5344CB8AC3E}">
         <p14:creationId xmlns:p14="http://schemas.microsoft.com/office/powerpoint/2010/main" val="898586238"/>
+      </p:ext>
+    </p:extLst>
+  </p:cSld>
+  <p:clrMapOvr>
+    <a:masterClrMapping/>
+  </p:clrMapOvr>
+</p:sld>
+</file>
+
+<file path=ppt/slides/slide13.xml><?xml version="1.0" encoding="utf-8"?>
+<p:sld xmlns:a="http://schemas.openxmlformats.org/drawingml/2006/main" xmlns:r="http://schemas.openxmlformats.org/officeDocument/2006/relationships" xmlns:p="http://schemas.openxmlformats.org/presentationml/2006/main">
+  <p:cSld>
+    <p:spTree>
+      <p:nvGrpSpPr>
+        <p:cNvPr id="1" name=""/>
+        <p:cNvGrpSpPr/>
+        <p:nvPr/>
+      </p:nvGrpSpPr>
+      <p:grpSpPr>
+        <a:xfrm>
+          <a:off x="0" y="0"/>
+          <a:ext cx="0" cy="0"/>
+          <a:chOff x="0" y="0"/>
+          <a:chExt cx="0" cy="0"/>
+        </a:xfrm>
+      </p:grpSpPr>
+      <p:sp>
+        <p:nvSpPr>
+          <p:cNvPr id="4" name="TextBox 3">
+            <a:extLst>
+              <a:ext uri="{FF2B5EF4-FFF2-40B4-BE49-F238E27FC236}">
+                <a16:creationId xmlns:a16="http://schemas.microsoft.com/office/drawing/2014/main" id="{899C39C7-B679-392C-2FFF-3763D1F8D354}"/>
+              </a:ext>
+            </a:extLst>
+          </p:cNvPr>
+          <p:cNvSpPr txBox="1"/>
+          <p:nvPr/>
+        </p:nvSpPr>
+        <p:spPr>
+          <a:xfrm>
+            <a:off x="105100" y="156234"/>
+            <a:ext cx="12002814" cy="369332"/>
+          </a:xfrm>
+          <a:prstGeom prst="rect">
+            <a:avLst/>
+          </a:prstGeom>
+          <a:noFill/>
+        </p:spPr>
+        <p:txBody>
+          <a:bodyPr wrap="square" rtlCol="0">
+            <a:spAutoFit/>
+          </a:bodyPr>
+          <a:lstStyle/>
+          <a:p>
+            <a:r>
+              <a:rPr lang="en-US" dirty="0">
+                <a:solidFill>
+                  <a:schemeClr val="bg1"/>
+                </a:solidFill>
+              </a:rPr>
+              <a:t>Modern Portfolio Theory (MPT)</a:t>
+            </a:r>
+          </a:p>
+        </p:txBody>
+      </p:sp>
+      <p:sp>
+        <p:nvSpPr>
+          <p:cNvPr id="36" name="TextBox 35">
+            <a:extLst>
+              <a:ext uri="{FF2B5EF4-FFF2-40B4-BE49-F238E27FC236}">
+                <a16:creationId xmlns:a16="http://schemas.microsoft.com/office/drawing/2014/main" id="{68707800-AB8D-57D0-536F-C8DA6C6FCBB0}"/>
+              </a:ext>
+            </a:extLst>
+          </p:cNvPr>
+          <p:cNvSpPr txBox="1"/>
+          <p:nvPr/>
+        </p:nvSpPr>
+        <p:spPr>
+          <a:xfrm>
+            <a:off x="376437" y="951338"/>
+            <a:ext cx="7041400" cy="523220"/>
+          </a:xfrm>
+          <a:prstGeom prst="rect">
+            <a:avLst/>
+          </a:prstGeom>
+          <a:noFill/>
+        </p:spPr>
+        <p:txBody>
+          <a:bodyPr wrap="square" rtlCol="0">
+            <a:spAutoFit/>
+          </a:bodyPr>
+          <a:lstStyle/>
+          <a:p>
+            <a:r>
+              <a:rPr lang="en-US" sz="2800" dirty="0"/>
+              <a:t>What is the min </a:t>
+            </a:r>
+            <a:r>
+              <a:rPr lang="el-GR" sz="2800" dirty="0"/>
+              <a:t>σ</a:t>
+            </a:r>
+            <a:r>
+              <a:rPr lang="en-US" sz="2800" dirty="0"/>
+              <a:t> </a:t>
+            </a:r>
+            <a:r>
+              <a:rPr lang="en-US" sz="2800" baseline="30000" dirty="0"/>
+              <a:t>2</a:t>
+            </a:r>
+            <a:r>
+              <a:rPr lang="en-US" sz="2800" dirty="0"/>
+              <a:t>  ?   Equivalently : max q ?</a:t>
+            </a:r>
+          </a:p>
+        </p:txBody>
+      </p:sp>
+      <p:pic>
+        <p:nvPicPr>
+          <p:cNvPr id="6" name="Picture 5">
+            <a:extLst>
+              <a:ext uri="{FF2B5EF4-FFF2-40B4-BE49-F238E27FC236}">
+                <a16:creationId xmlns:a16="http://schemas.microsoft.com/office/drawing/2014/main" id="{8415DF3A-1840-1472-FF5D-99B1E507D5BD}"/>
+              </a:ext>
+            </a:extLst>
+          </p:cNvPr>
+          <p:cNvPicPr>
+            <a:picLocks noChangeAspect="1"/>
+          </p:cNvPicPr>
+          <p:nvPr/>
+        </p:nvPicPr>
+        <p:blipFill>
+          <a:blip r:embed="rId2"/>
+          <a:stretch>
+            <a:fillRect/>
+          </a:stretch>
+        </p:blipFill>
+        <p:spPr>
+          <a:xfrm>
+            <a:off x="830424" y="1914274"/>
+            <a:ext cx="3087484" cy="653506"/>
+          </a:xfrm>
+          <a:prstGeom prst="rect">
+            <a:avLst/>
+          </a:prstGeom>
+        </p:spPr>
+      </p:pic>
+      <p:pic>
+        <p:nvPicPr>
+          <p:cNvPr id="10" name="Picture 9">
+            <a:extLst>
+              <a:ext uri="{FF2B5EF4-FFF2-40B4-BE49-F238E27FC236}">
+                <a16:creationId xmlns:a16="http://schemas.microsoft.com/office/drawing/2014/main" id="{5F6B003D-FDF0-EF99-3586-C0FFDC583585}"/>
+              </a:ext>
+            </a:extLst>
+          </p:cNvPr>
+          <p:cNvPicPr>
+            <a:picLocks noChangeAspect="1"/>
+          </p:cNvPicPr>
+          <p:nvPr/>
+        </p:nvPicPr>
+        <p:blipFill>
+          <a:blip r:embed="rId3"/>
+          <a:stretch>
+            <a:fillRect/>
+          </a:stretch>
+        </p:blipFill>
+        <p:spPr>
+          <a:xfrm>
+            <a:off x="811763" y="3021222"/>
+            <a:ext cx="5994919" cy="640170"/>
+          </a:xfrm>
+          <a:prstGeom prst="rect">
+            <a:avLst/>
+          </a:prstGeom>
+        </p:spPr>
+      </p:pic>
+      <p:pic>
+        <p:nvPicPr>
+          <p:cNvPr id="12" name="Picture 11">
+            <a:extLst>
+              <a:ext uri="{FF2B5EF4-FFF2-40B4-BE49-F238E27FC236}">
+                <a16:creationId xmlns:a16="http://schemas.microsoft.com/office/drawing/2014/main" id="{C342B00A-A94B-0699-C1AA-03D5665E9411}"/>
+              </a:ext>
+            </a:extLst>
+          </p:cNvPr>
+          <p:cNvPicPr>
+            <a:picLocks noChangeAspect="1"/>
+          </p:cNvPicPr>
+          <p:nvPr/>
+        </p:nvPicPr>
+        <p:blipFill>
+          <a:blip r:embed="rId4"/>
+          <a:stretch>
+            <a:fillRect/>
+          </a:stretch>
+        </p:blipFill>
+        <p:spPr>
+          <a:xfrm>
+            <a:off x="830424" y="4115566"/>
+            <a:ext cx="3134163" cy="586822"/>
+          </a:xfrm>
+          <a:prstGeom prst="rect">
+            <a:avLst/>
+          </a:prstGeom>
+        </p:spPr>
+      </p:pic>
+      <p:pic>
+        <p:nvPicPr>
+          <p:cNvPr id="14" name="Picture 13">
+            <a:extLst>
+              <a:ext uri="{FF2B5EF4-FFF2-40B4-BE49-F238E27FC236}">
+                <a16:creationId xmlns:a16="http://schemas.microsoft.com/office/drawing/2014/main" id="{E2A14496-4CC6-21E2-0D68-D3D67F706319}"/>
+              </a:ext>
+            </a:extLst>
+          </p:cNvPr>
+          <p:cNvPicPr>
+            <a:picLocks noChangeAspect="1"/>
+          </p:cNvPicPr>
+          <p:nvPr/>
+        </p:nvPicPr>
+        <p:blipFill>
+          <a:blip r:embed="rId5"/>
+          <a:stretch>
+            <a:fillRect/>
+          </a:stretch>
+        </p:blipFill>
+        <p:spPr>
+          <a:xfrm>
+            <a:off x="811763" y="5229728"/>
+            <a:ext cx="4525006" cy="628738"/>
+          </a:xfrm>
+          <a:prstGeom prst="rect">
+            <a:avLst/>
+          </a:prstGeom>
+        </p:spPr>
+      </p:pic>
+      <p:sp>
+        <p:nvSpPr>
+          <p:cNvPr id="15" name="TextBox 14">
+            <a:extLst>
+              <a:ext uri="{FF2B5EF4-FFF2-40B4-BE49-F238E27FC236}">
+                <a16:creationId xmlns:a16="http://schemas.microsoft.com/office/drawing/2014/main" id="{F5E9F3B9-95D3-81F3-7859-EE24744EE42B}"/>
+              </a:ext>
+            </a:extLst>
+          </p:cNvPr>
+          <p:cNvSpPr txBox="1"/>
+          <p:nvPr/>
+        </p:nvSpPr>
+        <p:spPr>
+          <a:xfrm>
+            <a:off x="8494936" y="2492788"/>
+            <a:ext cx="3196321" cy="523220"/>
+          </a:xfrm>
+          <a:prstGeom prst="rect">
+            <a:avLst/>
+          </a:prstGeom>
+          <a:noFill/>
+        </p:spPr>
+        <p:txBody>
+          <a:bodyPr wrap="square" rtlCol="0">
+            <a:spAutoFit/>
+          </a:bodyPr>
+          <a:lstStyle/>
+          <a:p>
+            <a:pPr algn="ctr"/>
+            <a:r>
+              <a:rPr lang="en-US" sz="2800" dirty="0">
+                <a:solidFill>
+                  <a:srgbClr val="002060"/>
+                </a:solidFill>
+              </a:rPr>
+              <a:t>Numerical issues</a:t>
+            </a:r>
+            <a:endParaRPr lang="en-US" sz="2000" dirty="0">
+              <a:solidFill>
+                <a:srgbClr val="002060"/>
+              </a:solidFill>
+            </a:endParaRPr>
+          </a:p>
+        </p:txBody>
+      </p:sp>
+      <p:sp>
+        <p:nvSpPr>
+          <p:cNvPr id="17" name="TextBox 16">
+            <a:extLst>
+              <a:ext uri="{FF2B5EF4-FFF2-40B4-BE49-F238E27FC236}">
+                <a16:creationId xmlns:a16="http://schemas.microsoft.com/office/drawing/2014/main" id="{8A54D96C-01FC-AA4F-D2E5-C21ABDEF4A74}"/>
+              </a:ext>
+            </a:extLst>
+          </p:cNvPr>
+          <p:cNvSpPr txBox="1"/>
+          <p:nvPr/>
+        </p:nvSpPr>
+        <p:spPr>
+          <a:xfrm>
+            <a:off x="9782131" y="3265672"/>
+            <a:ext cx="1231427" cy="523220"/>
+          </a:xfrm>
+          <a:prstGeom prst="rect">
+            <a:avLst/>
+          </a:prstGeom>
+          <a:noFill/>
+        </p:spPr>
+        <p:txBody>
+          <a:bodyPr wrap="square" rtlCol="0">
+            <a:spAutoFit/>
+          </a:bodyPr>
+          <a:lstStyle/>
+          <a:p>
+            <a:r>
+              <a:rPr lang="en-US" sz="2800" b="1" dirty="0">
+                <a:solidFill>
+                  <a:srgbClr val="002060"/>
+                </a:solidFill>
+              </a:rPr>
+              <a:t>c </a:t>
+            </a:r>
+            <a:r>
+              <a:rPr lang="en-US" sz="2800" b="1" baseline="30000" dirty="0">
+                <a:solidFill>
+                  <a:srgbClr val="002060"/>
+                </a:solidFill>
+              </a:rPr>
+              <a:t>– 1</a:t>
+            </a:r>
+            <a:endParaRPr lang="en-US" sz="2400" b="1" baseline="30000" dirty="0">
+              <a:solidFill>
+                <a:srgbClr val="002060"/>
+              </a:solidFill>
+            </a:endParaRPr>
+          </a:p>
+        </p:txBody>
+      </p:sp>
+      <p:sp>
+        <p:nvSpPr>
+          <p:cNvPr id="18" name="TextBox 17">
+            <a:extLst>
+              <a:ext uri="{FF2B5EF4-FFF2-40B4-BE49-F238E27FC236}">
+                <a16:creationId xmlns:a16="http://schemas.microsoft.com/office/drawing/2014/main" id="{B1CC6144-310D-9A12-386A-973056CC7CE6}"/>
+              </a:ext>
+            </a:extLst>
+          </p:cNvPr>
+          <p:cNvSpPr txBox="1"/>
+          <p:nvPr/>
+        </p:nvSpPr>
+        <p:spPr>
+          <a:xfrm>
+            <a:off x="9782130" y="4085203"/>
+            <a:ext cx="1231427" cy="523220"/>
+          </a:xfrm>
+          <a:prstGeom prst="rect">
+            <a:avLst/>
+          </a:prstGeom>
+          <a:noFill/>
+        </p:spPr>
+        <p:txBody>
+          <a:bodyPr wrap="square" rtlCol="0">
+            <a:spAutoFit/>
+          </a:bodyPr>
+          <a:lstStyle/>
+          <a:p>
+            <a:r>
+              <a:rPr lang="en-US" sz="2800" b="1" dirty="0">
+                <a:solidFill>
+                  <a:srgbClr val="002060"/>
+                </a:solidFill>
+              </a:rPr>
+              <a:t>A </a:t>
+            </a:r>
+            <a:r>
+              <a:rPr lang="en-US" sz="2800" b="1" baseline="30000" dirty="0">
+                <a:solidFill>
+                  <a:srgbClr val="002060"/>
+                </a:solidFill>
+              </a:rPr>
+              <a:t>– 1</a:t>
+            </a:r>
+            <a:endParaRPr lang="en-US" sz="2400" b="1" baseline="30000" dirty="0">
+              <a:solidFill>
+                <a:srgbClr val="002060"/>
+              </a:solidFill>
+            </a:endParaRPr>
+          </a:p>
+        </p:txBody>
+      </p:sp>
+      <p:sp>
+        <p:nvSpPr>
+          <p:cNvPr id="20" name="TextBox 19">
+            <a:extLst>
+              <a:ext uri="{FF2B5EF4-FFF2-40B4-BE49-F238E27FC236}">
+                <a16:creationId xmlns:a16="http://schemas.microsoft.com/office/drawing/2014/main" id="{72B9A7BB-4332-77C1-DBC5-240B4ABD690E}"/>
+              </a:ext>
+            </a:extLst>
+          </p:cNvPr>
+          <p:cNvSpPr txBox="1"/>
+          <p:nvPr/>
+        </p:nvSpPr>
+        <p:spPr>
+          <a:xfrm>
+            <a:off x="811763" y="5881592"/>
+            <a:ext cx="5075853" cy="400110"/>
+          </a:xfrm>
+          <a:prstGeom prst="rect">
+            <a:avLst/>
+          </a:prstGeom>
+          <a:noFill/>
+        </p:spPr>
+        <p:txBody>
+          <a:bodyPr wrap="square" rtlCol="0">
+            <a:spAutoFit/>
+          </a:bodyPr>
+          <a:lstStyle/>
+          <a:p>
+            <a:r>
+              <a:rPr lang="en-US" sz="2000" dirty="0">
+                <a:solidFill>
+                  <a:srgbClr val="FF0000"/>
+                </a:solidFill>
+              </a:rPr>
+              <a:t>Efficient Frontier (EF) of the risky assets only</a:t>
+            </a:r>
+          </a:p>
+        </p:txBody>
+      </p:sp>
+    </p:spTree>
+    <p:extLst>
+      <p:ext uri="{BB962C8B-B14F-4D97-AF65-F5344CB8AC3E}">
+        <p14:creationId xmlns:p14="http://schemas.microsoft.com/office/powerpoint/2010/main" val="4169213409"/>
       </p:ext>
     </p:extLst>
   </p:cSld>
@@ -8017,7 +8755,7 @@
           <a:p>
             <a:r>
               <a:rPr lang="en-US" sz="2400" dirty="0"/>
-              <a:t>For example, 1 unit of MSFT and 1 unit of MOL</a:t>
+              <a:t>For example, 1 unit of MSFT and 1 unit of AAPL</a:t>
             </a:r>
           </a:p>
           <a:p>
@@ -8026,7 +8764,7 @@
           <a:p>
             <a:r>
               <a:rPr lang="en-US" sz="2400" dirty="0"/>
-              <a:t>Normalization to sum of weights = 1 gives :   0.5 MSFT + 0.5 MOL</a:t>
+              <a:t>Normalization to sum of weights = 1 gives :   0.5 MSFT + 0.5 AAPL</a:t>
             </a:r>
           </a:p>
           <a:p>
@@ -8622,7 +9360,7 @@
         <p:spPr>
           <a:xfrm>
             <a:off x="625366" y="1602304"/>
-            <a:ext cx="3257086" cy="461665"/>
+            <a:ext cx="3886673" cy="461665"/>
           </a:xfrm>
           <a:prstGeom prst="rect">
             <a:avLst/>
@@ -8637,7 +9375,7 @@
           <a:p>
             <a:r>
               <a:rPr lang="en-US" sz="2400" b="1" dirty="0"/>
-              <a:t>Why forecast return ?</a:t>
+              <a:t>Why forecast the return ?</a:t>
             </a:r>
           </a:p>
         </p:txBody>
@@ -8657,7 +9395,7 @@
         <p:spPr>
           <a:xfrm>
             <a:off x="1224946" y="2709022"/>
-            <a:ext cx="8833456" cy="461665"/>
+            <a:ext cx="8833456" cy="1200329"/>
           </a:xfrm>
           <a:prstGeom prst="rect">
             <a:avLst/>
@@ -8676,7 +9414,16 @@
             </a:r>
             <a:r>
               <a:rPr lang="en-US" sz="2400" dirty="0"/>
-              <a:t>  can be used for discounting in, for example, bond pricing</a:t>
+              <a:t>  can be used for discounting</a:t>
+            </a:r>
+          </a:p>
+          <a:p>
+            <a:endParaRPr lang="en-US" sz="2400" dirty="0"/>
+          </a:p>
+          <a:p>
+            <a:r>
+              <a:rPr lang="en-US" sz="2400" dirty="0"/>
+              <a:t>discounting can be applied to – for example – bond pricing</a:t>
             </a:r>
           </a:p>
         </p:txBody>

</xml_diff>

<commit_message>
updated until slide with CAPM vs MPT detailed comparison
</commit_message>
<xml_diff>
--- a/MMS_2024_09_10/Farkas_2024_09_10.pptx
+++ b/MMS_2024_09_10/Farkas_2024_09_10.pptx
@@ -18,6 +18,12 @@
     <p:sldId id="274" r:id="rId12"/>
     <p:sldId id="272" r:id="rId13"/>
     <p:sldId id="275" r:id="rId14"/>
+    <p:sldId id="276" r:id="rId15"/>
+    <p:sldId id="277" r:id="rId16"/>
+    <p:sldId id="278" r:id="rId17"/>
+    <p:sldId id="279" r:id="rId18"/>
+    <p:sldId id="281" r:id="rId19"/>
+    <p:sldId id="280" r:id="rId20"/>
   </p:sldIdLst>
   <p:sldSz cx="12192000" cy="6858000"/>
   <p:notesSz cx="6858000" cy="9144000"/>
@@ -5554,7 +5560,7 @@
         </p:blipFill>
         <p:spPr>
           <a:xfrm>
-            <a:off x="811763" y="5229728"/>
+            <a:off x="774439" y="5229728"/>
             <a:ext cx="4525006" cy="628738"/>
           </a:xfrm>
           <a:prstGeom prst="rect">
@@ -5725,7 +5731,7 @@
         </p:nvSpPr>
         <p:spPr>
           <a:xfrm>
-            <a:off x="811763" y="5881592"/>
+            <a:off x="774439" y="5881592"/>
             <a:ext cx="5075853" cy="400110"/>
           </a:xfrm>
           <a:prstGeom prst="rect">
@@ -5754,6 +5760,1074 @@
     <p:extLst>
       <p:ext uri="{BB962C8B-B14F-4D97-AF65-F5344CB8AC3E}">
         <p14:creationId xmlns:p14="http://schemas.microsoft.com/office/powerpoint/2010/main" val="4169213409"/>
+      </p:ext>
+    </p:extLst>
+  </p:cSld>
+  <p:clrMapOvr>
+    <a:masterClrMapping/>
+  </p:clrMapOvr>
+</p:sld>
+</file>
+
+<file path=ppt/slides/slide14.xml><?xml version="1.0" encoding="utf-8"?>
+<p:sld xmlns:a="http://schemas.openxmlformats.org/drawingml/2006/main" xmlns:r="http://schemas.openxmlformats.org/officeDocument/2006/relationships" xmlns:p="http://schemas.openxmlformats.org/presentationml/2006/main">
+  <p:cSld>
+    <p:spTree>
+      <p:nvGrpSpPr>
+        <p:cNvPr id="1" name=""/>
+        <p:cNvGrpSpPr/>
+        <p:nvPr/>
+      </p:nvGrpSpPr>
+      <p:grpSpPr>
+        <a:xfrm>
+          <a:off x="0" y="0"/>
+          <a:ext cx="0" cy="0"/>
+          <a:chOff x="0" y="0"/>
+          <a:chExt cx="0" cy="0"/>
+        </a:xfrm>
+      </p:grpSpPr>
+      <p:sp>
+        <p:nvSpPr>
+          <p:cNvPr id="4" name="TextBox 3">
+            <a:extLst>
+              <a:ext uri="{FF2B5EF4-FFF2-40B4-BE49-F238E27FC236}">
+                <a16:creationId xmlns:a16="http://schemas.microsoft.com/office/drawing/2014/main" id="{899C39C7-B679-392C-2FFF-3763D1F8D354}"/>
+              </a:ext>
+            </a:extLst>
+          </p:cNvPr>
+          <p:cNvSpPr txBox="1"/>
+          <p:nvPr/>
+        </p:nvSpPr>
+        <p:spPr>
+          <a:xfrm>
+            <a:off x="105100" y="156234"/>
+            <a:ext cx="12002814" cy="369332"/>
+          </a:xfrm>
+          <a:prstGeom prst="rect">
+            <a:avLst/>
+          </a:prstGeom>
+          <a:noFill/>
+        </p:spPr>
+        <p:txBody>
+          <a:bodyPr wrap="square" rtlCol="0">
+            <a:spAutoFit/>
+          </a:bodyPr>
+          <a:lstStyle/>
+          <a:p>
+            <a:r>
+              <a:rPr lang="en-US" dirty="0">
+                <a:solidFill>
+                  <a:schemeClr val="bg1"/>
+                </a:solidFill>
+              </a:rPr>
+              <a:t>Modern Portfolio Theory (MPT)</a:t>
+            </a:r>
+          </a:p>
+        </p:txBody>
+      </p:sp>
+      <p:sp>
+        <p:nvSpPr>
+          <p:cNvPr id="36" name="TextBox 35">
+            <a:extLst>
+              <a:ext uri="{FF2B5EF4-FFF2-40B4-BE49-F238E27FC236}">
+                <a16:creationId xmlns:a16="http://schemas.microsoft.com/office/drawing/2014/main" id="{68707800-AB8D-57D0-536F-C8DA6C6FCBB0}"/>
+              </a:ext>
+            </a:extLst>
+          </p:cNvPr>
+          <p:cNvSpPr txBox="1"/>
+          <p:nvPr/>
+        </p:nvSpPr>
+        <p:spPr>
+          <a:xfrm>
+            <a:off x="376442" y="1315232"/>
+            <a:ext cx="2823963" cy="1815882"/>
+          </a:xfrm>
+          <a:prstGeom prst="rect">
+            <a:avLst/>
+          </a:prstGeom>
+          <a:noFill/>
+        </p:spPr>
+        <p:txBody>
+          <a:bodyPr wrap="square" rtlCol="0">
+            <a:spAutoFit/>
+          </a:bodyPr>
+          <a:lstStyle/>
+          <a:p>
+            <a:r>
+              <a:rPr lang="en-US" sz="2800" dirty="0"/>
+              <a:t>Example :</a:t>
+            </a:r>
+          </a:p>
+          <a:p>
+            <a:endParaRPr lang="en-US" sz="2800" dirty="0"/>
+          </a:p>
+          <a:p>
+            <a:r>
+              <a:rPr lang="en-US" sz="2800" dirty="0"/>
+              <a:t>Efficient Frontier</a:t>
+            </a:r>
+          </a:p>
+          <a:p>
+            <a:r>
+              <a:rPr lang="en-US" sz="2800" dirty="0"/>
+              <a:t>of  2  risky assets</a:t>
+            </a:r>
+          </a:p>
+        </p:txBody>
+      </p:sp>
+      <p:pic>
+        <p:nvPicPr>
+          <p:cNvPr id="9" name="Picture 8">
+            <a:extLst>
+              <a:ext uri="{FF2B5EF4-FFF2-40B4-BE49-F238E27FC236}">
+                <a16:creationId xmlns:a16="http://schemas.microsoft.com/office/drawing/2014/main" id="{82F5E05E-3E71-9401-A913-E66D800CDFF6}"/>
+              </a:ext>
+            </a:extLst>
+          </p:cNvPr>
+          <p:cNvPicPr>
+            <a:picLocks noChangeAspect="1"/>
+          </p:cNvPicPr>
+          <p:nvPr/>
+        </p:nvPicPr>
+        <p:blipFill>
+          <a:blip r:embed="rId2"/>
+          <a:stretch>
+            <a:fillRect/>
+          </a:stretch>
+        </p:blipFill>
+        <p:spPr>
+          <a:xfrm>
+            <a:off x="4189765" y="934539"/>
+            <a:ext cx="7483885" cy="5334745"/>
+          </a:xfrm>
+          <a:prstGeom prst="rect">
+            <a:avLst/>
+          </a:prstGeom>
+        </p:spPr>
+      </p:pic>
+      <p:sp>
+        <p:nvSpPr>
+          <p:cNvPr id="11" name="TextBox 10">
+            <a:extLst>
+              <a:ext uri="{FF2B5EF4-FFF2-40B4-BE49-F238E27FC236}">
+                <a16:creationId xmlns:a16="http://schemas.microsoft.com/office/drawing/2014/main" id="{D5610882-B506-D7E3-E6BD-499A93E4BF59}"/>
+              </a:ext>
+            </a:extLst>
+          </p:cNvPr>
+          <p:cNvSpPr txBox="1"/>
+          <p:nvPr/>
+        </p:nvSpPr>
+        <p:spPr>
+          <a:xfrm>
+            <a:off x="376441" y="5470466"/>
+            <a:ext cx="2823963" cy="584775"/>
+          </a:xfrm>
+          <a:prstGeom prst="rect">
+            <a:avLst/>
+          </a:prstGeom>
+          <a:noFill/>
+        </p:spPr>
+        <p:txBody>
+          <a:bodyPr wrap="square" rtlCol="0">
+            <a:spAutoFit/>
+          </a:bodyPr>
+          <a:lstStyle/>
+          <a:p>
+            <a:r>
+              <a:rPr lang="en-US" dirty="0"/>
+              <a:t>Data source:</a:t>
+            </a:r>
+          </a:p>
+          <a:p>
+            <a:r>
+              <a:rPr lang="en-US" sz="1400" dirty="0">
+                <a:latin typeface="Courier New" panose="02070309020205020404" pitchFamily="49" charset="0"/>
+                <a:cs typeface="Courier New" panose="02070309020205020404" pitchFamily="49" charset="0"/>
+              </a:rPr>
+              <a:t>kaggle.com/</a:t>
+            </a:r>
+            <a:r>
+              <a:rPr lang="en-US" sz="1400" dirty="0" err="1">
+                <a:latin typeface="Courier New" panose="02070309020205020404" pitchFamily="49" charset="0"/>
+                <a:cs typeface="Courier New" panose="02070309020205020404" pitchFamily="49" charset="0"/>
+              </a:rPr>
+              <a:t>dgawlik</a:t>
+            </a:r>
+            <a:r>
+              <a:rPr lang="en-US" sz="1400" dirty="0">
+                <a:latin typeface="Courier New" panose="02070309020205020404" pitchFamily="49" charset="0"/>
+                <a:cs typeface="Courier New" panose="02070309020205020404" pitchFamily="49" charset="0"/>
+              </a:rPr>
+              <a:t>/</a:t>
+            </a:r>
+            <a:r>
+              <a:rPr lang="en-US" sz="1400" dirty="0" err="1">
+                <a:latin typeface="Courier New" panose="02070309020205020404" pitchFamily="49" charset="0"/>
+                <a:cs typeface="Courier New" panose="02070309020205020404" pitchFamily="49" charset="0"/>
+              </a:rPr>
+              <a:t>nyse</a:t>
+            </a:r>
+            <a:endParaRPr lang="en-US" sz="1400" dirty="0">
+              <a:latin typeface="Courier New" panose="02070309020205020404" pitchFamily="49" charset="0"/>
+              <a:cs typeface="Courier New" panose="02070309020205020404" pitchFamily="49" charset="0"/>
+            </a:endParaRPr>
+          </a:p>
+        </p:txBody>
+      </p:sp>
+    </p:spTree>
+    <p:extLst>
+      <p:ext uri="{BB962C8B-B14F-4D97-AF65-F5344CB8AC3E}">
+        <p14:creationId xmlns:p14="http://schemas.microsoft.com/office/powerpoint/2010/main" val="1971575289"/>
+      </p:ext>
+    </p:extLst>
+  </p:cSld>
+  <p:clrMapOvr>
+    <a:masterClrMapping/>
+  </p:clrMapOvr>
+</p:sld>
+</file>
+
+<file path=ppt/slides/slide15.xml><?xml version="1.0" encoding="utf-8"?>
+<p:sld xmlns:a="http://schemas.openxmlformats.org/drawingml/2006/main" xmlns:r="http://schemas.openxmlformats.org/officeDocument/2006/relationships" xmlns:p="http://schemas.openxmlformats.org/presentationml/2006/main">
+  <p:cSld>
+    <p:spTree>
+      <p:nvGrpSpPr>
+        <p:cNvPr id="1" name=""/>
+        <p:cNvGrpSpPr/>
+        <p:nvPr/>
+      </p:nvGrpSpPr>
+      <p:grpSpPr>
+        <a:xfrm>
+          <a:off x="0" y="0"/>
+          <a:ext cx="0" cy="0"/>
+          <a:chOff x="0" y="0"/>
+          <a:chExt cx="0" cy="0"/>
+        </a:xfrm>
+      </p:grpSpPr>
+      <p:sp>
+        <p:nvSpPr>
+          <p:cNvPr id="4" name="TextBox 3">
+            <a:extLst>
+              <a:ext uri="{FF2B5EF4-FFF2-40B4-BE49-F238E27FC236}">
+                <a16:creationId xmlns:a16="http://schemas.microsoft.com/office/drawing/2014/main" id="{899C39C7-B679-392C-2FFF-3763D1F8D354}"/>
+              </a:ext>
+            </a:extLst>
+          </p:cNvPr>
+          <p:cNvSpPr txBox="1"/>
+          <p:nvPr/>
+        </p:nvSpPr>
+        <p:spPr>
+          <a:xfrm>
+            <a:off x="105100" y="156234"/>
+            <a:ext cx="12002814" cy="369332"/>
+          </a:xfrm>
+          <a:prstGeom prst="rect">
+            <a:avLst/>
+          </a:prstGeom>
+          <a:noFill/>
+        </p:spPr>
+        <p:txBody>
+          <a:bodyPr wrap="square" rtlCol="0">
+            <a:spAutoFit/>
+          </a:bodyPr>
+          <a:lstStyle/>
+          <a:p>
+            <a:r>
+              <a:rPr lang="en-US" dirty="0">
+                <a:solidFill>
+                  <a:schemeClr val="bg1"/>
+                </a:solidFill>
+              </a:rPr>
+              <a:t>Modern Portfolio Theory (MPT)</a:t>
+            </a:r>
+          </a:p>
+        </p:txBody>
+      </p:sp>
+      <p:sp>
+        <p:nvSpPr>
+          <p:cNvPr id="36" name="TextBox 35">
+            <a:extLst>
+              <a:ext uri="{FF2B5EF4-FFF2-40B4-BE49-F238E27FC236}">
+                <a16:creationId xmlns:a16="http://schemas.microsoft.com/office/drawing/2014/main" id="{68707800-AB8D-57D0-536F-C8DA6C6FCBB0}"/>
+              </a:ext>
+            </a:extLst>
+          </p:cNvPr>
+          <p:cNvSpPr txBox="1"/>
+          <p:nvPr/>
+        </p:nvSpPr>
+        <p:spPr>
+          <a:xfrm>
+            <a:off x="376442" y="1315232"/>
+            <a:ext cx="2823963" cy="1815882"/>
+          </a:xfrm>
+          <a:prstGeom prst="rect">
+            <a:avLst/>
+          </a:prstGeom>
+          <a:noFill/>
+        </p:spPr>
+        <p:txBody>
+          <a:bodyPr wrap="square" rtlCol="0">
+            <a:spAutoFit/>
+          </a:bodyPr>
+          <a:lstStyle/>
+          <a:p>
+            <a:r>
+              <a:rPr lang="en-US" sz="2800" dirty="0"/>
+              <a:t>Example :</a:t>
+            </a:r>
+          </a:p>
+          <a:p>
+            <a:endParaRPr lang="en-US" sz="2800" dirty="0"/>
+          </a:p>
+          <a:p>
+            <a:r>
+              <a:rPr lang="en-US" sz="2800" dirty="0"/>
+              <a:t>Efficient Frontier</a:t>
+            </a:r>
+          </a:p>
+          <a:p>
+            <a:r>
+              <a:rPr lang="en-US" sz="2800" dirty="0"/>
+              <a:t>of  5  risky assets</a:t>
+            </a:r>
+          </a:p>
+        </p:txBody>
+      </p:sp>
+      <p:pic>
+        <p:nvPicPr>
+          <p:cNvPr id="7" name="Picture 6">
+            <a:extLst>
+              <a:ext uri="{FF2B5EF4-FFF2-40B4-BE49-F238E27FC236}">
+                <a16:creationId xmlns:a16="http://schemas.microsoft.com/office/drawing/2014/main" id="{D4C81ECB-F85A-4974-9B81-A0DDB5F64FA9}"/>
+              </a:ext>
+            </a:extLst>
+          </p:cNvPr>
+          <p:cNvPicPr>
+            <a:picLocks noChangeAspect="1"/>
+          </p:cNvPicPr>
+          <p:nvPr/>
+        </p:nvPicPr>
+        <p:blipFill>
+          <a:blip r:embed="rId2"/>
+          <a:stretch>
+            <a:fillRect/>
+          </a:stretch>
+        </p:blipFill>
+        <p:spPr>
+          <a:xfrm>
+            <a:off x="4174104" y="939499"/>
+            <a:ext cx="7613442" cy="5311882"/>
+          </a:xfrm>
+          <a:prstGeom prst="rect">
+            <a:avLst/>
+          </a:prstGeom>
+        </p:spPr>
+      </p:pic>
+    </p:spTree>
+    <p:extLst>
+      <p:ext uri="{BB962C8B-B14F-4D97-AF65-F5344CB8AC3E}">
+        <p14:creationId xmlns:p14="http://schemas.microsoft.com/office/powerpoint/2010/main" val="4155681774"/>
+      </p:ext>
+    </p:extLst>
+  </p:cSld>
+  <p:clrMapOvr>
+    <a:masterClrMapping/>
+  </p:clrMapOvr>
+</p:sld>
+</file>
+
+<file path=ppt/slides/slide16.xml><?xml version="1.0" encoding="utf-8"?>
+<p:sld xmlns:a="http://schemas.openxmlformats.org/drawingml/2006/main" xmlns:r="http://schemas.openxmlformats.org/officeDocument/2006/relationships" xmlns:p="http://schemas.openxmlformats.org/presentationml/2006/main">
+  <p:cSld>
+    <p:spTree>
+      <p:nvGrpSpPr>
+        <p:cNvPr id="1" name=""/>
+        <p:cNvGrpSpPr/>
+        <p:nvPr/>
+      </p:nvGrpSpPr>
+      <p:grpSpPr>
+        <a:xfrm>
+          <a:off x="0" y="0"/>
+          <a:ext cx="0" cy="0"/>
+          <a:chOff x="0" y="0"/>
+          <a:chExt cx="0" cy="0"/>
+        </a:xfrm>
+      </p:grpSpPr>
+      <p:sp>
+        <p:nvSpPr>
+          <p:cNvPr id="4" name="TextBox 3">
+            <a:extLst>
+              <a:ext uri="{FF2B5EF4-FFF2-40B4-BE49-F238E27FC236}">
+                <a16:creationId xmlns:a16="http://schemas.microsoft.com/office/drawing/2014/main" id="{899C39C7-B679-392C-2FFF-3763D1F8D354}"/>
+              </a:ext>
+            </a:extLst>
+          </p:cNvPr>
+          <p:cNvSpPr txBox="1"/>
+          <p:nvPr/>
+        </p:nvSpPr>
+        <p:spPr>
+          <a:xfrm>
+            <a:off x="105100" y="156234"/>
+            <a:ext cx="12002814" cy="369332"/>
+          </a:xfrm>
+          <a:prstGeom prst="rect">
+            <a:avLst/>
+          </a:prstGeom>
+          <a:noFill/>
+        </p:spPr>
+        <p:txBody>
+          <a:bodyPr wrap="square" rtlCol="0">
+            <a:spAutoFit/>
+          </a:bodyPr>
+          <a:lstStyle/>
+          <a:p>
+            <a:r>
+              <a:rPr lang="en-US" dirty="0">
+                <a:solidFill>
+                  <a:schemeClr val="bg1"/>
+                </a:solidFill>
+              </a:rPr>
+              <a:t>Modern Portfolio Theory (MPT)</a:t>
+            </a:r>
+          </a:p>
+        </p:txBody>
+      </p:sp>
+      <p:sp>
+        <p:nvSpPr>
+          <p:cNvPr id="2" name="TextBox 1">
+            <a:extLst>
+              <a:ext uri="{FF2B5EF4-FFF2-40B4-BE49-F238E27FC236}">
+                <a16:creationId xmlns:a16="http://schemas.microsoft.com/office/drawing/2014/main" id="{4775D9B1-79E0-0E46-9124-62EB8F6F7B50}"/>
+              </a:ext>
+            </a:extLst>
+          </p:cNvPr>
+          <p:cNvSpPr txBox="1"/>
+          <p:nvPr/>
+        </p:nvSpPr>
+        <p:spPr>
+          <a:xfrm>
+            <a:off x="376438" y="1156604"/>
+            <a:ext cx="4419498" cy="523220"/>
+          </a:xfrm>
+          <a:prstGeom prst="rect">
+            <a:avLst/>
+          </a:prstGeom>
+          <a:noFill/>
+        </p:spPr>
+        <p:txBody>
+          <a:bodyPr wrap="square" rtlCol="0">
+            <a:spAutoFit/>
+          </a:bodyPr>
+          <a:lstStyle/>
+          <a:p>
+            <a:r>
+              <a:rPr lang="en-US" sz="2800" dirty="0"/>
+              <a:t>Variable change :   </a:t>
+            </a:r>
+            <a:r>
+              <a:rPr lang="el-GR" sz="2800" dirty="0"/>
+              <a:t>σ</a:t>
+            </a:r>
+            <a:r>
+              <a:rPr lang="en-US" sz="2800" dirty="0"/>
+              <a:t> </a:t>
+            </a:r>
+            <a:r>
+              <a:rPr lang="en-US" sz="2800" baseline="30000" dirty="0"/>
+              <a:t>2</a:t>
+            </a:r>
+            <a:r>
+              <a:rPr lang="el-GR" sz="2800" dirty="0"/>
+              <a:t> </a:t>
+            </a:r>
+            <a:r>
+              <a:rPr lang="en-US" sz="2000" dirty="0">
+                <a:sym typeface="Wingdings" panose="05000000000000000000" pitchFamily="2" charset="2"/>
+              </a:rPr>
+              <a:t></a:t>
+            </a:r>
+            <a:r>
+              <a:rPr lang="en-US" sz="2800" dirty="0">
+                <a:sym typeface="Wingdings" panose="05000000000000000000" pitchFamily="2" charset="2"/>
+              </a:rPr>
+              <a:t> </a:t>
+            </a:r>
+            <a:r>
+              <a:rPr lang="el-GR" sz="2800" dirty="0"/>
+              <a:t>σ</a:t>
+            </a:r>
+            <a:endParaRPr lang="en-US" sz="2000" dirty="0"/>
+          </a:p>
+        </p:txBody>
+      </p:sp>
+      <p:pic>
+        <p:nvPicPr>
+          <p:cNvPr id="6" name="Picture 5">
+            <a:extLst>
+              <a:ext uri="{FF2B5EF4-FFF2-40B4-BE49-F238E27FC236}">
+                <a16:creationId xmlns:a16="http://schemas.microsoft.com/office/drawing/2014/main" id="{D75D7060-7943-0A88-173D-970A80F5E6F7}"/>
+              </a:ext>
+            </a:extLst>
+          </p:cNvPr>
+          <p:cNvPicPr>
+            <a:picLocks noChangeAspect="1"/>
+          </p:cNvPicPr>
+          <p:nvPr/>
+        </p:nvPicPr>
+        <p:blipFill>
+          <a:blip r:embed="rId2"/>
+          <a:stretch>
+            <a:fillRect/>
+          </a:stretch>
+        </p:blipFill>
+        <p:spPr>
+          <a:xfrm>
+            <a:off x="714660" y="2108660"/>
+            <a:ext cx="5668166" cy="609685"/>
+          </a:xfrm>
+          <a:prstGeom prst="rect">
+            <a:avLst/>
+          </a:prstGeom>
+        </p:spPr>
+      </p:pic>
+      <p:pic>
+        <p:nvPicPr>
+          <p:cNvPr id="9" name="Picture 8">
+            <a:extLst>
+              <a:ext uri="{FF2B5EF4-FFF2-40B4-BE49-F238E27FC236}">
+                <a16:creationId xmlns:a16="http://schemas.microsoft.com/office/drawing/2014/main" id="{FEACAF8D-4904-51D0-F1C0-D527F5C3710E}"/>
+              </a:ext>
+            </a:extLst>
+          </p:cNvPr>
+          <p:cNvPicPr>
+            <a:picLocks noChangeAspect="1"/>
+          </p:cNvPicPr>
+          <p:nvPr/>
+        </p:nvPicPr>
+        <p:blipFill>
+          <a:blip r:embed="rId3"/>
+          <a:stretch>
+            <a:fillRect/>
+          </a:stretch>
+        </p:blipFill>
+        <p:spPr>
+          <a:xfrm>
+            <a:off x="714660" y="3326359"/>
+            <a:ext cx="2724530" cy="866896"/>
+          </a:xfrm>
+          <a:prstGeom prst="rect">
+            <a:avLst/>
+          </a:prstGeom>
+        </p:spPr>
+      </p:pic>
+      <p:sp>
+        <p:nvSpPr>
+          <p:cNvPr id="10" name="Arrow: Down 9">
+            <a:extLst>
+              <a:ext uri="{FF2B5EF4-FFF2-40B4-BE49-F238E27FC236}">
+                <a16:creationId xmlns:a16="http://schemas.microsoft.com/office/drawing/2014/main" id="{F544D323-0F48-ED7D-A213-2E8DBB172B8F}"/>
+              </a:ext>
+            </a:extLst>
+          </p:cNvPr>
+          <p:cNvSpPr/>
+          <p:nvPr/>
+        </p:nvSpPr>
+        <p:spPr>
+          <a:xfrm>
+            <a:off x="2155371" y="2855160"/>
+            <a:ext cx="373225" cy="396551"/>
+          </a:xfrm>
+          <a:prstGeom prst="downArrow">
+            <a:avLst/>
+          </a:prstGeom>
+          <a:solidFill>
+            <a:schemeClr val="tx2">
+              <a:lumMod val="50000"/>
+              <a:lumOff val="50000"/>
+            </a:schemeClr>
+          </a:solidFill>
+          <a:ln w="12700"/>
+        </p:spPr>
+        <p:style>
+          <a:lnRef idx="2">
+            <a:schemeClr val="accent1">
+              <a:shade val="15000"/>
+            </a:schemeClr>
+          </a:lnRef>
+          <a:fillRef idx="1">
+            <a:schemeClr val="accent1"/>
+          </a:fillRef>
+          <a:effectRef idx="0">
+            <a:schemeClr val="accent1"/>
+          </a:effectRef>
+          <a:fontRef idx="minor">
+            <a:schemeClr val="lt1"/>
+          </a:fontRef>
+        </p:style>
+        <p:txBody>
+          <a:bodyPr rtlCol="0" anchor="ctr"/>
+          <a:lstStyle/>
+          <a:p>
+            <a:pPr algn="ctr"/>
+            <a:endParaRPr lang="en-US"/>
+          </a:p>
+        </p:txBody>
+      </p:sp>
+      <p:pic>
+        <p:nvPicPr>
+          <p:cNvPr id="14" name="Picture 13">
+            <a:extLst>
+              <a:ext uri="{FF2B5EF4-FFF2-40B4-BE49-F238E27FC236}">
+                <a16:creationId xmlns:a16="http://schemas.microsoft.com/office/drawing/2014/main" id="{3FC29E25-E353-A818-2F7A-BBD04D9068F7}"/>
+              </a:ext>
+            </a:extLst>
+          </p:cNvPr>
+          <p:cNvPicPr>
+            <a:picLocks noChangeAspect="1"/>
+          </p:cNvPicPr>
+          <p:nvPr/>
+        </p:nvPicPr>
+        <p:blipFill>
+          <a:blip r:embed="rId4"/>
+          <a:stretch>
+            <a:fillRect/>
+          </a:stretch>
+        </p:blipFill>
+        <p:spPr>
+          <a:xfrm>
+            <a:off x="695806" y="4770793"/>
+            <a:ext cx="10721971" cy="1363390"/>
+          </a:xfrm>
+          <a:prstGeom prst="rect">
+            <a:avLst/>
+          </a:prstGeom>
+        </p:spPr>
+      </p:pic>
+    </p:spTree>
+    <p:extLst>
+      <p:ext uri="{BB962C8B-B14F-4D97-AF65-F5344CB8AC3E}">
+        <p14:creationId xmlns:p14="http://schemas.microsoft.com/office/powerpoint/2010/main" val="2555849594"/>
+      </p:ext>
+    </p:extLst>
+  </p:cSld>
+  <p:clrMapOvr>
+    <a:masterClrMapping/>
+  </p:clrMapOvr>
+</p:sld>
+</file>
+
+<file path=ppt/slides/slide17.xml><?xml version="1.0" encoding="utf-8"?>
+<p:sld xmlns:a="http://schemas.openxmlformats.org/drawingml/2006/main" xmlns:r="http://schemas.openxmlformats.org/officeDocument/2006/relationships" xmlns:p="http://schemas.openxmlformats.org/presentationml/2006/main">
+  <p:cSld>
+    <p:spTree>
+      <p:nvGrpSpPr>
+        <p:cNvPr id="1" name=""/>
+        <p:cNvGrpSpPr/>
+        <p:nvPr/>
+      </p:nvGrpSpPr>
+      <p:grpSpPr>
+        <a:xfrm>
+          <a:off x="0" y="0"/>
+          <a:ext cx="0" cy="0"/>
+          <a:chOff x="0" y="0"/>
+          <a:chExt cx="0" cy="0"/>
+        </a:xfrm>
+      </p:grpSpPr>
+      <p:sp>
+        <p:nvSpPr>
+          <p:cNvPr id="4" name="TextBox 3">
+            <a:extLst>
+              <a:ext uri="{FF2B5EF4-FFF2-40B4-BE49-F238E27FC236}">
+                <a16:creationId xmlns:a16="http://schemas.microsoft.com/office/drawing/2014/main" id="{899C39C7-B679-392C-2FFF-3763D1F8D354}"/>
+              </a:ext>
+            </a:extLst>
+          </p:cNvPr>
+          <p:cNvSpPr txBox="1"/>
+          <p:nvPr/>
+        </p:nvSpPr>
+        <p:spPr>
+          <a:xfrm>
+            <a:off x="105100" y="156234"/>
+            <a:ext cx="12002814" cy="369332"/>
+          </a:xfrm>
+          <a:prstGeom prst="rect">
+            <a:avLst/>
+          </a:prstGeom>
+          <a:noFill/>
+        </p:spPr>
+        <p:txBody>
+          <a:bodyPr wrap="square" rtlCol="0">
+            <a:spAutoFit/>
+          </a:bodyPr>
+          <a:lstStyle/>
+          <a:p>
+            <a:r>
+              <a:rPr lang="en-US" dirty="0">
+                <a:solidFill>
+                  <a:schemeClr val="bg1"/>
+                </a:solidFill>
+              </a:rPr>
+              <a:t>Modern Portfolio Theory (MPT)</a:t>
+            </a:r>
+          </a:p>
+        </p:txBody>
+      </p:sp>
+      <p:pic>
+        <p:nvPicPr>
+          <p:cNvPr id="8" name="Picture 7">
+            <a:extLst>
+              <a:ext uri="{FF2B5EF4-FFF2-40B4-BE49-F238E27FC236}">
+                <a16:creationId xmlns:a16="http://schemas.microsoft.com/office/drawing/2014/main" id="{221F13C4-0DA3-B7DF-13D7-B20D47D677B6}"/>
+              </a:ext>
+            </a:extLst>
+          </p:cNvPr>
+          <p:cNvPicPr>
+            <a:picLocks noChangeAspect="1"/>
+          </p:cNvPicPr>
+          <p:nvPr/>
+        </p:nvPicPr>
+        <p:blipFill>
+          <a:blip r:embed="rId2"/>
+          <a:stretch>
+            <a:fillRect/>
+          </a:stretch>
+        </p:blipFill>
+        <p:spPr>
+          <a:xfrm>
+            <a:off x="5793519" y="717970"/>
+            <a:ext cx="6207357" cy="5830114"/>
+          </a:xfrm>
+          <a:prstGeom prst="rect">
+            <a:avLst/>
+          </a:prstGeom>
+        </p:spPr>
+      </p:pic>
+      <p:pic>
+        <p:nvPicPr>
+          <p:cNvPr id="12" name="Picture 11">
+            <a:extLst>
+              <a:ext uri="{FF2B5EF4-FFF2-40B4-BE49-F238E27FC236}">
+                <a16:creationId xmlns:a16="http://schemas.microsoft.com/office/drawing/2014/main" id="{561D786B-A4EB-A69E-E2C7-5BA20B7940FA}"/>
+              </a:ext>
+            </a:extLst>
+          </p:cNvPr>
+          <p:cNvPicPr>
+            <a:picLocks noChangeAspect="1"/>
+          </p:cNvPicPr>
+          <p:nvPr/>
+        </p:nvPicPr>
+        <p:blipFill>
+          <a:blip r:embed="rId3"/>
+          <a:stretch>
+            <a:fillRect/>
+          </a:stretch>
+        </p:blipFill>
+        <p:spPr>
+          <a:xfrm>
+            <a:off x="376441" y="4782554"/>
+            <a:ext cx="5024186" cy="1448955"/>
+          </a:xfrm>
+          <a:prstGeom prst="rect">
+            <a:avLst/>
+          </a:prstGeom>
+        </p:spPr>
+      </p:pic>
+      <p:sp>
+        <p:nvSpPr>
+          <p:cNvPr id="13" name="TextBox 12">
+            <a:extLst>
+              <a:ext uri="{FF2B5EF4-FFF2-40B4-BE49-F238E27FC236}">
+                <a16:creationId xmlns:a16="http://schemas.microsoft.com/office/drawing/2014/main" id="{3E57BC3D-5F24-82F6-720A-0BFF2CAE2D78}"/>
+              </a:ext>
+            </a:extLst>
+          </p:cNvPr>
+          <p:cNvSpPr txBox="1"/>
+          <p:nvPr/>
+        </p:nvSpPr>
+        <p:spPr>
+          <a:xfrm>
+            <a:off x="227145" y="1165936"/>
+            <a:ext cx="5315232" cy="2677656"/>
+          </a:xfrm>
+          <a:prstGeom prst="rect">
+            <a:avLst/>
+          </a:prstGeom>
+          <a:noFill/>
+        </p:spPr>
+        <p:txBody>
+          <a:bodyPr wrap="square" rtlCol="0">
+            <a:spAutoFit/>
+          </a:bodyPr>
+          <a:lstStyle/>
+          <a:p>
+            <a:r>
+              <a:rPr lang="en-US" sz="2800" dirty="0"/>
+              <a:t>Efficient Frontier (EF)</a:t>
+            </a:r>
+          </a:p>
+          <a:p>
+            <a:r>
+              <a:rPr lang="en-US" sz="2800" dirty="0"/>
+              <a:t>of  </a:t>
+            </a:r>
+            <a:r>
+              <a:rPr lang="en-US" sz="2800" i="1" dirty="0"/>
+              <a:t>N</a:t>
+            </a:r>
+            <a:r>
+              <a:rPr lang="en-US" sz="2800" dirty="0"/>
+              <a:t>  risky assets</a:t>
+            </a:r>
+          </a:p>
+          <a:p>
+            <a:r>
+              <a:rPr lang="en-US" sz="2800" dirty="0"/>
+              <a:t>      plus  1  risk-free asset :</a:t>
+            </a:r>
+          </a:p>
+          <a:p>
+            <a:endParaRPr lang="en-US" sz="2800" dirty="0"/>
+          </a:p>
+          <a:p>
+            <a:r>
+              <a:rPr lang="en-US" sz="2800" dirty="0"/>
+              <a:t>Line containing the Risk-Free point and tangent to the Risky EF</a:t>
+            </a:r>
+          </a:p>
+        </p:txBody>
+      </p:sp>
+    </p:spTree>
+    <p:extLst>
+      <p:ext uri="{BB962C8B-B14F-4D97-AF65-F5344CB8AC3E}">
+        <p14:creationId xmlns:p14="http://schemas.microsoft.com/office/powerpoint/2010/main" val="4192395932"/>
+      </p:ext>
+    </p:extLst>
+  </p:cSld>
+  <p:clrMapOvr>
+    <a:masterClrMapping/>
+  </p:clrMapOvr>
+</p:sld>
+</file>
+
+<file path=ppt/slides/slide18.xml><?xml version="1.0" encoding="utf-8"?>
+<p:sld xmlns:a="http://schemas.openxmlformats.org/drawingml/2006/main" xmlns:r="http://schemas.openxmlformats.org/officeDocument/2006/relationships" xmlns:p="http://schemas.openxmlformats.org/presentationml/2006/main">
+  <p:cSld>
+    <p:spTree>
+      <p:nvGrpSpPr>
+        <p:cNvPr id="1" name=""/>
+        <p:cNvGrpSpPr/>
+        <p:nvPr/>
+      </p:nvGrpSpPr>
+      <p:grpSpPr>
+        <a:xfrm>
+          <a:off x="0" y="0"/>
+          <a:ext cx="0" cy="0"/>
+          <a:chOff x="0" y="0"/>
+          <a:chExt cx="0" cy="0"/>
+        </a:xfrm>
+      </p:grpSpPr>
+      <p:sp>
+        <p:nvSpPr>
+          <p:cNvPr id="4" name="TextBox 3">
+            <a:extLst>
+              <a:ext uri="{FF2B5EF4-FFF2-40B4-BE49-F238E27FC236}">
+                <a16:creationId xmlns:a16="http://schemas.microsoft.com/office/drawing/2014/main" id="{899C39C7-B679-392C-2FFF-3763D1F8D354}"/>
+              </a:ext>
+            </a:extLst>
+          </p:cNvPr>
+          <p:cNvSpPr txBox="1"/>
+          <p:nvPr/>
+        </p:nvSpPr>
+        <p:spPr>
+          <a:xfrm>
+            <a:off x="105100" y="156234"/>
+            <a:ext cx="12002814" cy="369332"/>
+          </a:xfrm>
+          <a:prstGeom prst="rect">
+            <a:avLst/>
+          </a:prstGeom>
+          <a:noFill/>
+        </p:spPr>
+        <p:txBody>
+          <a:bodyPr wrap="square" rtlCol="0">
+            <a:spAutoFit/>
+          </a:bodyPr>
+          <a:lstStyle/>
+          <a:p>
+            <a:r>
+              <a:rPr lang="en-US" dirty="0">
+                <a:solidFill>
+                  <a:schemeClr val="bg1"/>
+                </a:solidFill>
+              </a:rPr>
+              <a:t>Capital Asset Pricing Model (CAPM)</a:t>
+            </a:r>
+          </a:p>
+        </p:txBody>
+      </p:sp>
+      <p:sp>
+        <p:nvSpPr>
+          <p:cNvPr id="2" name="TextBox 1">
+            <a:extLst>
+              <a:ext uri="{FF2B5EF4-FFF2-40B4-BE49-F238E27FC236}">
+                <a16:creationId xmlns:a16="http://schemas.microsoft.com/office/drawing/2014/main" id="{A6D233CE-EEF2-5880-0EAD-95627C8D55EB}"/>
+              </a:ext>
+            </a:extLst>
+          </p:cNvPr>
+          <p:cNvSpPr txBox="1"/>
+          <p:nvPr/>
+        </p:nvSpPr>
+        <p:spPr>
+          <a:xfrm>
+            <a:off x="1999961" y="1641797"/>
+            <a:ext cx="7731868" cy="1384995"/>
+          </a:xfrm>
+          <a:prstGeom prst="rect">
+            <a:avLst/>
+          </a:prstGeom>
+          <a:noFill/>
+        </p:spPr>
+        <p:txBody>
+          <a:bodyPr wrap="square" rtlCol="0">
+            <a:spAutoFit/>
+          </a:bodyPr>
+          <a:lstStyle/>
+          <a:p>
+            <a:r>
+              <a:rPr lang="en-US" sz="2800" dirty="0"/>
+              <a:t>MPT		</a:t>
+            </a:r>
+            <a:r>
+              <a:rPr lang="el-GR" sz="2800" dirty="0"/>
+              <a:t>σ</a:t>
+            </a:r>
+            <a:r>
+              <a:rPr lang="en-US" sz="2800" dirty="0"/>
+              <a:t>	full risk</a:t>
+            </a:r>
+          </a:p>
+          <a:p>
+            <a:endParaRPr lang="en-US" sz="2800" dirty="0"/>
+          </a:p>
+          <a:p>
+            <a:r>
+              <a:rPr lang="en-US" sz="2800" dirty="0"/>
+              <a:t>CAPM	</a:t>
+            </a:r>
+            <a:r>
+              <a:rPr lang="el-GR" sz="2800" dirty="0"/>
+              <a:t>ϐ</a:t>
+            </a:r>
+            <a:r>
+              <a:rPr lang="en-US" sz="2800" dirty="0"/>
+              <a:t>	non-diversifiable risk</a:t>
+            </a:r>
+          </a:p>
+        </p:txBody>
+      </p:sp>
+    </p:spTree>
+    <p:extLst>
+      <p:ext uri="{BB962C8B-B14F-4D97-AF65-F5344CB8AC3E}">
+        <p14:creationId xmlns:p14="http://schemas.microsoft.com/office/powerpoint/2010/main" val="1238996385"/>
+      </p:ext>
+    </p:extLst>
+  </p:cSld>
+  <p:clrMapOvr>
+    <a:masterClrMapping/>
+  </p:clrMapOvr>
+</p:sld>
+</file>
+
+<file path=ppt/slides/slide19.xml><?xml version="1.0" encoding="utf-8"?>
+<p:sld xmlns:a="http://schemas.openxmlformats.org/drawingml/2006/main" xmlns:r="http://schemas.openxmlformats.org/officeDocument/2006/relationships" xmlns:p="http://schemas.openxmlformats.org/presentationml/2006/main">
+  <p:cSld>
+    <p:spTree>
+      <p:nvGrpSpPr>
+        <p:cNvPr id="1" name=""/>
+        <p:cNvGrpSpPr/>
+        <p:nvPr/>
+      </p:nvGrpSpPr>
+      <p:grpSpPr>
+        <a:xfrm>
+          <a:off x="0" y="0"/>
+          <a:ext cx="0" cy="0"/>
+          <a:chOff x="0" y="0"/>
+          <a:chExt cx="0" cy="0"/>
+        </a:xfrm>
+      </p:grpSpPr>
+      <p:sp>
+        <p:nvSpPr>
+          <p:cNvPr id="4" name="TextBox 3">
+            <a:extLst>
+              <a:ext uri="{FF2B5EF4-FFF2-40B4-BE49-F238E27FC236}">
+                <a16:creationId xmlns:a16="http://schemas.microsoft.com/office/drawing/2014/main" id="{899C39C7-B679-392C-2FFF-3763D1F8D354}"/>
+              </a:ext>
+            </a:extLst>
+          </p:cNvPr>
+          <p:cNvSpPr txBox="1"/>
+          <p:nvPr/>
+        </p:nvSpPr>
+        <p:spPr>
+          <a:xfrm>
+            <a:off x="105100" y="156234"/>
+            <a:ext cx="12002814" cy="369332"/>
+          </a:xfrm>
+          <a:prstGeom prst="rect">
+            <a:avLst/>
+          </a:prstGeom>
+          <a:noFill/>
+        </p:spPr>
+        <p:txBody>
+          <a:bodyPr wrap="square" rtlCol="0">
+            <a:spAutoFit/>
+          </a:bodyPr>
+          <a:lstStyle/>
+          <a:p>
+            <a:r>
+              <a:rPr lang="en-US" dirty="0">
+                <a:solidFill>
+                  <a:schemeClr val="bg1"/>
+                </a:solidFill>
+              </a:rPr>
+              <a:t>Capital Asset Pricing Model (CAPM)</a:t>
+            </a:r>
+          </a:p>
+        </p:txBody>
+      </p:sp>
+      <p:pic>
+        <p:nvPicPr>
+          <p:cNvPr id="6" name="Picture 5">
+            <a:extLst>
+              <a:ext uri="{FF2B5EF4-FFF2-40B4-BE49-F238E27FC236}">
+                <a16:creationId xmlns:a16="http://schemas.microsoft.com/office/drawing/2014/main" id="{AB3E4D3C-CC89-19AC-F0C4-3607CAA7F3E5}"/>
+              </a:ext>
+            </a:extLst>
+          </p:cNvPr>
+          <p:cNvPicPr>
+            <a:picLocks noChangeAspect="1"/>
+          </p:cNvPicPr>
+          <p:nvPr/>
+        </p:nvPicPr>
+        <p:blipFill>
+          <a:blip r:embed="rId2"/>
+          <a:stretch>
+            <a:fillRect/>
+          </a:stretch>
+        </p:blipFill>
+        <p:spPr>
+          <a:xfrm>
+            <a:off x="1049694" y="907170"/>
+            <a:ext cx="10092612" cy="5449413"/>
+          </a:xfrm>
+          <a:prstGeom prst="rect">
+            <a:avLst/>
+          </a:prstGeom>
+        </p:spPr>
+      </p:pic>
+    </p:spTree>
+    <p:extLst>
+      <p:ext uri="{BB962C8B-B14F-4D97-AF65-F5344CB8AC3E}">
+        <p14:creationId xmlns:p14="http://schemas.microsoft.com/office/powerpoint/2010/main" val="1107598918"/>
       </p:ext>
     </p:extLst>
   </p:cSld>

</xml_diff>

<commit_message>
added slide: MPT EF of rnd portfolios of risky assets
</commit_message>
<xml_diff>
--- a/MMS_2024_09_10/Farkas_2024_09_10.pptx
+++ b/MMS_2024_09_10/Farkas_2024_09_10.pptx
@@ -20,10 +20,12 @@
     <p:sldId id="275" r:id="rId14"/>
     <p:sldId id="276" r:id="rId15"/>
     <p:sldId id="277" r:id="rId16"/>
-    <p:sldId id="278" r:id="rId17"/>
-    <p:sldId id="279" r:id="rId18"/>
-    <p:sldId id="281" r:id="rId19"/>
-    <p:sldId id="280" r:id="rId20"/>
+    <p:sldId id="283" r:id="rId17"/>
+    <p:sldId id="278" r:id="rId18"/>
+    <p:sldId id="279" r:id="rId19"/>
+    <p:sldId id="281" r:id="rId20"/>
+    <p:sldId id="280" r:id="rId21"/>
+    <p:sldId id="282" r:id="rId22"/>
   </p:sldIdLst>
   <p:sldSz cx="12192000" cy="6858000"/>
   <p:notesSz cx="6858000" cy="9144000"/>
@@ -309,7 +311,7 @@
           <a:p>
             <a:fld id="{0163D073-7F8B-4D43-A6FF-3B651CD8FEF9}" type="datetimeFigureOut">
               <a:rPr lang="en-US" smtClean="0"/>
-              <a:t>9/3/2024</a:t>
+              <a:t>9/7/2024</a:t>
             </a:fld>
             <a:endParaRPr lang="en-US"/>
           </a:p>
@@ -547,7 +549,7 @@
           <a:p>
             <a:fld id="{0163D073-7F8B-4D43-A6FF-3B651CD8FEF9}" type="datetimeFigureOut">
               <a:rPr lang="en-US" smtClean="0"/>
-              <a:t>9/3/2024</a:t>
+              <a:t>9/7/2024</a:t>
             </a:fld>
             <a:endParaRPr lang="en-US"/>
           </a:p>
@@ -785,7 +787,7 @@
           <a:p>
             <a:fld id="{0163D073-7F8B-4D43-A6FF-3B651CD8FEF9}" type="datetimeFigureOut">
               <a:rPr lang="en-US" smtClean="0"/>
-              <a:t>9/3/2024</a:t>
+              <a:t>9/7/2024</a:t>
             </a:fld>
             <a:endParaRPr lang="en-US"/>
           </a:p>
@@ -1090,7 +1092,7 @@
           <a:p>
             <a:fld id="{0163D073-7F8B-4D43-A6FF-3B651CD8FEF9}" type="datetimeFigureOut">
               <a:rPr lang="en-US" smtClean="0"/>
-              <a:t>9/3/2024</a:t>
+              <a:t>9/7/2024</a:t>
             </a:fld>
             <a:endParaRPr lang="en-US"/>
           </a:p>
@@ -1393,7 +1395,7 @@
           <a:p>
             <a:fld id="{0163D073-7F8B-4D43-A6FF-3B651CD8FEF9}" type="datetimeFigureOut">
               <a:rPr lang="en-US" smtClean="0"/>
-              <a:t>9/3/2024</a:t>
+              <a:t>9/7/2024</a:t>
             </a:fld>
             <a:endParaRPr lang="en-US"/>
           </a:p>
@@ -1844,7 +1846,7 @@
           <a:p>
             <a:fld id="{0163D073-7F8B-4D43-A6FF-3B651CD8FEF9}" type="datetimeFigureOut">
               <a:rPr lang="en-US" smtClean="0"/>
-              <a:t>9/3/2024</a:t>
+              <a:t>9/7/2024</a:t>
             </a:fld>
             <a:endParaRPr lang="en-US"/>
           </a:p>
@@ -2017,7 +2019,7 @@
           <a:p>
             <a:fld id="{0163D073-7F8B-4D43-A6FF-3B651CD8FEF9}" type="datetimeFigureOut">
               <a:rPr lang="en-US" smtClean="0"/>
-              <a:t>9/3/2024</a:t>
+              <a:t>9/7/2024</a:t>
             </a:fld>
             <a:endParaRPr lang="en-US"/>
           </a:p>
@@ -2154,7 +2156,7 @@
           <a:p>
             <a:fld id="{0163D073-7F8B-4D43-A6FF-3B651CD8FEF9}" type="datetimeFigureOut">
               <a:rPr lang="en-US" smtClean="0"/>
-              <a:t>9/3/2024</a:t>
+              <a:t>9/7/2024</a:t>
             </a:fld>
             <a:endParaRPr lang="en-US"/>
           </a:p>
@@ -2498,7 +2500,7 @@
           <a:p>
             <a:fld id="{0163D073-7F8B-4D43-A6FF-3B651CD8FEF9}" type="datetimeFigureOut">
               <a:rPr lang="en-US" smtClean="0"/>
-              <a:t>9/3/2024</a:t>
+              <a:t>9/7/2024</a:t>
             </a:fld>
             <a:endParaRPr lang="en-US"/>
           </a:p>
@@ -2819,7 +2821,7 @@
           <a:p>
             <a:fld id="{0163D073-7F8B-4D43-A6FF-3B651CD8FEF9}" type="datetimeFigureOut">
               <a:rPr lang="en-US" smtClean="0"/>
-              <a:t>9/3/2024</a:t>
+              <a:t>9/7/2024</a:t>
             </a:fld>
             <a:endParaRPr lang="en-US"/>
           </a:p>
@@ -6194,10 +6196,10 @@
       </p:sp>
       <p:sp>
         <p:nvSpPr>
-          <p:cNvPr id="2" name="TextBox 1">
-            <a:extLst>
-              <a:ext uri="{FF2B5EF4-FFF2-40B4-BE49-F238E27FC236}">
-                <a16:creationId xmlns:a16="http://schemas.microsoft.com/office/drawing/2014/main" id="{4775D9B1-79E0-0E46-9124-62EB8F6F7B50}"/>
+          <p:cNvPr id="36" name="TextBox 35">
+            <a:extLst>
+              <a:ext uri="{FF2B5EF4-FFF2-40B4-BE49-F238E27FC236}">
+                <a16:creationId xmlns:a16="http://schemas.microsoft.com/office/drawing/2014/main" id="{68707800-AB8D-57D0-536F-C8DA6C6FCBB0}"/>
               </a:ext>
             </a:extLst>
           </p:cNvPr>
@@ -6206,8 +6208,8 @@
         </p:nvSpPr>
         <p:spPr>
           <a:xfrm>
-            <a:off x="376438" y="1156604"/>
-            <a:ext cx="4419498" cy="523220"/>
+            <a:off x="376443" y="1315232"/>
+            <a:ext cx="2558782" cy="1815882"/>
           </a:xfrm>
           <a:prstGeom prst="rect">
             <a:avLst/>
@@ -6222,50 +6224,36 @@
           <a:p>
             <a:r>
               <a:rPr lang="en-US" sz="2800" dirty="0"/>
-              <a:t>Variable change :   </a:t>
-            </a:r>
-            <a:r>
-              <a:rPr lang="el-GR" sz="2800" dirty="0"/>
-              <a:t>σ</a:t>
+              <a:t>Example :</a:t>
+            </a:r>
+          </a:p>
+          <a:p>
+            <a:endParaRPr lang="en-US" sz="2800" dirty="0"/>
+          </a:p>
+          <a:p>
+            <a:r>
+              <a:rPr lang="en-US" sz="2800" dirty="0" err="1"/>
+              <a:t>Rnd</a:t>
             </a:r>
             <a:r>
               <a:rPr lang="en-US" sz="2800" dirty="0"/>
-              <a:t> </a:t>
-            </a:r>
-            <a:r>
-              <a:rPr lang="en-US" sz="2800" baseline="30000" dirty="0"/>
-              <a:t>2</a:t>
-            </a:r>
-            <a:r>
-              <a:rPr lang="el-GR" sz="2800" dirty="0"/>
-              <a:t> </a:t>
-            </a:r>
-            <a:r>
-              <a:rPr lang="en-US" sz="2000" dirty="0">
-                <a:sym typeface="Wingdings" panose="05000000000000000000" pitchFamily="2" charset="2"/>
-              </a:rPr>
-              <a:t></a:t>
-            </a:r>
-            <a:r>
-              <a:rPr lang="en-US" sz="2800" dirty="0">
-                <a:sym typeface="Wingdings" panose="05000000000000000000" pitchFamily="2" charset="2"/>
-              </a:rPr>
-              <a:t> </a:t>
-            </a:r>
-            <a:r>
-              <a:rPr lang="el-GR" sz="2800" dirty="0"/>
-              <a:t>σ</a:t>
-            </a:r>
-            <a:endParaRPr lang="en-US" sz="2000" dirty="0"/>
+              <a:t> portfolios</a:t>
+            </a:r>
+          </a:p>
+          <a:p>
+            <a:r>
+              <a:rPr lang="en-US" sz="2800" dirty="0"/>
+              <a:t>of risky assets</a:t>
+            </a:r>
           </a:p>
         </p:txBody>
       </p:sp>
       <p:pic>
         <p:nvPicPr>
-          <p:cNvPr id="6" name="Picture 5">
-            <a:extLst>
-              <a:ext uri="{FF2B5EF4-FFF2-40B4-BE49-F238E27FC236}">
-                <a16:creationId xmlns:a16="http://schemas.microsoft.com/office/drawing/2014/main" id="{D75D7060-7943-0A88-173D-970A80F5E6F7}"/>
+          <p:cNvPr id="3" name="Picture 2">
+            <a:extLst>
+              <a:ext uri="{FF2B5EF4-FFF2-40B4-BE49-F238E27FC236}">
+                <a16:creationId xmlns:a16="http://schemas.microsoft.com/office/drawing/2014/main" id="{362F1446-CBF1-2DB3-0ED1-3E77AE53C69A}"/>
               </a:ext>
             </a:extLst>
           </p:cNvPr>
@@ -6282,8 +6270,8 @@
         </p:blipFill>
         <p:spPr>
           <a:xfrm>
-            <a:off x="714660" y="2108660"/>
-            <a:ext cx="5668166" cy="609685"/>
+            <a:off x="3732245" y="797825"/>
+            <a:ext cx="7909321" cy="5318336"/>
           </a:xfrm>
           <a:prstGeom prst="rect">
             <a:avLst/>
@@ -6292,10 +6280,10 @@
       </p:pic>
       <p:pic>
         <p:nvPicPr>
-          <p:cNvPr id="9" name="Picture 8">
-            <a:extLst>
-              <a:ext uri="{FF2B5EF4-FFF2-40B4-BE49-F238E27FC236}">
-                <a16:creationId xmlns:a16="http://schemas.microsoft.com/office/drawing/2014/main" id="{FEACAF8D-4904-51D0-F1C0-D527F5C3710E}"/>
+          <p:cNvPr id="6" name="Picture 5">
+            <a:extLst>
+              <a:ext uri="{FF2B5EF4-FFF2-40B4-BE49-F238E27FC236}">
+                <a16:creationId xmlns:a16="http://schemas.microsoft.com/office/drawing/2014/main" id="{58E318EB-39C1-30D6-9A07-7107C8AB6F53}"/>
               </a:ext>
             </a:extLst>
           </p:cNvPr>
@@ -6312,91 +6300,8 @@
         </p:blipFill>
         <p:spPr>
           <a:xfrm>
-            <a:off x="714660" y="3326359"/>
-            <a:ext cx="2724530" cy="866896"/>
-          </a:xfrm>
-          <a:prstGeom prst="rect">
-            <a:avLst/>
-          </a:prstGeom>
-        </p:spPr>
-      </p:pic>
-      <p:sp>
-        <p:nvSpPr>
-          <p:cNvPr id="10" name="Arrow: Down 9">
-            <a:extLst>
-              <a:ext uri="{FF2B5EF4-FFF2-40B4-BE49-F238E27FC236}">
-                <a16:creationId xmlns:a16="http://schemas.microsoft.com/office/drawing/2014/main" id="{F544D323-0F48-ED7D-A213-2E8DBB172B8F}"/>
-              </a:ext>
-            </a:extLst>
-          </p:cNvPr>
-          <p:cNvSpPr/>
-          <p:nvPr/>
-        </p:nvSpPr>
-        <p:spPr>
-          <a:xfrm>
-            <a:off x="2155371" y="2855160"/>
-            <a:ext cx="373225" cy="396551"/>
-          </a:xfrm>
-          <a:prstGeom prst="downArrow">
-            <a:avLst/>
-          </a:prstGeom>
-          <a:solidFill>
-            <a:schemeClr val="tx2">
-              <a:lumMod val="50000"/>
-              <a:lumOff val="50000"/>
-            </a:schemeClr>
-          </a:solidFill>
-          <a:ln w="12700"/>
-        </p:spPr>
-        <p:style>
-          <a:lnRef idx="2">
-            <a:schemeClr val="accent1">
-              <a:shade val="15000"/>
-            </a:schemeClr>
-          </a:lnRef>
-          <a:fillRef idx="1">
-            <a:schemeClr val="accent1"/>
-          </a:fillRef>
-          <a:effectRef idx="0">
-            <a:schemeClr val="accent1"/>
-          </a:effectRef>
-          <a:fontRef idx="minor">
-            <a:schemeClr val="lt1"/>
-          </a:fontRef>
-        </p:style>
-        <p:txBody>
-          <a:bodyPr rtlCol="0" anchor="ctr"/>
-          <a:lstStyle/>
-          <a:p>
-            <a:pPr algn="ctr"/>
-            <a:endParaRPr lang="en-US"/>
-          </a:p>
-        </p:txBody>
-      </p:sp>
-      <p:pic>
-        <p:nvPicPr>
-          <p:cNvPr id="14" name="Picture 13">
-            <a:extLst>
-              <a:ext uri="{FF2B5EF4-FFF2-40B4-BE49-F238E27FC236}">
-                <a16:creationId xmlns:a16="http://schemas.microsoft.com/office/drawing/2014/main" id="{3FC29E25-E353-A818-2F7A-BBD04D9068F7}"/>
-              </a:ext>
-            </a:extLst>
-          </p:cNvPr>
-          <p:cNvPicPr>
-            <a:picLocks noChangeAspect="1"/>
-          </p:cNvPicPr>
-          <p:nvPr/>
-        </p:nvPicPr>
-        <p:blipFill>
-          <a:blip r:embed="rId4"/>
-          <a:stretch>
-            <a:fillRect/>
-          </a:stretch>
-        </p:blipFill>
-        <p:spPr>
-          <a:xfrm>
-            <a:off x="695806" y="4770793"/>
-            <a:ext cx="10721971" cy="1363390"/>
+            <a:off x="5346441" y="6190824"/>
+            <a:ext cx="4964768" cy="224537"/>
           </a:xfrm>
           <a:prstGeom prst="rect">
             <a:avLst/>
@@ -6406,7 +6311,7 @@
     </p:spTree>
     <p:extLst>
       <p:ext uri="{BB962C8B-B14F-4D97-AF65-F5344CB8AC3E}">
-        <p14:creationId xmlns:p14="http://schemas.microsoft.com/office/powerpoint/2010/main" val="2555849594"/>
+        <p14:creationId xmlns:p14="http://schemas.microsoft.com/office/powerpoint/2010/main" val="1300022009"/>
       </p:ext>
     </p:extLst>
   </p:cSld>
@@ -6472,12 +6377,80 @@
           </a:p>
         </p:txBody>
       </p:sp>
+      <p:sp>
+        <p:nvSpPr>
+          <p:cNvPr id="2" name="TextBox 1">
+            <a:extLst>
+              <a:ext uri="{FF2B5EF4-FFF2-40B4-BE49-F238E27FC236}">
+                <a16:creationId xmlns:a16="http://schemas.microsoft.com/office/drawing/2014/main" id="{4775D9B1-79E0-0E46-9124-62EB8F6F7B50}"/>
+              </a:ext>
+            </a:extLst>
+          </p:cNvPr>
+          <p:cNvSpPr txBox="1"/>
+          <p:nvPr/>
+        </p:nvSpPr>
+        <p:spPr>
+          <a:xfrm>
+            <a:off x="376438" y="1156604"/>
+            <a:ext cx="4419498" cy="523220"/>
+          </a:xfrm>
+          <a:prstGeom prst="rect">
+            <a:avLst/>
+          </a:prstGeom>
+          <a:noFill/>
+        </p:spPr>
+        <p:txBody>
+          <a:bodyPr wrap="square" rtlCol="0">
+            <a:spAutoFit/>
+          </a:bodyPr>
+          <a:lstStyle/>
+          <a:p>
+            <a:r>
+              <a:rPr lang="en-US" sz="2800" dirty="0"/>
+              <a:t>Variable change :   </a:t>
+            </a:r>
+            <a:r>
+              <a:rPr lang="el-GR" sz="2800" dirty="0"/>
+              <a:t>σ</a:t>
+            </a:r>
+            <a:r>
+              <a:rPr lang="en-US" sz="2800" dirty="0"/>
+              <a:t> </a:t>
+            </a:r>
+            <a:r>
+              <a:rPr lang="en-US" sz="2800" baseline="30000" dirty="0"/>
+              <a:t>2</a:t>
+            </a:r>
+            <a:r>
+              <a:rPr lang="el-GR" sz="2800" dirty="0"/>
+              <a:t> </a:t>
+            </a:r>
+            <a:r>
+              <a:rPr lang="en-US" sz="2000" dirty="0">
+                <a:sym typeface="Wingdings" panose="05000000000000000000" pitchFamily="2" charset="2"/>
+              </a:rPr>
+              <a:t></a:t>
+            </a:r>
+            <a:r>
+              <a:rPr lang="en-US" sz="2800" dirty="0">
+                <a:sym typeface="Wingdings" panose="05000000000000000000" pitchFamily="2" charset="2"/>
+              </a:rPr>
+              <a:t> </a:t>
+            </a:r>
+            <a:r>
+              <a:rPr lang="el-GR" sz="2800" dirty="0"/>
+              <a:t>σ</a:t>
+            </a:r>
+            <a:endParaRPr lang="en-US" sz="2000" dirty="0"/>
+          </a:p>
+        </p:txBody>
+      </p:sp>
       <p:pic>
         <p:nvPicPr>
-          <p:cNvPr id="8" name="Picture 7">
-            <a:extLst>
-              <a:ext uri="{FF2B5EF4-FFF2-40B4-BE49-F238E27FC236}">
-                <a16:creationId xmlns:a16="http://schemas.microsoft.com/office/drawing/2014/main" id="{221F13C4-0DA3-B7DF-13D7-B20D47D677B6}"/>
+          <p:cNvPr id="6" name="Picture 5">
+            <a:extLst>
+              <a:ext uri="{FF2B5EF4-FFF2-40B4-BE49-F238E27FC236}">
+                <a16:creationId xmlns:a16="http://schemas.microsoft.com/office/drawing/2014/main" id="{D75D7060-7943-0A88-173D-970A80F5E6F7}"/>
               </a:ext>
             </a:extLst>
           </p:cNvPr>
@@ -6494,8 +6467,8 @@
         </p:blipFill>
         <p:spPr>
           <a:xfrm>
-            <a:off x="5793519" y="717970"/>
-            <a:ext cx="6207357" cy="5830114"/>
+            <a:off x="714660" y="2108660"/>
+            <a:ext cx="5668166" cy="609685"/>
           </a:xfrm>
           <a:prstGeom prst="rect">
             <a:avLst/>
@@ -6504,10 +6477,10 @@
       </p:pic>
       <p:pic>
         <p:nvPicPr>
-          <p:cNvPr id="12" name="Picture 11">
-            <a:extLst>
-              <a:ext uri="{FF2B5EF4-FFF2-40B4-BE49-F238E27FC236}">
-                <a16:creationId xmlns:a16="http://schemas.microsoft.com/office/drawing/2014/main" id="{561D786B-A4EB-A69E-E2C7-5BA20B7940FA}"/>
+          <p:cNvPr id="9" name="Picture 8">
+            <a:extLst>
+              <a:ext uri="{FF2B5EF4-FFF2-40B4-BE49-F238E27FC236}">
+                <a16:creationId xmlns:a16="http://schemas.microsoft.com/office/drawing/2014/main" id="{FEACAF8D-4904-51D0-F1C0-D527F5C3710E}"/>
               </a:ext>
             </a:extLst>
           </p:cNvPr>
@@ -6524,8 +6497,8 @@
         </p:blipFill>
         <p:spPr>
           <a:xfrm>
-            <a:off x="376441" y="4782554"/>
-            <a:ext cx="5024186" cy="1448955"/>
+            <a:off x="714660" y="3326359"/>
+            <a:ext cx="2724530" cy="866896"/>
           </a:xfrm>
           <a:prstGeom prst="rect">
             <a:avLst/>
@@ -6534,72 +6507,91 @@
       </p:pic>
       <p:sp>
         <p:nvSpPr>
-          <p:cNvPr id="13" name="TextBox 12">
-            <a:extLst>
-              <a:ext uri="{FF2B5EF4-FFF2-40B4-BE49-F238E27FC236}">
-                <a16:creationId xmlns:a16="http://schemas.microsoft.com/office/drawing/2014/main" id="{3E57BC3D-5F24-82F6-720A-0BFF2CAE2D78}"/>
-              </a:ext>
-            </a:extLst>
-          </p:cNvPr>
-          <p:cNvSpPr txBox="1"/>
-          <p:nvPr/>
-        </p:nvSpPr>
-        <p:spPr>
-          <a:xfrm>
-            <a:off x="227145" y="1165936"/>
-            <a:ext cx="5315232" cy="2677656"/>
-          </a:xfrm>
-          <a:prstGeom prst="rect">
-            <a:avLst/>
-          </a:prstGeom>
-          <a:noFill/>
-        </p:spPr>
-        <p:txBody>
-          <a:bodyPr wrap="square" rtlCol="0">
-            <a:spAutoFit/>
-          </a:bodyPr>
-          <a:lstStyle/>
-          <a:p>
-            <a:r>
-              <a:rPr lang="en-US" sz="2800" dirty="0"/>
-              <a:t>Efficient Frontier (EF)</a:t>
-            </a:r>
-          </a:p>
-          <a:p>
-            <a:r>
-              <a:rPr lang="en-US" sz="2800" dirty="0"/>
-              <a:t>of  </a:t>
-            </a:r>
-            <a:r>
-              <a:rPr lang="en-US" sz="2800" i="1" dirty="0"/>
-              <a:t>N</a:t>
-            </a:r>
-            <a:r>
-              <a:rPr lang="en-US" sz="2800" dirty="0"/>
-              <a:t>  risky assets</a:t>
-            </a:r>
-          </a:p>
-          <a:p>
-            <a:r>
-              <a:rPr lang="en-US" sz="2800" dirty="0"/>
-              <a:t>      plus  1  risk-free asset :</a:t>
-            </a:r>
-          </a:p>
-          <a:p>
-            <a:endParaRPr lang="en-US" sz="2800" dirty="0"/>
-          </a:p>
-          <a:p>
-            <a:r>
-              <a:rPr lang="en-US" sz="2800" dirty="0"/>
-              <a:t>Line containing the Risk-Free point and tangent to the Risky EF</a:t>
-            </a:r>
-          </a:p>
-        </p:txBody>
-      </p:sp>
+          <p:cNvPr id="10" name="Arrow: Down 9">
+            <a:extLst>
+              <a:ext uri="{FF2B5EF4-FFF2-40B4-BE49-F238E27FC236}">
+                <a16:creationId xmlns:a16="http://schemas.microsoft.com/office/drawing/2014/main" id="{F544D323-0F48-ED7D-A213-2E8DBB172B8F}"/>
+              </a:ext>
+            </a:extLst>
+          </p:cNvPr>
+          <p:cNvSpPr/>
+          <p:nvPr/>
+        </p:nvSpPr>
+        <p:spPr>
+          <a:xfrm>
+            <a:off x="2155371" y="2855160"/>
+            <a:ext cx="373225" cy="396551"/>
+          </a:xfrm>
+          <a:prstGeom prst="downArrow">
+            <a:avLst/>
+          </a:prstGeom>
+          <a:solidFill>
+            <a:schemeClr val="tx2">
+              <a:lumMod val="50000"/>
+              <a:lumOff val="50000"/>
+            </a:schemeClr>
+          </a:solidFill>
+          <a:ln w="12700"/>
+        </p:spPr>
+        <p:style>
+          <a:lnRef idx="2">
+            <a:schemeClr val="accent1">
+              <a:shade val="15000"/>
+            </a:schemeClr>
+          </a:lnRef>
+          <a:fillRef idx="1">
+            <a:schemeClr val="accent1"/>
+          </a:fillRef>
+          <a:effectRef idx="0">
+            <a:schemeClr val="accent1"/>
+          </a:effectRef>
+          <a:fontRef idx="minor">
+            <a:schemeClr val="lt1"/>
+          </a:fontRef>
+        </p:style>
+        <p:txBody>
+          <a:bodyPr rtlCol="0" anchor="ctr"/>
+          <a:lstStyle/>
+          <a:p>
+            <a:pPr algn="ctr"/>
+            <a:endParaRPr lang="en-US"/>
+          </a:p>
+        </p:txBody>
+      </p:sp>
+      <p:pic>
+        <p:nvPicPr>
+          <p:cNvPr id="14" name="Picture 13">
+            <a:extLst>
+              <a:ext uri="{FF2B5EF4-FFF2-40B4-BE49-F238E27FC236}">
+                <a16:creationId xmlns:a16="http://schemas.microsoft.com/office/drawing/2014/main" id="{3FC29E25-E353-A818-2F7A-BBD04D9068F7}"/>
+              </a:ext>
+            </a:extLst>
+          </p:cNvPr>
+          <p:cNvPicPr>
+            <a:picLocks noChangeAspect="1"/>
+          </p:cNvPicPr>
+          <p:nvPr/>
+        </p:nvPicPr>
+        <p:blipFill>
+          <a:blip r:embed="rId4"/>
+          <a:stretch>
+            <a:fillRect/>
+          </a:stretch>
+        </p:blipFill>
+        <p:spPr>
+          <a:xfrm>
+            <a:off x="695806" y="4770793"/>
+            <a:ext cx="10721971" cy="1363390"/>
+          </a:xfrm>
+          <a:prstGeom prst="rect">
+            <a:avLst/>
+          </a:prstGeom>
+        </p:spPr>
+      </p:pic>
     </p:spTree>
     <p:extLst>
       <p:ext uri="{BB962C8B-B14F-4D97-AF65-F5344CB8AC3E}">
-        <p14:creationId xmlns:p14="http://schemas.microsoft.com/office/powerpoint/2010/main" val="4192395932"/>
+        <p14:creationId xmlns:p14="http://schemas.microsoft.com/office/powerpoint/2010/main" val="2555849594"/>
       </p:ext>
     </p:extLst>
   </p:cSld>
@@ -6660,17 +6652,77 @@
                   <a:schemeClr val="bg1"/>
                 </a:solidFill>
               </a:rPr>
-              <a:t>Capital Asset Pricing Model (CAPM)</a:t>
-            </a:r>
-          </a:p>
-        </p:txBody>
-      </p:sp>
-      <p:sp>
-        <p:nvSpPr>
-          <p:cNvPr id="2" name="TextBox 1">
-            <a:extLst>
-              <a:ext uri="{FF2B5EF4-FFF2-40B4-BE49-F238E27FC236}">
-                <a16:creationId xmlns:a16="http://schemas.microsoft.com/office/drawing/2014/main" id="{A6D233CE-EEF2-5880-0EAD-95627C8D55EB}"/>
+              <a:t>Modern Portfolio Theory (MPT)</a:t>
+            </a:r>
+          </a:p>
+        </p:txBody>
+      </p:sp>
+      <p:pic>
+        <p:nvPicPr>
+          <p:cNvPr id="8" name="Picture 7">
+            <a:extLst>
+              <a:ext uri="{FF2B5EF4-FFF2-40B4-BE49-F238E27FC236}">
+                <a16:creationId xmlns:a16="http://schemas.microsoft.com/office/drawing/2014/main" id="{221F13C4-0DA3-B7DF-13D7-B20D47D677B6}"/>
+              </a:ext>
+            </a:extLst>
+          </p:cNvPr>
+          <p:cNvPicPr>
+            <a:picLocks noChangeAspect="1"/>
+          </p:cNvPicPr>
+          <p:nvPr/>
+        </p:nvPicPr>
+        <p:blipFill>
+          <a:blip r:embed="rId2"/>
+          <a:stretch>
+            <a:fillRect/>
+          </a:stretch>
+        </p:blipFill>
+        <p:spPr>
+          <a:xfrm>
+            <a:off x="5793519" y="717970"/>
+            <a:ext cx="6207357" cy="5830114"/>
+          </a:xfrm>
+          <a:prstGeom prst="rect">
+            <a:avLst/>
+          </a:prstGeom>
+        </p:spPr>
+      </p:pic>
+      <p:pic>
+        <p:nvPicPr>
+          <p:cNvPr id="12" name="Picture 11">
+            <a:extLst>
+              <a:ext uri="{FF2B5EF4-FFF2-40B4-BE49-F238E27FC236}">
+                <a16:creationId xmlns:a16="http://schemas.microsoft.com/office/drawing/2014/main" id="{561D786B-A4EB-A69E-E2C7-5BA20B7940FA}"/>
+              </a:ext>
+            </a:extLst>
+          </p:cNvPr>
+          <p:cNvPicPr>
+            <a:picLocks noChangeAspect="1"/>
+          </p:cNvPicPr>
+          <p:nvPr/>
+        </p:nvPicPr>
+        <p:blipFill>
+          <a:blip r:embed="rId3"/>
+          <a:stretch>
+            <a:fillRect/>
+          </a:stretch>
+        </p:blipFill>
+        <p:spPr>
+          <a:xfrm>
+            <a:off x="376441" y="4782554"/>
+            <a:ext cx="5024186" cy="1448955"/>
+          </a:xfrm>
+          <a:prstGeom prst="rect">
+            <a:avLst/>
+          </a:prstGeom>
+        </p:spPr>
+      </p:pic>
+      <p:sp>
+        <p:nvSpPr>
+          <p:cNvPr id="13" name="TextBox 12">
+            <a:extLst>
+              <a:ext uri="{FF2B5EF4-FFF2-40B4-BE49-F238E27FC236}">
+                <a16:creationId xmlns:a16="http://schemas.microsoft.com/office/drawing/2014/main" id="{3E57BC3D-5F24-82F6-720A-0BFF2CAE2D78}"/>
               </a:ext>
             </a:extLst>
           </p:cNvPr>
@@ -6679,8 +6731,8 @@
         </p:nvSpPr>
         <p:spPr>
           <a:xfrm>
-            <a:off x="1999961" y="1641797"/>
-            <a:ext cx="7731868" cy="1384995"/>
+            <a:off x="227145" y="1165936"/>
+            <a:ext cx="5315232" cy="2677656"/>
           </a:xfrm>
           <a:prstGeom prst="rect">
             <a:avLst/>
@@ -6695,15 +6747,27 @@
           <a:p>
             <a:r>
               <a:rPr lang="en-US" sz="2800" dirty="0"/>
-              <a:t>MPT		</a:t>
-            </a:r>
-            <a:r>
-              <a:rPr lang="el-GR" sz="2800" dirty="0"/>
-              <a:t>σ</a:t>
-            </a:r>
+              <a:t>Efficient Frontier (EF)</a:t>
+            </a:r>
+          </a:p>
+          <a:p>
             <a:r>
               <a:rPr lang="en-US" sz="2800" dirty="0"/>
-              <a:t>	full risk</a:t>
+              <a:t>of  </a:t>
+            </a:r>
+            <a:r>
+              <a:rPr lang="en-US" sz="2800" i="1" dirty="0"/>
+              <a:t>N</a:t>
+            </a:r>
+            <a:r>
+              <a:rPr lang="en-US" sz="2800" dirty="0"/>
+              <a:t>  risky assets</a:t>
+            </a:r>
+          </a:p>
+          <a:p>
+            <a:r>
+              <a:rPr lang="en-US" sz="2800" dirty="0"/>
+              <a:t>      plus  1  risk-free asset :</a:t>
             </a:r>
           </a:p>
           <a:p>
@@ -6712,15 +6776,7 @@
           <a:p>
             <a:r>
               <a:rPr lang="en-US" sz="2800" dirty="0"/>
-              <a:t>CAPM	</a:t>
-            </a:r>
-            <a:r>
-              <a:rPr lang="el-GR" sz="2800" dirty="0"/>
-              <a:t>ϐ</a:t>
-            </a:r>
-            <a:r>
-              <a:rPr lang="en-US" sz="2800" dirty="0"/>
-              <a:t>	non-diversifiable risk</a:t>
+              <a:t>Line containing the Risk-Free point and tangent to the Risky EF</a:t>
             </a:r>
           </a:p>
         </p:txBody>
@@ -6728,7 +6784,7 @@
     </p:spTree>
     <p:extLst>
       <p:ext uri="{BB962C8B-B14F-4D97-AF65-F5344CB8AC3E}">
-        <p14:creationId xmlns:p14="http://schemas.microsoft.com/office/powerpoint/2010/main" val="1238996385"/>
+        <p14:creationId xmlns:p14="http://schemas.microsoft.com/office/powerpoint/2010/main" val="4192395932"/>
       </p:ext>
     </p:extLst>
   </p:cSld>
@@ -6794,40 +6850,70 @@
           </a:p>
         </p:txBody>
       </p:sp>
-      <p:pic>
-        <p:nvPicPr>
-          <p:cNvPr id="6" name="Picture 5">
-            <a:extLst>
-              <a:ext uri="{FF2B5EF4-FFF2-40B4-BE49-F238E27FC236}">
-                <a16:creationId xmlns:a16="http://schemas.microsoft.com/office/drawing/2014/main" id="{AB3E4D3C-CC89-19AC-F0C4-3607CAA7F3E5}"/>
-              </a:ext>
-            </a:extLst>
-          </p:cNvPr>
-          <p:cNvPicPr>
-            <a:picLocks noChangeAspect="1"/>
-          </p:cNvPicPr>
-          <p:nvPr/>
-        </p:nvPicPr>
-        <p:blipFill>
-          <a:blip r:embed="rId2"/>
-          <a:stretch>
-            <a:fillRect/>
-          </a:stretch>
-        </p:blipFill>
-        <p:spPr>
-          <a:xfrm>
-            <a:off x="1049694" y="907170"/>
-            <a:ext cx="10092612" cy="5449413"/>
-          </a:xfrm>
-          <a:prstGeom prst="rect">
-            <a:avLst/>
-          </a:prstGeom>
-        </p:spPr>
-      </p:pic>
+      <p:sp>
+        <p:nvSpPr>
+          <p:cNvPr id="2" name="TextBox 1">
+            <a:extLst>
+              <a:ext uri="{FF2B5EF4-FFF2-40B4-BE49-F238E27FC236}">
+                <a16:creationId xmlns:a16="http://schemas.microsoft.com/office/drawing/2014/main" id="{A6D233CE-EEF2-5880-0EAD-95627C8D55EB}"/>
+              </a:ext>
+            </a:extLst>
+          </p:cNvPr>
+          <p:cNvSpPr txBox="1"/>
+          <p:nvPr/>
+        </p:nvSpPr>
+        <p:spPr>
+          <a:xfrm>
+            <a:off x="2326532" y="2044005"/>
+            <a:ext cx="7731868" cy="1384995"/>
+          </a:xfrm>
+          <a:prstGeom prst="rect">
+            <a:avLst/>
+          </a:prstGeom>
+          <a:noFill/>
+        </p:spPr>
+        <p:txBody>
+          <a:bodyPr wrap="square" rtlCol="0">
+            <a:spAutoFit/>
+          </a:bodyPr>
+          <a:lstStyle/>
+          <a:p>
+            <a:r>
+              <a:rPr lang="en-US" sz="2800" dirty="0"/>
+              <a:t>MPT		</a:t>
+            </a:r>
+            <a:r>
+              <a:rPr lang="el-GR" sz="2800" dirty="0"/>
+              <a:t>σ</a:t>
+            </a:r>
+            <a:r>
+              <a:rPr lang="en-US" sz="2800" dirty="0"/>
+              <a:t>	full risk</a:t>
+            </a:r>
+          </a:p>
+          <a:p>
+            <a:endParaRPr lang="en-US" sz="2800" dirty="0"/>
+          </a:p>
+          <a:p>
+            <a:r>
+              <a:rPr lang="en-US" sz="2800" dirty="0"/>
+              <a:t>CAPM	</a:t>
+            </a:r>
+            <a:r>
+              <a:rPr lang="el-GR" sz="2800" dirty="0"/>
+              <a:t>ϐ</a:t>
+            </a:r>
+            <a:r>
+              <a:rPr lang="en-US" sz="2800" dirty="0"/>
+              <a:t>	non-diversifiable risk</a:t>
+            </a:r>
+          </a:p>
+        </p:txBody>
+      </p:sp>
     </p:spTree>
     <p:extLst>
       <p:ext uri="{BB962C8B-B14F-4D97-AF65-F5344CB8AC3E}">
-        <p14:creationId xmlns:p14="http://schemas.microsoft.com/office/powerpoint/2010/main" val="1107598918"/>
+        <p14:creationId xmlns:p14="http://schemas.microsoft.com/office/powerpoint/2010/main" val="1238996385"/>
       </p:ext>
     </p:extLst>
   </p:cSld>
@@ -6992,6 +7078,174 @@
     <p:extLst>
       <p:ext uri="{BB962C8B-B14F-4D97-AF65-F5344CB8AC3E}">
         <p14:creationId xmlns:p14="http://schemas.microsoft.com/office/powerpoint/2010/main" val="876769427"/>
+      </p:ext>
+    </p:extLst>
+  </p:cSld>
+  <p:clrMapOvr>
+    <a:masterClrMapping/>
+  </p:clrMapOvr>
+</p:sld>
+</file>
+
+<file path=ppt/slides/slide20.xml><?xml version="1.0" encoding="utf-8"?>
+<p:sld xmlns:a="http://schemas.openxmlformats.org/drawingml/2006/main" xmlns:r="http://schemas.openxmlformats.org/officeDocument/2006/relationships" xmlns:p="http://schemas.openxmlformats.org/presentationml/2006/main">
+  <p:cSld>
+    <p:spTree>
+      <p:nvGrpSpPr>
+        <p:cNvPr id="1" name=""/>
+        <p:cNvGrpSpPr/>
+        <p:nvPr/>
+      </p:nvGrpSpPr>
+      <p:grpSpPr>
+        <a:xfrm>
+          <a:off x="0" y="0"/>
+          <a:ext cx="0" cy="0"/>
+          <a:chOff x="0" y="0"/>
+          <a:chExt cx="0" cy="0"/>
+        </a:xfrm>
+      </p:grpSpPr>
+      <p:sp>
+        <p:nvSpPr>
+          <p:cNvPr id="4" name="TextBox 3">
+            <a:extLst>
+              <a:ext uri="{FF2B5EF4-FFF2-40B4-BE49-F238E27FC236}">
+                <a16:creationId xmlns:a16="http://schemas.microsoft.com/office/drawing/2014/main" id="{899C39C7-B679-392C-2FFF-3763D1F8D354}"/>
+              </a:ext>
+            </a:extLst>
+          </p:cNvPr>
+          <p:cNvSpPr txBox="1"/>
+          <p:nvPr/>
+        </p:nvSpPr>
+        <p:spPr>
+          <a:xfrm>
+            <a:off x="105100" y="156234"/>
+            <a:ext cx="12002814" cy="369332"/>
+          </a:xfrm>
+          <a:prstGeom prst="rect">
+            <a:avLst/>
+          </a:prstGeom>
+          <a:noFill/>
+        </p:spPr>
+        <p:txBody>
+          <a:bodyPr wrap="square" rtlCol="0">
+            <a:spAutoFit/>
+          </a:bodyPr>
+          <a:lstStyle/>
+          <a:p>
+            <a:r>
+              <a:rPr lang="en-US" dirty="0">
+                <a:solidFill>
+                  <a:schemeClr val="bg1"/>
+                </a:solidFill>
+              </a:rPr>
+              <a:t>Capital Asset Pricing Model (CAPM)</a:t>
+            </a:r>
+          </a:p>
+        </p:txBody>
+      </p:sp>
+      <p:pic>
+        <p:nvPicPr>
+          <p:cNvPr id="6" name="Picture 5">
+            <a:extLst>
+              <a:ext uri="{FF2B5EF4-FFF2-40B4-BE49-F238E27FC236}">
+                <a16:creationId xmlns:a16="http://schemas.microsoft.com/office/drawing/2014/main" id="{AB3E4D3C-CC89-19AC-F0C4-3607CAA7F3E5}"/>
+              </a:ext>
+            </a:extLst>
+          </p:cNvPr>
+          <p:cNvPicPr>
+            <a:picLocks noChangeAspect="1"/>
+          </p:cNvPicPr>
+          <p:nvPr/>
+        </p:nvPicPr>
+        <p:blipFill>
+          <a:blip r:embed="rId2"/>
+          <a:stretch>
+            <a:fillRect/>
+          </a:stretch>
+        </p:blipFill>
+        <p:spPr>
+          <a:xfrm>
+            <a:off x="1049694" y="907170"/>
+            <a:ext cx="10092612" cy="5449413"/>
+          </a:xfrm>
+          <a:prstGeom prst="rect">
+            <a:avLst/>
+          </a:prstGeom>
+        </p:spPr>
+      </p:pic>
+    </p:spTree>
+    <p:extLst>
+      <p:ext uri="{BB962C8B-B14F-4D97-AF65-F5344CB8AC3E}">
+        <p14:creationId xmlns:p14="http://schemas.microsoft.com/office/powerpoint/2010/main" val="1107598918"/>
+      </p:ext>
+    </p:extLst>
+  </p:cSld>
+  <p:clrMapOvr>
+    <a:masterClrMapping/>
+  </p:clrMapOvr>
+</p:sld>
+</file>
+
+<file path=ppt/slides/slide21.xml><?xml version="1.0" encoding="utf-8"?>
+<p:sld xmlns:a="http://schemas.openxmlformats.org/drawingml/2006/main" xmlns:r="http://schemas.openxmlformats.org/officeDocument/2006/relationships" xmlns:p="http://schemas.openxmlformats.org/presentationml/2006/main">
+  <p:cSld>
+    <p:spTree>
+      <p:nvGrpSpPr>
+        <p:cNvPr id="1" name=""/>
+        <p:cNvGrpSpPr/>
+        <p:nvPr/>
+      </p:nvGrpSpPr>
+      <p:grpSpPr>
+        <a:xfrm>
+          <a:off x="0" y="0"/>
+          <a:ext cx="0" cy="0"/>
+          <a:chOff x="0" y="0"/>
+          <a:chExt cx="0" cy="0"/>
+        </a:xfrm>
+      </p:grpSpPr>
+      <p:sp>
+        <p:nvSpPr>
+          <p:cNvPr id="4" name="TextBox 3">
+            <a:extLst>
+              <a:ext uri="{FF2B5EF4-FFF2-40B4-BE49-F238E27FC236}">
+                <a16:creationId xmlns:a16="http://schemas.microsoft.com/office/drawing/2014/main" id="{899C39C7-B679-392C-2FFF-3763D1F8D354}"/>
+              </a:ext>
+            </a:extLst>
+          </p:cNvPr>
+          <p:cNvSpPr txBox="1"/>
+          <p:nvPr/>
+        </p:nvSpPr>
+        <p:spPr>
+          <a:xfrm>
+            <a:off x="105100" y="156234"/>
+            <a:ext cx="12002814" cy="369332"/>
+          </a:xfrm>
+          <a:prstGeom prst="rect">
+            <a:avLst/>
+          </a:prstGeom>
+          <a:noFill/>
+        </p:spPr>
+        <p:txBody>
+          <a:bodyPr wrap="square" rtlCol="0">
+            <a:spAutoFit/>
+          </a:bodyPr>
+          <a:lstStyle/>
+          <a:p>
+            <a:r>
+              <a:rPr lang="en-US" dirty="0">
+                <a:solidFill>
+                  <a:schemeClr val="bg1"/>
+                </a:solidFill>
+              </a:rPr>
+              <a:t>Capital Asset Pricing Model (CAPM)</a:t>
+            </a:r>
+          </a:p>
+        </p:txBody>
+      </p:sp>
+    </p:spTree>
+    <p:extLst>
+      <p:ext uri="{BB962C8B-B14F-4D97-AF65-F5344CB8AC3E}">
+        <p14:creationId xmlns:p14="http://schemas.microsoft.com/office/powerpoint/2010/main" val="672154613"/>
       </p:ext>
     </p:extLst>
   </p:cSld>

</xml_diff>

<commit_message>
added slides until last
</commit_message>
<xml_diff>
--- a/MMS_2024_09_10/Farkas_2024_09_10.pptx
+++ b/MMS_2024_09_10/Farkas_2024_09_10.pptx
@@ -27,6 +27,9 @@
     <p:sldId id="281" r:id="rId21"/>
     <p:sldId id="280" r:id="rId22"/>
     <p:sldId id="282" r:id="rId23"/>
+    <p:sldId id="285" r:id="rId24"/>
+    <p:sldId id="286" r:id="rId25"/>
+    <p:sldId id="287" r:id="rId26"/>
   </p:sldIdLst>
   <p:sldSz cx="12192000" cy="6858000"/>
   <p:notesSz cx="6858000" cy="9144000"/>
@@ -312,7 +315,7 @@
           <a:p>
             <a:fld id="{0163D073-7F8B-4D43-A6FF-3B651CD8FEF9}" type="datetimeFigureOut">
               <a:rPr lang="en-US" smtClean="0"/>
-              <a:t>9/7/2024</a:t>
+              <a:t>9/8/2024</a:t>
             </a:fld>
             <a:endParaRPr lang="en-US"/>
           </a:p>
@@ -550,7 +553,7 @@
           <a:p>
             <a:fld id="{0163D073-7F8B-4D43-A6FF-3B651CD8FEF9}" type="datetimeFigureOut">
               <a:rPr lang="en-US" smtClean="0"/>
-              <a:t>9/7/2024</a:t>
+              <a:t>9/8/2024</a:t>
             </a:fld>
             <a:endParaRPr lang="en-US"/>
           </a:p>
@@ -788,7 +791,7 @@
           <a:p>
             <a:fld id="{0163D073-7F8B-4D43-A6FF-3B651CD8FEF9}" type="datetimeFigureOut">
               <a:rPr lang="en-US" smtClean="0"/>
-              <a:t>9/7/2024</a:t>
+              <a:t>9/8/2024</a:t>
             </a:fld>
             <a:endParaRPr lang="en-US"/>
           </a:p>
@@ -1093,7 +1096,7 @@
           <a:p>
             <a:fld id="{0163D073-7F8B-4D43-A6FF-3B651CD8FEF9}" type="datetimeFigureOut">
               <a:rPr lang="en-US" smtClean="0"/>
-              <a:t>9/7/2024</a:t>
+              <a:t>9/8/2024</a:t>
             </a:fld>
             <a:endParaRPr lang="en-US"/>
           </a:p>
@@ -1396,7 +1399,7 @@
           <a:p>
             <a:fld id="{0163D073-7F8B-4D43-A6FF-3B651CD8FEF9}" type="datetimeFigureOut">
               <a:rPr lang="en-US" smtClean="0"/>
-              <a:t>9/7/2024</a:t>
+              <a:t>9/8/2024</a:t>
             </a:fld>
             <a:endParaRPr lang="en-US"/>
           </a:p>
@@ -1847,7 +1850,7 @@
           <a:p>
             <a:fld id="{0163D073-7F8B-4D43-A6FF-3B651CD8FEF9}" type="datetimeFigureOut">
               <a:rPr lang="en-US" smtClean="0"/>
-              <a:t>9/7/2024</a:t>
+              <a:t>9/8/2024</a:t>
             </a:fld>
             <a:endParaRPr lang="en-US"/>
           </a:p>
@@ -2020,7 +2023,7 @@
           <a:p>
             <a:fld id="{0163D073-7F8B-4D43-A6FF-3B651CD8FEF9}" type="datetimeFigureOut">
               <a:rPr lang="en-US" smtClean="0"/>
-              <a:t>9/7/2024</a:t>
+              <a:t>9/8/2024</a:t>
             </a:fld>
             <a:endParaRPr lang="en-US"/>
           </a:p>
@@ -2157,7 +2160,7 @@
           <a:p>
             <a:fld id="{0163D073-7F8B-4D43-A6FF-3B651CD8FEF9}" type="datetimeFigureOut">
               <a:rPr lang="en-US" smtClean="0"/>
-              <a:t>9/7/2024</a:t>
+              <a:t>9/8/2024</a:t>
             </a:fld>
             <a:endParaRPr lang="en-US"/>
           </a:p>
@@ -2501,7 +2504,7 @@
           <a:p>
             <a:fld id="{0163D073-7F8B-4D43-A6FF-3B651CD8FEF9}" type="datetimeFigureOut">
               <a:rPr lang="en-US" smtClean="0"/>
-              <a:t>9/7/2024</a:t>
+              <a:t>9/8/2024</a:t>
             </a:fld>
             <a:endParaRPr lang="en-US"/>
           </a:p>
@@ -2822,7 +2825,7 @@
           <a:p>
             <a:fld id="{0163D073-7F8B-4D43-A6FF-3B651CD8FEF9}" type="datetimeFigureOut">
               <a:rPr lang="en-US" smtClean="0"/>
-              <a:t>9/7/2024</a:t>
+              <a:t>9/8/2024</a:t>
             </a:fld>
             <a:endParaRPr lang="en-US"/>
           </a:p>
@@ -7516,8 +7519,8 @@
           </a:p>
         </p:txBody>
       </p:sp>
-      <mc:AlternateContent xmlns:mc="http://schemas.openxmlformats.org/markup-compatibility/2006">
-        <mc:Choice xmlns:a14="http://schemas.microsoft.com/office/drawing/2010/main" Requires="a14">
+      <mc:AlternateContent xmlns:mc="http://schemas.openxmlformats.org/markup-compatibility/2006" xmlns:a14="http://schemas.microsoft.com/office/drawing/2010/main">
+        <mc:Choice Requires="a14">
           <p:sp>
             <p:nvSpPr>
               <p:cNvPr id="5" name="TextBox 4">
@@ -7546,6 +7549,7 @@
               </a:bodyPr>
               <a:lstStyle/>
               <a:p>
+                <a:pPr/>
                 <a14:m>
                   <m:oMathPara xmlns:m="http://schemas.openxmlformats.org/officeDocument/2006/math">
                     <m:oMathParaPr>
@@ -7701,7 +7705,7 @@
             </p:txBody>
           </p:sp>
         </mc:Choice>
-        <mc:Fallback>
+        <mc:Fallback xmlns="">
           <p:sp>
             <p:nvSpPr>
               <p:cNvPr id="5" name="TextBox 4">
@@ -7746,8 +7750,8 @@
           </p:sp>
         </mc:Fallback>
       </mc:AlternateContent>
-      <mc:AlternateContent xmlns:mc="http://schemas.openxmlformats.org/markup-compatibility/2006">
-        <mc:Choice xmlns:a14="http://schemas.microsoft.com/office/drawing/2010/main" Requires="a14">
+      <mc:AlternateContent xmlns:mc="http://schemas.openxmlformats.org/markup-compatibility/2006" xmlns:a14="http://schemas.microsoft.com/office/drawing/2010/main">
+        <mc:Choice Requires="a14">
           <p:sp>
             <p:nvSpPr>
               <p:cNvPr id="7" name="TextBox 6">
@@ -7776,6 +7780,7 @@
               </a:bodyPr>
               <a:lstStyle/>
               <a:p>
+                <a:pPr/>
                 <a14:m>
                   <m:oMathPara xmlns:m="http://schemas.openxmlformats.org/officeDocument/2006/math">
                     <m:oMathParaPr>
@@ -7818,7 +7823,7 @@
             </p:txBody>
           </p:sp>
         </mc:Choice>
-        <mc:Fallback>
+        <mc:Fallback xmlns="">
           <p:sp>
             <p:nvSpPr>
               <p:cNvPr id="7" name="TextBox 6">
@@ -7898,8 +7903,8 @@
           </a:p>
         </p:txBody>
       </p:sp>
-      <mc:AlternateContent xmlns:mc="http://schemas.openxmlformats.org/markup-compatibility/2006">
-        <mc:Choice xmlns:a14="http://schemas.microsoft.com/office/drawing/2010/main" Requires="a14">
+      <mc:AlternateContent xmlns:mc="http://schemas.openxmlformats.org/markup-compatibility/2006" xmlns:a14="http://schemas.microsoft.com/office/drawing/2010/main">
+        <mc:Choice Requires="a14">
           <p:sp>
             <p:nvSpPr>
               <p:cNvPr id="9" name="TextBox 8">
@@ -7928,6 +7933,7 @@
               </a:bodyPr>
               <a:lstStyle/>
               <a:p>
+                <a:pPr/>
                 <a14:m>
                   <m:oMathPara xmlns:m="http://schemas.openxmlformats.org/officeDocument/2006/math">
                     <m:oMathParaPr>
@@ -7970,7 +7976,7 @@
             </p:txBody>
           </p:sp>
         </mc:Choice>
-        <mc:Fallback>
+        <mc:Fallback xmlns="">
           <p:sp>
             <p:nvSpPr>
               <p:cNvPr id="9" name="TextBox 8">
@@ -8054,6 +8060,390 @@
     <p:extLst>
       <p:ext uri="{BB962C8B-B14F-4D97-AF65-F5344CB8AC3E}">
         <p14:creationId xmlns:p14="http://schemas.microsoft.com/office/powerpoint/2010/main" val="672154613"/>
+      </p:ext>
+    </p:extLst>
+  </p:cSld>
+  <p:clrMapOvr>
+    <a:masterClrMapping/>
+  </p:clrMapOvr>
+</p:sld>
+</file>
+
+<file path=ppt/slides/slide23.xml><?xml version="1.0" encoding="utf-8"?>
+<p:sld xmlns:a="http://schemas.openxmlformats.org/drawingml/2006/main" xmlns:r="http://schemas.openxmlformats.org/officeDocument/2006/relationships" xmlns:p="http://schemas.openxmlformats.org/presentationml/2006/main">
+  <p:cSld>
+    <p:spTree>
+      <p:nvGrpSpPr>
+        <p:cNvPr id="1" name=""/>
+        <p:cNvGrpSpPr/>
+        <p:nvPr/>
+      </p:nvGrpSpPr>
+      <p:grpSpPr>
+        <a:xfrm>
+          <a:off x="0" y="0"/>
+          <a:ext cx="0" cy="0"/>
+          <a:chOff x="0" y="0"/>
+          <a:chExt cx="0" cy="0"/>
+        </a:xfrm>
+      </p:grpSpPr>
+      <p:sp>
+        <p:nvSpPr>
+          <p:cNvPr id="4" name="TextBox 3">
+            <a:extLst>
+              <a:ext uri="{FF2B5EF4-FFF2-40B4-BE49-F238E27FC236}">
+                <a16:creationId xmlns:a16="http://schemas.microsoft.com/office/drawing/2014/main" id="{899C39C7-B679-392C-2FFF-3763D1F8D354}"/>
+              </a:ext>
+            </a:extLst>
+          </p:cNvPr>
+          <p:cNvSpPr txBox="1"/>
+          <p:nvPr/>
+        </p:nvSpPr>
+        <p:spPr>
+          <a:xfrm>
+            <a:off x="105100" y="156234"/>
+            <a:ext cx="12002814" cy="369332"/>
+          </a:xfrm>
+          <a:prstGeom prst="rect">
+            <a:avLst/>
+          </a:prstGeom>
+          <a:noFill/>
+        </p:spPr>
+        <p:txBody>
+          <a:bodyPr wrap="square" rtlCol="0">
+            <a:spAutoFit/>
+          </a:bodyPr>
+          <a:lstStyle/>
+          <a:p>
+            <a:r>
+              <a:rPr lang="en-US" dirty="0">
+                <a:solidFill>
+                  <a:schemeClr val="bg1"/>
+                </a:solidFill>
+              </a:rPr>
+              <a:t>Capital Asset Pricing Model (CAPM)</a:t>
+            </a:r>
+          </a:p>
+        </p:txBody>
+      </p:sp>
+      <p:sp>
+        <p:nvSpPr>
+          <p:cNvPr id="2" name="TextBox 1">
+            <a:extLst>
+              <a:ext uri="{FF2B5EF4-FFF2-40B4-BE49-F238E27FC236}">
+                <a16:creationId xmlns:a16="http://schemas.microsoft.com/office/drawing/2014/main" id="{02F54961-31E0-C38E-5D9F-988E1FF20D33}"/>
+              </a:ext>
+            </a:extLst>
+          </p:cNvPr>
+          <p:cNvSpPr txBox="1"/>
+          <p:nvPr/>
+        </p:nvSpPr>
+        <p:spPr>
+          <a:xfrm>
+            <a:off x="227144" y="1165936"/>
+            <a:ext cx="4786344" cy="892552"/>
+          </a:xfrm>
+          <a:prstGeom prst="rect">
+            <a:avLst/>
+          </a:prstGeom>
+          <a:noFill/>
+        </p:spPr>
+        <p:txBody>
+          <a:bodyPr wrap="square" rtlCol="0">
+            <a:spAutoFit/>
+          </a:bodyPr>
+          <a:lstStyle/>
+          <a:p>
+            <a:r>
+              <a:rPr lang="en-US" sz="2800" dirty="0"/>
+              <a:t>Example: Market is 3 stocks</a:t>
+            </a:r>
+          </a:p>
+          <a:p>
+            <a:r>
+              <a:rPr lang="en-US" sz="2400" dirty="0"/>
+              <a:t>Pepsi, Coke, Monster Beverages</a:t>
+            </a:r>
+          </a:p>
+        </p:txBody>
+      </p:sp>
+      <p:pic>
+        <p:nvPicPr>
+          <p:cNvPr id="1026" name="Picture 2" descr="tAAAAAElFTkSuQmCC (1358×453)">
+            <a:extLst>
+              <a:ext uri="{FF2B5EF4-FFF2-40B4-BE49-F238E27FC236}">
+                <a16:creationId xmlns:a16="http://schemas.microsoft.com/office/drawing/2014/main" id="{AC3972EB-D9C2-C496-AF9A-2358115D0041}"/>
+              </a:ext>
+            </a:extLst>
+          </p:cNvPr>
+          <p:cNvPicPr>
+            <a:picLocks noChangeAspect="1" noChangeArrowheads="1"/>
+          </p:cNvPicPr>
+          <p:nvPr/>
+        </p:nvPicPr>
+        <p:blipFill>
+          <a:blip r:embed="rId2">
+            <a:extLst>
+              <a:ext uri="{28A0092B-C50C-407E-A947-70E740481C1C}">
+                <a14:useLocalDpi xmlns:a14="http://schemas.microsoft.com/office/drawing/2010/main" val="0"/>
+              </a:ext>
+            </a:extLst>
+          </a:blip>
+          <a:srcRect/>
+          <a:stretch>
+            <a:fillRect/>
+          </a:stretch>
+        </p:blipFill>
+        <p:spPr bwMode="auto">
+          <a:xfrm>
+            <a:off x="222643" y="2244819"/>
+            <a:ext cx="11773299" cy="3927499"/>
+          </a:xfrm>
+          <a:prstGeom prst="rect">
+            <a:avLst/>
+          </a:prstGeom>
+          <a:noFill/>
+          <a:extLst>
+            <a:ext uri="{909E8E84-426E-40DD-AFC4-6F175D3DCCD1}">
+              <a14:hiddenFill xmlns:a14="http://schemas.microsoft.com/office/drawing/2010/main">
+                <a:solidFill>
+                  <a:srgbClr val="FFFFFF"/>
+                </a:solidFill>
+              </a14:hiddenFill>
+            </a:ext>
+          </a:extLst>
+        </p:spPr>
+      </p:pic>
+    </p:spTree>
+    <p:extLst>
+      <p:ext uri="{BB962C8B-B14F-4D97-AF65-F5344CB8AC3E}">
+        <p14:creationId xmlns:p14="http://schemas.microsoft.com/office/powerpoint/2010/main" val="2119553350"/>
+      </p:ext>
+    </p:extLst>
+  </p:cSld>
+  <p:clrMapOvr>
+    <a:masterClrMapping/>
+  </p:clrMapOvr>
+</p:sld>
+</file>
+
+<file path=ppt/slides/slide24.xml><?xml version="1.0" encoding="utf-8"?>
+<p:sld xmlns:a="http://schemas.openxmlformats.org/drawingml/2006/main" xmlns:r="http://schemas.openxmlformats.org/officeDocument/2006/relationships" xmlns:p="http://schemas.openxmlformats.org/presentationml/2006/main">
+  <p:cSld>
+    <p:spTree>
+      <p:nvGrpSpPr>
+        <p:cNvPr id="1" name=""/>
+        <p:cNvGrpSpPr/>
+        <p:nvPr/>
+      </p:nvGrpSpPr>
+      <p:grpSpPr>
+        <a:xfrm>
+          <a:off x="0" y="0"/>
+          <a:ext cx="0" cy="0"/>
+          <a:chOff x="0" y="0"/>
+          <a:chExt cx="0" cy="0"/>
+        </a:xfrm>
+      </p:grpSpPr>
+      <p:sp>
+        <p:nvSpPr>
+          <p:cNvPr id="4" name="TextBox 3">
+            <a:extLst>
+              <a:ext uri="{FF2B5EF4-FFF2-40B4-BE49-F238E27FC236}">
+                <a16:creationId xmlns:a16="http://schemas.microsoft.com/office/drawing/2014/main" id="{899C39C7-B679-392C-2FFF-3763D1F8D354}"/>
+              </a:ext>
+            </a:extLst>
+          </p:cNvPr>
+          <p:cNvSpPr txBox="1"/>
+          <p:nvPr/>
+        </p:nvSpPr>
+        <p:spPr>
+          <a:xfrm>
+            <a:off x="105100" y="156234"/>
+            <a:ext cx="12002814" cy="369332"/>
+          </a:xfrm>
+          <a:prstGeom prst="rect">
+            <a:avLst/>
+          </a:prstGeom>
+          <a:noFill/>
+        </p:spPr>
+        <p:txBody>
+          <a:bodyPr wrap="square" rtlCol="0">
+            <a:spAutoFit/>
+          </a:bodyPr>
+          <a:lstStyle/>
+          <a:p>
+            <a:r>
+              <a:rPr lang="en-US" dirty="0">
+                <a:solidFill>
+                  <a:schemeClr val="bg1"/>
+                </a:solidFill>
+              </a:rPr>
+              <a:t>Capital Asset Pricing Model (CAPM)</a:t>
+            </a:r>
+          </a:p>
+        </p:txBody>
+      </p:sp>
+      <p:sp>
+        <p:nvSpPr>
+          <p:cNvPr id="2" name="TextBox 1">
+            <a:extLst>
+              <a:ext uri="{FF2B5EF4-FFF2-40B4-BE49-F238E27FC236}">
+                <a16:creationId xmlns:a16="http://schemas.microsoft.com/office/drawing/2014/main" id="{02F54961-31E0-C38E-5D9F-988E1FF20D33}"/>
+              </a:ext>
+            </a:extLst>
+          </p:cNvPr>
+          <p:cNvSpPr txBox="1"/>
+          <p:nvPr/>
+        </p:nvSpPr>
+        <p:spPr>
+          <a:xfrm>
+            <a:off x="105100" y="773718"/>
+            <a:ext cx="4786344" cy="523220"/>
+          </a:xfrm>
+          <a:prstGeom prst="rect">
+            <a:avLst/>
+          </a:prstGeom>
+          <a:noFill/>
+        </p:spPr>
+        <p:txBody>
+          <a:bodyPr wrap="square" rtlCol="0">
+            <a:spAutoFit/>
+          </a:bodyPr>
+          <a:lstStyle/>
+          <a:p>
+            <a:r>
+              <a:rPr lang="en-US" sz="2800" dirty="0"/>
+              <a:t>Example: Market is 3 stocks</a:t>
+            </a:r>
+            <a:endParaRPr lang="en-US" sz="2400" dirty="0"/>
+          </a:p>
+        </p:txBody>
+      </p:sp>
+      <p:pic>
+        <p:nvPicPr>
+          <p:cNvPr id="2050" name="Picture 2">
+            <a:extLst>
+              <a:ext uri="{FF2B5EF4-FFF2-40B4-BE49-F238E27FC236}">
+                <a16:creationId xmlns:a16="http://schemas.microsoft.com/office/drawing/2014/main" id="{9E194D02-7C7C-1C87-3190-7F144422ED28}"/>
+              </a:ext>
+            </a:extLst>
+          </p:cNvPr>
+          <p:cNvPicPr>
+            <a:picLocks noChangeAspect="1" noChangeArrowheads="1"/>
+          </p:cNvPicPr>
+          <p:nvPr/>
+        </p:nvPicPr>
+        <p:blipFill>
+          <a:blip r:embed="rId2">
+            <a:extLst>
+              <a:ext uri="{28A0092B-C50C-407E-A947-70E740481C1C}">
+                <a14:useLocalDpi xmlns:a14="http://schemas.microsoft.com/office/drawing/2010/main" val="0"/>
+              </a:ext>
+            </a:extLst>
+          </a:blip>
+          <a:srcRect/>
+          <a:stretch>
+            <a:fillRect/>
+          </a:stretch>
+        </p:blipFill>
+        <p:spPr bwMode="auto">
+          <a:xfrm>
+            <a:off x="361950" y="1545091"/>
+            <a:ext cx="11468100" cy="4943475"/>
+          </a:xfrm>
+          <a:prstGeom prst="rect">
+            <a:avLst/>
+          </a:prstGeom>
+          <a:noFill/>
+          <a:extLst>
+            <a:ext uri="{909E8E84-426E-40DD-AFC4-6F175D3DCCD1}">
+              <a14:hiddenFill xmlns:a14="http://schemas.microsoft.com/office/drawing/2010/main">
+                <a:solidFill>
+                  <a:srgbClr val="FFFFFF"/>
+                </a:solidFill>
+              </a14:hiddenFill>
+            </a:ext>
+          </a:extLst>
+        </p:spPr>
+      </p:pic>
+    </p:spTree>
+    <p:extLst>
+      <p:ext uri="{BB962C8B-B14F-4D97-AF65-F5344CB8AC3E}">
+        <p14:creationId xmlns:p14="http://schemas.microsoft.com/office/powerpoint/2010/main" val="4158879799"/>
+      </p:ext>
+    </p:extLst>
+  </p:cSld>
+  <p:clrMapOvr>
+    <a:masterClrMapping/>
+  </p:clrMapOvr>
+</p:sld>
+</file>
+
+<file path=ppt/slides/slide25.xml><?xml version="1.0" encoding="utf-8"?>
+<p:sld xmlns:a="http://schemas.openxmlformats.org/drawingml/2006/main" xmlns:r="http://schemas.openxmlformats.org/officeDocument/2006/relationships" xmlns:p="http://schemas.openxmlformats.org/presentationml/2006/main">
+  <p:cSld>
+    <p:spTree>
+      <p:nvGrpSpPr>
+        <p:cNvPr id="1" name=""/>
+        <p:cNvGrpSpPr/>
+        <p:nvPr/>
+      </p:nvGrpSpPr>
+      <p:grpSpPr>
+        <a:xfrm>
+          <a:off x="0" y="0"/>
+          <a:ext cx="0" cy="0"/>
+          <a:chOff x="0" y="0"/>
+          <a:chExt cx="0" cy="0"/>
+        </a:xfrm>
+      </p:grpSpPr>
+      <p:sp>
+        <p:nvSpPr>
+          <p:cNvPr id="2" name="TextBox 1">
+            <a:extLst>
+              <a:ext uri="{FF2B5EF4-FFF2-40B4-BE49-F238E27FC236}">
+                <a16:creationId xmlns:a16="http://schemas.microsoft.com/office/drawing/2014/main" id="{02F54961-31E0-C38E-5D9F-988E1FF20D33}"/>
+              </a:ext>
+            </a:extLst>
+          </p:cNvPr>
+          <p:cNvSpPr txBox="1"/>
+          <p:nvPr/>
+        </p:nvSpPr>
+        <p:spPr>
+          <a:xfrm>
+            <a:off x="636944" y="1594811"/>
+            <a:ext cx="2899358" cy="1384995"/>
+          </a:xfrm>
+          <a:prstGeom prst="rect">
+            <a:avLst/>
+          </a:prstGeom>
+          <a:noFill/>
+        </p:spPr>
+        <p:txBody>
+          <a:bodyPr wrap="square" rtlCol="0">
+            <a:spAutoFit/>
+          </a:bodyPr>
+          <a:lstStyle/>
+          <a:p>
+            <a:r>
+              <a:rPr lang="en-US" sz="2800" dirty="0"/>
+              <a:t>Thanks</a:t>
+            </a:r>
+          </a:p>
+          <a:p>
+            <a:endParaRPr lang="en-US" sz="2800" dirty="0"/>
+          </a:p>
+          <a:p>
+            <a:r>
+              <a:rPr lang="en-US" sz="2800" dirty="0"/>
+              <a:t>Questions</a:t>
+            </a:r>
+            <a:endParaRPr lang="en-US" sz="2400" dirty="0"/>
+          </a:p>
+        </p:txBody>
+      </p:sp>
+    </p:spTree>
+    <p:extLst>
+      <p:ext uri="{BB962C8B-B14F-4D97-AF65-F5344CB8AC3E}">
+        <p14:creationId xmlns:p14="http://schemas.microsoft.com/office/powerpoint/2010/main" val="2365150651"/>
       </p:ext>
     </p:extLst>
   </p:cSld>

</xml_diff>

<commit_message>
switched about slides, added back slide headers, added agenda item list
</commit_message>
<xml_diff>
--- a/MMS_2024_09_10/Farkas_2024_09_10.pptx
+++ b/MMS_2024_09_10/Farkas_2024_09_10.pptx
@@ -6,8 +6,8 @@
   </p:sldMasterIdLst>
   <p:sldIdLst>
     <p:sldId id="258" r:id="rId2"/>
-    <p:sldId id="260" r:id="rId3"/>
-    <p:sldId id="261" r:id="rId4"/>
+    <p:sldId id="261" r:id="rId3"/>
+    <p:sldId id="260" r:id="rId4"/>
     <p:sldId id="259" r:id="rId5"/>
     <p:sldId id="262" r:id="rId6"/>
     <p:sldId id="266" r:id="rId7"/>
@@ -3605,7 +3605,7 @@
         </p:nvSpPr>
         <p:spPr>
           <a:xfrm>
-            <a:off x="2875580" y="1397323"/>
+            <a:off x="2875580" y="1517243"/>
             <a:ext cx="6440839" cy="2246769"/>
           </a:xfrm>
           <a:prstGeom prst="rect">
@@ -3866,6 +3866,45 @@
           </a:prstGeom>
         </p:spPr>
       </p:pic>
+      <p:sp>
+        <p:nvSpPr>
+          <p:cNvPr id="14" name="TextBox 13">
+            <a:extLst>
+              <a:ext uri="{FF2B5EF4-FFF2-40B4-BE49-F238E27FC236}">
+                <a16:creationId xmlns:a16="http://schemas.microsoft.com/office/drawing/2014/main" id="{A2A01599-6E2A-3D95-7346-71649191706B}"/>
+              </a:ext>
+            </a:extLst>
+          </p:cNvPr>
+          <p:cNvSpPr txBox="1"/>
+          <p:nvPr/>
+        </p:nvSpPr>
+        <p:spPr>
+          <a:xfrm>
+            <a:off x="104543" y="151072"/>
+            <a:ext cx="5303851" cy="400110"/>
+          </a:xfrm>
+          <a:prstGeom prst="rect">
+            <a:avLst/>
+          </a:prstGeom>
+          <a:noFill/>
+        </p:spPr>
+        <p:txBody>
+          <a:bodyPr wrap="square" rtlCol="0">
+            <a:spAutoFit/>
+          </a:bodyPr>
+          <a:lstStyle/>
+          <a:p>
+            <a:r>
+              <a:rPr lang="en-US" sz="2000" dirty="0">
+                <a:latin typeface="Verdana" panose="020B0604030504040204" pitchFamily="34" charset="0"/>
+                <a:ea typeface="Verdana" panose="020B0604030504040204" pitchFamily="34" charset="0"/>
+              </a:rPr>
+              <a:t>Mathematical Modeling Seminar</a:t>
+            </a:r>
+            <a:endParaRPr lang="en-US" sz="2400" dirty="0"/>
+          </a:p>
+        </p:txBody>
+      </p:sp>
     </p:spTree>
     <p:extLst>
       <p:ext uri="{BB962C8B-B14F-4D97-AF65-F5344CB8AC3E}">
@@ -4723,6 +4762,45 @@
           </a:p>
         </p:txBody>
       </p:sp>
+      <p:sp>
+        <p:nvSpPr>
+          <p:cNvPr id="2" name="TextBox 1">
+            <a:extLst>
+              <a:ext uri="{FF2B5EF4-FFF2-40B4-BE49-F238E27FC236}">
+                <a16:creationId xmlns:a16="http://schemas.microsoft.com/office/drawing/2014/main" id="{B4ED56F5-8107-1124-F6E9-4E719E6DA7FB}"/>
+              </a:ext>
+            </a:extLst>
+          </p:cNvPr>
+          <p:cNvSpPr txBox="1"/>
+          <p:nvPr/>
+        </p:nvSpPr>
+        <p:spPr>
+          <a:xfrm>
+            <a:off x="104543" y="151072"/>
+            <a:ext cx="4688825" cy="400110"/>
+          </a:xfrm>
+          <a:prstGeom prst="rect">
+            <a:avLst/>
+          </a:prstGeom>
+          <a:noFill/>
+        </p:spPr>
+        <p:txBody>
+          <a:bodyPr wrap="square" rtlCol="0">
+            <a:spAutoFit/>
+          </a:bodyPr>
+          <a:lstStyle/>
+          <a:p>
+            <a:r>
+              <a:rPr lang="en-US" sz="2000" dirty="0">
+                <a:latin typeface="Verdana" panose="020B0604030504040204" pitchFamily="34" charset="0"/>
+                <a:ea typeface="Verdana" panose="020B0604030504040204" pitchFamily="34" charset="0"/>
+              </a:rPr>
+              <a:t>Modern Portfolio Theory (MPT)</a:t>
+            </a:r>
+            <a:endParaRPr lang="en-US" sz="2400" dirty="0"/>
+          </a:p>
+        </p:txBody>
+      </p:sp>
     </p:spTree>
     <p:extLst>
       <p:ext uri="{BB962C8B-B14F-4D97-AF65-F5344CB8AC3E}">
@@ -5290,6 +5368,45 @@
               <a:rPr lang="en-US" sz="2000" dirty="0"/>
               <a:t>Variable transformation</a:t>
             </a:r>
+          </a:p>
+        </p:txBody>
+      </p:sp>
+      <p:sp>
+        <p:nvSpPr>
+          <p:cNvPr id="3" name="TextBox 2">
+            <a:extLst>
+              <a:ext uri="{FF2B5EF4-FFF2-40B4-BE49-F238E27FC236}">
+                <a16:creationId xmlns:a16="http://schemas.microsoft.com/office/drawing/2014/main" id="{5224B3C6-DBC4-9DF1-8D01-B4BB9CBAA12F}"/>
+              </a:ext>
+            </a:extLst>
+          </p:cNvPr>
+          <p:cNvSpPr txBox="1"/>
+          <p:nvPr/>
+        </p:nvSpPr>
+        <p:spPr>
+          <a:xfrm>
+            <a:off x="104543" y="151072"/>
+            <a:ext cx="4688825" cy="400110"/>
+          </a:xfrm>
+          <a:prstGeom prst="rect">
+            <a:avLst/>
+          </a:prstGeom>
+          <a:noFill/>
+        </p:spPr>
+        <p:txBody>
+          <a:bodyPr wrap="square" rtlCol="0">
+            <a:spAutoFit/>
+          </a:bodyPr>
+          <a:lstStyle/>
+          <a:p>
+            <a:r>
+              <a:rPr lang="en-US" sz="2000" dirty="0">
+                <a:latin typeface="Verdana" panose="020B0604030504040204" pitchFamily="34" charset="0"/>
+                <a:ea typeface="Verdana" panose="020B0604030504040204" pitchFamily="34" charset="0"/>
+              </a:rPr>
+              <a:t>Modern Portfolio Theory (MPT)</a:t>
+            </a:r>
+            <a:endParaRPr lang="en-US" sz="2400" dirty="0"/>
           </a:p>
         </p:txBody>
       </p:sp>
@@ -5517,6 +5634,45 @@
           </p:txBody>
         </p:sp>
       </p:grpSp>
+      <p:sp>
+        <p:nvSpPr>
+          <p:cNvPr id="5" name="TextBox 4">
+            <a:extLst>
+              <a:ext uri="{FF2B5EF4-FFF2-40B4-BE49-F238E27FC236}">
+                <a16:creationId xmlns:a16="http://schemas.microsoft.com/office/drawing/2014/main" id="{495C89DA-AA64-DD90-79EB-CE7A827E9720}"/>
+              </a:ext>
+            </a:extLst>
+          </p:cNvPr>
+          <p:cNvSpPr txBox="1"/>
+          <p:nvPr/>
+        </p:nvSpPr>
+        <p:spPr>
+          <a:xfrm>
+            <a:off x="104543" y="151072"/>
+            <a:ext cx="4688825" cy="400110"/>
+          </a:xfrm>
+          <a:prstGeom prst="rect">
+            <a:avLst/>
+          </a:prstGeom>
+          <a:noFill/>
+        </p:spPr>
+        <p:txBody>
+          <a:bodyPr wrap="square" rtlCol="0">
+            <a:spAutoFit/>
+          </a:bodyPr>
+          <a:lstStyle/>
+          <a:p>
+            <a:r>
+              <a:rPr lang="en-US" sz="2000" dirty="0">
+                <a:latin typeface="Verdana" panose="020B0604030504040204" pitchFamily="34" charset="0"/>
+                <a:ea typeface="Verdana" panose="020B0604030504040204" pitchFamily="34" charset="0"/>
+              </a:rPr>
+              <a:t>Modern Portfolio Theory (MPT)</a:t>
+            </a:r>
+            <a:endParaRPr lang="en-US" sz="2400" dirty="0"/>
+          </a:p>
+        </p:txBody>
+      </p:sp>
     </p:spTree>
     <p:extLst>
       <p:ext uri="{BB962C8B-B14F-4D97-AF65-F5344CB8AC3E}">
@@ -5945,6 +6101,45 @@
           </a:p>
         </p:txBody>
       </p:sp>
+      <p:sp>
+        <p:nvSpPr>
+          <p:cNvPr id="2" name="TextBox 1">
+            <a:extLst>
+              <a:ext uri="{FF2B5EF4-FFF2-40B4-BE49-F238E27FC236}">
+                <a16:creationId xmlns:a16="http://schemas.microsoft.com/office/drawing/2014/main" id="{006A74DF-648E-9DB2-B6F2-08238318EF7B}"/>
+              </a:ext>
+            </a:extLst>
+          </p:cNvPr>
+          <p:cNvSpPr txBox="1"/>
+          <p:nvPr/>
+        </p:nvSpPr>
+        <p:spPr>
+          <a:xfrm>
+            <a:off x="104543" y="151072"/>
+            <a:ext cx="4688825" cy="400110"/>
+          </a:xfrm>
+          <a:prstGeom prst="rect">
+            <a:avLst/>
+          </a:prstGeom>
+          <a:noFill/>
+        </p:spPr>
+        <p:txBody>
+          <a:bodyPr wrap="square" rtlCol="0">
+            <a:spAutoFit/>
+          </a:bodyPr>
+          <a:lstStyle/>
+          <a:p>
+            <a:r>
+              <a:rPr lang="en-US" sz="2000" dirty="0">
+                <a:latin typeface="Verdana" panose="020B0604030504040204" pitchFamily="34" charset="0"/>
+                <a:ea typeface="Verdana" panose="020B0604030504040204" pitchFamily="34" charset="0"/>
+              </a:rPr>
+              <a:t>Modern Portfolio Theory (MPT)</a:t>
+            </a:r>
+            <a:endParaRPr lang="en-US" sz="2400" dirty="0"/>
+          </a:p>
+        </p:txBody>
+      </p:sp>
     </p:spTree>
     <p:extLst>
       <p:ext uri="{BB962C8B-B14F-4D97-AF65-F5344CB8AC3E}">
@@ -6163,6 +6358,45 @@
           </a:p>
         </p:txBody>
       </p:sp>
+      <p:sp>
+        <p:nvSpPr>
+          <p:cNvPr id="2" name="TextBox 1">
+            <a:extLst>
+              <a:ext uri="{FF2B5EF4-FFF2-40B4-BE49-F238E27FC236}">
+                <a16:creationId xmlns:a16="http://schemas.microsoft.com/office/drawing/2014/main" id="{55F76414-34CF-C9E4-3A6A-3EC979CC7B53}"/>
+              </a:ext>
+            </a:extLst>
+          </p:cNvPr>
+          <p:cNvSpPr txBox="1"/>
+          <p:nvPr/>
+        </p:nvSpPr>
+        <p:spPr>
+          <a:xfrm>
+            <a:off x="104543" y="151072"/>
+            <a:ext cx="4688825" cy="400110"/>
+          </a:xfrm>
+          <a:prstGeom prst="rect">
+            <a:avLst/>
+          </a:prstGeom>
+          <a:noFill/>
+        </p:spPr>
+        <p:txBody>
+          <a:bodyPr wrap="square" rtlCol="0">
+            <a:spAutoFit/>
+          </a:bodyPr>
+          <a:lstStyle/>
+          <a:p>
+            <a:r>
+              <a:rPr lang="en-US" sz="2000" dirty="0">
+                <a:latin typeface="Verdana" panose="020B0604030504040204" pitchFamily="34" charset="0"/>
+                <a:ea typeface="Verdana" panose="020B0604030504040204" pitchFamily="34" charset="0"/>
+              </a:rPr>
+              <a:t>Modern Portfolio Theory (MPT)</a:t>
+            </a:r>
+            <a:endParaRPr lang="en-US" sz="2400" dirty="0"/>
+          </a:p>
+        </p:txBody>
+      </p:sp>
     </p:spTree>
     <p:extLst>
       <p:ext uri="{BB962C8B-B14F-4D97-AF65-F5344CB8AC3E}">
@@ -6312,6 +6546,45 @@
           </a:prstGeom>
         </p:spPr>
       </p:pic>
+      <p:sp>
+        <p:nvSpPr>
+          <p:cNvPr id="2" name="TextBox 1">
+            <a:extLst>
+              <a:ext uri="{FF2B5EF4-FFF2-40B4-BE49-F238E27FC236}">
+                <a16:creationId xmlns:a16="http://schemas.microsoft.com/office/drawing/2014/main" id="{447CFCA8-AA0F-F6F5-8F80-47264AD81AC9}"/>
+              </a:ext>
+            </a:extLst>
+          </p:cNvPr>
+          <p:cNvSpPr txBox="1"/>
+          <p:nvPr/>
+        </p:nvSpPr>
+        <p:spPr>
+          <a:xfrm>
+            <a:off x="104543" y="151072"/>
+            <a:ext cx="4688825" cy="400110"/>
+          </a:xfrm>
+          <a:prstGeom prst="rect">
+            <a:avLst/>
+          </a:prstGeom>
+          <a:noFill/>
+        </p:spPr>
+        <p:txBody>
+          <a:bodyPr wrap="square" rtlCol="0">
+            <a:spAutoFit/>
+          </a:bodyPr>
+          <a:lstStyle/>
+          <a:p>
+            <a:r>
+              <a:rPr lang="en-US" sz="2000" dirty="0">
+                <a:latin typeface="Verdana" panose="020B0604030504040204" pitchFamily="34" charset="0"/>
+                <a:ea typeface="Verdana" panose="020B0604030504040204" pitchFamily="34" charset="0"/>
+              </a:rPr>
+              <a:t>Modern Portfolio Theory (MPT)</a:t>
+            </a:r>
+            <a:endParaRPr lang="en-US" sz="2400" dirty="0"/>
+          </a:p>
+        </p:txBody>
+      </p:sp>
     </p:spTree>
     <p:extLst>
       <p:ext uri="{BB962C8B-B14F-4D97-AF65-F5344CB8AC3E}">
@@ -6495,6 +6768,45 @@
           </a:prstGeom>
         </p:spPr>
       </p:pic>
+      <p:sp>
+        <p:nvSpPr>
+          <p:cNvPr id="2" name="TextBox 1">
+            <a:extLst>
+              <a:ext uri="{FF2B5EF4-FFF2-40B4-BE49-F238E27FC236}">
+                <a16:creationId xmlns:a16="http://schemas.microsoft.com/office/drawing/2014/main" id="{9C17F7E5-1C3B-7064-EC32-74D0AB51027C}"/>
+              </a:ext>
+            </a:extLst>
+          </p:cNvPr>
+          <p:cNvSpPr txBox="1"/>
+          <p:nvPr/>
+        </p:nvSpPr>
+        <p:spPr>
+          <a:xfrm>
+            <a:off x="104543" y="151072"/>
+            <a:ext cx="4688825" cy="400110"/>
+          </a:xfrm>
+          <a:prstGeom prst="rect">
+            <a:avLst/>
+          </a:prstGeom>
+          <a:noFill/>
+        </p:spPr>
+        <p:txBody>
+          <a:bodyPr wrap="square" rtlCol="0">
+            <a:spAutoFit/>
+          </a:bodyPr>
+          <a:lstStyle/>
+          <a:p>
+            <a:r>
+              <a:rPr lang="en-US" sz="2000" dirty="0">
+                <a:latin typeface="Verdana" panose="020B0604030504040204" pitchFamily="34" charset="0"/>
+                <a:ea typeface="Verdana" panose="020B0604030504040204" pitchFamily="34" charset="0"/>
+              </a:rPr>
+              <a:t>Modern Portfolio Theory (MPT)</a:t>
+            </a:r>
+            <a:endParaRPr lang="en-US" sz="2400" dirty="0"/>
+          </a:p>
+        </p:txBody>
+      </p:sp>
     </p:spTree>
     <p:extLst>
       <p:ext uri="{BB962C8B-B14F-4D97-AF65-F5344CB8AC3E}">
@@ -6775,6 +7087,45 @@
           </a:prstGeom>
         </p:spPr>
       </p:pic>
+      <p:sp>
+        <p:nvSpPr>
+          <p:cNvPr id="3" name="TextBox 2">
+            <a:extLst>
+              <a:ext uri="{FF2B5EF4-FFF2-40B4-BE49-F238E27FC236}">
+                <a16:creationId xmlns:a16="http://schemas.microsoft.com/office/drawing/2014/main" id="{472574B9-3186-3D9A-4638-CC9FA5BC8113}"/>
+              </a:ext>
+            </a:extLst>
+          </p:cNvPr>
+          <p:cNvSpPr txBox="1"/>
+          <p:nvPr/>
+        </p:nvSpPr>
+        <p:spPr>
+          <a:xfrm>
+            <a:off x="104543" y="151072"/>
+            <a:ext cx="4688825" cy="400110"/>
+          </a:xfrm>
+          <a:prstGeom prst="rect">
+            <a:avLst/>
+          </a:prstGeom>
+          <a:noFill/>
+        </p:spPr>
+        <p:txBody>
+          <a:bodyPr wrap="square" rtlCol="0">
+            <a:spAutoFit/>
+          </a:bodyPr>
+          <a:lstStyle/>
+          <a:p>
+            <a:r>
+              <a:rPr lang="en-US" sz="2000" dirty="0">
+                <a:latin typeface="Verdana" panose="020B0604030504040204" pitchFamily="34" charset="0"/>
+                <a:ea typeface="Verdana" panose="020B0604030504040204" pitchFamily="34" charset="0"/>
+              </a:rPr>
+              <a:t>Modern Portfolio Theory (MPT)</a:t>
+            </a:r>
+            <a:endParaRPr lang="en-US" sz="2400" dirty="0"/>
+          </a:p>
+        </p:txBody>
+      </p:sp>
     </p:spTree>
     <p:extLst>
       <p:ext uri="{BB962C8B-B14F-4D97-AF65-F5344CB8AC3E}">
@@ -6968,6 +7319,45 @@
           </a:p>
         </p:txBody>
       </p:sp>
+      <p:sp>
+        <p:nvSpPr>
+          <p:cNvPr id="2" name="TextBox 1">
+            <a:extLst>
+              <a:ext uri="{FF2B5EF4-FFF2-40B4-BE49-F238E27FC236}">
+                <a16:creationId xmlns:a16="http://schemas.microsoft.com/office/drawing/2014/main" id="{F5C80E98-B17C-4A94-7DE3-4B494D600EE5}"/>
+              </a:ext>
+            </a:extLst>
+          </p:cNvPr>
+          <p:cNvSpPr txBox="1"/>
+          <p:nvPr/>
+        </p:nvSpPr>
+        <p:spPr>
+          <a:xfrm>
+            <a:off x="104543" y="151072"/>
+            <a:ext cx="4688825" cy="400110"/>
+          </a:xfrm>
+          <a:prstGeom prst="rect">
+            <a:avLst/>
+          </a:prstGeom>
+          <a:noFill/>
+        </p:spPr>
+        <p:txBody>
+          <a:bodyPr wrap="square" rtlCol="0">
+            <a:spAutoFit/>
+          </a:bodyPr>
+          <a:lstStyle/>
+          <a:p>
+            <a:r>
+              <a:rPr lang="en-US" sz="2000" dirty="0">
+                <a:latin typeface="Verdana" panose="020B0604030504040204" pitchFamily="34" charset="0"/>
+                <a:ea typeface="Verdana" panose="020B0604030504040204" pitchFamily="34" charset="0"/>
+              </a:rPr>
+              <a:t>Modern Portfolio Theory (MPT)</a:t>
+            </a:r>
+            <a:endParaRPr lang="en-US" sz="2400" dirty="0"/>
+          </a:p>
+        </p:txBody>
+      </p:sp>
     </p:spTree>
     <p:extLst>
       <p:ext uri="{BB962C8B-B14F-4D97-AF65-F5344CB8AC3E}">
@@ -7155,6 +7545,45 @@
           </a:prstGeom>
         </p:spPr>
       </p:pic>
+      <p:sp>
+        <p:nvSpPr>
+          <p:cNvPr id="2" name="TextBox 1">
+            <a:extLst>
+              <a:ext uri="{FF2B5EF4-FFF2-40B4-BE49-F238E27FC236}">
+                <a16:creationId xmlns:a16="http://schemas.microsoft.com/office/drawing/2014/main" id="{81CD6B22-3940-E9D1-75BA-6E78AD5FF5F6}"/>
+              </a:ext>
+            </a:extLst>
+          </p:cNvPr>
+          <p:cNvSpPr txBox="1"/>
+          <p:nvPr/>
+        </p:nvSpPr>
+        <p:spPr>
+          <a:xfrm>
+            <a:off x="104543" y="151072"/>
+            <a:ext cx="4688825" cy="400110"/>
+          </a:xfrm>
+          <a:prstGeom prst="rect">
+            <a:avLst/>
+          </a:prstGeom>
+          <a:noFill/>
+        </p:spPr>
+        <p:txBody>
+          <a:bodyPr wrap="square" rtlCol="0">
+            <a:spAutoFit/>
+          </a:bodyPr>
+          <a:lstStyle/>
+          <a:p>
+            <a:r>
+              <a:rPr lang="en-US" sz="2000" dirty="0">
+                <a:latin typeface="Verdana" panose="020B0604030504040204" pitchFamily="34" charset="0"/>
+                <a:ea typeface="Verdana" panose="020B0604030504040204" pitchFamily="34" charset="0"/>
+              </a:rPr>
+              <a:t>Modern Portfolio Theory (MPT)</a:t>
+            </a:r>
+            <a:endParaRPr lang="en-US" sz="2400" dirty="0"/>
+          </a:p>
+        </p:txBody>
+      </p:sp>
     </p:spTree>
     <p:extLst>
       <p:ext uri="{BB962C8B-B14F-4D97-AF65-F5344CB8AC3E}">
@@ -7187,10 +7616,10 @@
       </p:grpSpPr>
       <p:sp>
         <p:nvSpPr>
-          <p:cNvPr id="2" name="TextBox 1">
-            <a:extLst>
-              <a:ext uri="{FF2B5EF4-FFF2-40B4-BE49-F238E27FC236}">
-                <a16:creationId xmlns:a16="http://schemas.microsoft.com/office/drawing/2014/main" id="{02002A64-F599-BFAE-7FA0-842F396C21E9}"/>
+          <p:cNvPr id="3" name="TextBox 2">
+            <a:extLst>
+              <a:ext uri="{FF2B5EF4-FFF2-40B4-BE49-F238E27FC236}">
+                <a16:creationId xmlns:a16="http://schemas.microsoft.com/office/drawing/2014/main" id="{5BF1FBE9-6845-04B8-3738-90763B05AD50}"/>
               </a:ext>
             </a:extLst>
           </p:cNvPr>
@@ -7199,8 +7628,8 @@
         </p:nvSpPr>
         <p:spPr>
           <a:xfrm>
-            <a:off x="625365" y="1602304"/>
-            <a:ext cx="9363185" cy="2308324"/>
+            <a:off x="6605033" y="1602305"/>
+            <a:ext cx="4194031" cy="461665"/>
           </a:xfrm>
           <a:prstGeom prst="rect">
             <a:avLst/>
@@ -7215,77 +7644,226 @@
           <a:p>
             <a:r>
               <a:rPr lang="en-US" sz="2400" dirty="0"/>
-              <a:t>2004		</a:t>
+              <a:t>220</a:t>
             </a:r>
             <a:r>
               <a:rPr lang="hu-HU" sz="2400" dirty="0"/>
-              <a:t>Physics </a:t>
+              <a:t> 000</a:t>
             </a:r>
             <a:r>
               <a:rPr lang="en-US" sz="2400" dirty="0"/>
-              <a:t>PhD </a:t>
-            </a:r>
-            <a:r>
-              <a:rPr lang="hu-HU" sz="2400" dirty="0" err="1"/>
-              <a:t>at</a:t>
+              <a:t>+</a:t>
             </a:r>
             <a:r>
               <a:rPr lang="hu-HU" sz="2400" dirty="0"/>
+              <a:t> colleagues</a:t>
+            </a:r>
+            <a:r>
+              <a:rPr lang="en-US" sz="2400" dirty="0"/>
+              <a:t> globally</a:t>
+            </a:r>
+          </a:p>
+        </p:txBody>
+      </p:sp>
+      <p:sp>
+        <p:nvSpPr>
+          <p:cNvPr id="2" name="TextBox 1">
+            <a:extLst>
+              <a:ext uri="{FF2B5EF4-FFF2-40B4-BE49-F238E27FC236}">
+                <a16:creationId xmlns:a16="http://schemas.microsoft.com/office/drawing/2014/main" id="{02002A64-F599-BFAE-7FA0-842F396C21E9}"/>
+              </a:ext>
+            </a:extLst>
+          </p:cNvPr>
+          <p:cNvSpPr txBox="1"/>
+          <p:nvPr/>
+        </p:nvSpPr>
+        <p:spPr>
+          <a:xfrm>
+            <a:off x="867966" y="1602304"/>
+            <a:ext cx="804043" cy="461665"/>
+          </a:xfrm>
+          <a:prstGeom prst="rect">
+            <a:avLst/>
+          </a:prstGeom>
+          <a:noFill/>
+        </p:spPr>
+        <p:txBody>
+          <a:bodyPr wrap="square" rtlCol="0">
+            <a:spAutoFit/>
+          </a:bodyPr>
+          <a:lstStyle/>
+          <a:p>
+            <a:r>
+              <a:rPr lang="en-US" sz="2400" dirty="0"/>
+              <a:t>CEO</a:t>
+            </a:r>
+          </a:p>
+        </p:txBody>
+      </p:sp>
+      <p:sp>
+        <p:nvSpPr>
+          <p:cNvPr id="5" name="TextBox 4">
+            <a:extLst>
+              <a:ext uri="{FF2B5EF4-FFF2-40B4-BE49-F238E27FC236}">
+                <a16:creationId xmlns:a16="http://schemas.microsoft.com/office/drawing/2014/main" id="{7CC0E1A6-5864-175F-E223-C4DB6733E3AF}"/>
+              </a:ext>
+            </a:extLst>
+          </p:cNvPr>
+          <p:cNvSpPr txBox="1"/>
+          <p:nvPr/>
+        </p:nvSpPr>
+        <p:spPr>
+          <a:xfrm>
+            <a:off x="210520" y="2625054"/>
+            <a:ext cx="2849411" cy="923330"/>
+          </a:xfrm>
+          <a:prstGeom prst="rect">
+            <a:avLst/>
+          </a:prstGeom>
+          <a:noFill/>
+        </p:spPr>
+        <p:txBody>
+          <a:bodyPr wrap="square" rtlCol="0">
+            <a:spAutoFit/>
+          </a:bodyPr>
+          <a:lstStyle/>
+          <a:p>
+            <a:r>
+              <a:rPr lang="en-US" dirty="0"/>
+              <a:t>Managing Director,</a:t>
+            </a:r>
+          </a:p>
+          <a:p>
+            <a:r>
+              <a:rPr lang="en-US" dirty="0"/>
+              <a:t>Citi Country Officer, and </a:t>
+            </a:r>
+            <a:r>
+              <a:rPr lang="en-US" sz="1700" dirty="0"/>
+              <a:t>Banking Head for Hungary</a:t>
+            </a:r>
+          </a:p>
+        </p:txBody>
+      </p:sp>
+      <p:sp>
+        <p:nvSpPr>
+          <p:cNvPr id="7" name="TextBox 6">
+            <a:extLst>
+              <a:ext uri="{FF2B5EF4-FFF2-40B4-BE49-F238E27FC236}">
+                <a16:creationId xmlns:a16="http://schemas.microsoft.com/office/drawing/2014/main" id="{FC8BE81A-C958-F19D-C633-58C1F5EFFE30}"/>
+              </a:ext>
+            </a:extLst>
+          </p:cNvPr>
+          <p:cNvSpPr txBox="1"/>
+          <p:nvPr/>
+        </p:nvSpPr>
+        <p:spPr>
+          <a:xfrm>
+            <a:off x="6584495" y="2690469"/>
+            <a:ext cx="2849411" cy="461665"/>
+          </a:xfrm>
+          <a:prstGeom prst="rect">
+            <a:avLst/>
+          </a:prstGeom>
+          <a:noFill/>
+        </p:spPr>
+        <p:txBody>
+          <a:bodyPr wrap="square" rtlCol="0">
+            <a:spAutoFit/>
+          </a:bodyPr>
+          <a:lstStyle/>
+          <a:p>
+            <a:r>
+              <a:rPr lang="en-US" sz="2400" dirty="0"/>
+              <a:t>3 000+</a:t>
+            </a:r>
+            <a:r>
+              <a:rPr lang="hu-HU" sz="2400" dirty="0"/>
+              <a:t> in Budapest</a:t>
+            </a:r>
+            <a:r>
+              <a:rPr lang="en-US" sz="2400" dirty="0"/>
               <a:t> </a:t>
             </a:r>
+          </a:p>
+        </p:txBody>
+      </p:sp>
+      <p:sp>
+        <p:nvSpPr>
+          <p:cNvPr id="9" name="TextBox 8">
+            <a:extLst>
+              <a:ext uri="{FF2B5EF4-FFF2-40B4-BE49-F238E27FC236}">
+                <a16:creationId xmlns:a16="http://schemas.microsoft.com/office/drawing/2014/main" id="{76DB2818-7BB4-B7D0-6029-A9943CDF24A6}"/>
+              </a:ext>
+            </a:extLst>
+          </p:cNvPr>
+          <p:cNvSpPr txBox="1"/>
+          <p:nvPr/>
+        </p:nvSpPr>
+        <p:spPr>
+          <a:xfrm>
+            <a:off x="3243297" y="1634623"/>
+            <a:ext cx="1739466" cy="461665"/>
+          </a:xfrm>
+          <a:prstGeom prst="rect">
+            <a:avLst/>
+          </a:prstGeom>
+          <a:noFill/>
+        </p:spPr>
+        <p:txBody>
+          <a:bodyPr wrap="square" rtlCol="0">
+            <a:spAutoFit/>
+          </a:bodyPr>
+          <a:lstStyle/>
+          <a:p>
             <a:r>
               <a:rPr lang="en-US" sz="2400" dirty="0"/>
-              <a:t>Eotvos University</a:t>
-            </a:r>
-            <a:r>
-              <a:rPr lang="hu-HU" sz="2400" dirty="0"/>
-              <a:t>, </a:t>
-            </a:r>
+              <a:t>Jane Fraser</a:t>
+            </a:r>
+          </a:p>
+        </p:txBody>
+      </p:sp>
+      <p:sp>
+        <p:nvSpPr>
+          <p:cNvPr id="10" name="TextBox 9">
+            <a:extLst>
+              <a:ext uri="{FF2B5EF4-FFF2-40B4-BE49-F238E27FC236}">
+                <a16:creationId xmlns:a16="http://schemas.microsoft.com/office/drawing/2014/main" id="{7D9AA9EB-D47A-1CFE-195D-127A90D63DAF}"/>
+              </a:ext>
+            </a:extLst>
+          </p:cNvPr>
+          <p:cNvSpPr txBox="1"/>
+          <p:nvPr/>
+        </p:nvSpPr>
+        <p:spPr>
+          <a:xfrm>
+            <a:off x="3243296" y="2685213"/>
+            <a:ext cx="2969178" cy="461665"/>
+          </a:xfrm>
+          <a:prstGeom prst="rect">
+            <a:avLst/>
+          </a:prstGeom>
+          <a:noFill/>
+        </p:spPr>
+        <p:txBody>
+          <a:bodyPr wrap="square" rtlCol="0">
+            <a:spAutoFit/>
+          </a:bodyPr>
+          <a:lstStyle/>
+          <a:p>
             <a:r>
               <a:rPr lang="en-US" sz="2400" dirty="0"/>
-              <a:t>Advisor: Tamas Vicsek</a:t>
-            </a:r>
-          </a:p>
-          <a:p>
-            <a:endParaRPr lang="en-US" sz="2400" dirty="0"/>
-          </a:p>
-          <a:p>
-            <a:r>
-              <a:rPr lang="en-US" sz="2400" dirty="0"/>
-              <a:t> – 2017	Eotvos Univ.</a:t>
-            </a:r>
-            <a:r>
-              <a:rPr lang="hu-HU" sz="2400" dirty="0"/>
-              <a:t> /</a:t>
-            </a:r>
-            <a:r>
-              <a:rPr lang="en-US" sz="2400" dirty="0"/>
-              <a:t> Hung. Acad. of Sci.</a:t>
-            </a:r>
-          </a:p>
-          <a:p>
-            <a:r>
-              <a:rPr lang="en-US" sz="2400" dirty="0"/>
-              <a:t>		Habilitation, DSc</a:t>
-            </a:r>
-          </a:p>
-          <a:p>
-            <a:endParaRPr lang="en-US" sz="2400" dirty="0"/>
-          </a:p>
-          <a:p>
-            <a:r>
-              <a:rPr lang="en-US" sz="2400" dirty="0"/>
-              <a:t>2017 –		Citi HU MQA (Markets Quantitative Analysis) </a:t>
-            </a:r>
-          </a:p>
-        </p:txBody>
-      </p:sp>
-      <p:sp>
-        <p:nvSpPr>
-          <p:cNvPr id="11" name="TextBox 10">
-            <a:extLst>
-              <a:ext uri="{FF2B5EF4-FFF2-40B4-BE49-F238E27FC236}">
-                <a16:creationId xmlns:a16="http://schemas.microsoft.com/office/drawing/2014/main" id="{EC134B16-DCE9-765A-7C9D-A62A134E92BA}"/>
+              <a:t>Veronika Spanarova</a:t>
+            </a:r>
+          </a:p>
+        </p:txBody>
+      </p:sp>
+      <p:sp>
+        <p:nvSpPr>
+          <p:cNvPr id="8" name="TextBox 7">
+            <a:extLst>
+              <a:ext uri="{FF2B5EF4-FFF2-40B4-BE49-F238E27FC236}">
+                <a16:creationId xmlns:a16="http://schemas.microsoft.com/office/drawing/2014/main" id="{013FBD2B-6514-1D4D-79D1-350EF6074CDF}"/>
               </a:ext>
             </a:extLst>
           </p:cNvPr>
@@ -7314,15 +7892,84 @@
                   <a:schemeClr val="bg1"/>
                 </a:solidFill>
               </a:rPr>
-              <a:t>About myself</a:t>
-            </a:r>
+              <a:t>About Citi</a:t>
+            </a:r>
+          </a:p>
+        </p:txBody>
+      </p:sp>
+      <p:pic>
+        <p:nvPicPr>
+          <p:cNvPr id="11" name="Picture 10">
+            <a:extLst>
+              <a:ext uri="{FF2B5EF4-FFF2-40B4-BE49-F238E27FC236}">
+                <a16:creationId xmlns:a16="http://schemas.microsoft.com/office/drawing/2014/main" id="{F3688CA2-6CE8-9EC5-940A-E0A3003BDE21}"/>
+              </a:ext>
+            </a:extLst>
+          </p:cNvPr>
+          <p:cNvPicPr>
+            <a:picLocks noChangeAspect="1"/>
+          </p:cNvPicPr>
+          <p:nvPr/>
+        </p:nvPicPr>
+        <p:blipFill>
+          <a:blip r:embed="rId2"/>
+          <a:stretch>
+            <a:fillRect/>
+          </a:stretch>
+        </p:blipFill>
+        <p:spPr>
+          <a:xfrm>
+            <a:off x="7415350" y="4169664"/>
+            <a:ext cx="3844622" cy="1864244"/>
+          </a:xfrm>
+          <a:prstGeom prst="rect">
+            <a:avLst/>
+          </a:prstGeom>
+        </p:spPr>
+      </p:pic>
+      <p:sp>
+        <p:nvSpPr>
+          <p:cNvPr id="4" name="TextBox 3">
+            <a:extLst>
+              <a:ext uri="{FF2B5EF4-FFF2-40B4-BE49-F238E27FC236}">
+                <a16:creationId xmlns:a16="http://schemas.microsoft.com/office/drawing/2014/main" id="{598A6748-6EE2-338C-3CDA-24356F84FEC2}"/>
+              </a:ext>
+            </a:extLst>
+          </p:cNvPr>
+          <p:cNvSpPr txBox="1"/>
+          <p:nvPr/>
+        </p:nvSpPr>
+        <p:spPr>
+          <a:xfrm>
+            <a:off x="104543" y="151072"/>
+            <a:ext cx="5303851" cy="400110"/>
+          </a:xfrm>
+          <a:prstGeom prst="rect">
+            <a:avLst/>
+          </a:prstGeom>
+          <a:noFill/>
+        </p:spPr>
+        <p:txBody>
+          <a:bodyPr wrap="square" rtlCol="0">
+            <a:spAutoFit/>
+          </a:bodyPr>
+          <a:lstStyle/>
+          <a:p>
+            <a:r>
+              <a:rPr lang="en-US" sz="2000" dirty="0">
+                <a:latin typeface="Verdana" panose="020B0604030504040204" pitchFamily="34" charset="0"/>
+                <a:ea typeface="Verdana" panose="020B0604030504040204" pitchFamily="34" charset="0"/>
+              </a:rPr>
+              <a:t>About Citi</a:t>
+            </a:r>
+            <a:endParaRPr lang="en-US" sz="2400" dirty="0"/>
           </a:p>
         </p:txBody>
       </p:sp>
     </p:spTree>
     <p:extLst>
       <p:ext uri="{BB962C8B-B14F-4D97-AF65-F5344CB8AC3E}">
-        <p14:creationId xmlns:p14="http://schemas.microsoft.com/office/powerpoint/2010/main" val="876769427"/>
+        <p14:creationId xmlns:p14="http://schemas.microsoft.com/office/powerpoint/2010/main" val="3614639626"/>
       </p:ext>
     </p:extLst>
   </p:cSld>
@@ -7445,6 +8092,45 @@
               <a:rPr lang="en-US" sz="2800" dirty="0"/>
               <a:t>	non-diversifiable risk</a:t>
             </a:r>
+          </a:p>
+        </p:txBody>
+      </p:sp>
+      <p:sp>
+        <p:nvSpPr>
+          <p:cNvPr id="3" name="TextBox 2">
+            <a:extLst>
+              <a:ext uri="{FF2B5EF4-FFF2-40B4-BE49-F238E27FC236}">
+                <a16:creationId xmlns:a16="http://schemas.microsoft.com/office/drawing/2014/main" id="{54ED6637-D0CB-E9C6-D049-D602ECB3B24B}"/>
+              </a:ext>
+            </a:extLst>
+          </p:cNvPr>
+          <p:cNvSpPr txBox="1"/>
+          <p:nvPr/>
+        </p:nvSpPr>
+        <p:spPr>
+          <a:xfrm>
+            <a:off x="104543" y="151072"/>
+            <a:ext cx="5127024" cy="400110"/>
+          </a:xfrm>
+          <a:prstGeom prst="rect">
+            <a:avLst/>
+          </a:prstGeom>
+          <a:noFill/>
+        </p:spPr>
+        <p:txBody>
+          <a:bodyPr wrap="square" rtlCol="0">
+            <a:spAutoFit/>
+          </a:bodyPr>
+          <a:lstStyle/>
+          <a:p>
+            <a:r>
+              <a:rPr lang="en-US" sz="2000" dirty="0">
+                <a:latin typeface="Verdana" panose="020B0604030504040204" pitchFamily="34" charset="0"/>
+                <a:ea typeface="Verdana" panose="020B0604030504040204" pitchFamily="34" charset="0"/>
+              </a:rPr>
+              <a:t>Capital Asset Pricing Model (CAPM)</a:t>
+            </a:r>
+            <a:endParaRPr lang="en-US" sz="2400" dirty="0"/>
           </a:p>
         </p:txBody>
       </p:sp>
@@ -7539,14 +8225,53 @@
         </p:blipFill>
         <p:spPr>
           <a:xfrm>
-            <a:off x="1049694" y="907170"/>
-            <a:ext cx="10092612" cy="5449413"/>
+            <a:off x="674408" y="809470"/>
+            <a:ext cx="10606708" cy="5726994"/>
           </a:xfrm>
           <a:prstGeom prst="rect">
             <a:avLst/>
           </a:prstGeom>
         </p:spPr>
       </p:pic>
+      <p:sp>
+        <p:nvSpPr>
+          <p:cNvPr id="2" name="TextBox 1">
+            <a:extLst>
+              <a:ext uri="{FF2B5EF4-FFF2-40B4-BE49-F238E27FC236}">
+                <a16:creationId xmlns:a16="http://schemas.microsoft.com/office/drawing/2014/main" id="{6CB33B4E-5F0B-C100-03AE-491AEBB99B91}"/>
+              </a:ext>
+            </a:extLst>
+          </p:cNvPr>
+          <p:cNvSpPr txBox="1"/>
+          <p:nvPr/>
+        </p:nvSpPr>
+        <p:spPr>
+          <a:xfrm>
+            <a:off x="104543" y="151072"/>
+            <a:ext cx="5127024" cy="400110"/>
+          </a:xfrm>
+          <a:prstGeom prst="rect">
+            <a:avLst/>
+          </a:prstGeom>
+          <a:noFill/>
+        </p:spPr>
+        <p:txBody>
+          <a:bodyPr wrap="square" rtlCol="0">
+            <a:spAutoFit/>
+          </a:bodyPr>
+          <a:lstStyle/>
+          <a:p>
+            <a:r>
+              <a:rPr lang="en-US" sz="2000" dirty="0">
+                <a:latin typeface="Verdana" panose="020B0604030504040204" pitchFamily="34" charset="0"/>
+                <a:ea typeface="Verdana" panose="020B0604030504040204" pitchFamily="34" charset="0"/>
+              </a:rPr>
+              <a:t>Capital Asset Pricing Model (CAPM)</a:t>
+            </a:r>
+            <a:endParaRPr lang="en-US" sz="2400" dirty="0"/>
+          </a:p>
+        </p:txBody>
+      </p:sp>
     </p:spTree>
     <p:extLst>
       <p:ext uri="{BB962C8B-B14F-4D97-AF65-F5344CB8AC3E}">
@@ -8239,6 +8964,45 @@
           </a:p>
         </p:txBody>
       </p:sp>
+      <p:sp>
+        <p:nvSpPr>
+          <p:cNvPr id="6" name="TextBox 5">
+            <a:extLst>
+              <a:ext uri="{FF2B5EF4-FFF2-40B4-BE49-F238E27FC236}">
+                <a16:creationId xmlns:a16="http://schemas.microsoft.com/office/drawing/2014/main" id="{9062E381-60FE-6950-DE1F-033F0579750E}"/>
+              </a:ext>
+            </a:extLst>
+          </p:cNvPr>
+          <p:cNvSpPr txBox="1"/>
+          <p:nvPr/>
+        </p:nvSpPr>
+        <p:spPr>
+          <a:xfrm>
+            <a:off x="104543" y="151072"/>
+            <a:ext cx="5127024" cy="400110"/>
+          </a:xfrm>
+          <a:prstGeom prst="rect">
+            <a:avLst/>
+          </a:prstGeom>
+          <a:noFill/>
+        </p:spPr>
+        <p:txBody>
+          <a:bodyPr wrap="square" rtlCol="0">
+            <a:spAutoFit/>
+          </a:bodyPr>
+          <a:lstStyle/>
+          <a:p>
+            <a:r>
+              <a:rPr lang="en-US" sz="2000" dirty="0">
+                <a:latin typeface="Verdana" panose="020B0604030504040204" pitchFamily="34" charset="0"/>
+                <a:ea typeface="Verdana" panose="020B0604030504040204" pitchFamily="34" charset="0"/>
+              </a:rPr>
+              <a:t>Capital Asset Pricing Model (CAPM)</a:t>
+            </a:r>
+            <a:endParaRPr lang="en-US" sz="2400" dirty="0"/>
+          </a:p>
+        </p:txBody>
+      </p:sp>
     </p:spTree>
     <p:extLst>
       <p:ext uri="{BB962C8B-B14F-4D97-AF65-F5344CB8AC3E}">
@@ -8322,7 +9086,7 @@
         </p:nvSpPr>
         <p:spPr>
           <a:xfrm>
-            <a:off x="227144" y="1165936"/>
+            <a:off x="227144" y="911106"/>
             <a:ext cx="4786344" cy="892552"/>
           </a:xfrm>
           <a:prstGeom prst="rect">
@@ -8378,7 +9142,7 @@
         </p:blipFill>
         <p:spPr bwMode="auto">
           <a:xfrm>
-            <a:off x="222643" y="2244819"/>
+            <a:off x="222643" y="2094919"/>
             <a:ext cx="11773299" cy="3927499"/>
           </a:xfrm>
           <a:prstGeom prst="rect">
@@ -8396,6 +9160,45 @@
           </a:extLst>
         </p:spPr>
       </p:pic>
+      <p:sp>
+        <p:nvSpPr>
+          <p:cNvPr id="3" name="TextBox 2">
+            <a:extLst>
+              <a:ext uri="{FF2B5EF4-FFF2-40B4-BE49-F238E27FC236}">
+                <a16:creationId xmlns:a16="http://schemas.microsoft.com/office/drawing/2014/main" id="{BBAE2614-FE13-7C62-368F-38855514F65F}"/>
+              </a:ext>
+            </a:extLst>
+          </p:cNvPr>
+          <p:cNvSpPr txBox="1"/>
+          <p:nvPr/>
+        </p:nvSpPr>
+        <p:spPr>
+          <a:xfrm>
+            <a:off x="104543" y="151072"/>
+            <a:ext cx="5127024" cy="400110"/>
+          </a:xfrm>
+          <a:prstGeom prst="rect">
+            <a:avLst/>
+          </a:prstGeom>
+          <a:noFill/>
+        </p:spPr>
+        <p:txBody>
+          <a:bodyPr wrap="square" rtlCol="0">
+            <a:spAutoFit/>
+          </a:bodyPr>
+          <a:lstStyle/>
+          <a:p>
+            <a:r>
+              <a:rPr lang="en-US" sz="2000" dirty="0">
+                <a:latin typeface="Verdana" panose="020B0604030504040204" pitchFamily="34" charset="0"/>
+                <a:ea typeface="Verdana" panose="020B0604030504040204" pitchFamily="34" charset="0"/>
+              </a:rPr>
+              <a:t>Capital Asset Pricing Model (CAPM)</a:t>
+            </a:r>
+            <a:endParaRPr lang="en-US" sz="2400" dirty="0"/>
+          </a:p>
+        </p:txBody>
+      </p:sp>
     </p:spTree>
     <p:extLst>
       <p:ext uri="{BB962C8B-B14F-4D97-AF65-F5344CB8AC3E}">
@@ -8548,6 +9351,45 @@
           </a:extLst>
         </p:spPr>
       </p:pic>
+      <p:sp>
+        <p:nvSpPr>
+          <p:cNvPr id="3" name="TextBox 2">
+            <a:extLst>
+              <a:ext uri="{FF2B5EF4-FFF2-40B4-BE49-F238E27FC236}">
+                <a16:creationId xmlns:a16="http://schemas.microsoft.com/office/drawing/2014/main" id="{DC9B9A62-C13B-BEE9-0835-CAE008176436}"/>
+              </a:ext>
+            </a:extLst>
+          </p:cNvPr>
+          <p:cNvSpPr txBox="1"/>
+          <p:nvPr/>
+        </p:nvSpPr>
+        <p:spPr>
+          <a:xfrm>
+            <a:off x="104543" y="151072"/>
+            <a:ext cx="5127024" cy="400110"/>
+          </a:xfrm>
+          <a:prstGeom prst="rect">
+            <a:avLst/>
+          </a:prstGeom>
+          <a:noFill/>
+        </p:spPr>
+        <p:txBody>
+          <a:bodyPr wrap="square" rtlCol="0">
+            <a:spAutoFit/>
+          </a:bodyPr>
+          <a:lstStyle/>
+          <a:p>
+            <a:r>
+              <a:rPr lang="en-US" sz="2000" dirty="0">
+                <a:latin typeface="Verdana" panose="020B0604030504040204" pitchFamily="34" charset="0"/>
+                <a:ea typeface="Verdana" panose="020B0604030504040204" pitchFamily="34" charset="0"/>
+              </a:rPr>
+              <a:t>Capital Asset Pricing Model (CAPM)</a:t>
+            </a:r>
+            <a:endParaRPr lang="en-US" sz="2400" dirty="0"/>
+          </a:p>
+        </p:txBody>
+      </p:sp>
     </p:spTree>
     <p:extLst>
       <p:ext uri="{BB962C8B-B14F-4D97-AF65-F5344CB8AC3E}">
@@ -8592,8 +9434,8 @@
         </p:nvSpPr>
         <p:spPr>
           <a:xfrm>
-            <a:off x="636944" y="1594811"/>
-            <a:ext cx="2899358" cy="1384995"/>
+            <a:off x="1896118" y="2905780"/>
+            <a:ext cx="2899358" cy="523220"/>
           </a:xfrm>
           <a:prstGeom prst="rect">
             <a:avLst/>
@@ -8608,16 +9450,46 @@
           <a:p>
             <a:r>
               <a:rPr lang="en-US" sz="2800" dirty="0"/>
+              <a:t>Questions</a:t>
+            </a:r>
+            <a:endParaRPr lang="en-US" sz="2400" dirty="0"/>
+          </a:p>
+        </p:txBody>
+      </p:sp>
+      <p:sp>
+        <p:nvSpPr>
+          <p:cNvPr id="3" name="TextBox 2">
+            <a:extLst>
+              <a:ext uri="{FF2B5EF4-FFF2-40B4-BE49-F238E27FC236}">
+                <a16:creationId xmlns:a16="http://schemas.microsoft.com/office/drawing/2014/main" id="{387D12F6-7525-2267-99C8-748A3834FA18}"/>
+              </a:ext>
+            </a:extLst>
+          </p:cNvPr>
+          <p:cNvSpPr txBox="1"/>
+          <p:nvPr/>
+        </p:nvSpPr>
+        <p:spPr>
+          <a:xfrm>
+            <a:off x="104543" y="151072"/>
+            <a:ext cx="2443785" cy="400110"/>
+          </a:xfrm>
+          <a:prstGeom prst="rect">
+            <a:avLst/>
+          </a:prstGeom>
+          <a:noFill/>
+        </p:spPr>
+        <p:txBody>
+          <a:bodyPr wrap="square" rtlCol="0">
+            <a:spAutoFit/>
+          </a:bodyPr>
+          <a:lstStyle/>
+          <a:p>
+            <a:r>
+              <a:rPr lang="en-US" sz="2000" dirty="0">
+                <a:latin typeface="Verdana" panose="020B0604030504040204" pitchFamily="34" charset="0"/>
+                <a:ea typeface="Verdana" panose="020B0604030504040204" pitchFamily="34" charset="0"/>
+              </a:rPr>
               <a:t>Thank you</a:t>
-            </a:r>
-          </a:p>
-          <a:p>
-            <a:endParaRPr lang="en-US" sz="2800" dirty="0"/>
-          </a:p>
-          <a:p>
-            <a:r>
-              <a:rPr lang="en-US" sz="2800" dirty="0"/>
-              <a:t>Questions</a:t>
             </a:r>
             <a:endParaRPr lang="en-US" sz="2400" dirty="0"/>
           </a:p>
@@ -8655,10 +9527,10 @@
       </p:grpSpPr>
       <p:sp>
         <p:nvSpPr>
-          <p:cNvPr id="3" name="TextBox 2">
-            <a:extLst>
-              <a:ext uri="{FF2B5EF4-FFF2-40B4-BE49-F238E27FC236}">
-                <a16:creationId xmlns:a16="http://schemas.microsoft.com/office/drawing/2014/main" id="{5BF1FBE9-6845-04B8-3738-90763B05AD50}"/>
+          <p:cNvPr id="2" name="TextBox 1">
+            <a:extLst>
+              <a:ext uri="{FF2B5EF4-FFF2-40B4-BE49-F238E27FC236}">
+                <a16:creationId xmlns:a16="http://schemas.microsoft.com/office/drawing/2014/main" id="{02002A64-F599-BFAE-7FA0-842F396C21E9}"/>
               </a:ext>
             </a:extLst>
           </p:cNvPr>
@@ -8667,8 +9539,8 @@
         </p:nvSpPr>
         <p:spPr>
           <a:xfrm>
-            <a:off x="6605033" y="1602305"/>
-            <a:ext cx="4194031" cy="461665"/>
+            <a:off x="715305" y="1662264"/>
+            <a:ext cx="9363185" cy="2308324"/>
           </a:xfrm>
           <a:prstGeom prst="rect">
             <a:avLst/>
@@ -8683,226 +9555,77 @@
           <a:p>
             <a:r>
               <a:rPr lang="en-US" sz="2400" dirty="0"/>
-              <a:t>220</a:t>
+              <a:t>2004		</a:t>
             </a:r>
             <a:r>
               <a:rPr lang="hu-HU" sz="2400" dirty="0"/>
-              <a:t> 000</a:t>
+              <a:t>Physics </a:t>
             </a:r>
             <a:r>
               <a:rPr lang="en-US" sz="2400" dirty="0"/>
-              <a:t>+</a:t>
+              <a:t>PhD </a:t>
+            </a:r>
+            <a:r>
+              <a:rPr lang="hu-HU" sz="2400" dirty="0" err="1"/>
+              <a:t>at</a:t>
             </a:r>
             <a:r>
               <a:rPr lang="hu-HU" sz="2400" dirty="0"/>
-              <a:t> colleagues</a:t>
+              <a:t> </a:t>
             </a:r>
             <a:r>
               <a:rPr lang="en-US" sz="2400" dirty="0"/>
-              <a:t> globally</a:t>
-            </a:r>
-          </a:p>
-        </p:txBody>
-      </p:sp>
-      <p:sp>
-        <p:nvSpPr>
-          <p:cNvPr id="2" name="TextBox 1">
-            <a:extLst>
-              <a:ext uri="{FF2B5EF4-FFF2-40B4-BE49-F238E27FC236}">
-                <a16:creationId xmlns:a16="http://schemas.microsoft.com/office/drawing/2014/main" id="{02002A64-F599-BFAE-7FA0-842F396C21E9}"/>
-              </a:ext>
-            </a:extLst>
-          </p:cNvPr>
-          <p:cNvSpPr txBox="1"/>
-          <p:nvPr/>
-        </p:nvSpPr>
-        <p:spPr>
-          <a:xfrm>
-            <a:off x="867966" y="1602304"/>
-            <a:ext cx="804043" cy="461665"/>
-          </a:xfrm>
-          <a:prstGeom prst="rect">
-            <a:avLst/>
-          </a:prstGeom>
-          <a:noFill/>
-        </p:spPr>
-        <p:txBody>
-          <a:bodyPr wrap="square" rtlCol="0">
-            <a:spAutoFit/>
-          </a:bodyPr>
-          <a:lstStyle/>
-          <a:p>
+              <a:t>Eotvos University</a:t>
+            </a:r>
+            <a:r>
+              <a:rPr lang="hu-HU" sz="2400" dirty="0"/>
+              <a:t>, </a:t>
+            </a:r>
             <a:r>
               <a:rPr lang="en-US" sz="2400" dirty="0"/>
-              <a:t>CEO</a:t>
-            </a:r>
-          </a:p>
-        </p:txBody>
-      </p:sp>
-      <p:sp>
-        <p:nvSpPr>
-          <p:cNvPr id="5" name="TextBox 4">
-            <a:extLst>
-              <a:ext uri="{FF2B5EF4-FFF2-40B4-BE49-F238E27FC236}">
-                <a16:creationId xmlns:a16="http://schemas.microsoft.com/office/drawing/2014/main" id="{7CC0E1A6-5864-175F-E223-C4DB6733E3AF}"/>
-              </a:ext>
-            </a:extLst>
-          </p:cNvPr>
-          <p:cNvSpPr txBox="1"/>
-          <p:nvPr/>
-        </p:nvSpPr>
-        <p:spPr>
-          <a:xfrm>
-            <a:off x="210520" y="2625054"/>
-            <a:ext cx="2849411" cy="923330"/>
-          </a:xfrm>
-          <a:prstGeom prst="rect">
-            <a:avLst/>
-          </a:prstGeom>
-          <a:noFill/>
-        </p:spPr>
-        <p:txBody>
-          <a:bodyPr wrap="square" rtlCol="0">
-            <a:spAutoFit/>
-          </a:bodyPr>
-          <a:lstStyle/>
-          <a:p>
-            <a:r>
-              <a:rPr lang="en-US" dirty="0"/>
-              <a:t>Managing Director,</a:t>
-            </a:r>
-          </a:p>
-          <a:p>
-            <a:r>
-              <a:rPr lang="en-US" dirty="0"/>
-              <a:t>Citi Country Officer, and </a:t>
-            </a:r>
-            <a:r>
-              <a:rPr lang="en-US" sz="1700" dirty="0"/>
-              <a:t>Banking Head for Hungary</a:t>
-            </a:r>
-          </a:p>
-        </p:txBody>
-      </p:sp>
-      <p:sp>
-        <p:nvSpPr>
-          <p:cNvPr id="7" name="TextBox 6">
-            <a:extLst>
-              <a:ext uri="{FF2B5EF4-FFF2-40B4-BE49-F238E27FC236}">
-                <a16:creationId xmlns:a16="http://schemas.microsoft.com/office/drawing/2014/main" id="{FC8BE81A-C958-F19D-C633-58C1F5EFFE30}"/>
-              </a:ext>
-            </a:extLst>
-          </p:cNvPr>
-          <p:cNvSpPr txBox="1"/>
-          <p:nvPr/>
-        </p:nvSpPr>
-        <p:spPr>
-          <a:xfrm>
-            <a:off x="6584495" y="2690469"/>
-            <a:ext cx="2849411" cy="461665"/>
-          </a:xfrm>
-          <a:prstGeom prst="rect">
-            <a:avLst/>
-          </a:prstGeom>
-          <a:noFill/>
-        </p:spPr>
-        <p:txBody>
-          <a:bodyPr wrap="square" rtlCol="0">
-            <a:spAutoFit/>
-          </a:bodyPr>
-          <a:lstStyle/>
+              <a:t>Advisor: Tamas Vicsek</a:t>
+            </a:r>
+          </a:p>
+          <a:p>
+            <a:endParaRPr lang="en-US" sz="2400" dirty="0"/>
+          </a:p>
           <a:p>
             <a:r>
               <a:rPr lang="en-US" sz="2400" dirty="0"/>
-              <a:t>3 000+</a:t>
+              <a:t> – 2017	Eotvos Univ.</a:t>
             </a:r>
             <a:r>
               <a:rPr lang="hu-HU" sz="2400" dirty="0"/>
-              <a:t> in Budapest</a:t>
+              <a:t> /</a:t>
             </a:r>
             <a:r>
               <a:rPr lang="en-US" sz="2400" dirty="0"/>
-              <a:t> </a:t>
-            </a:r>
-          </a:p>
-        </p:txBody>
-      </p:sp>
-      <p:sp>
-        <p:nvSpPr>
-          <p:cNvPr id="9" name="TextBox 8">
-            <a:extLst>
-              <a:ext uri="{FF2B5EF4-FFF2-40B4-BE49-F238E27FC236}">
-                <a16:creationId xmlns:a16="http://schemas.microsoft.com/office/drawing/2014/main" id="{76DB2818-7BB4-B7D0-6029-A9943CDF24A6}"/>
-              </a:ext>
-            </a:extLst>
-          </p:cNvPr>
-          <p:cNvSpPr txBox="1"/>
-          <p:nvPr/>
-        </p:nvSpPr>
-        <p:spPr>
-          <a:xfrm>
-            <a:off x="3243297" y="1634623"/>
-            <a:ext cx="1739466" cy="461665"/>
-          </a:xfrm>
-          <a:prstGeom prst="rect">
-            <a:avLst/>
-          </a:prstGeom>
-          <a:noFill/>
-        </p:spPr>
-        <p:txBody>
-          <a:bodyPr wrap="square" rtlCol="0">
-            <a:spAutoFit/>
-          </a:bodyPr>
-          <a:lstStyle/>
+              <a:t> Hung. Acad. of Sci.</a:t>
+            </a:r>
+          </a:p>
           <a:p>
             <a:r>
               <a:rPr lang="en-US" sz="2400" dirty="0"/>
-              <a:t>Jane Fraser</a:t>
-            </a:r>
-          </a:p>
-        </p:txBody>
-      </p:sp>
-      <p:sp>
-        <p:nvSpPr>
-          <p:cNvPr id="10" name="TextBox 9">
-            <a:extLst>
-              <a:ext uri="{FF2B5EF4-FFF2-40B4-BE49-F238E27FC236}">
-                <a16:creationId xmlns:a16="http://schemas.microsoft.com/office/drawing/2014/main" id="{7D9AA9EB-D47A-1CFE-195D-127A90D63DAF}"/>
-              </a:ext>
-            </a:extLst>
-          </p:cNvPr>
-          <p:cNvSpPr txBox="1"/>
-          <p:nvPr/>
-        </p:nvSpPr>
-        <p:spPr>
-          <a:xfrm>
-            <a:off x="3243296" y="2685213"/>
-            <a:ext cx="2969178" cy="461665"/>
-          </a:xfrm>
-          <a:prstGeom prst="rect">
-            <a:avLst/>
-          </a:prstGeom>
-          <a:noFill/>
-        </p:spPr>
-        <p:txBody>
-          <a:bodyPr wrap="square" rtlCol="0">
-            <a:spAutoFit/>
-          </a:bodyPr>
-          <a:lstStyle/>
+              <a:t>		Habilitation, DSc</a:t>
+            </a:r>
+          </a:p>
+          <a:p>
+            <a:endParaRPr lang="en-US" sz="2400" dirty="0"/>
+          </a:p>
           <a:p>
             <a:r>
               <a:rPr lang="en-US" sz="2400" dirty="0"/>
-              <a:t>Veronika Spanarova</a:t>
-            </a:r>
-          </a:p>
-        </p:txBody>
-      </p:sp>
-      <p:sp>
-        <p:nvSpPr>
-          <p:cNvPr id="8" name="TextBox 7">
-            <a:extLst>
-              <a:ext uri="{FF2B5EF4-FFF2-40B4-BE49-F238E27FC236}">
-                <a16:creationId xmlns:a16="http://schemas.microsoft.com/office/drawing/2014/main" id="{013FBD2B-6514-1D4D-79D1-350EF6074CDF}"/>
+              <a:t>2017 –		Citi HU MQA (Markets Quantitative Analysis) </a:t>
+            </a:r>
+          </a:p>
+        </p:txBody>
+      </p:sp>
+      <p:sp>
+        <p:nvSpPr>
+          <p:cNvPr id="11" name="TextBox 10">
+            <a:extLst>
+              <a:ext uri="{FF2B5EF4-FFF2-40B4-BE49-F238E27FC236}">
+                <a16:creationId xmlns:a16="http://schemas.microsoft.com/office/drawing/2014/main" id="{EC134B16-DCE9-765A-7C9D-A62A134E92BA}"/>
               </a:ext>
             </a:extLst>
           </p:cNvPr>
@@ -8931,45 +9654,54 @@
                   <a:schemeClr val="bg1"/>
                 </a:solidFill>
               </a:rPr>
-              <a:t>About Citi</a:t>
-            </a:r>
-          </a:p>
-        </p:txBody>
-      </p:sp>
-      <p:pic>
-        <p:nvPicPr>
-          <p:cNvPr id="11" name="Picture 10">
-            <a:extLst>
-              <a:ext uri="{FF2B5EF4-FFF2-40B4-BE49-F238E27FC236}">
-                <a16:creationId xmlns:a16="http://schemas.microsoft.com/office/drawing/2014/main" id="{F3688CA2-6CE8-9EC5-940A-E0A3003BDE21}"/>
-              </a:ext>
-            </a:extLst>
-          </p:cNvPr>
-          <p:cNvPicPr>
-            <a:picLocks noChangeAspect="1"/>
-          </p:cNvPicPr>
-          <p:nvPr/>
-        </p:nvPicPr>
-        <p:blipFill>
-          <a:blip r:embed="rId2"/>
-          <a:stretch>
-            <a:fillRect/>
-          </a:stretch>
-        </p:blipFill>
-        <p:spPr>
-          <a:xfrm>
-            <a:off x="7415350" y="4169664"/>
-            <a:ext cx="3844622" cy="1864244"/>
-          </a:xfrm>
-          <a:prstGeom prst="rect">
-            <a:avLst/>
-          </a:prstGeom>
-        </p:spPr>
-      </p:pic>
+              <a:t>About myself</a:t>
+            </a:r>
+          </a:p>
+        </p:txBody>
+      </p:sp>
+      <p:sp>
+        <p:nvSpPr>
+          <p:cNvPr id="3" name="TextBox 2">
+            <a:extLst>
+              <a:ext uri="{FF2B5EF4-FFF2-40B4-BE49-F238E27FC236}">
+                <a16:creationId xmlns:a16="http://schemas.microsoft.com/office/drawing/2014/main" id="{4FD1D860-BEE4-0552-D345-4839A73DAD7C}"/>
+              </a:ext>
+            </a:extLst>
+          </p:cNvPr>
+          <p:cNvSpPr txBox="1"/>
+          <p:nvPr/>
+        </p:nvSpPr>
+        <p:spPr>
+          <a:xfrm>
+            <a:off x="104543" y="151072"/>
+            <a:ext cx="5303851" cy="400110"/>
+          </a:xfrm>
+          <a:prstGeom prst="rect">
+            <a:avLst/>
+          </a:prstGeom>
+          <a:noFill/>
+        </p:spPr>
+        <p:txBody>
+          <a:bodyPr wrap="square" rtlCol="0">
+            <a:spAutoFit/>
+          </a:bodyPr>
+          <a:lstStyle/>
+          <a:p>
+            <a:r>
+              <a:rPr lang="en-US" sz="2000" dirty="0">
+                <a:latin typeface="Verdana" panose="020B0604030504040204" pitchFamily="34" charset="0"/>
+                <a:ea typeface="Verdana" panose="020B0604030504040204" pitchFamily="34" charset="0"/>
+              </a:rPr>
+              <a:t>About myself</a:t>
+            </a:r>
+            <a:endParaRPr lang="en-US" sz="2400" dirty="0"/>
+          </a:p>
+        </p:txBody>
+      </p:sp>
     </p:spTree>
     <p:extLst>
       <p:ext uri="{BB962C8B-B14F-4D97-AF65-F5344CB8AC3E}">
-        <p14:creationId xmlns:p14="http://schemas.microsoft.com/office/powerpoint/2010/main" val="3614639626"/>
+        <p14:creationId xmlns:p14="http://schemas.microsoft.com/office/powerpoint/2010/main" val="876769427"/>
       </p:ext>
     </p:extLst>
   </p:cSld>
@@ -9337,8 +10069,8 @@
         </p:nvSpPr>
         <p:spPr>
           <a:xfrm>
-            <a:off x="438251" y="1600357"/>
-            <a:ext cx="4398922" cy="2677656"/>
+            <a:off x="438251" y="1735267"/>
+            <a:ext cx="4398922" cy="3046988"/>
           </a:xfrm>
           <a:prstGeom prst="rect">
             <a:avLst/>
@@ -9353,7 +10085,13 @@
           <a:p>
             <a:r>
               <a:rPr lang="en-US" sz="2400" dirty="0"/>
-              <a:t>Introduction</a:t>
+              <a:t>A brief introduction to</a:t>
+            </a:r>
+          </a:p>
+          <a:p>
+            <a:r>
+              <a:rPr lang="en-US" sz="2400" dirty="0"/>
+              <a:t>return, risk, and portfolios</a:t>
             </a:r>
           </a:p>
           <a:p>
@@ -9385,6 +10123,45 @@
               <a:rPr lang="en-US" sz="2400" dirty="0"/>
               <a:t>Pricing Model (CAPM)</a:t>
             </a:r>
+          </a:p>
+        </p:txBody>
+      </p:sp>
+      <p:sp>
+        <p:nvSpPr>
+          <p:cNvPr id="7" name="TextBox 6">
+            <a:extLst>
+              <a:ext uri="{FF2B5EF4-FFF2-40B4-BE49-F238E27FC236}">
+                <a16:creationId xmlns:a16="http://schemas.microsoft.com/office/drawing/2014/main" id="{46DD86C1-DB8C-AC8D-E0F9-7444FAA7089C}"/>
+              </a:ext>
+            </a:extLst>
+          </p:cNvPr>
+          <p:cNvSpPr txBox="1"/>
+          <p:nvPr/>
+        </p:nvSpPr>
+        <p:spPr>
+          <a:xfrm>
+            <a:off x="104544" y="151072"/>
+            <a:ext cx="1964100" cy="400110"/>
+          </a:xfrm>
+          <a:prstGeom prst="rect">
+            <a:avLst/>
+          </a:prstGeom>
+          <a:noFill/>
+        </p:spPr>
+        <p:txBody>
+          <a:bodyPr wrap="square" rtlCol="0">
+            <a:spAutoFit/>
+          </a:bodyPr>
+          <a:lstStyle/>
+          <a:p>
+            <a:r>
+              <a:rPr lang="en-US" sz="2000" dirty="0">
+                <a:latin typeface="Verdana" panose="020B0604030504040204" pitchFamily="34" charset="0"/>
+                <a:ea typeface="Verdana" panose="020B0604030504040204" pitchFamily="34" charset="0"/>
+              </a:rPr>
+              <a:t>Agenda</a:t>
+            </a:r>
+            <a:endParaRPr lang="en-US" sz="2400" dirty="0"/>
           </a:p>
         </p:txBody>
       </p:sp>
@@ -10263,6 +11040,84 @@
           </a:p>
         </p:txBody>
       </p:sp>
+      <p:sp>
+        <p:nvSpPr>
+          <p:cNvPr id="3" name="TextBox 2">
+            <a:extLst>
+              <a:ext uri="{FF2B5EF4-FFF2-40B4-BE49-F238E27FC236}">
+                <a16:creationId xmlns:a16="http://schemas.microsoft.com/office/drawing/2014/main" id="{8E6AA809-3AE6-9C0A-A0DD-D1C6C3D0769C}"/>
+              </a:ext>
+            </a:extLst>
+          </p:cNvPr>
+          <p:cNvSpPr txBox="1"/>
+          <p:nvPr/>
+        </p:nvSpPr>
+        <p:spPr>
+          <a:xfrm>
+            <a:off x="104543" y="151072"/>
+            <a:ext cx="2728597" cy="400110"/>
+          </a:xfrm>
+          <a:prstGeom prst="rect">
+            <a:avLst/>
+          </a:prstGeom>
+          <a:noFill/>
+        </p:spPr>
+        <p:txBody>
+          <a:bodyPr wrap="square" rtlCol="0">
+            <a:spAutoFit/>
+          </a:bodyPr>
+          <a:lstStyle/>
+          <a:p>
+            <a:r>
+              <a:rPr lang="en-US" sz="2000" dirty="0">
+                <a:latin typeface="Verdana" panose="020B0604030504040204" pitchFamily="34" charset="0"/>
+                <a:ea typeface="Verdana" panose="020B0604030504040204" pitchFamily="34" charset="0"/>
+              </a:rPr>
+              <a:t>Introduction</a:t>
+            </a:r>
+            <a:endParaRPr lang="en-US" sz="2400" dirty="0"/>
+          </a:p>
+        </p:txBody>
+      </p:sp>
+      <p:sp>
+        <p:nvSpPr>
+          <p:cNvPr id="4" name="TextBox 3">
+            <a:extLst>
+              <a:ext uri="{FF2B5EF4-FFF2-40B4-BE49-F238E27FC236}">
+                <a16:creationId xmlns:a16="http://schemas.microsoft.com/office/drawing/2014/main" id="{266A4B6F-7A2E-A118-BC15-1656038F50E9}"/>
+              </a:ext>
+            </a:extLst>
+          </p:cNvPr>
+          <p:cNvSpPr txBox="1"/>
+          <p:nvPr/>
+        </p:nvSpPr>
+        <p:spPr>
+          <a:xfrm>
+            <a:off x="104544" y="151072"/>
+            <a:ext cx="1454434" cy="400110"/>
+          </a:xfrm>
+          <a:prstGeom prst="rect">
+            <a:avLst/>
+          </a:prstGeom>
+          <a:noFill/>
+        </p:spPr>
+        <p:txBody>
+          <a:bodyPr wrap="square" rtlCol="0">
+            <a:spAutoFit/>
+          </a:bodyPr>
+          <a:lstStyle/>
+          <a:p>
+            <a:r>
+              <a:rPr lang="en-US" sz="2000" dirty="0">
+                <a:latin typeface="Verdana" panose="020B0604030504040204" pitchFamily="34" charset="0"/>
+                <a:ea typeface="Verdana" panose="020B0604030504040204" pitchFamily="34" charset="0"/>
+              </a:rPr>
+              <a:t>Intro</a:t>
+            </a:r>
+            <a:endParaRPr lang="en-US" sz="2400" dirty="0"/>
+          </a:p>
+        </p:txBody>
+      </p:sp>
     </p:spTree>
     <p:extLst>
       <p:ext uri="{BB962C8B-B14F-4D97-AF65-F5344CB8AC3E}">
@@ -11397,6 +12252,45 @@
           </a:p>
         </p:txBody>
       </p:sp>
+      <p:sp>
+        <p:nvSpPr>
+          <p:cNvPr id="13" name="TextBox 12">
+            <a:extLst>
+              <a:ext uri="{FF2B5EF4-FFF2-40B4-BE49-F238E27FC236}">
+                <a16:creationId xmlns:a16="http://schemas.microsoft.com/office/drawing/2014/main" id="{2828DBAC-065F-36FA-7D93-65C8FA06DD7B}"/>
+              </a:ext>
+            </a:extLst>
+          </p:cNvPr>
+          <p:cNvSpPr txBox="1"/>
+          <p:nvPr/>
+        </p:nvSpPr>
+        <p:spPr>
+          <a:xfrm>
+            <a:off x="104543" y="151072"/>
+            <a:ext cx="2728597" cy="400110"/>
+          </a:xfrm>
+          <a:prstGeom prst="rect">
+            <a:avLst/>
+          </a:prstGeom>
+          <a:noFill/>
+        </p:spPr>
+        <p:txBody>
+          <a:bodyPr wrap="square" rtlCol="0">
+            <a:spAutoFit/>
+          </a:bodyPr>
+          <a:lstStyle/>
+          <a:p>
+            <a:r>
+              <a:rPr lang="en-US" sz="2000" dirty="0">
+                <a:latin typeface="Verdana" panose="020B0604030504040204" pitchFamily="34" charset="0"/>
+                <a:ea typeface="Verdana" panose="020B0604030504040204" pitchFamily="34" charset="0"/>
+              </a:rPr>
+              <a:t>Introduction</a:t>
+            </a:r>
+            <a:endParaRPr lang="en-US" sz="2400" dirty="0"/>
+          </a:p>
+        </p:txBody>
+      </p:sp>
     </p:spTree>
     <p:extLst>
       <p:ext uri="{BB962C8B-B14F-4D97-AF65-F5344CB8AC3E}">
@@ -11570,6 +12464,45 @@
           </a:p>
         </p:txBody>
       </p:sp>
+      <p:sp>
+        <p:nvSpPr>
+          <p:cNvPr id="5" name="TextBox 4">
+            <a:extLst>
+              <a:ext uri="{FF2B5EF4-FFF2-40B4-BE49-F238E27FC236}">
+                <a16:creationId xmlns:a16="http://schemas.microsoft.com/office/drawing/2014/main" id="{A390E507-1144-D14E-106A-BA20528B7015}"/>
+              </a:ext>
+            </a:extLst>
+          </p:cNvPr>
+          <p:cNvSpPr txBox="1"/>
+          <p:nvPr/>
+        </p:nvSpPr>
+        <p:spPr>
+          <a:xfrm>
+            <a:off x="104543" y="151072"/>
+            <a:ext cx="2728597" cy="400110"/>
+          </a:xfrm>
+          <a:prstGeom prst="rect">
+            <a:avLst/>
+          </a:prstGeom>
+          <a:noFill/>
+        </p:spPr>
+        <p:txBody>
+          <a:bodyPr wrap="square" rtlCol="0">
+            <a:spAutoFit/>
+          </a:bodyPr>
+          <a:lstStyle/>
+          <a:p>
+            <a:r>
+              <a:rPr lang="en-US" sz="2000" dirty="0">
+                <a:latin typeface="Verdana" panose="020B0604030504040204" pitchFamily="34" charset="0"/>
+                <a:ea typeface="Verdana" panose="020B0604030504040204" pitchFamily="34" charset="0"/>
+              </a:rPr>
+              <a:t>Introduction</a:t>
+            </a:r>
+            <a:endParaRPr lang="en-US" sz="2400" dirty="0"/>
+          </a:p>
+        </p:txBody>
+      </p:sp>
     </p:spTree>
     <p:extLst>
       <p:ext uri="{BB962C8B-B14F-4D97-AF65-F5344CB8AC3E}">
@@ -11602,45 +12535,6 @@
       </p:grpSpPr>
       <p:sp>
         <p:nvSpPr>
-          <p:cNvPr id="2" name="TextBox 1">
-            <a:extLst>
-              <a:ext uri="{FF2B5EF4-FFF2-40B4-BE49-F238E27FC236}">
-                <a16:creationId xmlns:a16="http://schemas.microsoft.com/office/drawing/2014/main" id="{E03B3FC0-A19A-0D68-D5BE-C9362748E2B5}"/>
-              </a:ext>
-            </a:extLst>
-          </p:cNvPr>
-          <p:cNvSpPr txBox="1"/>
-          <p:nvPr/>
-        </p:nvSpPr>
-        <p:spPr>
-          <a:xfrm>
-            <a:off x="105100" y="156234"/>
-            <a:ext cx="12002814" cy="369332"/>
-          </a:xfrm>
-          <a:prstGeom prst="rect">
-            <a:avLst/>
-          </a:prstGeom>
-          <a:noFill/>
-        </p:spPr>
-        <p:txBody>
-          <a:bodyPr wrap="square" rtlCol="0">
-            <a:spAutoFit/>
-          </a:bodyPr>
-          <a:lstStyle/>
-          <a:p>
-            <a:r>
-              <a:rPr lang="en-US" dirty="0">
-                <a:solidFill>
-                  <a:schemeClr val="bg1"/>
-                </a:solidFill>
-              </a:rPr>
-              <a:t>Intro</a:t>
-            </a:r>
-          </a:p>
-        </p:txBody>
-      </p:sp>
-      <p:sp>
-        <p:nvSpPr>
           <p:cNvPr id="3" name="TextBox 2">
             <a:extLst>
               <a:ext uri="{FF2B5EF4-FFF2-40B4-BE49-F238E27FC236}">
@@ -12068,6 +12962,45 @@
           </a:fontRef>
         </p:style>
       </p:cxnSp>
+      <p:sp>
+        <p:nvSpPr>
+          <p:cNvPr id="4" name="TextBox 3">
+            <a:extLst>
+              <a:ext uri="{FF2B5EF4-FFF2-40B4-BE49-F238E27FC236}">
+                <a16:creationId xmlns:a16="http://schemas.microsoft.com/office/drawing/2014/main" id="{1446A964-6CFE-2E1B-1C6F-59970CEF3004}"/>
+              </a:ext>
+            </a:extLst>
+          </p:cNvPr>
+          <p:cNvSpPr txBox="1"/>
+          <p:nvPr/>
+        </p:nvSpPr>
+        <p:spPr>
+          <a:xfrm>
+            <a:off x="104543" y="151072"/>
+            <a:ext cx="2728597" cy="400110"/>
+          </a:xfrm>
+          <a:prstGeom prst="rect">
+            <a:avLst/>
+          </a:prstGeom>
+          <a:noFill/>
+        </p:spPr>
+        <p:txBody>
+          <a:bodyPr wrap="square" rtlCol="0">
+            <a:spAutoFit/>
+          </a:bodyPr>
+          <a:lstStyle/>
+          <a:p>
+            <a:r>
+              <a:rPr lang="en-US" sz="2000" dirty="0">
+                <a:latin typeface="Verdana" panose="020B0604030504040204" pitchFamily="34" charset="0"/>
+                <a:ea typeface="Verdana" panose="020B0604030504040204" pitchFamily="34" charset="0"/>
+              </a:rPr>
+              <a:t>Introduction</a:t>
+            </a:r>
+            <a:endParaRPr lang="en-US" sz="2400" dirty="0"/>
+          </a:p>
+        </p:txBody>
+      </p:sp>
     </p:spTree>
     <p:extLst>
       <p:ext uri="{BB962C8B-B14F-4D97-AF65-F5344CB8AC3E}">
@@ -12217,6 +13150,45 @@
               <a:rPr lang="en-US" sz="2400" dirty="0"/>
               <a:t>discounting can be applied to – for example – bond pricing</a:t>
             </a:r>
+          </a:p>
+        </p:txBody>
+      </p:sp>
+      <p:sp>
+        <p:nvSpPr>
+          <p:cNvPr id="4" name="TextBox 3">
+            <a:extLst>
+              <a:ext uri="{FF2B5EF4-FFF2-40B4-BE49-F238E27FC236}">
+                <a16:creationId xmlns:a16="http://schemas.microsoft.com/office/drawing/2014/main" id="{A1C3809A-28E1-FBCC-C300-E3F41535D5D4}"/>
+              </a:ext>
+            </a:extLst>
+          </p:cNvPr>
+          <p:cNvSpPr txBox="1"/>
+          <p:nvPr/>
+        </p:nvSpPr>
+        <p:spPr>
+          <a:xfrm>
+            <a:off x="104543" y="151072"/>
+            <a:ext cx="2728597" cy="400110"/>
+          </a:xfrm>
+          <a:prstGeom prst="rect">
+            <a:avLst/>
+          </a:prstGeom>
+          <a:noFill/>
+        </p:spPr>
+        <p:txBody>
+          <a:bodyPr wrap="square" rtlCol="0">
+            <a:spAutoFit/>
+          </a:bodyPr>
+          <a:lstStyle/>
+          <a:p>
+            <a:r>
+              <a:rPr lang="en-US" sz="2000" dirty="0">
+                <a:latin typeface="Verdana" panose="020B0604030504040204" pitchFamily="34" charset="0"/>
+                <a:ea typeface="Verdana" panose="020B0604030504040204" pitchFamily="34" charset="0"/>
+              </a:rPr>
+              <a:t>Introduction</a:t>
+            </a:r>
+            <a:endParaRPr lang="en-US" sz="2400" dirty="0"/>
           </a:p>
         </p:txBody>
       </p:sp>

</xml_diff>

<commit_message>
re-inserted references to course and github repo
</commit_message>
<xml_diff>
--- a/MMS_2024_09_10/Farkas_2024_09_10.pptx
+++ b/MMS_2024_09_10/Farkas_2024_09_10.pptx
@@ -3761,8 +3761,8 @@
         </p:nvSpPr>
         <p:spPr>
           <a:xfrm>
-            <a:off x="105101" y="5018766"/>
-            <a:ext cx="3879397" cy="830997"/>
+            <a:off x="105101" y="4002330"/>
+            <a:ext cx="3879397" cy="1938992"/>
           </a:xfrm>
           <a:prstGeom prst="rect">
             <a:avLst/>
@@ -3793,6 +3793,52 @@
               <a:t>September 10, 2024</a:t>
             </a:r>
           </a:p>
+          <a:p>
+            <a:endParaRPr lang="en-US" sz="2400" dirty="0"/>
+          </a:p>
+          <a:p>
+            <a:r>
+              <a:rPr lang="en-US" sz="2400" dirty="0">
+                <a:latin typeface="Courier New" panose="02070309020205020404" pitchFamily="49" charset="0"/>
+                <a:cs typeface="Courier New" panose="02070309020205020404" pitchFamily="49" charset="0"/>
+              </a:rPr>
+              <a:t>BMETE15MF78</a:t>
+            </a:r>
+          </a:p>
+          <a:p>
+            <a:r>
+              <a:rPr lang="en-US" sz="2400" dirty="0">
+                <a:latin typeface="Courier New" panose="02070309020205020404" pitchFamily="49" charset="0"/>
+                <a:cs typeface="Courier New" panose="02070309020205020404" pitchFamily="49" charset="0"/>
+              </a:rPr>
+              <a:t>github.com/</a:t>
+            </a:r>
+            <a:r>
+              <a:rPr lang="en-US" sz="2400" dirty="0" err="1">
+                <a:latin typeface="Courier New" panose="02070309020205020404" pitchFamily="49" charset="0"/>
+                <a:cs typeface="Courier New" panose="02070309020205020404" pitchFamily="49" charset="0"/>
+              </a:rPr>
+              <a:t>fij</a:t>
+            </a:r>
+            <a:r>
+              <a:rPr lang="en-US" sz="2400" dirty="0">
+                <a:latin typeface="Courier New" panose="02070309020205020404" pitchFamily="49" charset="0"/>
+                <a:cs typeface="Courier New" panose="02070309020205020404" pitchFamily="49" charset="0"/>
+              </a:rPr>
+              <a:t>/</a:t>
+            </a:r>
+            <a:r>
+              <a:rPr lang="en-US" sz="2400" dirty="0" err="1">
+                <a:latin typeface="Courier New" panose="02070309020205020404" pitchFamily="49" charset="0"/>
+                <a:cs typeface="Courier New" panose="02070309020205020404" pitchFamily="49" charset="0"/>
+              </a:rPr>
+              <a:t>btup</a:t>
+            </a:r>
+            <a:endParaRPr lang="en-US" sz="2400" dirty="0">
+              <a:latin typeface="Courier New" panose="02070309020205020404" pitchFamily="49" charset="0"/>
+              <a:cs typeface="Courier New" panose="02070309020205020404" pitchFamily="49" charset="0"/>
+            </a:endParaRPr>
+          </a:p>
         </p:txBody>
       </p:sp>
       <p:sp>
@@ -3858,7 +3904,7 @@
         </p:blipFill>
         <p:spPr>
           <a:xfrm>
-            <a:off x="9774186" y="4833354"/>
+            <a:off x="9744206" y="4758404"/>
             <a:ext cx="1724469" cy="1016409"/>
           </a:xfrm>
           <a:prstGeom prst="rect">

</xml_diff>

<commit_message>
removed an unnecessary comment
</commit_message>
<xml_diff>
--- a/MMS_2024_09_10/Farkas_2024_09_10.pptx
+++ b/MMS_2024_09_10/Farkas_2024_09_10.pptx
@@ -406,7 +406,7 @@
           <a:p>
             <a:fld id="{0163D073-7F8B-4D43-A6FF-3B651CD8FEF9}" type="datetimeFigureOut">
               <a:rPr lang="en-US" smtClean="0"/>
-              <a:t>9/9/2024</a:t>
+              <a:t>9/10/2024</a:t>
             </a:fld>
             <a:endParaRPr lang="en-US"/>
           </a:p>
@@ -644,7 +644,7 @@
           <a:p>
             <a:fld id="{0163D073-7F8B-4D43-A6FF-3B651CD8FEF9}" type="datetimeFigureOut">
               <a:rPr lang="en-US" smtClean="0"/>
-              <a:t>9/9/2024</a:t>
+              <a:t>9/10/2024</a:t>
             </a:fld>
             <a:endParaRPr lang="en-US"/>
           </a:p>
@@ -882,7 +882,7 @@
           <a:p>
             <a:fld id="{0163D073-7F8B-4D43-A6FF-3B651CD8FEF9}" type="datetimeFigureOut">
               <a:rPr lang="en-US" smtClean="0"/>
-              <a:t>9/9/2024</a:t>
+              <a:t>9/10/2024</a:t>
             </a:fld>
             <a:endParaRPr lang="en-US"/>
           </a:p>
@@ -1187,7 +1187,7 @@
           <a:p>
             <a:fld id="{0163D073-7F8B-4D43-A6FF-3B651CD8FEF9}" type="datetimeFigureOut">
               <a:rPr lang="en-US" smtClean="0"/>
-              <a:t>9/9/2024</a:t>
+              <a:t>9/10/2024</a:t>
             </a:fld>
             <a:endParaRPr lang="en-US"/>
           </a:p>
@@ -1490,7 +1490,7 @@
           <a:p>
             <a:fld id="{0163D073-7F8B-4D43-A6FF-3B651CD8FEF9}" type="datetimeFigureOut">
               <a:rPr lang="en-US" smtClean="0"/>
-              <a:t>9/9/2024</a:t>
+              <a:t>9/10/2024</a:t>
             </a:fld>
             <a:endParaRPr lang="en-US"/>
           </a:p>
@@ -1941,7 +1941,7 @@
           <a:p>
             <a:fld id="{0163D073-7F8B-4D43-A6FF-3B651CD8FEF9}" type="datetimeFigureOut">
               <a:rPr lang="en-US" smtClean="0"/>
-              <a:t>9/9/2024</a:t>
+              <a:t>9/10/2024</a:t>
             </a:fld>
             <a:endParaRPr lang="en-US"/>
           </a:p>
@@ -2114,7 +2114,7 @@
           <a:p>
             <a:fld id="{0163D073-7F8B-4D43-A6FF-3B651CD8FEF9}" type="datetimeFigureOut">
               <a:rPr lang="en-US" smtClean="0"/>
-              <a:t>9/9/2024</a:t>
+              <a:t>9/10/2024</a:t>
             </a:fld>
             <a:endParaRPr lang="en-US"/>
           </a:p>
@@ -2251,7 +2251,7 @@
           <a:p>
             <a:fld id="{0163D073-7F8B-4D43-A6FF-3B651CD8FEF9}" type="datetimeFigureOut">
               <a:rPr lang="en-US" smtClean="0"/>
-              <a:t>9/9/2024</a:t>
+              <a:t>9/10/2024</a:t>
             </a:fld>
             <a:endParaRPr lang="en-US"/>
           </a:p>
@@ -2595,7 +2595,7 @@
           <a:p>
             <a:fld id="{0163D073-7F8B-4D43-A6FF-3B651CD8FEF9}" type="datetimeFigureOut">
               <a:rPr lang="en-US" smtClean="0"/>
-              <a:t>9/9/2024</a:t>
+              <a:t>9/10/2024</a:t>
             </a:fld>
             <a:endParaRPr lang="en-US"/>
           </a:p>
@@ -2916,7 +2916,7 @@
           <a:p>
             <a:fld id="{0163D073-7F8B-4D43-A6FF-3B651CD8FEF9}" type="datetimeFigureOut">
               <a:rPr lang="en-US" smtClean="0"/>
-              <a:t>9/9/2024</a:t>
+              <a:t>9/10/2024</a:t>
             </a:fld>
             <a:endParaRPr lang="en-US"/>
           </a:p>
@@ -12463,7 +12463,7 @@
         <p:spPr>
           <a:xfrm>
             <a:off x="1056076" y="2505306"/>
-            <a:ext cx="9450380" cy="2677656"/>
+            <a:ext cx="9450380" cy="1938992"/>
           </a:xfrm>
           <a:prstGeom prst="rect">
             <a:avLst/>
@@ -12496,17 +12496,13 @@
           <a:p>
             <a:r>
               <a:rPr lang="en-US" sz="2400" dirty="0"/>
-              <a:t>Normalization to sum of weights = 1 gives :   0.5 MSFT + 0.5 AAPL</a:t>
-            </a:r>
-          </a:p>
-          <a:p>
+              <a:t>Normalization to sum of weights = 1 gives :   0.5 MSFT + </a:t>
+            </a:r>
+            <a:r>
+              <a:rPr lang="en-US" sz="2400"/>
+              <a:t>0.5 AAPL</a:t>
+            </a:r>
             <a:endParaRPr lang="en-US" sz="2400" dirty="0"/>
-          </a:p>
-          <a:p>
-            <a:r>
-              <a:rPr lang="en-US" sz="2400" dirty="0"/>
-              <a:t>In this presentation :  only positive weights</a:t>
-            </a:r>
           </a:p>
         </p:txBody>
       </p:sp>

</xml_diff>